<commit_message>
consumer module formatting and more
</commit_message>
<xml_diff>
--- a/doc/source/_static/raw_figures.pptx
+++ b/doc/source/_static/raw_figures.pptx
@@ -5,11 +5,12 @@
     <p:sldMasterId id="2147483648" r:id="rId1"/>
   </p:sldMasterIdLst>
   <p:notesMasterIdLst>
-    <p:notesMasterId r:id="rId4"/>
+    <p:notesMasterId r:id="rId5"/>
   </p:notesMasterIdLst>
   <p:sldIdLst>
     <p:sldId id="257" r:id="rId2"/>
     <p:sldId id="258" r:id="rId3"/>
+    <p:sldId id="256" r:id="rId4"/>
   </p:sldIdLst>
   <p:sldSz cx="12192000" cy="6858000"/>
   <p:notesSz cx="6858000" cy="9144000"/>
@@ -116,6 +117,4588 @@
 </p:presentation>
 </file>
 
+<file path=ppt/diagrams/colors1.xml><?xml version="1.0" encoding="utf-8"?>
+<dgm:colorsDef xmlns:dgm="http://schemas.openxmlformats.org/drawingml/2006/diagram" xmlns:a="http://schemas.openxmlformats.org/drawingml/2006/main" uniqueId="urn:microsoft.com/office/officeart/2005/8/colors/accent1_2">
+  <dgm:title val=""/>
+  <dgm:desc val=""/>
+  <dgm:catLst>
+    <dgm:cat type="accent1" pri="11200"/>
+  </dgm:catLst>
+  <dgm:styleLbl name="node0">
+    <dgm:fillClrLst meth="repeat">
+      <a:schemeClr val="accent1"/>
+    </dgm:fillClrLst>
+    <dgm:linClrLst meth="repeat">
+      <a:schemeClr val="lt1"/>
+    </dgm:linClrLst>
+    <dgm:effectClrLst/>
+    <dgm:txLinClrLst/>
+    <dgm:txFillClrLst/>
+    <dgm:txEffectClrLst/>
+  </dgm:styleLbl>
+  <dgm:styleLbl name="alignNode1">
+    <dgm:fillClrLst meth="repeat">
+      <a:schemeClr val="accent1"/>
+    </dgm:fillClrLst>
+    <dgm:linClrLst meth="repeat">
+      <a:schemeClr val="accent1"/>
+    </dgm:linClrLst>
+    <dgm:effectClrLst/>
+    <dgm:txLinClrLst/>
+    <dgm:txFillClrLst/>
+    <dgm:txEffectClrLst/>
+  </dgm:styleLbl>
+  <dgm:styleLbl name="node1">
+    <dgm:fillClrLst meth="repeat">
+      <a:schemeClr val="accent1"/>
+    </dgm:fillClrLst>
+    <dgm:linClrLst meth="repeat">
+      <a:schemeClr val="lt1"/>
+    </dgm:linClrLst>
+    <dgm:effectClrLst/>
+    <dgm:txLinClrLst/>
+    <dgm:txFillClrLst/>
+    <dgm:txEffectClrLst/>
+  </dgm:styleLbl>
+  <dgm:styleLbl name="lnNode1">
+    <dgm:fillClrLst meth="repeat">
+      <a:schemeClr val="accent1"/>
+    </dgm:fillClrLst>
+    <dgm:linClrLst meth="repeat">
+      <a:schemeClr val="lt1"/>
+    </dgm:linClrLst>
+    <dgm:effectClrLst/>
+    <dgm:txLinClrLst/>
+    <dgm:txFillClrLst/>
+    <dgm:txEffectClrLst/>
+  </dgm:styleLbl>
+  <dgm:styleLbl name="vennNode1">
+    <dgm:fillClrLst meth="repeat">
+      <a:schemeClr val="accent1">
+        <a:alpha val="50000"/>
+      </a:schemeClr>
+    </dgm:fillClrLst>
+    <dgm:linClrLst meth="repeat">
+      <a:schemeClr val="lt1"/>
+    </dgm:linClrLst>
+    <dgm:effectClrLst/>
+    <dgm:txLinClrLst/>
+    <dgm:txFillClrLst/>
+    <dgm:txEffectClrLst/>
+  </dgm:styleLbl>
+  <dgm:styleLbl name="node2">
+    <dgm:fillClrLst meth="repeat">
+      <a:schemeClr val="accent1"/>
+    </dgm:fillClrLst>
+    <dgm:linClrLst meth="repeat">
+      <a:schemeClr val="lt1"/>
+    </dgm:linClrLst>
+    <dgm:effectClrLst/>
+    <dgm:txLinClrLst/>
+    <dgm:txFillClrLst/>
+    <dgm:txEffectClrLst/>
+  </dgm:styleLbl>
+  <dgm:styleLbl name="node3">
+    <dgm:fillClrLst meth="repeat">
+      <a:schemeClr val="accent1"/>
+    </dgm:fillClrLst>
+    <dgm:linClrLst meth="repeat">
+      <a:schemeClr val="lt1"/>
+    </dgm:linClrLst>
+    <dgm:effectClrLst/>
+    <dgm:txLinClrLst/>
+    <dgm:txFillClrLst/>
+    <dgm:txEffectClrLst/>
+  </dgm:styleLbl>
+  <dgm:styleLbl name="node4">
+    <dgm:fillClrLst meth="repeat">
+      <a:schemeClr val="accent1"/>
+    </dgm:fillClrLst>
+    <dgm:linClrLst meth="repeat">
+      <a:schemeClr val="lt1"/>
+    </dgm:linClrLst>
+    <dgm:effectClrLst/>
+    <dgm:txLinClrLst/>
+    <dgm:txFillClrLst/>
+    <dgm:txEffectClrLst/>
+  </dgm:styleLbl>
+  <dgm:styleLbl name="fgImgPlace1">
+    <dgm:fillClrLst meth="repeat">
+      <a:schemeClr val="accent1">
+        <a:tint val="50000"/>
+      </a:schemeClr>
+    </dgm:fillClrLst>
+    <dgm:linClrLst meth="repeat">
+      <a:schemeClr val="lt1"/>
+    </dgm:linClrLst>
+    <dgm:effectClrLst/>
+    <dgm:txLinClrLst/>
+    <dgm:txFillClrLst meth="repeat">
+      <a:schemeClr val="lt1"/>
+    </dgm:txFillClrLst>
+    <dgm:txEffectClrLst/>
+  </dgm:styleLbl>
+  <dgm:styleLbl name="alignImgPlace1">
+    <dgm:fillClrLst meth="repeat">
+      <a:schemeClr val="accent1">
+        <a:tint val="50000"/>
+      </a:schemeClr>
+    </dgm:fillClrLst>
+    <dgm:linClrLst meth="repeat">
+      <a:schemeClr val="lt1"/>
+    </dgm:linClrLst>
+    <dgm:effectClrLst/>
+    <dgm:txLinClrLst/>
+    <dgm:txFillClrLst meth="repeat">
+      <a:schemeClr val="lt1"/>
+    </dgm:txFillClrLst>
+    <dgm:txEffectClrLst/>
+  </dgm:styleLbl>
+  <dgm:styleLbl name="bgImgPlace1">
+    <dgm:fillClrLst meth="repeat">
+      <a:schemeClr val="accent1">
+        <a:tint val="50000"/>
+      </a:schemeClr>
+    </dgm:fillClrLst>
+    <dgm:linClrLst meth="repeat">
+      <a:schemeClr val="lt1"/>
+    </dgm:linClrLst>
+    <dgm:effectClrLst/>
+    <dgm:txLinClrLst/>
+    <dgm:txFillClrLst meth="repeat">
+      <a:schemeClr val="lt1"/>
+    </dgm:txFillClrLst>
+    <dgm:txEffectClrLst/>
+  </dgm:styleLbl>
+  <dgm:styleLbl name="sibTrans2D1">
+    <dgm:fillClrLst meth="repeat">
+      <a:schemeClr val="accent1">
+        <a:tint val="60000"/>
+      </a:schemeClr>
+    </dgm:fillClrLst>
+    <dgm:linClrLst meth="repeat">
+      <a:schemeClr val="accent1">
+        <a:tint val="60000"/>
+      </a:schemeClr>
+    </dgm:linClrLst>
+    <dgm:effectClrLst/>
+    <dgm:txLinClrLst/>
+    <dgm:txFillClrLst/>
+    <dgm:txEffectClrLst/>
+  </dgm:styleLbl>
+  <dgm:styleLbl name="fgSibTrans2D1">
+    <dgm:fillClrLst meth="repeat">
+      <a:schemeClr val="accent1">
+        <a:tint val="60000"/>
+      </a:schemeClr>
+    </dgm:fillClrLst>
+    <dgm:linClrLst meth="repeat">
+      <a:schemeClr val="accent1">
+        <a:tint val="60000"/>
+      </a:schemeClr>
+    </dgm:linClrLst>
+    <dgm:effectClrLst/>
+    <dgm:txLinClrLst/>
+    <dgm:txFillClrLst/>
+    <dgm:txEffectClrLst/>
+  </dgm:styleLbl>
+  <dgm:styleLbl name="bgSibTrans2D1">
+    <dgm:fillClrLst meth="repeat">
+      <a:schemeClr val="accent1">
+        <a:tint val="60000"/>
+      </a:schemeClr>
+    </dgm:fillClrLst>
+    <dgm:linClrLst meth="repeat">
+      <a:schemeClr val="accent1">
+        <a:tint val="60000"/>
+      </a:schemeClr>
+    </dgm:linClrLst>
+    <dgm:effectClrLst/>
+    <dgm:txLinClrLst/>
+    <dgm:txFillClrLst/>
+    <dgm:txEffectClrLst/>
+  </dgm:styleLbl>
+  <dgm:styleLbl name="sibTrans1D1">
+    <dgm:fillClrLst meth="repeat">
+      <a:schemeClr val="accent1"/>
+    </dgm:fillClrLst>
+    <dgm:linClrLst meth="repeat">
+      <a:schemeClr val="accent1"/>
+    </dgm:linClrLst>
+    <dgm:effectClrLst/>
+    <dgm:txLinClrLst/>
+    <dgm:txFillClrLst meth="repeat">
+      <a:schemeClr val="tx1"/>
+    </dgm:txFillClrLst>
+    <dgm:txEffectClrLst/>
+  </dgm:styleLbl>
+  <dgm:styleLbl name="callout">
+    <dgm:fillClrLst meth="repeat">
+      <a:schemeClr val="accent1"/>
+    </dgm:fillClrLst>
+    <dgm:linClrLst meth="repeat">
+      <a:schemeClr val="accent1">
+        <a:tint val="50000"/>
+      </a:schemeClr>
+    </dgm:linClrLst>
+    <dgm:effectClrLst/>
+    <dgm:txLinClrLst/>
+    <dgm:txFillClrLst meth="repeat">
+      <a:schemeClr val="tx1"/>
+    </dgm:txFillClrLst>
+    <dgm:txEffectClrLst/>
+  </dgm:styleLbl>
+  <dgm:styleLbl name="asst0">
+    <dgm:fillClrLst meth="repeat">
+      <a:schemeClr val="accent1"/>
+    </dgm:fillClrLst>
+    <dgm:linClrLst meth="repeat">
+      <a:schemeClr val="lt1"/>
+    </dgm:linClrLst>
+    <dgm:effectClrLst/>
+    <dgm:txLinClrLst/>
+    <dgm:txFillClrLst/>
+    <dgm:txEffectClrLst/>
+  </dgm:styleLbl>
+  <dgm:styleLbl name="asst1">
+    <dgm:fillClrLst meth="repeat">
+      <a:schemeClr val="accent1"/>
+    </dgm:fillClrLst>
+    <dgm:linClrLst meth="repeat">
+      <a:schemeClr val="lt1"/>
+    </dgm:linClrLst>
+    <dgm:effectClrLst/>
+    <dgm:txLinClrLst/>
+    <dgm:txFillClrLst/>
+    <dgm:txEffectClrLst/>
+  </dgm:styleLbl>
+  <dgm:styleLbl name="asst2">
+    <dgm:fillClrLst meth="repeat">
+      <a:schemeClr val="accent1"/>
+    </dgm:fillClrLst>
+    <dgm:linClrLst meth="repeat">
+      <a:schemeClr val="lt1"/>
+    </dgm:linClrLst>
+    <dgm:effectClrLst/>
+    <dgm:txLinClrLst/>
+    <dgm:txFillClrLst/>
+    <dgm:txEffectClrLst/>
+  </dgm:styleLbl>
+  <dgm:styleLbl name="asst3">
+    <dgm:fillClrLst meth="repeat">
+      <a:schemeClr val="accent1"/>
+    </dgm:fillClrLst>
+    <dgm:linClrLst meth="repeat">
+      <a:schemeClr val="lt1"/>
+    </dgm:linClrLst>
+    <dgm:effectClrLst/>
+    <dgm:txLinClrLst/>
+    <dgm:txFillClrLst/>
+    <dgm:txEffectClrLst/>
+  </dgm:styleLbl>
+  <dgm:styleLbl name="asst4">
+    <dgm:fillClrLst meth="repeat">
+      <a:schemeClr val="accent1"/>
+    </dgm:fillClrLst>
+    <dgm:linClrLst meth="repeat">
+      <a:schemeClr val="lt1"/>
+    </dgm:linClrLst>
+    <dgm:effectClrLst/>
+    <dgm:txLinClrLst/>
+    <dgm:txFillClrLst/>
+    <dgm:txEffectClrLst/>
+  </dgm:styleLbl>
+  <dgm:styleLbl name="parChTrans2D1">
+    <dgm:fillClrLst meth="repeat">
+      <a:schemeClr val="accent1">
+        <a:tint val="60000"/>
+      </a:schemeClr>
+    </dgm:fillClrLst>
+    <dgm:linClrLst meth="repeat">
+      <a:schemeClr val="accent1">
+        <a:tint val="60000"/>
+      </a:schemeClr>
+    </dgm:linClrLst>
+    <dgm:effectClrLst/>
+    <dgm:txLinClrLst/>
+    <dgm:txFillClrLst meth="repeat">
+      <a:schemeClr val="lt1"/>
+    </dgm:txFillClrLst>
+    <dgm:txEffectClrLst/>
+  </dgm:styleLbl>
+  <dgm:styleLbl name="parChTrans2D2">
+    <dgm:fillClrLst meth="repeat">
+      <a:schemeClr val="accent1"/>
+    </dgm:fillClrLst>
+    <dgm:linClrLst meth="repeat">
+      <a:schemeClr val="accent1"/>
+    </dgm:linClrLst>
+    <dgm:effectClrLst/>
+    <dgm:txLinClrLst/>
+    <dgm:txFillClrLst meth="repeat">
+      <a:schemeClr val="lt1"/>
+    </dgm:txFillClrLst>
+    <dgm:txEffectClrLst/>
+  </dgm:styleLbl>
+  <dgm:styleLbl name="parChTrans2D3">
+    <dgm:fillClrLst meth="repeat">
+      <a:schemeClr val="accent1"/>
+    </dgm:fillClrLst>
+    <dgm:linClrLst meth="repeat">
+      <a:schemeClr val="accent1"/>
+    </dgm:linClrLst>
+    <dgm:effectClrLst/>
+    <dgm:txLinClrLst/>
+    <dgm:txFillClrLst meth="repeat">
+      <a:schemeClr val="lt1"/>
+    </dgm:txFillClrLst>
+    <dgm:txEffectClrLst/>
+  </dgm:styleLbl>
+  <dgm:styleLbl name="parChTrans2D4">
+    <dgm:fillClrLst meth="repeat">
+      <a:schemeClr val="accent1"/>
+    </dgm:fillClrLst>
+    <dgm:linClrLst meth="repeat">
+      <a:schemeClr val="accent1"/>
+    </dgm:linClrLst>
+    <dgm:effectClrLst/>
+    <dgm:txLinClrLst/>
+    <dgm:txFillClrLst meth="repeat">
+      <a:schemeClr val="lt1"/>
+    </dgm:txFillClrLst>
+    <dgm:txEffectClrLst/>
+  </dgm:styleLbl>
+  <dgm:styleLbl name="parChTrans1D1">
+    <dgm:fillClrLst meth="repeat">
+      <a:schemeClr val="accent1"/>
+    </dgm:fillClrLst>
+    <dgm:linClrLst meth="repeat">
+      <a:schemeClr val="accent1">
+        <a:shade val="60000"/>
+      </a:schemeClr>
+    </dgm:linClrLst>
+    <dgm:effectClrLst/>
+    <dgm:txLinClrLst/>
+    <dgm:txFillClrLst meth="repeat">
+      <a:schemeClr val="tx1"/>
+    </dgm:txFillClrLst>
+    <dgm:txEffectClrLst/>
+  </dgm:styleLbl>
+  <dgm:styleLbl name="parChTrans1D2">
+    <dgm:fillClrLst meth="repeat">
+      <a:schemeClr val="accent1"/>
+    </dgm:fillClrLst>
+    <dgm:linClrLst meth="repeat">
+      <a:schemeClr val="accent1">
+        <a:shade val="60000"/>
+      </a:schemeClr>
+    </dgm:linClrLst>
+    <dgm:effectClrLst/>
+    <dgm:txLinClrLst/>
+    <dgm:txFillClrLst meth="repeat">
+      <a:schemeClr val="tx1"/>
+    </dgm:txFillClrLst>
+    <dgm:txEffectClrLst/>
+  </dgm:styleLbl>
+  <dgm:styleLbl name="parChTrans1D3">
+    <dgm:fillClrLst meth="repeat">
+      <a:schemeClr val="accent1"/>
+    </dgm:fillClrLst>
+    <dgm:linClrLst meth="repeat">
+      <a:schemeClr val="accent1">
+        <a:shade val="80000"/>
+      </a:schemeClr>
+    </dgm:linClrLst>
+    <dgm:effectClrLst/>
+    <dgm:txLinClrLst/>
+    <dgm:txFillClrLst meth="repeat">
+      <a:schemeClr val="tx1"/>
+    </dgm:txFillClrLst>
+    <dgm:txEffectClrLst/>
+  </dgm:styleLbl>
+  <dgm:styleLbl name="parChTrans1D4">
+    <dgm:fillClrLst meth="repeat">
+      <a:schemeClr val="accent1"/>
+    </dgm:fillClrLst>
+    <dgm:linClrLst meth="repeat">
+      <a:schemeClr val="accent1">
+        <a:shade val="80000"/>
+      </a:schemeClr>
+    </dgm:linClrLst>
+    <dgm:effectClrLst/>
+    <dgm:txLinClrLst/>
+    <dgm:txFillClrLst meth="repeat">
+      <a:schemeClr val="tx1"/>
+    </dgm:txFillClrLst>
+    <dgm:txEffectClrLst/>
+  </dgm:styleLbl>
+  <dgm:styleLbl name="fgAcc1">
+    <dgm:fillClrLst meth="repeat">
+      <a:schemeClr val="lt1">
+        <a:alpha val="90000"/>
+      </a:schemeClr>
+    </dgm:fillClrLst>
+    <dgm:linClrLst meth="repeat">
+      <a:schemeClr val="accent1"/>
+    </dgm:linClrLst>
+    <dgm:effectClrLst/>
+    <dgm:txLinClrLst/>
+    <dgm:txFillClrLst meth="repeat">
+      <a:schemeClr val="dk1"/>
+    </dgm:txFillClrLst>
+    <dgm:txEffectClrLst/>
+  </dgm:styleLbl>
+  <dgm:styleLbl name="conFgAcc1">
+    <dgm:fillClrLst meth="repeat">
+      <a:schemeClr val="lt1">
+        <a:alpha val="90000"/>
+      </a:schemeClr>
+    </dgm:fillClrLst>
+    <dgm:linClrLst meth="repeat">
+      <a:schemeClr val="accent1"/>
+    </dgm:linClrLst>
+    <dgm:effectClrLst/>
+    <dgm:txLinClrLst/>
+    <dgm:txFillClrLst meth="repeat">
+      <a:schemeClr val="dk1"/>
+    </dgm:txFillClrLst>
+    <dgm:txEffectClrLst/>
+  </dgm:styleLbl>
+  <dgm:styleLbl name="alignAcc1">
+    <dgm:fillClrLst meth="repeat">
+      <a:schemeClr val="lt1">
+        <a:alpha val="90000"/>
+      </a:schemeClr>
+    </dgm:fillClrLst>
+    <dgm:linClrLst meth="repeat">
+      <a:schemeClr val="accent1"/>
+    </dgm:linClrLst>
+    <dgm:effectClrLst/>
+    <dgm:txLinClrLst/>
+    <dgm:txFillClrLst meth="repeat">
+      <a:schemeClr val="dk1"/>
+    </dgm:txFillClrLst>
+    <dgm:txEffectClrLst/>
+  </dgm:styleLbl>
+  <dgm:styleLbl name="trAlignAcc1">
+    <dgm:fillClrLst meth="repeat">
+      <a:schemeClr val="lt1">
+        <a:alpha val="40000"/>
+      </a:schemeClr>
+    </dgm:fillClrLst>
+    <dgm:linClrLst meth="repeat">
+      <a:schemeClr val="accent1"/>
+    </dgm:linClrLst>
+    <dgm:effectClrLst/>
+    <dgm:txLinClrLst/>
+    <dgm:txFillClrLst meth="repeat">
+      <a:schemeClr val="dk1"/>
+    </dgm:txFillClrLst>
+    <dgm:txEffectClrLst/>
+  </dgm:styleLbl>
+  <dgm:styleLbl name="bgAcc1">
+    <dgm:fillClrLst meth="repeat">
+      <a:schemeClr val="lt1">
+        <a:alpha val="90000"/>
+      </a:schemeClr>
+    </dgm:fillClrLst>
+    <dgm:linClrLst meth="repeat">
+      <a:schemeClr val="accent1"/>
+    </dgm:linClrLst>
+    <dgm:effectClrLst/>
+    <dgm:txLinClrLst/>
+    <dgm:txFillClrLst meth="repeat">
+      <a:schemeClr val="dk1"/>
+    </dgm:txFillClrLst>
+    <dgm:txEffectClrLst/>
+  </dgm:styleLbl>
+  <dgm:styleLbl name="solidFgAcc1">
+    <dgm:fillClrLst meth="repeat">
+      <a:schemeClr val="lt1"/>
+    </dgm:fillClrLst>
+    <dgm:linClrLst meth="repeat">
+      <a:schemeClr val="accent1"/>
+    </dgm:linClrLst>
+    <dgm:effectClrLst/>
+    <dgm:txLinClrLst/>
+    <dgm:txFillClrLst meth="repeat">
+      <a:schemeClr val="dk1"/>
+    </dgm:txFillClrLst>
+    <dgm:txEffectClrLst/>
+  </dgm:styleLbl>
+  <dgm:styleLbl name="solidAlignAcc1">
+    <dgm:fillClrLst meth="repeat">
+      <a:schemeClr val="lt1"/>
+    </dgm:fillClrLst>
+    <dgm:linClrLst meth="repeat">
+      <a:schemeClr val="accent1"/>
+    </dgm:linClrLst>
+    <dgm:effectClrLst/>
+    <dgm:txLinClrLst/>
+    <dgm:txFillClrLst meth="repeat">
+      <a:schemeClr val="dk1"/>
+    </dgm:txFillClrLst>
+    <dgm:txEffectClrLst/>
+  </dgm:styleLbl>
+  <dgm:styleLbl name="solidBgAcc1">
+    <dgm:fillClrLst meth="repeat">
+      <a:schemeClr val="lt1"/>
+    </dgm:fillClrLst>
+    <dgm:linClrLst meth="repeat">
+      <a:schemeClr val="accent1"/>
+    </dgm:linClrLst>
+    <dgm:effectClrLst/>
+    <dgm:txLinClrLst/>
+    <dgm:txFillClrLst meth="repeat">
+      <a:schemeClr val="dk1"/>
+    </dgm:txFillClrLst>
+    <dgm:txEffectClrLst/>
+  </dgm:styleLbl>
+  <dgm:styleLbl name="fgAccFollowNode1">
+    <dgm:fillClrLst meth="repeat">
+      <a:schemeClr val="accent1">
+        <a:alpha val="90000"/>
+        <a:tint val="40000"/>
+      </a:schemeClr>
+    </dgm:fillClrLst>
+    <dgm:linClrLst meth="repeat">
+      <a:schemeClr val="accent1">
+        <a:alpha val="90000"/>
+        <a:tint val="40000"/>
+      </a:schemeClr>
+    </dgm:linClrLst>
+    <dgm:effectClrLst/>
+    <dgm:txLinClrLst/>
+    <dgm:txFillClrLst meth="repeat">
+      <a:schemeClr val="dk1"/>
+    </dgm:txFillClrLst>
+    <dgm:txEffectClrLst/>
+  </dgm:styleLbl>
+  <dgm:styleLbl name="alignAccFollowNode1">
+    <dgm:fillClrLst meth="repeat">
+      <a:schemeClr val="accent1">
+        <a:alpha val="90000"/>
+        <a:tint val="40000"/>
+      </a:schemeClr>
+    </dgm:fillClrLst>
+    <dgm:linClrLst meth="repeat">
+      <a:schemeClr val="accent1">
+        <a:alpha val="90000"/>
+        <a:tint val="40000"/>
+      </a:schemeClr>
+    </dgm:linClrLst>
+    <dgm:effectClrLst/>
+    <dgm:txLinClrLst/>
+    <dgm:txFillClrLst meth="repeat">
+      <a:schemeClr val="dk1"/>
+    </dgm:txFillClrLst>
+    <dgm:txEffectClrLst/>
+  </dgm:styleLbl>
+  <dgm:styleLbl name="bgAccFollowNode1">
+    <dgm:fillClrLst meth="repeat">
+      <a:schemeClr val="accent1">
+        <a:alpha val="90000"/>
+        <a:tint val="40000"/>
+      </a:schemeClr>
+    </dgm:fillClrLst>
+    <dgm:linClrLst meth="repeat">
+      <a:schemeClr val="accent1">
+        <a:alpha val="90000"/>
+        <a:tint val="40000"/>
+      </a:schemeClr>
+    </dgm:linClrLst>
+    <dgm:effectClrLst/>
+    <dgm:txLinClrLst/>
+    <dgm:txFillClrLst meth="repeat">
+      <a:schemeClr val="dk1"/>
+    </dgm:txFillClrLst>
+    <dgm:txEffectClrLst/>
+  </dgm:styleLbl>
+  <dgm:styleLbl name="fgAcc0">
+    <dgm:fillClrLst meth="repeat">
+      <a:schemeClr val="lt1">
+        <a:alpha val="90000"/>
+      </a:schemeClr>
+    </dgm:fillClrLst>
+    <dgm:linClrLst meth="repeat">
+      <a:schemeClr val="accent1"/>
+    </dgm:linClrLst>
+    <dgm:effectClrLst/>
+    <dgm:txLinClrLst/>
+    <dgm:txFillClrLst meth="repeat">
+      <a:schemeClr val="dk1"/>
+    </dgm:txFillClrLst>
+    <dgm:txEffectClrLst/>
+  </dgm:styleLbl>
+  <dgm:styleLbl name="fgAcc2">
+    <dgm:fillClrLst meth="repeat">
+      <a:schemeClr val="lt1">
+        <a:alpha val="90000"/>
+      </a:schemeClr>
+    </dgm:fillClrLst>
+    <dgm:linClrLst meth="repeat">
+      <a:schemeClr val="accent1"/>
+    </dgm:linClrLst>
+    <dgm:effectClrLst/>
+    <dgm:txLinClrLst/>
+    <dgm:txFillClrLst meth="repeat">
+      <a:schemeClr val="dk1"/>
+    </dgm:txFillClrLst>
+    <dgm:txEffectClrLst/>
+  </dgm:styleLbl>
+  <dgm:styleLbl name="fgAcc3">
+    <dgm:fillClrLst meth="repeat">
+      <a:schemeClr val="lt1">
+        <a:alpha val="90000"/>
+      </a:schemeClr>
+    </dgm:fillClrLst>
+    <dgm:linClrLst meth="repeat">
+      <a:schemeClr val="accent1"/>
+    </dgm:linClrLst>
+    <dgm:effectClrLst/>
+    <dgm:txLinClrLst/>
+    <dgm:txFillClrLst meth="repeat">
+      <a:schemeClr val="dk1"/>
+    </dgm:txFillClrLst>
+    <dgm:txEffectClrLst/>
+  </dgm:styleLbl>
+  <dgm:styleLbl name="fgAcc4">
+    <dgm:fillClrLst meth="repeat">
+      <a:schemeClr val="lt1">
+        <a:alpha val="90000"/>
+      </a:schemeClr>
+    </dgm:fillClrLst>
+    <dgm:linClrLst meth="repeat">
+      <a:schemeClr val="accent1"/>
+    </dgm:linClrLst>
+    <dgm:effectClrLst/>
+    <dgm:txLinClrLst/>
+    <dgm:txFillClrLst meth="repeat">
+      <a:schemeClr val="dk1"/>
+    </dgm:txFillClrLst>
+    <dgm:txEffectClrLst/>
+  </dgm:styleLbl>
+  <dgm:styleLbl name="bgShp">
+    <dgm:fillClrLst meth="repeat">
+      <a:schemeClr val="accent1">
+        <a:tint val="40000"/>
+      </a:schemeClr>
+    </dgm:fillClrLst>
+    <dgm:linClrLst meth="repeat">
+      <a:schemeClr val="accent1"/>
+    </dgm:linClrLst>
+    <dgm:effectClrLst/>
+    <dgm:txLinClrLst/>
+    <dgm:txFillClrLst meth="repeat">
+      <a:schemeClr val="dk1"/>
+    </dgm:txFillClrLst>
+    <dgm:txEffectClrLst/>
+  </dgm:styleLbl>
+  <dgm:styleLbl name="dkBgShp">
+    <dgm:fillClrLst meth="repeat">
+      <a:schemeClr val="accent1">
+        <a:shade val="80000"/>
+      </a:schemeClr>
+    </dgm:fillClrLst>
+    <dgm:linClrLst meth="repeat">
+      <a:schemeClr val="accent1"/>
+    </dgm:linClrLst>
+    <dgm:effectClrLst/>
+    <dgm:txLinClrLst/>
+    <dgm:txFillClrLst meth="repeat">
+      <a:schemeClr val="lt1"/>
+    </dgm:txFillClrLst>
+    <dgm:txEffectClrLst/>
+  </dgm:styleLbl>
+  <dgm:styleLbl name="trBgShp">
+    <dgm:fillClrLst meth="repeat">
+      <a:schemeClr val="accent1">
+        <a:tint val="50000"/>
+        <a:alpha val="40000"/>
+      </a:schemeClr>
+    </dgm:fillClrLst>
+    <dgm:linClrLst meth="repeat">
+      <a:schemeClr val="accent1"/>
+    </dgm:linClrLst>
+    <dgm:effectClrLst/>
+    <dgm:txLinClrLst/>
+    <dgm:txFillClrLst meth="repeat">
+      <a:schemeClr val="lt1"/>
+    </dgm:txFillClrLst>
+    <dgm:txEffectClrLst/>
+  </dgm:styleLbl>
+  <dgm:styleLbl name="fgShp">
+    <dgm:fillClrLst meth="repeat">
+      <a:schemeClr val="accent1">
+        <a:tint val="60000"/>
+      </a:schemeClr>
+    </dgm:fillClrLst>
+    <dgm:linClrLst meth="repeat">
+      <a:schemeClr val="lt1"/>
+    </dgm:linClrLst>
+    <dgm:effectClrLst/>
+    <dgm:txLinClrLst/>
+    <dgm:txFillClrLst meth="repeat">
+      <a:schemeClr val="dk1"/>
+    </dgm:txFillClrLst>
+    <dgm:txEffectClrLst/>
+  </dgm:styleLbl>
+  <dgm:styleLbl name="revTx">
+    <dgm:fillClrLst meth="repeat">
+      <a:schemeClr val="lt1">
+        <a:alpha val="0"/>
+      </a:schemeClr>
+    </dgm:fillClrLst>
+    <dgm:linClrLst meth="repeat">
+      <a:schemeClr val="dk1">
+        <a:alpha val="0"/>
+      </a:schemeClr>
+    </dgm:linClrLst>
+    <dgm:effectClrLst/>
+    <dgm:txLinClrLst/>
+    <dgm:txFillClrLst meth="repeat">
+      <a:schemeClr val="tx1"/>
+    </dgm:txFillClrLst>
+    <dgm:txEffectClrLst/>
+  </dgm:styleLbl>
+</dgm:colorsDef>
+</file>
+
+<file path=ppt/diagrams/data1.xml><?xml version="1.0" encoding="utf-8"?>
+<dgm:dataModel xmlns:dgm="http://schemas.openxmlformats.org/drawingml/2006/diagram" xmlns:a="http://schemas.openxmlformats.org/drawingml/2006/main">
+  <dgm:ptLst>
+    <dgm:pt modelId="{CCFB450C-051B-4339-AE40-D49F56C101ED}" type="doc">
+      <dgm:prSet loTypeId="urn:microsoft.com/office/officeart/2005/8/layout/orgChart1" loCatId="hierarchy" qsTypeId="urn:microsoft.com/office/officeart/2005/8/quickstyle/simple1" qsCatId="simple" csTypeId="urn:microsoft.com/office/officeart/2005/8/colors/accent1_2" csCatId="accent1" phldr="1"/>
+      <dgm:spPr/>
+      <dgm:t>
+        <a:bodyPr/>
+        <a:lstStyle/>
+        <a:p>
+          <a:endParaRPr lang="en-US"/>
+        </a:p>
+      </dgm:t>
+    </dgm:pt>
+    <dgm:pt modelId="{B14CE9BA-7259-40E8-A17E-E5076A1EE50A}">
+      <dgm:prSet phldrT="[Text]" custT="1"/>
+      <dgm:spPr>
+        <a:solidFill>
+          <a:schemeClr val="accent2"/>
+        </a:solidFill>
+        <a:ln>
+          <a:solidFill>
+            <a:schemeClr val="tx1"/>
+          </a:solidFill>
+        </a:ln>
+      </dgm:spPr>
+      <dgm:t>
+        <a:bodyPr/>
+        <a:lstStyle/>
+        <a:p>
+          <a:r>
+            <a:rPr lang="en-US" sz="2000" dirty="0"/>
+            <a:t>All Vehicles</a:t>
+          </a:r>
+        </a:p>
+      </dgm:t>
+    </dgm:pt>
+    <dgm:pt modelId="{38C41944-ECD7-4BA7-B79B-5FF112A91DA4}" type="parTrans" cxnId="{D5DAD2BF-32D3-4F6B-B266-73E70C4657E6}">
+      <dgm:prSet/>
+      <dgm:spPr/>
+      <dgm:t>
+        <a:bodyPr/>
+        <a:lstStyle/>
+        <a:p>
+          <a:endParaRPr lang="en-US" sz="2000"/>
+        </a:p>
+      </dgm:t>
+    </dgm:pt>
+    <dgm:pt modelId="{3B739074-B445-4D95-B479-132CFDCAD671}" type="sibTrans" cxnId="{D5DAD2BF-32D3-4F6B-B266-73E70C4657E6}">
+      <dgm:prSet/>
+      <dgm:spPr/>
+      <dgm:t>
+        <a:bodyPr/>
+        <a:lstStyle/>
+        <a:p>
+          <a:endParaRPr lang="en-US" sz="2000"/>
+        </a:p>
+      </dgm:t>
+    </dgm:pt>
+    <dgm:pt modelId="{7996F403-BCCF-4C66-8F04-5B36990E4701}">
+      <dgm:prSet phldrT="[Text]" custT="1"/>
+      <dgm:spPr>
+        <a:solidFill>
+          <a:schemeClr val="accent2"/>
+        </a:solidFill>
+        <a:ln>
+          <a:solidFill>
+            <a:schemeClr val="tx1"/>
+          </a:solidFill>
+        </a:ln>
+      </dgm:spPr>
+      <dgm:t>
+        <a:bodyPr/>
+        <a:lstStyle/>
+        <a:p>
+          <a:r>
+            <a:rPr lang="en-US" sz="2000" dirty="0"/>
+            <a:t>Hauling Vehicles</a:t>
+          </a:r>
+        </a:p>
+      </dgm:t>
+    </dgm:pt>
+    <dgm:pt modelId="{9BDB4BA7-F7CA-4951-9B8B-A8A47154C73A}" type="parTrans" cxnId="{188F83FE-AEEF-4287-9585-AC90F2C8A46B}">
+      <dgm:prSet>
+        <dgm:style>
+          <a:lnRef idx="1">
+            <a:schemeClr val="accent1"/>
+          </a:lnRef>
+          <a:fillRef idx="0">
+            <a:schemeClr val="accent1"/>
+          </a:fillRef>
+          <a:effectRef idx="0">
+            <a:schemeClr val="accent1"/>
+          </a:effectRef>
+          <a:fontRef idx="minor">
+            <a:schemeClr val="tx1"/>
+          </a:fontRef>
+        </dgm:style>
+      </dgm:prSet>
+      <dgm:spPr>
+        <a:ln w="19050">
+          <a:headEnd type="none" w="med" len="med"/>
+          <a:tailEnd type="triangle" w="med" len="med"/>
+        </a:ln>
+      </dgm:spPr>
+      <dgm:t>
+        <a:bodyPr/>
+        <a:lstStyle/>
+        <a:p>
+          <a:endParaRPr lang="en-US" sz="2000"/>
+        </a:p>
+      </dgm:t>
+    </dgm:pt>
+    <dgm:pt modelId="{4C407750-66C1-460F-B522-D130C1678E8F}" type="sibTrans" cxnId="{188F83FE-AEEF-4287-9585-AC90F2C8A46B}">
+      <dgm:prSet/>
+      <dgm:spPr/>
+      <dgm:t>
+        <a:bodyPr/>
+        <a:lstStyle/>
+        <a:p>
+          <a:endParaRPr lang="en-US" sz="2000"/>
+        </a:p>
+      </dgm:t>
+    </dgm:pt>
+    <dgm:pt modelId="{F00117E2-A138-450C-93A9-266090B1B098}">
+      <dgm:prSet phldrT="[Text]" custT="1"/>
+      <dgm:spPr>
+        <a:solidFill>
+          <a:schemeClr val="accent2"/>
+        </a:solidFill>
+        <a:ln>
+          <a:solidFill>
+            <a:schemeClr val="tx1"/>
+          </a:solidFill>
+        </a:ln>
+      </dgm:spPr>
+      <dgm:t>
+        <a:bodyPr/>
+        <a:lstStyle/>
+        <a:p>
+          <a:r>
+            <a:rPr lang="en-US" sz="2000" dirty="0" err="1"/>
+            <a:t>Nonhauling</a:t>
+          </a:r>
+          <a:r>
+            <a:rPr lang="en-US" sz="2000" dirty="0"/>
+            <a:t> Vehicles</a:t>
+          </a:r>
+        </a:p>
+      </dgm:t>
+    </dgm:pt>
+    <dgm:pt modelId="{CA89E4ED-8115-4FAD-9B86-33DEAC2FD23D}" type="parTrans" cxnId="{3CA48549-5F3B-46EB-8971-FA552040E764}">
+      <dgm:prSet>
+        <dgm:style>
+          <a:lnRef idx="1">
+            <a:schemeClr val="accent1"/>
+          </a:lnRef>
+          <a:fillRef idx="0">
+            <a:schemeClr val="accent1"/>
+          </a:fillRef>
+          <a:effectRef idx="0">
+            <a:schemeClr val="accent1"/>
+          </a:effectRef>
+          <a:fontRef idx="minor">
+            <a:schemeClr val="tx1"/>
+          </a:fontRef>
+        </dgm:style>
+      </dgm:prSet>
+      <dgm:spPr>
+        <a:ln w="19050">
+          <a:headEnd type="none" w="med" len="med"/>
+          <a:tailEnd type="triangle" w="med" len="med"/>
+        </a:ln>
+      </dgm:spPr>
+      <dgm:t>
+        <a:bodyPr/>
+        <a:lstStyle/>
+        <a:p>
+          <a:endParaRPr lang="en-US" sz="2000"/>
+        </a:p>
+      </dgm:t>
+    </dgm:pt>
+    <dgm:pt modelId="{6E501AD7-F648-4D8D-8B4B-51EF0231D0BB}" type="sibTrans" cxnId="{3CA48549-5F3B-46EB-8971-FA552040E764}">
+      <dgm:prSet/>
+      <dgm:spPr/>
+      <dgm:t>
+        <a:bodyPr/>
+        <a:lstStyle/>
+        <a:p>
+          <a:endParaRPr lang="en-US" sz="2000"/>
+        </a:p>
+      </dgm:t>
+    </dgm:pt>
+    <dgm:pt modelId="{4638B457-0A25-4587-80C3-AA7D08B89FE3}">
+      <dgm:prSet phldrT="[Text]" custT="1"/>
+      <dgm:spPr>
+        <a:solidFill>
+          <a:schemeClr val="accent2"/>
+        </a:solidFill>
+        <a:ln>
+          <a:solidFill>
+            <a:schemeClr val="tx1"/>
+          </a:solidFill>
+        </a:ln>
+      </dgm:spPr>
+      <dgm:t>
+        <a:bodyPr/>
+        <a:lstStyle/>
+        <a:p>
+          <a:r>
+            <a:rPr lang="en-US" sz="2000" dirty="0"/>
+            <a:t>BEV</a:t>
+          </a:r>
+        </a:p>
+      </dgm:t>
+    </dgm:pt>
+    <dgm:pt modelId="{29C84AB8-D889-485C-9A5D-13AF4205BE7E}" type="parTrans" cxnId="{C6404CBC-8F79-4EC2-92F5-EA733A0CAC8F}">
+      <dgm:prSet>
+        <dgm:style>
+          <a:lnRef idx="1">
+            <a:schemeClr val="accent1"/>
+          </a:lnRef>
+          <a:fillRef idx="0">
+            <a:schemeClr val="accent1"/>
+          </a:fillRef>
+          <a:effectRef idx="0">
+            <a:schemeClr val="accent1"/>
+          </a:effectRef>
+          <a:fontRef idx="minor">
+            <a:schemeClr val="tx1"/>
+          </a:fontRef>
+        </dgm:style>
+      </dgm:prSet>
+      <dgm:spPr>
+        <a:ln w="19050">
+          <a:headEnd type="none" w="med" len="med"/>
+          <a:tailEnd type="triangle" w="med" len="med"/>
+        </a:ln>
+      </dgm:spPr>
+      <dgm:t>
+        <a:bodyPr/>
+        <a:lstStyle/>
+        <a:p>
+          <a:endParaRPr lang="en-US" sz="2000"/>
+        </a:p>
+      </dgm:t>
+    </dgm:pt>
+    <dgm:pt modelId="{1B446019-6E9D-454A-9A8A-34D9371D4536}" type="sibTrans" cxnId="{C6404CBC-8F79-4EC2-92F5-EA733A0CAC8F}">
+      <dgm:prSet/>
+      <dgm:spPr/>
+      <dgm:t>
+        <a:bodyPr/>
+        <a:lstStyle/>
+        <a:p>
+          <a:endParaRPr lang="en-US" sz="2000"/>
+        </a:p>
+      </dgm:t>
+    </dgm:pt>
+    <dgm:pt modelId="{27BFE818-C984-421D-A465-4327BA34684D}">
+      <dgm:prSet phldrT="[Text]" custT="1"/>
+      <dgm:spPr>
+        <a:solidFill>
+          <a:schemeClr val="accent2"/>
+        </a:solidFill>
+        <a:ln>
+          <a:solidFill>
+            <a:schemeClr val="tx1"/>
+          </a:solidFill>
+        </a:ln>
+      </dgm:spPr>
+      <dgm:t>
+        <a:bodyPr/>
+        <a:lstStyle/>
+        <a:p>
+          <a:r>
+            <a:rPr lang="en-US" sz="2000" dirty="0"/>
+            <a:t>ICE</a:t>
+          </a:r>
+        </a:p>
+      </dgm:t>
+    </dgm:pt>
+    <dgm:pt modelId="{47FC04C3-CA9A-4A1F-8BFA-5A2F125D3DC9}" type="parTrans" cxnId="{9D5F8467-9433-482B-AE4A-943879860B41}">
+      <dgm:prSet>
+        <dgm:style>
+          <a:lnRef idx="1">
+            <a:schemeClr val="accent1"/>
+          </a:lnRef>
+          <a:fillRef idx="0">
+            <a:schemeClr val="accent1"/>
+          </a:fillRef>
+          <a:effectRef idx="0">
+            <a:schemeClr val="accent1"/>
+          </a:effectRef>
+          <a:fontRef idx="minor">
+            <a:schemeClr val="tx1"/>
+          </a:fontRef>
+        </dgm:style>
+      </dgm:prSet>
+      <dgm:spPr>
+        <a:ln w="19050">
+          <a:headEnd type="none" w="med" len="med"/>
+          <a:tailEnd type="triangle" w="med" len="med"/>
+        </a:ln>
+      </dgm:spPr>
+      <dgm:t>
+        <a:bodyPr/>
+        <a:lstStyle/>
+        <a:p>
+          <a:endParaRPr lang="en-US" sz="2000"/>
+        </a:p>
+      </dgm:t>
+    </dgm:pt>
+    <dgm:pt modelId="{E095DE2E-54EE-4FEE-B10A-E5437043F10E}" type="sibTrans" cxnId="{9D5F8467-9433-482B-AE4A-943879860B41}">
+      <dgm:prSet/>
+      <dgm:spPr/>
+      <dgm:t>
+        <a:bodyPr/>
+        <a:lstStyle/>
+        <a:p>
+          <a:endParaRPr lang="en-US" sz="2000"/>
+        </a:p>
+      </dgm:t>
+    </dgm:pt>
+    <dgm:pt modelId="{60893952-5B8B-49DF-B5A8-39675B435DCE}">
+      <dgm:prSet phldrT="[Text]" custT="1"/>
+      <dgm:spPr>
+        <a:solidFill>
+          <a:schemeClr val="accent2"/>
+        </a:solidFill>
+        <a:ln>
+          <a:solidFill>
+            <a:schemeClr val="tx1"/>
+          </a:solidFill>
+        </a:ln>
+      </dgm:spPr>
+      <dgm:t>
+        <a:bodyPr/>
+        <a:lstStyle/>
+        <a:p>
+          <a:r>
+            <a:rPr lang="en-US" sz="2000" dirty="0"/>
+            <a:t>BEV</a:t>
+          </a:r>
+        </a:p>
+      </dgm:t>
+    </dgm:pt>
+    <dgm:pt modelId="{7BC31BC0-492B-4CED-A363-F5293EB6BE73}" type="parTrans" cxnId="{1DBC025F-9EC4-4E5C-B65E-102756583D78}">
+      <dgm:prSet>
+        <dgm:style>
+          <a:lnRef idx="1">
+            <a:schemeClr val="accent1"/>
+          </a:lnRef>
+          <a:fillRef idx="0">
+            <a:schemeClr val="accent1"/>
+          </a:fillRef>
+          <a:effectRef idx="0">
+            <a:schemeClr val="accent1"/>
+          </a:effectRef>
+          <a:fontRef idx="minor">
+            <a:schemeClr val="tx1"/>
+          </a:fontRef>
+        </dgm:style>
+      </dgm:prSet>
+      <dgm:spPr>
+        <a:ln w="19050">
+          <a:headEnd type="none" w="med" len="med"/>
+          <a:tailEnd type="triangle" w="med" len="med"/>
+        </a:ln>
+      </dgm:spPr>
+      <dgm:t>
+        <a:bodyPr/>
+        <a:lstStyle/>
+        <a:p>
+          <a:endParaRPr lang="en-US" sz="2000"/>
+        </a:p>
+      </dgm:t>
+    </dgm:pt>
+    <dgm:pt modelId="{9BDBA612-0465-4797-A42B-D9C159EA600F}" type="sibTrans" cxnId="{1DBC025F-9EC4-4E5C-B65E-102756583D78}">
+      <dgm:prSet/>
+      <dgm:spPr/>
+      <dgm:t>
+        <a:bodyPr/>
+        <a:lstStyle/>
+        <a:p>
+          <a:endParaRPr lang="en-US" sz="2000"/>
+        </a:p>
+      </dgm:t>
+    </dgm:pt>
+    <dgm:pt modelId="{1B2335B3-113B-4467-8A91-DB48FBC4DB07}">
+      <dgm:prSet phldrT="[Text]" custT="1"/>
+      <dgm:spPr>
+        <a:solidFill>
+          <a:schemeClr val="accent2"/>
+        </a:solidFill>
+        <a:ln>
+          <a:solidFill>
+            <a:schemeClr val="tx1"/>
+          </a:solidFill>
+        </a:ln>
+      </dgm:spPr>
+      <dgm:t>
+        <a:bodyPr/>
+        <a:lstStyle/>
+        <a:p>
+          <a:r>
+            <a:rPr lang="en-US" sz="2000" dirty="0"/>
+            <a:t>ICE</a:t>
+          </a:r>
+        </a:p>
+      </dgm:t>
+    </dgm:pt>
+    <dgm:pt modelId="{B85A94E8-208A-41DC-A327-FC0230789D16}" type="parTrans" cxnId="{9B45F799-6B15-449A-86B8-EF87BDFC80C9}">
+      <dgm:prSet>
+        <dgm:style>
+          <a:lnRef idx="1">
+            <a:schemeClr val="accent1"/>
+          </a:lnRef>
+          <a:fillRef idx="0">
+            <a:schemeClr val="accent1"/>
+          </a:fillRef>
+          <a:effectRef idx="0">
+            <a:schemeClr val="accent1"/>
+          </a:effectRef>
+          <a:fontRef idx="minor">
+            <a:schemeClr val="tx1"/>
+          </a:fontRef>
+        </dgm:style>
+      </dgm:prSet>
+      <dgm:spPr>
+        <a:ln w="19050">
+          <a:headEnd type="none" w="med" len="med"/>
+          <a:tailEnd type="triangle" w="med" len="med"/>
+        </a:ln>
+      </dgm:spPr>
+      <dgm:t>
+        <a:bodyPr/>
+        <a:lstStyle/>
+        <a:p>
+          <a:endParaRPr lang="en-US" sz="2000"/>
+        </a:p>
+      </dgm:t>
+    </dgm:pt>
+    <dgm:pt modelId="{7F253131-1718-4D62-957B-F90A27A442E9}" type="sibTrans" cxnId="{9B45F799-6B15-449A-86B8-EF87BDFC80C9}">
+      <dgm:prSet/>
+      <dgm:spPr/>
+      <dgm:t>
+        <a:bodyPr/>
+        <a:lstStyle/>
+        <a:p>
+          <a:endParaRPr lang="en-US" sz="2000"/>
+        </a:p>
+      </dgm:t>
+    </dgm:pt>
+    <dgm:pt modelId="{DFC98E46-78B1-4B0D-B607-0671DF42C260}" type="pres">
+      <dgm:prSet presAssocID="{CCFB450C-051B-4339-AE40-D49F56C101ED}" presName="hierChild1" presStyleCnt="0">
+        <dgm:presLayoutVars>
+          <dgm:orgChart val="1"/>
+          <dgm:chPref val="1"/>
+          <dgm:dir/>
+          <dgm:animOne val="branch"/>
+          <dgm:animLvl val="lvl"/>
+          <dgm:resizeHandles/>
+        </dgm:presLayoutVars>
+      </dgm:prSet>
+      <dgm:spPr/>
+    </dgm:pt>
+    <dgm:pt modelId="{322CFF8B-E10F-4471-98D6-D9991E06AC17}" type="pres">
+      <dgm:prSet presAssocID="{B14CE9BA-7259-40E8-A17E-E5076A1EE50A}" presName="hierRoot1" presStyleCnt="0">
+        <dgm:presLayoutVars>
+          <dgm:hierBranch val="init"/>
+        </dgm:presLayoutVars>
+      </dgm:prSet>
+      <dgm:spPr/>
+    </dgm:pt>
+    <dgm:pt modelId="{3B78C7A0-50B1-4C78-9912-5EAE419B64FF}" type="pres">
+      <dgm:prSet presAssocID="{B14CE9BA-7259-40E8-A17E-E5076A1EE50A}" presName="rootComposite1" presStyleCnt="0"/>
+      <dgm:spPr/>
+    </dgm:pt>
+    <dgm:pt modelId="{35591249-49B0-4DE6-88F3-5C346C278126}" type="pres">
+      <dgm:prSet presAssocID="{B14CE9BA-7259-40E8-A17E-E5076A1EE50A}" presName="rootText1" presStyleLbl="node0" presStyleIdx="0" presStyleCnt="1" custScaleX="137679" custScaleY="103260">
+        <dgm:presLayoutVars>
+          <dgm:chPref val="3"/>
+        </dgm:presLayoutVars>
+      </dgm:prSet>
+      <dgm:spPr/>
+    </dgm:pt>
+    <dgm:pt modelId="{4A0A7BC9-07E0-44C7-9256-F8302B005515}" type="pres">
+      <dgm:prSet presAssocID="{B14CE9BA-7259-40E8-A17E-E5076A1EE50A}" presName="rootConnector1" presStyleLbl="node1" presStyleIdx="0" presStyleCnt="0"/>
+      <dgm:spPr/>
+    </dgm:pt>
+    <dgm:pt modelId="{52B867FF-7952-40C5-B570-20DB5408FAC7}" type="pres">
+      <dgm:prSet presAssocID="{B14CE9BA-7259-40E8-A17E-E5076A1EE50A}" presName="hierChild2" presStyleCnt="0"/>
+      <dgm:spPr/>
+    </dgm:pt>
+    <dgm:pt modelId="{8FFA7E2D-31EA-4288-995A-DE5F25D6B811}" type="pres">
+      <dgm:prSet presAssocID="{9BDB4BA7-F7CA-4951-9B8B-A8A47154C73A}" presName="Name37" presStyleLbl="parChTrans1D2" presStyleIdx="0" presStyleCnt="2"/>
+      <dgm:spPr/>
+    </dgm:pt>
+    <dgm:pt modelId="{500CFC83-B43D-4A88-9D12-6C425E4B3149}" type="pres">
+      <dgm:prSet presAssocID="{7996F403-BCCF-4C66-8F04-5B36990E4701}" presName="hierRoot2" presStyleCnt="0">
+        <dgm:presLayoutVars>
+          <dgm:hierBranch/>
+        </dgm:presLayoutVars>
+      </dgm:prSet>
+      <dgm:spPr/>
+    </dgm:pt>
+    <dgm:pt modelId="{009452AD-1684-4BBB-9A94-B9A333C3B8CA}" type="pres">
+      <dgm:prSet presAssocID="{7996F403-BCCF-4C66-8F04-5B36990E4701}" presName="rootComposite" presStyleCnt="0"/>
+      <dgm:spPr/>
+    </dgm:pt>
+    <dgm:pt modelId="{6EC74892-373F-4465-A48B-3D9D87EF5754}" type="pres">
+      <dgm:prSet presAssocID="{7996F403-BCCF-4C66-8F04-5B36990E4701}" presName="rootText" presStyleLbl="node2" presStyleIdx="0" presStyleCnt="2" custScaleX="129074" custScaleY="86050" custLinFactNeighborX="4002">
+        <dgm:presLayoutVars>
+          <dgm:chPref val="3"/>
+        </dgm:presLayoutVars>
+      </dgm:prSet>
+      <dgm:spPr/>
+    </dgm:pt>
+    <dgm:pt modelId="{645D0C5E-8998-443F-95DC-89F8E9EE35A3}" type="pres">
+      <dgm:prSet presAssocID="{7996F403-BCCF-4C66-8F04-5B36990E4701}" presName="rootConnector" presStyleLbl="node2" presStyleIdx="0" presStyleCnt="2"/>
+      <dgm:spPr/>
+    </dgm:pt>
+    <dgm:pt modelId="{E0D824E3-6AB0-4909-84CB-F31ECF227F5E}" type="pres">
+      <dgm:prSet presAssocID="{7996F403-BCCF-4C66-8F04-5B36990E4701}" presName="hierChild4" presStyleCnt="0"/>
+      <dgm:spPr/>
+    </dgm:pt>
+    <dgm:pt modelId="{8BC382D4-C628-43A2-A316-F49271144571}" type="pres">
+      <dgm:prSet presAssocID="{47FC04C3-CA9A-4A1F-8BFA-5A2F125D3DC9}" presName="Name35" presStyleLbl="parChTrans1D3" presStyleIdx="0" presStyleCnt="4"/>
+      <dgm:spPr/>
+    </dgm:pt>
+    <dgm:pt modelId="{298996DA-D30F-44C1-84C4-980F5AC2997D}" type="pres">
+      <dgm:prSet presAssocID="{27BFE818-C984-421D-A465-4327BA34684D}" presName="hierRoot2" presStyleCnt="0">
+        <dgm:presLayoutVars>
+          <dgm:hierBranch val="hang"/>
+        </dgm:presLayoutVars>
+      </dgm:prSet>
+      <dgm:spPr/>
+    </dgm:pt>
+    <dgm:pt modelId="{14BCD635-B27C-4E4B-B18D-1D3669DED57E}" type="pres">
+      <dgm:prSet presAssocID="{27BFE818-C984-421D-A465-4327BA34684D}" presName="rootComposite" presStyleCnt="0"/>
+      <dgm:spPr/>
+    </dgm:pt>
+    <dgm:pt modelId="{DDA8EE1A-AC0A-4D9F-9CCA-7405442EE8D9}" type="pres">
+      <dgm:prSet presAssocID="{27BFE818-C984-421D-A465-4327BA34684D}" presName="rootText" presStyleLbl="node3" presStyleIdx="0" presStyleCnt="4" custScaleX="70279" custScaleY="73506" custLinFactNeighborX="5336">
+        <dgm:presLayoutVars>
+          <dgm:chPref val="3"/>
+        </dgm:presLayoutVars>
+      </dgm:prSet>
+      <dgm:spPr/>
+    </dgm:pt>
+    <dgm:pt modelId="{D8CC6220-9BE7-465B-9152-B00EA3BBD520}" type="pres">
+      <dgm:prSet presAssocID="{27BFE818-C984-421D-A465-4327BA34684D}" presName="rootConnector" presStyleLbl="node3" presStyleIdx="0" presStyleCnt="4"/>
+      <dgm:spPr/>
+    </dgm:pt>
+    <dgm:pt modelId="{7BCC4CC2-46FB-47C6-8F1B-716506A04CA3}" type="pres">
+      <dgm:prSet presAssocID="{27BFE818-C984-421D-A465-4327BA34684D}" presName="hierChild4" presStyleCnt="0"/>
+      <dgm:spPr/>
+    </dgm:pt>
+    <dgm:pt modelId="{751CA94A-8FA6-4D12-9DBC-A25BFC323590}" type="pres">
+      <dgm:prSet presAssocID="{27BFE818-C984-421D-A465-4327BA34684D}" presName="hierChild5" presStyleCnt="0"/>
+      <dgm:spPr/>
+    </dgm:pt>
+    <dgm:pt modelId="{AE493773-4D26-4ED7-88EE-533AC3BCDFEF}" type="pres">
+      <dgm:prSet presAssocID="{29C84AB8-D889-485C-9A5D-13AF4205BE7E}" presName="Name35" presStyleLbl="parChTrans1D3" presStyleIdx="1" presStyleCnt="4"/>
+      <dgm:spPr/>
+    </dgm:pt>
+    <dgm:pt modelId="{34614795-E110-4735-8FD4-61033F3230F6}" type="pres">
+      <dgm:prSet presAssocID="{4638B457-0A25-4587-80C3-AA7D08B89FE3}" presName="hierRoot2" presStyleCnt="0">
+        <dgm:presLayoutVars>
+          <dgm:hierBranch val="hang"/>
+        </dgm:presLayoutVars>
+      </dgm:prSet>
+      <dgm:spPr/>
+    </dgm:pt>
+    <dgm:pt modelId="{04CB3543-BD90-407D-AF5F-F17FEBD8FC39}" type="pres">
+      <dgm:prSet presAssocID="{4638B457-0A25-4587-80C3-AA7D08B89FE3}" presName="rootComposite" presStyleCnt="0"/>
+      <dgm:spPr/>
+    </dgm:pt>
+    <dgm:pt modelId="{C9C0A8BD-918C-4C8E-B358-5DBA1BC4F123}" type="pres">
+      <dgm:prSet presAssocID="{4638B457-0A25-4587-80C3-AA7D08B89FE3}" presName="rootText" presStyleLbl="node3" presStyleIdx="1" presStyleCnt="4" custScaleX="70165" custScaleY="73506" custLinFactNeighborX="2668">
+        <dgm:presLayoutVars>
+          <dgm:chPref val="3"/>
+        </dgm:presLayoutVars>
+      </dgm:prSet>
+      <dgm:spPr/>
+    </dgm:pt>
+    <dgm:pt modelId="{ACF4F903-110C-421D-9234-C1B7341A04B8}" type="pres">
+      <dgm:prSet presAssocID="{4638B457-0A25-4587-80C3-AA7D08B89FE3}" presName="rootConnector" presStyleLbl="node3" presStyleIdx="1" presStyleCnt="4"/>
+      <dgm:spPr/>
+    </dgm:pt>
+    <dgm:pt modelId="{FB8B5FCC-00E9-405F-9263-0E22276BC480}" type="pres">
+      <dgm:prSet presAssocID="{4638B457-0A25-4587-80C3-AA7D08B89FE3}" presName="hierChild4" presStyleCnt="0"/>
+      <dgm:spPr/>
+    </dgm:pt>
+    <dgm:pt modelId="{11C575F1-BA95-427A-8F13-F6BF2F5BC11F}" type="pres">
+      <dgm:prSet presAssocID="{4638B457-0A25-4587-80C3-AA7D08B89FE3}" presName="hierChild5" presStyleCnt="0"/>
+      <dgm:spPr/>
+    </dgm:pt>
+    <dgm:pt modelId="{983DD3CB-871E-4D9E-9249-DDDA597F6115}" type="pres">
+      <dgm:prSet presAssocID="{7996F403-BCCF-4C66-8F04-5B36990E4701}" presName="hierChild5" presStyleCnt="0"/>
+      <dgm:spPr/>
+    </dgm:pt>
+    <dgm:pt modelId="{1944F29F-558C-4AFF-82FE-C3FCA5338613}" type="pres">
+      <dgm:prSet presAssocID="{CA89E4ED-8115-4FAD-9B86-33DEAC2FD23D}" presName="Name37" presStyleLbl="parChTrans1D2" presStyleIdx="1" presStyleCnt="2"/>
+      <dgm:spPr/>
+    </dgm:pt>
+    <dgm:pt modelId="{DA2630D6-3E36-4FB9-9AAD-69EE76E4C74C}" type="pres">
+      <dgm:prSet presAssocID="{F00117E2-A138-450C-93A9-266090B1B098}" presName="hierRoot2" presStyleCnt="0">
+        <dgm:presLayoutVars>
+          <dgm:hierBranch/>
+        </dgm:presLayoutVars>
+      </dgm:prSet>
+      <dgm:spPr/>
+    </dgm:pt>
+    <dgm:pt modelId="{632CEE2A-D537-4A24-AAAE-C89507A5F57B}" type="pres">
+      <dgm:prSet presAssocID="{F00117E2-A138-450C-93A9-266090B1B098}" presName="rootComposite" presStyleCnt="0"/>
+      <dgm:spPr/>
+    </dgm:pt>
+    <dgm:pt modelId="{14E57F1F-21B9-4C1B-9A2B-7E6D45E15A4E}" type="pres">
+      <dgm:prSet presAssocID="{F00117E2-A138-450C-93A9-266090B1B098}" presName="rootText" presStyleLbl="node2" presStyleIdx="1" presStyleCnt="2" custScaleX="128969" custScaleY="86202" custLinFactNeighborX="-4002">
+        <dgm:presLayoutVars>
+          <dgm:chPref val="3"/>
+        </dgm:presLayoutVars>
+      </dgm:prSet>
+      <dgm:spPr/>
+    </dgm:pt>
+    <dgm:pt modelId="{31DA14BB-1EA1-4D01-BFA1-BA4B57EE677C}" type="pres">
+      <dgm:prSet presAssocID="{F00117E2-A138-450C-93A9-266090B1B098}" presName="rootConnector" presStyleLbl="node2" presStyleIdx="1" presStyleCnt="2"/>
+      <dgm:spPr/>
+    </dgm:pt>
+    <dgm:pt modelId="{94231329-2B75-4D3E-A588-55B31150FBC9}" type="pres">
+      <dgm:prSet presAssocID="{F00117E2-A138-450C-93A9-266090B1B098}" presName="hierChild4" presStyleCnt="0"/>
+      <dgm:spPr/>
+    </dgm:pt>
+    <dgm:pt modelId="{E60CAED6-E982-4A4F-B6A5-4C83674E2F7B}" type="pres">
+      <dgm:prSet presAssocID="{B85A94E8-208A-41DC-A327-FC0230789D16}" presName="Name35" presStyleLbl="parChTrans1D3" presStyleIdx="2" presStyleCnt="4"/>
+      <dgm:spPr/>
+    </dgm:pt>
+    <dgm:pt modelId="{1CE9E612-F7C3-4FFB-89CB-9630B04660AA}" type="pres">
+      <dgm:prSet presAssocID="{1B2335B3-113B-4467-8A91-DB48FBC4DB07}" presName="hierRoot2" presStyleCnt="0">
+        <dgm:presLayoutVars>
+          <dgm:hierBranch val="l"/>
+        </dgm:presLayoutVars>
+      </dgm:prSet>
+      <dgm:spPr/>
+    </dgm:pt>
+    <dgm:pt modelId="{6C4B91F8-60CA-4B6B-9341-C23E408F7B44}" type="pres">
+      <dgm:prSet presAssocID="{1B2335B3-113B-4467-8A91-DB48FBC4DB07}" presName="rootComposite" presStyleCnt="0"/>
+      <dgm:spPr/>
+    </dgm:pt>
+    <dgm:pt modelId="{5856DCCA-786A-43C6-8785-19A535B844DA}" type="pres">
+      <dgm:prSet presAssocID="{1B2335B3-113B-4467-8A91-DB48FBC4DB07}" presName="rootText" presStyleLbl="node3" presStyleIdx="2" presStyleCnt="4" custScaleX="70165" custScaleY="73506" custLinFactNeighborX="-2668">
+        <dgm:presLayoutVars>
+          <dgm:chPref val="3"/>
+        </dgm:presLayoutVars>
+      </dgm:prSet>
+      <dgm:spPr/>
+    </dgm:pt>
+    <dgm:pt modelId="{2D64B2FC-DFA6-4D3B-B3E6-44BB44330859}" type="pres">
+      <dgm:prSet presAssocID="{1B2335B3-113B-4467-8A91-DB48FBC4DB07}" presName="rootConnector" presStyleLbl="node3" presStyleIdx="2" presStyleCnt="4"/>
+      <dgm:spPr/>
+    </dgm:pt>
+    <dgm:pt modelId="{2F901DCD-C772-426F-AE35-162B8C14AF59}" type="pres">
+      <dgm:prSet presAssocID="{1B2335B3-113B-4467-8A91-DB48FBC4DB07}" presName="hierChild4" presStyleCnt="0"/>
+      <dgm:spPr/>
+    </dgm:pt>
+    <dgm:pt modelId="{5DAB2438-7E92-42B3-B60C-7B5E528A3563}" type="pres">
+      <dgm:prSet presAssocID="{1B2335B3-113B-4467-8A91-DB48FBC4DB07}" presName="hierChild5" presStyleCnt="0"/>
+      <dgm:spPr/>
+    </dgm:pt>
+    <dgm:pt modelId="{80A1ADC3-40F2-497B-BFFB-095D71004696}" type="pres">
+      <dgm:prSet presAssocID="{7BC31BC0-492B-4CED-A363-F5293EB6BE73}" presName="Name35" presStyleLbl="parChTrans1D3" presStyleIdx="3" presStyleCnt="4"/>
+      <dgm:spPr/>
+    </dgm:pt>
+    <dgm:pt modelId="{61C5EB73-C639-4FE2-8DAE-65BBBAB5DBF3}" type="pres">
+      <dgm:prSet presAssocID="{60893952-5B8B-49DF-B5A8-39675B435DCE}" presName="hierRoot2" presStyleCnt="0">
+        <dgm:presLayoutVars>
+          <dgm:hierBranch val="init"/>
+        </dgm:presLayoutVars>
+      </dgm:prSet>
+      <dgm:spPr/>
+    </dgm:pt>
+    <dgm:pt modelId="{C32F0810-D410-4EE8-A479-4518A070869A}" type="pres">
+      <dgm:prSet presAssocID="{60893952-5B8B-49DF-B5A8-39675B435DCE}" presName="rootComposite" presStyleCnt="0"/>
+      <dgm:spPr/>
+    </dgm:pt>
+    <dgm:pt modelId="{379E58F8-578F-4A92-9D30-129E61E2E5B2}" type="pres">
+      <dgm:prSet presAssocID="{60893952-5B8B-49DF-B5A8-39675B435DCE}" presName="rootText" presStyleLbl="node3" presStyleIdx="3" presStyleCnt="4" custScaleX="70165" custScaleY="73506" custLinFactNeighborX="-5336">
+        <dgm:presLayoutVars>
+          <dgm:chPref val="3"/>
+        </dgm:presLayoutVars>
+      </dgm:prSet>
+      <dgm:spPr/>
+    </dgm:pt>
+    <dgm:pt modelId="{242F962D-5F37-4743-84E0-7F7B22DB1061}" type="pres">
+      <dgm:prSet presAssocID="{60893952-5B8B-49DF-B5A8-39675B435DCE}" presName="rootConnector" presStyleLbl="node3" presStyleIdx="3" presStyleCnt="4"/>
+      <dgm:spPr/>
+    </dgm:pt>
+    <dgm:pt modelId="{6ECC8057-ECB1-4C3D-B162-C07A68437BCF}" type="pres">
+      <dgm:prSet presAssocID="{60893952-5B8B-49DF-B5A8-39675B435DCE}" presName="hierChild4" presStyleCnt="0"/>
+      <dgm:spPr/>
+    </dgm:pt>
+    <dgm:pt modelId="{962DA0DC-BCE2-4E19-B7DB-B542E168C989}" type="pres">
+      <dgm:prSet presAssocID="{60893952-5B8B-49DF-B5A8-39675B435DCE}" presName="hierChild5" presStyleCnt="0"/>
+      <dgm:spPr/>
+    </dgm:pt>
+    <dgm:pt modelId="{E219829A-05AF-4E35-81D4-63C7A7A5736F}" type="pres">
+      <dgm:prSet presAssocID="{F00117E2-A138-450C-93A9-266090B1B098}" presName="hierChild5" presStyleCnt="0"/>
+      <dgm:spPr/>
+    </dgm:pt>
+    <dgm:pt modelId="{A0317483-6BDE-406B-BAE8-4868CC70BE70}" type="pres">
+      <dgm:prSet presAssocID="{B14CE9BA-7259-40E8-A17E-E5076A1EE50A}" presName="hierChild3" presStyleCnt="0"/>
+      <dgm:spPr/>
+    </dgm:pt>
+  </dgm:ptLst>
+  <dgm:cxnLst>
+    <dgm:cxn modelId="{6A92BE1F-9ED0-481C-A5B6-587ABF2C2554}" type="presOf" srcId="{60893952-5B8B-49DF-B5A8-39675B435DCE}" destId="{242F962D-5F37-4743-84E0-7F7B22DB1061}" srcOrd="1" destOrd="0" presId="urn:microsoft.com/office/officeart/2005/8/layout/orgChart1"/>
+    <dgm:cxn modelId="{2D278C3B-344B-4411-9A27-2DD636175AD6}" type="presOf" srcId="{B85A94E8-208A-41DC-A327-FC0230789D16}" destId="{E60CAED6-E982-4A4F-B6A5-4C83674E2F7B}" srcOrd="0" destOrd="0" presId="urn:microsoft.com/office/officeart/2005/8/layout/orgChart1"/>
+    <dgm:cxn modelId="{AEEC8D3C-6CFC-4058-A41C-C4D3EB691D53}" type="presOf" srcId="{29C84AB8-D889-485C-9A5D-13AF4205BE7E}" destId="{AE493773-4D26-4ED7-88EE-533AC3BCDFEF}" srcOrd="0" destOrd="0" presId="urn:microsoft.com/office/officeart/2005/8/layout/orgChart1"/>
+    <dgm:cxn modelId="{8233A63D-28D8-477B-A652-FD79A4B68172}" type="presOf" srcId="{47FC04C3-CA9A-4A1F-8BFA-5A2F125D3DC9}" destId="{8BC382D4-C628-43A2-A316-F49271144571}" srcOrd="0" destOrd="0" presId="urn:microsoft.com/office/officeart/2005/8/layout/orgChart1"/>
+    <dgm:cxn modelId="{F590F13F-AEFD-4100-846C-DDD4711E87DC}" type="presOf" srcId="{7996F403-BCCF-4C66-8F04-5B36990E4701}" destId="{645D0C5E-8998-443F-95DC-89F8E9EE35A3}" srcOrd="1" destOrd="0" presId="urn:microsoft.com/office/officeart/2005/8/layout/orgChart1"/>
+    <dgm:cxn modelId="{DA7CD35D-3B53-40BB-A434-E6C572D8771E}" type="presOf" srcId="{60893952-5B8B-49DF-B5A8-39675B435DCE}" destId="{379E58F8-578F-4A92-9D30-129E61E2E5B2}" srcOrd="0" destOrd="0" presId="urn:microsoft.com/office/officeart/2005/8/layout/orgChart1"/>
+    <dgm:cxn modelId="{1DBC025F-9EC4-4E5C-B65E-102756583D78}" srcId="{F00117E2-A138-450C-93A9-266090B1B098}" destId="{60893952-5B8B-49DF-B5A8-39675B435DCE}" srcOrd="1" destOrd="0" parTransId="{7BC31BC0-492B-4CED-A363-F5293EB6BE73}" sibTransId="{9BDBA612-0465-4797-A42B-D9C159EA600F}"/>
+    <dgm:cxn modelId="{9D5F8467-9433-482B-AE4A-943879860B41}" srcId="{7996F403-BCCF-4C66-8F04-5B36990E4701}" destId="{27BFE818-C984-421D-A465-4327BA34684D}" srcOrd="0" destOrd="0" parTransId="{47FC04C3-CA9A-4A1F-8BFA-5A2F125D3DC9}" sibTransId="{E095DE2E-54EE-4FEE-B10A-E5437043F10E}"/>
+    <dgm:cxn modelId="{395A2B48-CAB3-47B2-AE99-283A339D77BF}" type="presOf" srcId="{CCFB450C-051B-4339-AE40-D49F56C101ED}" destId="{DFC98E46-78B1-4B0D-B607-0671DF42C260}" srcOrd="0" destOrd="0" presId="urn:microsoft.com/office/officeart/2005/8/layout/orgChart1"/>
+    <dgm:cxn modelId="{3CA48549-5F3B-46EB-8971-FA552040E764}" srcId="{B14CE9BA-7259-40E8-A17E-E5076A1EE50A}" destId="{F00117E2-A138-450C-93A9-266090B1B098}" srcOrd="1" destOrd="0" parTransId="{CA89E4ED-8115-4FAD-9B86-33DEAC2FD23D}" sibTransId="{6E501AD7-F648-4D8D-8B4B-51EF0231D0BB}"/>
+    <dgm:cxn modelId="{615FE44A-0116-4608-89C0-70DE506152FE}" type="presOf" srcId="{B14CE9BA-7259-40E8-A17E-E5076A1EE50A}" destId="{35591249-49B0-4DE6-88F3-5C346C278126}" srcOrd="0" destOrd="0" presId="urn:microsoft.com/office/officeart/2005/8/layout/orgChart1"/>
+    <dgm:cxn modelId="{E4C7784C-0494-4D35-8904-2BA0B1F4706B}" type="presOf" srcId="{4638B457-0A25-4587-80C3-AA7D08B89FE3}" destId="{ACF4F903-110C-421D-9234-C1B7341A04B8}" srcOrd="1" destOrd="0" presId="urn:microsoft.com/office/officeart/2005/8/layout/orgChart1"/>
+    <dgm:cxn modelId="{A2DD6B4E-F692-457B-ADA0-E6DEF3415255}" type="presOf" srcId="{27BFE818-C984-421D-A465-4327BA34684D}" destId="{DDA8EE1A-AC0A-4D9F-9CCA-7405442EE8D9}" srcOrd="0" destOrd="0" presId="urn:microsoft.com/office/officeart/2005/8/layout/orgChart1"/>
+    <dgm:cxn modelId="{7D89CA75-B491-48A9-B637-065004A07C65}" type="presOf" srcId="{CA89E4ED-8115-4FAD-9B86-33DEAC2FD23D}" destId="{1944F29F-558C-4AFF-82FE-C3FCA5338613}" srcOrd="0" destOrd="0" presId="urn:microsoft.com/office/officeart/2005/8/layout/orgChart1"/>
+    <dgm:cxn modelId="{0224CA92-27B0-4944-9223-09F440EF0175}" type="presOf" srcId="{7BC31BC0-492B-4CED-A363-F5293EB6BE73}" destId="{80A1ADC3-40F2-497B-BFFB-095D71004696}" srcOrd="0" destOrd="0" presId="urn:microsoft.com/office/officeart/2005/8/layout/orgChart1"/>
+    <dgm:cxn modelId="{9B45F799-6B15-449A-86B8-EF87BDFC80C9}" srcId="{F00117E2-A138-450C-93A9-266090B1B098}" destId="{1B2335B3-113B-4467-8A91-DB48FBC4DB07}" srcOrd="0" destOrd="0" parTransId="{B85A94E8-208A-41DC-A327-FC0230789D16}" sibTransId="{7F253131-1718-4D62-957B-F90A27A442E9}"/>
+    <dgm:cxn modelId="{8EB750A1-A28D-4BE6-8DBC-7E2AECB23573}" type="presOf" srcId="{B14CE9BA-7259-40E8-A17E-E5076A1EE50A}" destId="{4A0A7BC9-07E0-44C7-9256-F8302B005515}" srcOrd="1" destOrd="0" presId="urn:microsoft.com/office/officeart/2005/8/layout/orgChart1"/>
+    <dgm:cxn modelId="{B3C18DAE-106F-472F-9AD6-70DFA761D40D}" type="presOf" srcId="{9BDB4BA7-F7CA-4951-9B8B-A8A47154C73A}" destId="{8FFA7E2D-31EA-4288-995A-DE5F25D6B811}" srcOrd="0" destOrd="0" presId="urn:microsoft.com/office/officeart/2005/8/layout/orgChart1"/>
+    <dgm:cxn modelId="{2AE32AB0-1581-423B-8D4D-6F1A21DC4429}" type="presOf" srcId="{1B2335B3-113B-4467-8A91-DB48FBC4DB07}" destId="{2D64B2FC-DFA6-4D3B-B3E6-44BB44330859}" srcOrd="1" destOrd="0" presId="urn:microsoft.com/office/officeart/2005/8/layout/orgChart1"/>
+    <dgm:cxn modelId="{C6404CBC-8F79-4EC2-92F5-EA733A0CAC8F}" srcId="{7996F403-BCCF-4C66-8F04-5B36990E4701}" destId="{4638B457-0A25-4587-80C3-AA7D08B89FE3}" srcOrd="1" destOrd="0" parTransId="{29C84AB8-D889-485C-9A5D-13AF4205BE7E}" sibTransId="{1B446019-6E9D-454A-9A8A-34D9371D4536}"/>
+    <dgm:cxn modelId="{D5DAD2BF-32D3-4F6B-B266-73E70C4657E6}" srcId="{CCFB450C-051B-4339-AE40-D49F56C101ED}" destId="{B14CE9BA-7259-40E8-A17E-E5076A1EE50A}" srcOrd="0" destOrd="0" parTransId="{38C41944-ECD7-4BA7-B79B-5FF112A91DA4}" sibTransId="{3B739074-B445-4D95-B479-132CFDCAD671}"/>
+    <dgm:cxn modelId="{9DB85ADC-2663-4869-84D2-127B533BB50D}" type="presOf" srcId="{1B2335B3-113B-4467-8A91-DB48FBC4DB07}" destId="{5856DCCA-786A-43C6-8785-19A535B844DA}" srcOrd="0" destOrd="0" presId="urn:microsoft.com/office/officeart/2005/8/layout/orgChart1"/>
+    <dgm:cxn modelId="{C62BEEDE-6400-4B68-B190-6088FCF68A93}" type="presOf" srcId="{F00117E2-A138-450C-93A9-266090B1B098}" destId="{31DA14BB-1EA1-4D01-BFA1-BA4B57EE677C}" srcOrd="1" destOrd="0" presId="urn:microsoft.com/office/officeart/2005/8/layout/orgChart1"/>
+    <dgm:cxn modelId="{263103DF-CF1F-413B-8A63-B129E97F73B5}" type="presOf" srcId="{F00117E2-A138-450C-93A9-266090B1B098}" destId="{14E57F1F-21B9-4C1B-9A2B-7E6D45E15A4E}" srcOrd="0" destOrd="0" presId="urn:microsoft.com/office/officeart/2005/8/layout/orgChart1"/>
+    <dgm:cxn modelId="{478CDFEC-178D-4EB2-B315-52CA965576A1}" type="presOf" srcId="{27BFE818-C984-421D-A465-4327BA34684D}" destId="{D8CC6220-9BE7-465B-9152-B00EA3BBD520}" srcOrd="1" destOrd="0" presId="urn:microsoft.com/office/officeart/2005/8/layout/orgChart1"/>
+    <dgm:cxn modelId="{B5163BF5-EE84-41AC-9FBC-C9C62DDB1B01}" type="presOf" srcId="{7996F403-BCCF-4C66-8F04-5B36990E4701}" destId="{6EC74892-373F-4465-A48B-3D9D87EF5754}" srcOrd="0" destOrd="0" presId="urn:microsoft.com/office/officeart/2005/8/layout/orgChart1"/>
+    <dgm:cxn modelId="{25E7FEFB-E039-4542-902D-1BF9761448AA}" type="presOf" srcId="{4638B457-0A25-4587-80C3-AA7D08B89FE3}" destId="{C9C0A8BD-918C-4C8E-B358-5DBA1BC4F123}" srcOrd="0" destOrd="0" presId="urn:microsoft.com/office/officeart/2005/8/layout/orgChart1"/>
+    <dgm:cxn modelId="{188F83FE-AEEF-4287-9585-AC90F2C8A46B}" srcId="{B14CE9BA-7259-40E8-A17E-E5076A1EE50A}" destId="{7996F403-BCCF-4C66-8F04-5B36990E4701}" srcOrd="0" destOrd="0" parTransId="{9BDB4BA7-F7CA-4951-9B8B-A8A47154C73A}" sibTransId="{4C407750-66C1-460F-B522-D130C1678E8F}"/>
+    <dgm:cxn modelId="{0E2EBB8D-7780-424D-A961-AD8F7D6E293F}" type="presParOf" srcId="{DFC98E46-78B1-4B0D-B607-0671DF42C260}" destId="{322CFF8B-E10F-4471-98D6-D9991E06AC17}" srcOrd="0" destOrd="0" presId="urn:microsoft.com/office/officeart/2005/8/layout/orgChart1"/>
+    <dgm:cxn modelId="{D6FA95C9-39FD-472D-874B-FC3DA03FF7F3}" type="presParOf" srcId="{322CFF8B-E10F-4471-98D6-D9991E06AC17}" destId="{3B78C7A0-50B1-4C78-9912-5EAE419B64FF}" srcOrd="0" destOrd="0" presId="urn:microsoft.com/office/officeart/2005/8/layout/orgChart1"/>
+    <dgm:cxn modelId="{BC0EB941-5FE5-45A7-B1B0-5411A444D46D}" type="presParOf" srcId="{3B78C7A0-50B1-4C78-9912-5EAE419B64FF}" destId="{35591249-49B0-4DE6-88F3-5C346C278126}" srcOrd="0" destOrd="0" presId="urn:microsoft.com/office/officeart/2005/8/layout/orgChart1"/>
+    <dgm:cxn modelId="{A0CE4D77-CB8F-4046-9F78-43EE626F1E46}" type="presParOf" srcId="{3B78C7A0-50B1-4C78-9912-5EAE419B64FF}" destId="{4A0A7BC9-07E0-44C7-9256-F8302B005515}" srcOrd="1" destOrd="0" presId="urn:microsoft.com/office/officeart/2005/8/layout/orgChart1"/>
+    <dgm:cxn modelId="{7C1EFEE7-40DE-4E93-8E75-6E687CABBE82}" type="presParOf" srcId="{322CFF8B-E10F-4471-98D6-D9991E06AC17}" destId="{52B867FF-7952-40C5-B570-20DB5408FAC7}" srcOrd="1" destOrd="0" presId="urn:microsoft.com/office/officeart/2005/8/layout/orgChart1"/>
+    <dgm:cxn modelId="{57FAC0E3-7618-426D-A832-E08F7A0F0619}" type="presParOf" srcId="{52B867FF-7952-40C5-B570-20DB5408FAC7}" destId="{8FFA7E2D-31EA-4288-995A-DE5F25D6B811}" srcOrd="0" destOrd="0" presId="urn:microsoft.com/office/officeart/2005/8/layout/orgChart1"/>
+    <dgm:cxn modelId="{9F57BEF1-7A05-434E-A03B-F17477AEE42B}" type="presParOf" srcId="{52B867FF-7952-40C5-B570-20DB5408FAC7}" destId="{500CFC83-B43D-4A88-9D12-6C425E4B3149}" srcOrd="1" destOrd="0" presId="urn:microsoft.com/office/officeart/2005/8/layout/orgChart1"/>
+    <dgm:cxn modelId="{773B7D13-4168-4C97-982C-F9758A353038}" type="presParOf" srcId="{500CFC83-B43D-4A88-9D12-6C425E4B3149}" destId="{009452AD-1684-4BBB-9A94-B9A333C3B8CA}" srcOrd="0" destOrd="0" presId="urn:microsoft.com/office/officeart/2005/8/layout/orgChart1"/>
+    <dgm:cxn modelId="{EDF21DF5-1526-4511-A3FC-DD4869D836B5}" type="presParOf" srcId="{009452AD-1684-4BBB-9A94-B9A333C3B8CA}" destId="{6EC74892-373F-4465-A48B-3D9D87EF5754}" srcOrd="0" destOrd="0" presId="urn:microsoft.com/office/officeart/2005/8/layout/orgChart1"/>
+    <dgm:cxn modelId="{EA2DF687-2E83-49BF-B706-EEADBE3CF31A}" type="presParOf" srcId="{009452AD-1684-4BBB-9A94-B9A333C3B8CA}" destId="{645D0C5E-8998-443F-95DC-89F8E9EE35A3}" srcOrd="1" destOrd="0" presId="urn:microsoft.com/office/officeart/2005/8/layout/orgChart1"/>
+    <dgm:cxn modelId="{1C381205-33BC-4EB7-85AA-BAC25DEEE077}" type="presParOf" srcId="{500CFC83-B43D-4A88-9D12-6C425E4B3149}" destId="{E0D824E3-6AB0-4909-84CB-F31ECF227F5E}" srcOrd="1" destOrd="0" presId="urn:microsoft.com/office/officeart/2005/8/layout/orgChart1"/>
+    <dgm:cxn modelId="{D1704C4F-B613-4DE5-A2CB-F6C2B14DAAB5}" type="presParOf" srcId="{E0D824E3-6AB0-4909-84CB-F31ECF227F5E}" destId="{8BC382D4-C628-43A2-A316-F49271144571}" srcOrd="0" destOrd="0" presId="urn:microsoft.com/office/officeart/2005/8/layout/orgChart1"/>
+    <dgm:cxn modelId="{BDE831DD-64C8-48C2-AFC3-E1E051CBBB84}" type="presParOf" srcId="{E0D824E3-6AB0-4909-84CB-F31ECF227F5E}" destId="{298996DA-D30F-44C1-84C4-980F5AC2997D}" srcOrd="1" destOrd="0" presId="urn:microsoft.com/office/officeart/2005/8/layout/orgChart1"/>
+    <dgm:cxn modelId="{CED7FC58-DC08-4A94-B32F-B5290E8B0B6E}" type="presParOf" srcId="{298996DA-D30F-44C1-84C4-980F5AC2997D}" destId="{14BCD635-B27C-4E4B-B18D-1D3669DED57E}" srcOrd="0" destOrd="0" presId="urn:microsoft.com/office/officeart/2005/8/layout/orgChart1"/>
+    <dgm:cxn modelId="{8C7A9B80-1EF0-4F59-A7C2-7B3658351555}" type="presParOf" srcId="{14BCD635-B27C-4E4B-B18D-1D3669DED57E}" destId="{DDA8EE1A-AC0A-4D9F-9CCA-7405442EE8D9}" srcOrd="0" destOrd="0" presId="urn:microsoft.com/office/officeart/2005/8/layout/orgChart1"/>
+    <dgm:cxn modelId="{9B7CF084-C1AE-4D2D-A24E-0E51E63BA590}" type="presParOf" srcId="{14BCD635-B27C-4E4B-B18D-1D3669DED57E}" destId="{D8CC6220-9BE7-465B-9152-B00EA3BBD520}" srcOrd="1" destOrd="0" presId="urn:microsoft.com/office/officeart/2005/8/layout/orgChart1"/>
+    <dgm:cxn modelId="{F42B1183-A8C2-47C3-8CA0-695E8C657C6C}" type="presParOf" srcId="{298996DA-D30F-44C1-84C4-980F5AC2997D}" destId="{7BCC4CC2-46FB-47C6-8F1B-716506A04CA3}" srcOrd="1" destOrd="0" presId="urn:microsoft.com/office/officeart/2005/8/layout/orgChart1"/>
+    <dgm:cxn modelId="{272EBAD7-E936-4DCE-BFAC-C3ABBB6C9B18}" type="presParOf" srcId="{298996DA-D30F-44C1-84C4-980F5AC2997D}" destId="{751CA94A-8FA6-4D12-9DBC-A25BFC323590}" srcOrd="2" destOrd="0" presId="urn:microsoft.com/office/officeart/2005/8/layout/orgChart1"/>
+    <dgm:cxn modelId="{C3DF804C-55C6-4221-B614-869D43E91A75}" type="presParOf" srcId="{E0D824E3-6AB0-4909-84CB-F31ECF227F5E}" destId="{AE493773-4D26-4ED7-88EE-533AC3BCDFEF}" srcOrd="2" destOrd="0" presId="urn:microsoft.com/office/officeart/2005/8/layout/orgChart1"/>
+    <dgm:cxn modelId="{F691FD1E-E353-4BF3-8A00-B638E8565446}" type="presParOf" srcId="{E0D824E3-6AB0-4909-84CB-F31ECF227F5E}" destId="{34614795-E110-4735-8FD4-61033F3230F6}" srcOrd="3" destOrd="0" presId="urn:microsoft.com/office/officeart/2005/8/layout/orgChart1"/>
+    <dgm:cxn modelId="{A509B529-97FF-484C-BF6C-E1AC31C0562B}" type="presParOf" srcId="{34614795-E110-4735-8FD4-61033F3230F6}" destId="{04CB3543-BD90-407D-AF5F-F17FEBD8FC39}" srcOrd="0" destOrd="0" presId="urn:microsoft.com/office/officeart/2005/8/layout/orgChart1"/>
+    <dgm:cxn modelId="{C0AED1FF-D1B4-4DDB-A559-98E33831671C}" type="presParOf" srcId="{04CB3543-BD90-407D-AF5F-F17FEBD8FC39}" destId="{C9C0A8BD-918C-4C8E-B358-5DBA1BC4F123}" srcOrd="0" destOrd="0" presId="urn:microsoft.com/office/officeart/2005/8/layout/orgChart1"/>
+    <dgm:cxn modelId="{B778CD90-BDAF-40F2-964C-71D2BF98F58D}" type="presParOf" srcId="{04CB3543-BD90-407D-AF5F-F17FEBD8FC39}" destId="{ACF4F903-110C-421D-9234-C1B7341A04B8}" srcOrd="1" destOrd="0" presId="urn:microsoft.com/office/officeart/2005/8/layout/orgChart1"/>
+    <dgm:cxn modelId="{8A2B79F5-C4EB-40A1-8CDD-04E67BF93213}" type="presParOf" srcId="{34614795-E110-4735-8FD4-61033F3230F6}" destId="{FB8B5FCC-00E9-405F-9263-0E22276BC480}" srcOrd="1" destOrd="0" presId="urn:microsoft.com/office/officeart/2005/8/layout/orgChart1"/>
+    <dgm:cxn modelId="{431F51EE-8C30-4E84-9341-BFE902E59856}" type="presParOf" srcId="{34614795-E110-4735-8FD4-61033F3230F6}" destId="{11C575F1-BA95-427A-8F13-F6BF2F5BC11F}" srcOrd="2" destOrd="0" presId="urn:microsoft.com/office/officeart/2005/8/layout/orgChart1"/>
+    <dgm:cxn modelId="{5B52598C-5BB0-46C8-B044-9B7A1F714E53}" type="presParOf" srcId="{500CFC83-B43D-4A88-9D12-6C425E4B3149}" destId="{983DD3CB-871E-4D9E-9249-DDDA597F6115}" srcOrd="2" destOrd="0" presId="urn:microsoft.com/office/officeart/2005/8/layout/orgChart1"/>
+    <dgm:cxn modelId="{C3B089B4-DC16-4C55-AD98-BA8E5433AD48}" type="presParOf" srcId="{52B867FF-7952-40C5-B570-20DB5408FAC7}" destId="{1944F29F-558C-4AFF-82FE-C3FCA5338613}" srcOrd="2" destOrd="0" presId="urn:microsoft.com/office/officeart/2005/8/layout/orgChart1"/>
+    <dgm:cxn modelId="{45A2746B-074F-4C31-9C00-3110A11236D1}" type="presParOf" srcId="{52B867FF-7952-40C5-B570-20DB5408FAC7}" destId="{DA2630D6-3E36-4FB9-9AAD-69EE76E4C74C}" srcOrd="3" destOrd="0" presId="urn:microsoft.com/office/officeart/2005/8/layout/orgChart1"/>
+    <dgm:cxn modelId="{F7B6174E-5CFD-41C6-8074-38233E698014}" type="presParOf" srcId="{DA2630D6-3E36-4FB9-9AAD-69EE76E4C74C}" destId="{632CEE2A-D537-4A24-AAAE-C89507A5F57B}" srcOrd="0" destOrd="0" presId="urn:microsoft.com/office/officeart/2005/8/layout/orgChart1"/>
+    <dgm:cxn modelId="{4A3B09F3-3962-430F-B7DD-184E0BE2AA44}" type="presParOf" srcId="{632CEE2A-D537-4A24-AAAE-C89507A5F57B}" destId="{14E57F1F-21B9-4C1B-9A2B-7E6D45E15A4E}" srcOrd="0" destOrd="0" presId="urn:microsoft.com/office/officeart/2005/8/layout/orgChart1"/>
+    <dgm:cxn modelId="{97CFC126-185F-4132-A35C-85EAF3E25C5A}" type="presParOf" srcId="{632CEE2A-D537-4A24-AAAE-C89507A5F57B}" destId="{31DA14BB-1EA1-4D01-BFA1-BA4B57EE677C}" srcOrd="1" destOrd="0" presId="urn:microsoft.com/office/officeart/2005/8/layout/orgChart1"/>
+    <dgm:cxn modelId="{5B0602E6-6A80-4929-9F40-AAF98571B678}" type="presParOf" srcId="{DA2630D6-3E36-4FB9-9AAD-69EE76E4C74C}" destId="{94231329-2B75-4D3E-A588-55B31150FBC9}" srcOrd="1" destOrd="0" presId="urn:microsoft.com/office/officeart/2005/8/layout/orgChart1"/>
+    <dgm:cxn modelId="{821D3AD2-2DE2-4A3F-BD4E-549034402F26}" type="presParOf" srcId="{94231329-2B75-4D3E-A588-55B31150FBC9}" destId="{E60CAED6-E982-4A4F-B6A5-4C83674E2F7B}" srcOrd="0" destOrd="0" presId="urn:microsoft.com/office/officeart/2005/8/layout/orgChart1"/>
+    <dgm:cxn modelId="{7E342F68-3A89-4D21-95D3-0CD4A1F8992A}" type="presParOf" srcId="{94231329-2B75-4D3E-A588-55B31150FBC9}" destId="{1CE9E612-F7C3-4FFB-89CB-9630B04660AA}" srcOrd="1" destOrd="0" presId="urn:microsoft.com/office/officeart/2005/8/layout/orgChart1"/>
+    <dgm:cxn modelId="{3E1F51AC-ADC1-4994-BA28-6EDF74BA2EB7}" type="presParOf" srcId="{1CE9E612-F7C3-4FFB-89CB-9630B04660AA}" destId="{6C4B91F8-60CA-4B6B-9341-C23E408F7B44}" srcOrd="0" destOrd="0" presId="urn:microsoft.com/office/officeart/2005/8/layout/orgChart1"/>
+    <dgm:cxn modelId="{9544864D-D0A4-4F38-830F-777C58ABBEB3}" type="presParOf" srcId="{6C4B91F8-60CA-4B6B-9341-C23E408F7B44}" destId="{5856DCCA-786A-43C6-8785-19A535B844DA}" srcOrd="0" destOrd="0" presId="urn:microsoft.com/office/officeart/2005/8/layout/orgChart1"/>
+    <dgm:cxn modelId="{A3643EE2-B0D0-47E8-830F-E8ECB6E1E992}" type="presParOf" srcId="{6C4B91F8-60CA-4B6B-9341-C23E408F7B44}" destId="{2D64B2FC-DFA6-4D3B-B3E6-44BB44330859}" srcOrd="1" destOrd="0" presId="urn:microsoft.com/office/officeart/2005/8/layout/orgChart1"/>
+    <dgm:cxn modelId="{B4968609-7A2F-4563-A70A-515D75F1CCE9}" type="presParOf" srcId="{1CE9E612-F7C3-4FFB-89CB-9630B04660AA}" destId="{2F901DCD-C772-426F-AE35-162B8C14AF59}" srcOrd="1" destOrd="0" presId="urn:microsoft.com/office/officeart/2005/8/layout/orgChart1"/>
+    <dgm:cxn modelId="{79497EA7-4DDA-4E7B-9556-B1B970827CAE}" type="presParOf" srcId="{1CE9E612-F7C3-4FFB-89CB-9630B04660AA}" destId="{5DAB2438-7E92-42B3-B60C-7B5E528A3563}" srcOrd="2" destOrd="0" presId="urn:microsoft.com/office/officeart/2005/8/layout/orgChart1"/>
+    <dgm:cxn modelId="{6C52D6DA-8837-492A-BD2E-0BC324080D3C}" type="presParOf" srcId="{94231329-2B75-4D3E-A588-55B31150FBC9}" destId="{80A1ADC3-40F2-497B-BFFB-095D71004696}" srcOrd="2" destOrd="0" presId="urn:microsoft.com/office/officeart/2005/8/layout/orgChart1"/>
+    <dgm:cxn modelId="{94632930-244F-4A85-89C4-2B4132BA8BFD}" type="presParOf" srcId="{94231329-2B75-4D3E-A588-55B31150FBC9}" destId="{61C5EB73-C639-4FE2-8DAE-65BBBAB5DBF3}" srcOrd="3" destOrd="0" presId="urn:microsoft.com/office/officeart/2005/8/layout/orgChart1"/>
+    <dgm:cxn modelId="{124ED26F-1DAD-4E49-95BD-72A7E539096E}" type="presParOf" srcId="{61C5EB73-C639-4FE2-8DAE-65BBBAB5DBF3}" destId="{C32F0810-D410-4EE8-A479-4518A070869A}" srcOrd="0" destOrd="0" presId="urn:microsoft.com/office/officeart/2005/8/layout/orgChart1"/>
+    <dgm:cxn modelId="{D2AA795D-999F-4698-BE16-D7949C797D7C}" type="presParOf" srcId="{C32F0810-D410-4EE8-A479-4518A070869A}" destId="{379E58F8-578F-4A92-9D30-129E61E2E5B2}" srcOrd="0" destOrd="0" presId="urn:microsoft.com/office/officeart/2005/8/layout/orgChart1"/>
+    <dgm:cxn modelId="{8D34EF87-3A60-4041-99C6-D9FC147C0E6B}" type="presParOf" srcId="{C32F0810-D410-4EE8-A479-4518A070869A}" destId="{242F962D-5F37-4743-84E0-7F7B22DB1061}" srcOrd="1" destOrd="0" presId="urn:microsoft.com/office/officeart/2005/8/layout/orgChart1"/>
+    <dgm:cxn modelId="{AADC9754-80D6-41E3-800B-718423DE2AF9}" type="presParOf" srcId="{61C5EB73-C639-4FE2-8DAE-65BBBAB5DBF3}" destId="{6ECC8057-ECB1-4C3D-B162-C07A68437BCF}" srcOrd="1" destOrd="0" presId="urn:microsoft.com/office/officeart/2005/8/layout/orgChart1"/>
+    <dgm:cxn modelId="{562FB687-9501-469F-9773-1806858DD11F}" type="presParOf" srcId="{61C5EB73-C639-4FE2-8DAE-65BBBAB5DBF3}" destId="{962DA0DC-BCE2-4E19-B7DB-B542E168C989}" srcOrd="2" destOrd="0" presId="urn:microsoft.com/office/officeart/2005/8/layout/orgChart1"/>
+    <dgm:cxn modelId="{C2D894E7-F9AF-4F8E-8D4D-636D1E915289}" type="presParOf" srcId="{DA2630D6-3E36-4FB9-9AAD-69EE76E4C74C}" destId="{E219829A-05AF-4E35-81D4-63C7A7A5736F}" srcOrd="2" destOrd="0" presId="urn:microsoft.com/office/officeart/2005/8/layout/orgChart1"/>
+    <dgm:cxn modelId="{CB25A196-ABFC-4835-B82D-09DBF6F916A4}" type="presParOf" srcId="{322CFF8B-E10F-4471-98D6-D9991E06AC17}" destId="{A0317483-6BDE-406B-BAE8-4868CC70BE70}" srcOrd="2" destOrd="0" presId="urn:microsoft.com/office/officeart/2005/8/layout/orgChart1"/>
+  </dgm:cxnLst>
+  <dgm:bg/>
+  <dgm:whole/>
+  <dgm:extLst>
+    <a:ext uri="http://schemas.microsoft.com/office/drawing/2008/diagram">
+      <dsp:dataModelExt xmlns:dsp="http://schemas.microsoft.com/office/drawing/2008/diagram" relId="rId7" minVer="http://schemas.openxmlformats.org/drawingml/2006/diagram"/>
+    </a:ext>
+  </dgm:extLst>
+</dgm:dataModel>
+</file>
+
+<file path=ppt/diagrams/drawing1.xml><?xml version="1.0" encoding="utf-8"?>
+<dsp:drawing xmlns:dgm="http://schemas.openxmlformats.org/drawingml/2006/diagram" xmlns:dsp="http://schemas.microsoft.com/office/drawing/2008/diagram" xmlns:a="http://schemas.openxmlformats.org/drawingml/2006/main">
+  <dsp:spTree>
+    <dsp:nvGrpSpPr>
+      <dsp:cNvPr id="0" name=""/>
+      <dsp:cNvGrpSpPr/>
+    </dsp:nvGrpSpPr>
+    <dsp:grpSpPr/>
+    <dsp:sp modelId="{80A1ADC3-40F2-497B-BFFB-095D71004696}">
+      <dsp:nvSpPr>
+        <dsp:cNvPr id="0" name=""/>
+        <dsp:cNvSpPr/>
+      </dsp:nvSpPr>
+      <dsp:spPr>
+        <a:xfrm>
+          <a:off x="7069795" y="3544702"/>
+          <a:ext cx="1207175" cy="572916"/>
+        </a:xfrm>
+        <a:custGeom>
+          <a:avLst/>
+          <a:gdLst/>
+          <a:ahLst/>
+          <a:cxnLst/>
+          <a:rect l="0" t="0" r="0" b="0"/>
+          <a:pathLst>
+            <a:path>
+              <a:moveTo>
+                <a:pt x="0" y="0"/>
+              </a:moveTo>
+              <a:lnTo>
+                <a:pt x="0" y="286458"/>
+              </a:lnTo>
+              <a:lnTo>
+                <a:pt x="1207175" y="286458"/>
+              </a:lnTo>
+              <a:lnTo>
+                <a:pt x="1207175" y="572916"/>
+              </a:lnTo>
+            </a:path>
+          </a:pathLst>
+        </a:custGeom>
+        <a:noFill/>
+        <a:ln w="19050" cap="flat" cmpd="sng" algn="ctr">
+          <a:solidFill>
+            <a:schemeClr val="accent1"/>
+          </a:solidFill>
+          <a:prstDash val="solid"/>
+          <a:miter lim="800000"/>
+          <a:headEnd type="none" w="med" len="med"/>
+          <a:tailEnd type="triangle" w="med" len="med"/>
+        </a:ln>
+        <a:effectLst/>
+      </dsp:spPr>
+      <dsp:style>
+        <a:lnRef idx="1">
+          <a:schemeClr val="accent1"/>
+        </a:lnRef>
+        <a:fillRef idx="0">
+          <a:schemeClr val="accent1"/>
+        </a:fillRef>
+        <a:effectRef idx="0">
+          <a:schemeClr val="accent1"/>
+        </a:effectRef>
+        <a:fontRef idx="minor">
+          <a:schemeClr val="tx1"/>
+        </a:fontRef>
+      </dsp:style>
+    </dsp:sp>
+    <dsp:sp modelId="{E60CAED6-E982-4A4F-B6A5-4C83674E2F7B}">
+      <dsp:nvSpPr>
+        <dsp:cNvPr id="0" name=""/>
+        <dsp:cNvSpPr/>
+      </dsp:nvSpPr>
+      <dsp:spPr>
+        <a:xfrm>
+          <a:off x="5862619" y="3544702"/>
+          <a:ext cx="1207175" cy="572916"/>
+        </a:xfrm>
+        <a:custGeom>
+          <a:avLst/>
+          <a:gdLst/>
+          <a:ahLst/>
+          <a:cxnLst/>
+          <a:rect l="0" t="0" r="0" b="0"/>
+          <a:pathLst>
+            <a:path>
+              <a:moveTo>
+                <a:pt x="1207175" y="0"/>
+              </a:moveTo>
+              <a:lnTo>
+                <a:pt x="1207175" y="286458"/>
+              </a:lnTo>
+              <a:lnTo>
+                <a:pt x="0" y="286458"/>
+              </a:lnTo>
+              <a:lnTo>
+                <a:pt x="0" y="572916"/>
+              </a:lnTo>
+            </a:path>
+          </a:pathLst>
+        </a:custGeom>
+        <a:noFill/>
+        <a:ln w="19050" cap="flat" cmpd="sng" algn="ctr">
+          <a:solidFill>
+            <a:schemeClr val="accent1"/>
+          </a:solidFill>
+          <a:prstDash val="solid"/>
+          <a:miter lim="800000"/>
+          <a:headEnd type="none" w="med" len="med"/>
+          <a:tailEnd type="triangle" w="med" len="med"/>
+        </a:ln>
+        <a:effectLst/>
+      </dsp:spPr>
+      <dsp:style>
+        <a:lnRef idx="1">
+          <a:schemeClr val="accent1"/>
+        </a:lnRef>
+        <a:fillRef idx="0">
+          <a:schemeClr val="accent1"/>
+        </a:fillRef>
+        <a:effectRef idx="0">
+          <a:schemeClr val="accent1"/>
+        </a:effectRef>
+        <a:fontRef idx="minor">
+          <a:schemeClr val="tx1"/>
+        </a:fontRef>
+      </dsp:style>
+    </dsp:sp>
+    <dsp:sp modelId="{1944F29F-558C-4AFF-82FE-C3FCA5338613}">
+      <dsp:nvSpPr>
+        <dsp:cNvPr id="0" name=""/>
+        <dsp:cNvSpPr/>
+      </dsp:nvSpPr>
+      <dsp:spPr>
+        <a:xfrm>
+          <a:off x="4690343" y="1795916"/>
+          <a:ext cx="2379451" cy="572916"/>
+        </a:xfrm>
+        <a:custGeom>
+          <a:avLst/>
+          <a:gdLst/>
+          <a:ahLst/>
+          <a:cxnLst/>
+          <a:rect l="0" t="0" r="0" b="0"/>
+          <a:pathLst>
+            <a:path>
+              <a:moveTo>
+                <a:pt x="0" y="0"/>
+              </a:moveTo>
+              <a:lnTo>
+                <a:pt x="0" y="286458"/>
+              </a:lnTo>
+              <a:lnTo>
+                <a:pt x="2379451" y="286458"/>
+              </a:lnTo>
+              <a:lnTo>
+                <a:pt x="2379451" y="572916"/>
+              </a:lnTo>
+            </a:path>
+          </a:pathLst>
+        </a:custGeom>
+        <a:noFill/>
+        <a:ln w="19050" cap="flat" cmpd="sng" algn="ctr">
+          <a:solidFill>
+            <a:schemeClr val="accent1"/>
+          </a:solidFill>
+          <a:prstDash val="solid"/>
+          <a:miter lim="800000"/>
+          <a:headEnd type="none" w="med" len="med"/>
+          <a:tailEnd type="triangle" w="med" len="med"/>
+        </a:ln>
+        <a:effectLst/>
+      </dsp:spPr>
+      <dsp:style>
+        <a:lnRef idx="1">
+          <a:schemeClr val="accent1"/>
+        </a:lnRef>
+        <a:fillRef idx="0">
+          <a:schemeClr val="accent1"/>
+        </a:fillRef>
+        <a:effectRef idx="0">
+          <a:schemeClr val="accent1"/>
+        </a:effectRef>
+        <a:fontRef idx="minor">
+          <a:schemeClr val="tx1"/>
+        </a:fontRef>
+      </dsp:style>
+    </dsp:sp>
+    <dsp:sp modelId="{AE493773-4D26-4ED7-88EE-533AC3BCDFEF}">
+      <dsp:nvSpPr>
+        <dsp:cNvPr id="0" name=""/>
+        <dsp:cNvSpPr/>
+      </dsp:nvSpPr>
+      <dsp:spPr>
+        <a:xfrm>
+          <a:off x="2312324" y="3542629"/>
+          <a:ext cx="1208730" cy="572916"/>
+        </a:xfrm>
+        <a:custGeom>
+          <a:avLst/>
+          <a:gdLst/>
+          <a:ahLst/>
+          <a:cxnLst/>
+          <a:rect l="0" t="0" r="0" b="0"/>
+          <a:pathLst>
+            <a:path>
+              <a:moveTo>
+                <a:pt x="0" y="0"/>
+              </a:moveTo>
+              <a:lnTo>
+                <a:pt x="0" y="286458"/>
+              </a:lnTo>
+              <a:lnTo>
+                <a:pt x="1208730" y="286458"/>
+              </a:lnTo>
+              <a:lnTo>
+                <a:pt x="1208730" y="572916"/>
+              </a:lnTo>
+            </a:path>
+          </a:pathLst>
+        </a:custGeom>
+        <a:noFill/>
+        <a:ln w="19050" cap="flat" cmpd="sng" algn="ctr">
+          <a:solidFill>
+            <a:schemeClr val="accent1"/>
+          </a:solidFill>
+          <a:prstDash val="solid"/>
+          <a:miter lim="800000"/>
+          <a:headEnd type="none" w="med" len="med"/>
+          <a:tailEnd type="triangle" w="med" len="med"/>
+        </a:ln>
+        <a:effectLst/>
+      </dsp:spPr>
+      <dsp:style>
+        <a:lnRef idx="1">
+          <a:schemeClr val="accent1"/>
+        </a:lnRef>
+        <a:fillRef idx="0">
+          <a:schemeClr val="accent1"/>
+        </a:fillRef>
+        <a:effectRef idx="0">
+          <a:schemeClr val="accent1"/>
+        </a:effectRef>
+        <a:fontRef idx="minor">
+          <a:schemeClr val="tx1"/>
+        </a:fontRef>
+      </dsp:style>
+    </dsp:sp>
+    <dsp:sp modelId="{8BC382D4-C628-43A2-A316-F49271144571}">
+      <dsp:nvSpPr>
+        <dsp:cNvPr id="0" name=""/>
+        <dsp:cNvSpPr/>
+      </dsp:nvSpPr>
+      <dsp:spPr>
+        <a:xfrm>
+          <a:off x="1105148" y="3542629"/>
+          <a:ext cx="1207175" cy="572916"/>
+        </a:xfrm>
+        <a:custGeom>
+          <a:avLst/>
+          <a:gdLst/>
+          <a:ahLst/>
+          <a:cxnLst/>
+          <a:rect l="0" t="0" r="0" b="0"/>
+          <a:pathLst>
+            <a:path>
+              <a:moveTo>
+                <a:pt x="1207175" y="0"/>
+              </a:moveTo>
+              <a:lnTo>
+                <a:pt x="1207175" y="286458"/>
+              </a:lnTo>
+              <a:lnTo>
+                <a:pt x="0" y="286458"/>
+              </a:lnTo>
+              <a:lnTo>
+                <a:pt x="0" y="572916"/>
+              </a:lnTo>
+            </a:path>
+          </a:pathLst>
+        </a:custGeom>
+        <a:noFill/>
+        <a:ln w="19050" cap="flat" cmpd="sng" algn="ctr">
+          <a:solidFill>
+            <a:schemeClr val="accent1"/>
+          </a:solidFill>
+          <a:prstDash val="solid"/>
+          <a:miter lim="800000"/>
+          <a:headEnd type="none" w="med" len="med"/>
+          <a:tailEnd type="triangle" w="med" len="med"/>
+        </a:ln>
+        <a:effectLst/>
+      </dsp:spPr>
+      <dsp:style>
+        <a:lnRef idx="1">
+          <a:schemeClr val="accent1"/>
+        </a:lnRef>
+        <a:fillRef idx="0">
+          <a:schemeClr val="accent1"/>
+        </a:fillRef>
+        <a:effectRef idx="0">
+          <a:schemeClr val="accent1"/>
+        </a:effectRef>
+        <a:fontRef idx="minor">
+          <a:schemeClr val="tx1"/>
+        </a:fontRef>
+      </dsp:style>
+    </dsp:sp>
+    <dsp:sp modelId="{8FFA7E2D-31EA-4288-995A-DE5F25D6B811}">
+      <dsp:nvSpPr>
+        <dsp:cNvPr id="0" name=""/>
+        <dsp:cNvSpPr/>
+      </dsp:nvSpPr>
+      <dsp:spPr>
+        <a:xfrm>
+          <a:off x="2312324" y="1795916"/>
+          <a:ext cx="2378019" cy="572916"/>
+        </a:xfrm>
+        <a:custGeom>
+          <a:avLst/>
+          <a:gdLst/>
+          <a:ahLst/>
+          <a:cxnLst/>
+          <a:rect l="0" t="0" r="0" b="0"/>
+          <a:pathLst>
+            <a:path>
+              <a:moveTo>
+                <a:pt x="2378019" y="0"/>
+              </a:moveTo>
+              <a:lnTo>
+                <a:pt x="2378019" y="286458"/>
+              </a:lnTo>
+              <a:lnTo>
+                <a:pt x="0" y="286458"/>
+              </a:lnTo>
+              <a:lnTo>
+                <a:pt x="0" y="572916"/>
+              </a:lnTo>
+            </a:path>
+          </a:pathLst>
+        </a:custGeom>
+        <a:noFill/>
+        <a:ln w="19050" cap="flat" cmpd="sng" algn="ctr">
+          <a:solidFill>
+            <a:schemeClr val="accent1"/>
+          </a:solidFill>
+          <a:prstDash val="solid"/>
+          <a:miter lim="800000"/>
+          <a:headEnd type="none" w="med" len="med"/>
+          <a:tailEnd type="triangle" w="med" len="med"/>
+        </a:ln>
+        <a:effectLst/>
+      </dsp:spPr>
+      <dsp:style>
+        <a:lnRef idx="1">
+          <a:schemeClr val="accent1"/>
+        </a:lnRef>
+        <a:fillRef idx="0">
+          <a:schemeClr val="accent1"/>
+        </a:fillRef>
+        <a:effectRef idx="0">
+          <a:schemeClr val="accent1"/>
+        </a:effectRef>
+        <a:fontRef idx="minor">
+          <a:schemeClr val="tx1"/>
+        </a:fontRef>
+      </dsp:style>
+    </dsp:sp>
+    <dsp:sp modelId="{35591249-49B0-4DE6-88F3-5C346C278126}">
+      <dsp:nvSpPr>
+        <dsp:cNvPr id="0" name=""/>
+        <dsp:cNvSpPr/>
+      </dsp:nvSpPr>
+      <dsp:spPr>
+        <a:xfrm>
+          <a:off x="2812282" y="387360"/>
+          <a:ext cx="3756121" cy="1408555"/>
+        </a:xfrm>
+        <a:prstGeom prst="rect">
+          <a:avLst/>
+        </a:prstGeom>
+        <a:solidFill>
+          <a:schemeClr val="accent2"/>
+        </a:solidFill>
+        <a:ln w="12700" cap="flat" cmpd="sng" algn="ctr">
+          <a:solidFill>
+            <a:schemeClr val="tx1"/>
+          </a:solidFill>
+          <a:prstDash val="solid"/>
+          <a:miter lim="800000"/>
+        </a:ln>
+        <a:effectLst/>
+      </dsp:spPr>
+      <dsp:style>
+        <a:lnRef idx="2">
+          <a:scrgbClr r="0" g="0" b="0"/>
+        </a:lnRef>
+        <a:fillRef idx="1">
+          <a:scrgbClr r="0" g="0" b="0"/>
+        </a:fillRef>
+        <a:effectRef idx="0">
+          <a:scrgbClr r="0" g="0" b="0"/>
+        </a:effectRef>
+        <a:fontRef idx="minor">
+          <a:schemeClr val="lt1"/>
+        </a:fontRef>
+      </dsp:style>
+      <dsp:txBody>
+        <a:bodyPr spcFirstLastPara="0" vert="horz" wrap="square" lIns="12700" tIns="12700" rIns="12700" bIns="12700" numCol="1" spcCol="1270" anchor="ctr" anchorCtr="0">
+          <a:noAutofit/>
+        </a:bodyPr>
+        <a:lstStyle/>
+        <a:p>
+          <a:pPr marL="0" lvl="0" indent="0" algn="ctr" defTabSz="889000">
+            <a:lnSpc>
+              <a:spcPct val="90000"/>
+            </a:lnSpc>
+            <a:spcBef>
+              <a:spcPct val="0"/>
+            </a:spcBef>
+            <a:spcAft>
+              <a:spcPct val="35000"/>
+            </a:spcAft>
+            <a:buNone/>
+          </a:pPr>
+          <a:r>
+            <a:rPr lang="en-US" sz="2000" kern="1200" dirty="0"/>
+            <a:t>All Vehicles</a:t>
+          </a:r>
+        </a:p>
+      </dsp:txBody>
+      <dsp:txXfrm>
+        <a:off x="2812282" y="387360"/>
+        <a:ext cx="3756121" cy="1408555"/>
+      </dsp:txXfrm>
+    </dsp:sp>
+    <dsp:sp modelId="{6EC74892-373F-4465-A48B-3D9D87EF5754}">
+      <dsp:nvSpPr>
+        <dsp:cNvPr id="0" name=""/>
+        <dsp:cNvSpPr/>
+      </dsp:nvSpPr>
+      <dsp:spPr>
+        <a:xfrm>
+          <a:off x="551643" y="2368832"/>
+          <a:ext cx="3521362" cy="1173796"/>
+        </a:xfrm>
+        <a:prstGeom prst="rect">
+          <a:avLst/>
+        </a:prstGeom>
+        <a:solidFill>
+          <a:schemeClr val="accent2"/>
+        </a:solidFill>
+        <a:ln w="12700" cap="flat" cmpd="sng" algn="ctr">
+          <a:solidFill>
+            <a:schemeClr val="tx1"/>
+          </a:solidFill>
+          <a:prstDash val="solid"/>
+          <a:miter lim="800000"/>
+        </a:ln>
+        <a:effectLst/>
+      </dsp:spPr>
+      <dsp:style>
+        <a:lnRef idx="2">
+          <a:scrgbClr r="0" g="0" b="0"/>
+        </a:lnRef>
+        <a:fillRef idx="1">
+          <a:scrgbClr r="0" g="0" b="0"/>
+        </a:fillRef>
+        <a:effectRef idx="0">
+          <a:scrgbClr r="0" g="0" b="0"/>
+        </a:effectRef>
+        <a:fontRef idx="minor">
+          <a:schemeClr val="lt1"/>
+        </a:fontRef>
+      </dsp:style>
+      <dsp:txBody>
+        <a:bodyPr spcFirstLastPara="0" vert="horz" wrap="square" lIns="12700" tIns="12700" rIns="12700" bIns="12700" numCol="1" spcCol="1270" anchor="ctr" anchorCtr="0">
+          <a:noAutofit/>
+        </a:bodyPr>
+        <a:lstStyle/>
+        <a:p>
+          <a:pPr marL="0" lvl="0" indent="0" algn="ctr" defTabSz="889000">
+            <a:lnSpc>
+              <a:spcPct val="90000"/>
+            </a:lnSpc>
+            <a:spcBef>
+              <a:spcPct val="0"/>
+            </a:spcBef>
+            <a:spcAft>
+              <a:spcPct val="35000"/>
+            </a:spcAft>
+            <a:buNone/>
+          </a:pPr>
+          <a:r>
+            <a:rPr lang="en-US" sz="2000" kern="1200" dirty="0"/>
+            <a:t>Hauling Vehicles</a:t>
+          </a:r>
+        </a:p>
+      </dsp:txBody>
+      <dsp:txXfrm>
+        <a:off x="551643" y="2368832"/>
+        <a:ext cx="3521362" cy="1173796"/>
+      </dsp:txXfrm>
+    </dsp:sp>
+    <dsp:sp modelId="{DDA8EE1A-AC0A-4D9F-9CCA-7405442EE8D9}">
+      <dsp:nvSpPr>
+        <dsp:cNvPr id="0" name=""/>
+        <dsp:cNvSpPr/>
+      </dsp:nvSpPr>
+      <dsp:spPr>
+        <a:xfrm>
+          <a:off x="146482" y="4115545"/>
+          <a:ext cx="1917332" cy="1002685"/>
+        </a:xfrm>
+        <a:prstGeom prst="rect">
+          <a:avLst/>
+        </a:prstGeom>
+        <a:solidFill>
+          <a:schemeClr val="accent2"/>
+        </a:solidFill>
+        <a:ln w="12700" cap="flat" cmpd="sng" algn="ctr">
+          <a:solidFill>
+            <a:schemeClr val="tx1"/>
+          </a:solidFill>
+          <a:prstDash val="solid"/>
+          <a:miter lim="800000"/>
+        </a:ln>
+        <a:effectLst/>
+      </dsp:spPr>
+      <dsp:style>
+        <a:lnRef idx="2">
+          <a:scrgbClr r="0" g="0" b="0"/>
+        </a:lnRef>
+        <a:fillRef idx="1">
+          <a:scrgbClr r="0" g="0" b="0"/>
+        </a:fillRef>
+        <a:effectRef idx="0">
+          <a:scrgbClr r="0" g="0" b="0"/>
+        </a:effectRef>
+        <a:fontRef idx="minor">
+          <a:schemeClr val="lt1"/>
+        </a:fontRef>
+      </dsp:style>
+      <dsp:txBody>
+        <a:bodyPr spcFirstLastPara="0" vert="horz" wrap="square" lIns="12700" tIns="12700" rIns="12700" bIns="12700" numCol="1" spcCol="1270" anchor="ctr" anchorCtr="0">
+          <a:noAutofit/>
+        </a:bodyPr>
+        <a:lstStyle/>
+        <a:p>
+          <a:pPr marL="0" lvl="0" indent="0" algn="ctr" defTabSz="889000">
+            <a:lnSpc>
+              <a:spcPct val="90000"/>
+            </a:lnSpc>
+            <a:spcBef>
+              <a:spcPct val="0"/>
+            </a:spcBef>
+            <a:spcAft>
+              <a:spcPct val="35000"/>
+            </a:spcAft>
+            <a:buNone/>
+          </a:pPr>
+          <a:r>
+            <a:rPr lang="en-US" sz="2000" kern="1200" dirty="0"/>
+            <a:t>ICE</a:t>
+          </a:r>
+        </a:p>
+      </dsp:txBody>
+      <dsp:txXfrm>
+        <a:off x="146482" y="4115545"/>
+        <a:ext cx="1917332" cy="1002685"/>
+      </dsp:txXfrm>
+    </dsp:sp>
+    <dsp:sp modelId="{C9C0A8BD-918C-4C8E-B358-5DBA1BC4F123}">
+      <dsp:nvSpPr>
+        <dsp:cNvPr id="0" name=""/>
+        <dsp:cNvSpPr/>
+      </dsp:nvSpPr>
+      <dsp:spPr>
+        <a:xfrm>
+          <a:off x="2563944" y="4115545"/>
+          <a:ext cx="1914222" cy="1002685"/>
+        </a:xfrm>
+        <a:prstGeom prst="rect">
+          <a:avLst/>
+        </a:prstGeom>
+        <a:solidFill>
+          <a:schemeClr val="accent2"/>
+        </a:solidFill>
+        <a:ln w="12700" cap="flat" cmpd="sng" algn="ctr">
+          <a:solidFill>
+            <a:schemeClr val="tx1"/>
+          </a:solidFill>
+          <a:prstDash val="solid"/>
+          <a:miter lim="800000"/>
+        </a:ln>
+        <a:effectLst/>
+      </dsp:spPr>
+      <dsp:style>
+        <a:lnRef idx="2">
+          <a:scrgbClr r="0" g="0" b="0"/>
+        </a:lnRef>
+        <a:fillRef idx="1">
+          <a:scrgbClr r="0" g="0" b="0"/>
+        </a:fillRef>
+        <a:effectRef idx="0">
+          <a:scrgbClr r="0" g="0" b="0"/>
+        </a:effectRef>
+        <a:fontRef idx="minor">
+          <a:schemeClr val="lt1"/>
+        </a:fontRef>
+      </dsp:style>
+      <dsp:txBody>
+        <a:bodyPr spcFirstLastPara="0" vert="horz" wrap="square" lIns="12700" tIns="12700" rIns="12700" bIns="12700" numCol="1" spcCol="1270" anchor="ctr" anchorCtr="0">
+          <a:noAutofit/>
+        </a:bodyPr>
+        <a:lstStyle/>
+        <a:p>
+          <a:pPr marL="0" lvl="0" indent="0" algn="ctr" defTabSz="889000">
+            <a:lnSpc>
+              <a:spcPct val="90000"/>
+            </a:lnSpc>
+            <a:spcBef>
+              <a:spcPct val="0"/>
+            </a:spcBef>
+            <a:spcAft>
+              <a:spcPct val="35000"/>
+            </a:spcAft>
+            <a:buNone/>
+          </a:pPr>
+          <a:r>
+            <a:rPr lang="en-US" sz="2000" kern="1200" dirty="0"/>
+            <a:t>BEV</a:t>
+          </a:r>
+        </a:p>
+      </dsp:txBody>
+      <dsp:txXfrm>
+        <a:off x="2563944" y="4115545"/>
+        <a:ext cx="1914222" cy="1002685"/>
+      </dsp:txXfrm>
+    </dsp:sp>
+    <dsp:sp modelId="{14E57F1F-21B9-4C1B-9A2B-7E6D45E15A4E}">
+      <dsp:nvSpPr>
+        <dsp:cNvPr id="0" name=""/>
+        <dsp:cNvSpPr/>
+      </dsp:nvSpPr>
+      <dsp:spPr>
+        <a:xfrm>
+          <a:off x="5310546" y="2368832"/>
+          <a:ext cx="3518497" cy="1175869"/>
+        </a:xfrm>
+        <a:prstGeom prst="rect">
+          <a:avLst/>
+        </a:prstGeom>
+        <a:solidFill>
+          <a:schemeClr val="accent2"/>
+        </a:solidFill>
+        <a:ln w="12700" cap="flat" cmpd="sng" algn="ctr">
+          <a:solidFill>
+            <a:schemeClr val="tx1"/>
+          </a:solidFill>
+          <a:prstDash val="solid"/>
+          <a:miter lim="800000"/>
+        </a:ln>
+        <a:effectLst/>
+      </dsp:spPr>
+      <dsp:style>
+        <a:lnRef idx="2">
+          <a:scrgbClr r="0" g="0" b="0"/>
+        </a:lnRef>
+        <a:fillRef idx="1">
+          <a:scrgbClr r="0" g="0" b="0"/>
+        </a:fillRef>
+        <a:effectRef idx="0">
+          <a:scrgbClr r="0" g="0" b="0"/>
+        </a:effectRef>
+        <a:fontRef idx="minor">
+          <a:schemeClr val="lt1"/>
+        </a:fontRef>
+      </dsp:style>
+      <dsp:txBody>
+        <a:bodyPr spcFirstLastPara="0" vert="horz" wrap="square" lIns="12700" tIns="12700" rIns="12700" bIns="12700" numCol="1" spcCol="1270" anchor="ctr" anchorCtr="0">
+          <a:noAutofit/>
+        </a:bodyPr>
+        <a:lstStyle/>
+        <a:p>
+          <a:pPr marL="0" lvl="0" indent="0" algn="ctr" defTabSz="889000">
+            <a:lnSpc>
+              <a:spcPct val="90000"/>
+            </a:lnSpc>
+            <a:spcBef>
+              <a:spcPct val="0"/>
+            </a:spcBef>
+            <a:spcAft>
+              <a:spcPct val="35000"/>
+            </a:spcAft>
+            <a:buNone/>
+          </a:pPr>
+          <a:r>
+            <a:rPr lang="en-US" sz="2000" kern="1200" dirty="0" err="1"/>
+            <a:t>Nonhauling</a:t>
+          </a:r>
+          <a:r>
+            <a:rPr lang="en-US" sz="2000" kern="1200" dirty="0"/>
+            <a:t> Vehicles</a:t>
+          </a:r>
+        </a:p>
+      </dsp:txBody>
+      <dsp:txXfrm>
+        <a:off x="5310546" y="2368832"/>
+        <a:ext cx="3518497" cy="1175869"/>
+      </dsp:txXfrm>
+    </dsp:sp>
+    <dsp:sp modelId="{5856DCCA-786A-43C6-8785-19A535B844DA}">
+      <dsp:nvSpPr>
+        <dsp:cNvPr id="0" name=""/>
+        <dsp:cNvSpPr/>
+      </dsp:nvSpPr>
+      <dsp:spPr>
+        <a:xfrm>
+          <a:off x="4905508" y="4117619"/>
+          <a:ext cx="1914222" cy="1002685"/>
+        </a:xfrm>
+        <a:prstGeom prst="rect">
+          <a:avLst/>
+        </a:prstGeom>
+        <a:solidFill>
+          <a:schemeClr val="accent2"/>
+        </a:solidFill>
+        <a:ln w="12700" cap="flat" cmpd="sng" algn="ctr">
+          <a:solidFill>
+            <a:schemeClr val="tx1"/>
+          </a:solidFill>
+          <a:prstDash val="solid"/>
+          <a:miter lim="800000"/>
+        </a:ln>
+        <a:effectLst/>
+      </dsp:spPr>
+      <dsp:style>
+        <a:lnRef idx="2">
+          <a:scrgbClr r="0" g="0" b="0"/>
+        </a:lnRef>
+        <a:fillRef idx="1">
+          <a:scrgbClr r="0" g="0" b="0"/>
+        </a:fillRef>
+        <a:effectRef idx="0">
+          <a:scrgbClr r="0" g="0" b="0"/>
+        </a:effectRef>
+        <a:fontRef idx="minor">
+          <a:schemeClr val="lt1"/>
+        </a:fontRef>
+      </dsp:style>
+      <dsp:txBody>
+        <a:bodyPr spcFirstLastPara="0" vert="horz" wrap="square" lIns="12700" tIns="12700" rIns="12700" bIns="12700" numCol="1" spcCol="1270" anchor="ctr" anchorCtr="0">
+          <a:noAutofit/>
+        </a:bodyPr>
+        <a:lstStyle/>
+        <a:p>
+          <a:pPr marL="0" lvl="0" indent="0" algn="ctr" defTabSz="889000">
+            <a:lnSpc>
+              <a:spcPct val="90000"/>
+            </a:lnSpc>
+            <a:spcBef>
+              <a:spcPct val="0"/>
+            </a:spcBef>
+            <a:spcAft>
+              <a:spcPct val="35000"/>
+            </a:spcAft>
+            <a:buNone/>
+          </a:pPr>
+          <a:r>
+            <a:rPr lang="en-US" sz="2000" kern="1200" dirty="0"/>
+            <a:t>ICE</a:t>
+          </a:r>
+        </a:p>
+      </dsp:txBody>
+      <dsp:txXfrm>
+        <a:off x="4905508" y="4117619"/>
+        <a:ext cx="1914222" cy="1002685"/>
+      </dsp:txXfrm>
+    </dsp:sp>
+    <dsp:sp modelId="{379E58F8-578F-4A92-9D30-129E61E2E5B2}">
+      <dsp:nvSpPr>
+        <dsp:cNvPr id="0" name=""/>
+        <dsp:cNvSpPr/>
+      </dsp:nvSpPr>
+      <dsp:spPr>
+        <a:xfrm>
+          <a:off x="7319859" y="4117619"/>
+          <a:ext cx="1914222" cy="1002685"/>
+        </a:xfrm>
+        <a:prstGeom prst="rect">
+          <a:avLst/>
+        </a:prstGeom>
+        <a:solidFill>
+          <a:schemeClr val="accent2"/>
+        </a:solidFill>
+        <a:ln w="12700" cap="flat" cmpd="sng" algn="ctr">
+          <a:solidFill>
+            <a:schemeClr val="tx1"/>
+          </a:solidFill>
+          <a:prstDash val="solid"/>
+          <a:miter lim="800000"/>
+        </a:ln>
+        <a:effectLst/>
+      </dsp:spPr>
+      <dsp:style>
+        <a:lnRef idx="2">
+          <a:scrgbClr r="0" g="0" b="0"/>
+        </a:lnRef>
+        <a:fillRef idx="1">
+          <a:scrgbClr r="0" g="0" b="0"/>
+        </a:fillRef>
+        <a:effectRef idx="0">
+          <a:scrgbClr r="0" g="0" b="0"/>
+        </a:effectRef>
+        <a:fontRef idx="minor">
+          <a:schemeClr val="lt1"/>
+        </a:fontRef>
+      </dsp:style>
+      <dsp:txBody>
+        <a:bodyPr spcFirstLastPara="0" vert="horz" wrap="square" lIns="12700" tIns="12700" rIns="12700" bIns="12700" numCol="1" spcCol="1270" anchor="ctr" anchorCtr="0">
+          <a:noAutofit/>
+        </a:bodyPr>
+        <a:lstStyle/>
+        <a:p>
+          <a:pPr marL="0" lvl="0" indent="0" algn="ctr" defTabSz="889000">
+            <a:lnSpc>
+              <a:spcPct val="90000"/>
+            </a:lnSpc>
+            <a:spcBef>
+              <a:spcPct val="0"/>
+            </a:spcBef>
+            <a:spcAft>
+              <a:spcPct val="35000"/>
+            </a:spcAft>
+            <a:buNone/>
+          </a:pPr>
+          <a:r>
+            <a:rPr lang="en-US" sz="2000" kern="1200" dirty="0"/>
+            <a:t>BEV</a:t>
+          </a:r>
+        </a:p>
+      </dsp:txBody>
+      <dsp:txXfrm>
+        <a:off x="7319859" y="4117619"/>
+        <a:ext cx="1914222" cy="1002685"/>
+      </dsp:txXfrm>
+    </dsp:sp>
+  </dsp:spTree>
+</dsp:drawing>
+</file>
+
+<file path=ppt/diagrams/layout1.xml><?xml version="1.0" encoding="utf-8"?>
+<dgm:layoutDef xmlns:dgm="http://schemas.openxmlformats.org/drawingml/2006/diagram" xmlns:a="http://schemas.openxmlformats.org/drawingml/2006/main" uniqueId="urn:microsoft.com/office/officeart/2005/8/layout/orgChart1">
+  <dgm:title val=""/>
+  <dgm:desc val=""/>
+  <dgm:catLst>
+    <dgm:cat type="hierarchy" pri="1000"/>
+    <dgm:cat type="convert" pri="6000"/>
+  </dgm:catLst>
+  <dgm:sampData>
+    <dgm:dataModel>
+      <dgm:ptLst>
+        <dgm:pt modelId="0" type="doc"/>
+        <dgm:pt modelId="1">
+          <dgm:prSet phldr="1"/>
+        </dgm:pt>
+        <dgm:pt modelId="2" type="asst">
+          <dgm:prSet phldr="1"/>
+        </dgm:pt>
+        <dgm:pt modelId="3">
+          <dgm:prSet phldr="1"/>
+        </dgm:pt>
+        <dgm:pt modelId="4">
+          <dgm:prSet phldr="1"/>
+        </dgm:pt>
+        <dgm:pt modelId="5">
+          <dgm:prSet phldr="1"/>
+        </dgm:pt>
+      </dgm:ptLst>
+      <dgm:cxnLst>
+        <dgm:cxn modelId="5" srcId="0" destId="1" srcOrd="0" destOrd="0"/>
+        <dgm:cxn modelId="6" srcId="1" destId="2" srcOrd="0" destOrd="0"/>
+        <dgm:cxn modelId="7" srcId="1" destId="3" srcOrd="1" destOrd="0"/>
+        <dgm:cxn modelId="8" srcId="1" destId="4" srcOrd="2" destOrd="0"/>
+        <dgm:cxn modelId="9" srcId="1" destId="5" srcOrd="3" destOrd="0"/>
+      </dgm:cxnLst>
+      <dgm:bg/>
+      <dgm:whole/>
+    </dgm:dataModel>
+  </dgm:sampData>
+  <dgm:styleData>
+    <dgm:dataModel>
+      <dgm:ptLst>
+        <dgm:pt modelId="0" type="doc"/>
+        <dgm:pt modelId="1"/>
+        <dgm:pt modelId="12"/>
+        <dgm:pt modelId="13"/>
+      </dgm:ptLst>
+      <dgm:cxnLst>
+        <dgm:cxn modelId="2" srcId="0" destId="1" srcOrd="0" destOrd="0"/>
+        <dgm:cxn modelId="16" srcId="1" destId="12" srcOrd="1" destOrd="0"/>
+        <dgm:cxn modelId="17" srcId="1" destId="13" srcOrd="2" destOrd="0"/>
+      </dgm:cxnLst>
+      <dgm:bg/>
+      <dgm:whole/>
+    </dgm:dataModel>
+  </dgm:styleData>
+  <dgm:clrData>
+    <dgm:dataModel>
+      <dgm:ptLst>
+        <dgm:pt modelId="0" type="doc"/>
+        <dgm:pt modelId="1"/>
+        <dgm:pt modelId="11" type="asst"/>
+        <dgm:pt modelId="12"/>
+        <dgm:pt modelId="13"/>
+        <dgm:pt modelId="14"/>
+      </dgm:ptLst>
+      <dgm:cxnLst>
+        <dgm:cxn modelId="2" srcId="0" destId="1" srcOrd="0" destOrd="0"/>
+        <dgm:cxn modelId="15" srcId="1" destId="11" srcOrd="0" destOrd="0"/>
+        <dgm:cxn modelId="16" srcId="1" destId="12" srcOrd="1" destOrd="0"/>
+        <dgm:cxn modelId="17" srcId="1" destId="13" srcOrd="2" destOrd="0"/>
+        <dgm:cxn modelId="18" srcId="1" destId="14" srcOrd="2" destOrd="0"/>
+      </dgm:cxnLst>
+      <dgm:bg/>
+      <dgm:whole/>
+    </dgm:dataModel>
+  </dgm:clrData>
+  <dgm:layoutNode name="hierChild1">
+    <dgm:varLst>
+      <dgm:orgChart val="1"/>
+      <dgm:chPref val="1"/>
+      <dgm:dir/>
+      <dgm:animOne val="branch"/>
+      <dgm:animLvl val="lvl"/>
+      <dgm:resizeHandles/>
+    </dgm:varLst>
+    <dgm:choose name="Name0">
+      <dgm:if name="Name1" func="var" arg="dir" op="equ" val="norm">
+        <dgm:alg type="hierChild">
+          <dgm:param type="linDir" val="fromL"/>
+        </dgm:alg>
+      </dgm:if>
+      <dgm:else name="Name2">
+        <dgm:alg type="hierChild">
+          <dgm:param type="linDir" val="fromR"/>
+        </dgm:alg>
+      </dgm:else>
+    </dgm:choose>
+    <dgm:shape xmlns:r="http://schemas.openxmlformats.org/officeDocument/2006/relationships" r:blip="">
+      <dgm:adjLst/>
+    </dgm:shape>
+    <dgm:presOf/>
+    <dgm:constrLst>
+      <dgm:constr type="w" for="des" forName="rootComposite1" refType="w" fact="10"/>
+      <dgm:constr type="h" for="des" forName="rootComposite1" refType="w" refFor="des" refForName="rootComposite1" fact="0.5"/>
+      <dgm:constr type="w" for="des" forName="rootComposite" refType="w" fact="10"/>
+      <dgm:constr type="h" for="des" forName="rootComposite" refType="w" refFor="des" refForName="rootComposite1" fact="0.5"/>
+      <dgm:constr type="w" for="des" forName="rootComposite3" refType="w" fact="10"/>
+      <dgm:constr type="h" for="des" forName="rootComposite3" refType="w" refFor="des" refForName="rootComposite1" fact="0.5"/>
+      <dgm:constr type="primFontSz" for="des" ptType="node" op="equ"/>
+      <dgm:constr type="sp" for="des" op="equ"/>
+      <dgm:constr type="sp" for="des" forName="hierRoot1" refType="w" refFor="des" refForName="rootComposite1" fact="0.21"/>
+      <dgm:constr type="sp" for="des" forName="hierRoot2" refType="sp" refFor="des" refForName="hierRoot1"/>
+      <dgm:constr type="sp" for="des" forName="hierRoot3" refType="sp" refFor="des" refForName="hierRoot1"/>
+      <dgm:constr type="sibSp" refType="w" refFor="des" refForName="rootComposite1" fact="0.21"/>
+      <dgm:constr type="sibSp" for="des" forName="hierChild2" refType="sibSp"/>
+      <dgm:constr type="sibSp" for="des" forName="hierChild3" refType="sibSp"/>
+      <dgm:constr type="sibSp" for="des" forName="hierChild4" refType="sibSp"/>
+      <dgm:constr type="sibSp" for="des" forName="hierChild5" refType="sibSp"/>
+      <dgm:constr type="sibSp" for="des" forName="hierChild6" refType="sibSp"/>
+      <dgm:constr type="sibSp" for="des" forName="hierChild7" refType="sibSp"/>
+      <dgm:constr type="secSibSp" refType="w" refFor="des" refForName="rootComposite1" fact="0.21"/>
+      <dgm:constr type="secSibSp" for="des" forName="hierChild2" refType="secSibSp"/>
+      <dgm:constr type="secSibSp" for="des" forName="hierChild3" refType="secSibSp"/>
+      <dgm:constr type="secSibSp" for="des" forName="hierChild4" refType="secSibSp"/>
+      <dgm:constr type="secSibSp" for="des" forName="hierChild5" refType="secSibSp"/>
+      <dgm:constr type="secSibSp" for="des" forName="hierChild6" refType="secSibSp"/>
+      <dgm:constr type="secSibSp" for="des" forName="hierChild7" refType="secSibSp"/>
+    </dgm:constrLst>
+    <dgm:ruleLst/>
+    <dgm:forEach name="Name3" axis="ch">
+      <dgm:forEach name="Name4" axis="self" ptType="node">
+        <dgm:layoutNode name="hierRoot1">
+          <dgm:varLst>
+            <dgm:hierBranch val="init"/>
+          </dgm:varLst>
+          <dgm:choose name="Name5">
+            <dgm:if name="Name6" func="var" arg="hierBranch" op="equ" val="l">
+              <dgm:choose name="Name7">
+                <dgm:if name="Name8" axis="ch" ptType="asst" func="cnt" op="gte" val="1">
+                  <dgm:alg type="hierRoot">
+                    <dgm:param type="hierAlign" val="tR"/>
+                  </dgm:alg>
+                  <dgm:constrLst>
+                    <dgm:constr type="alignOff" val="0.65"/>
+                  </dgm:constrLst>
+                </dgm:if>
+                <dgm:else name="Name9">
+                  <dgm:alg type="hierRoot">
+                    <dgm:param type="hierAlign" val="tR"/>
+                  </dgm:alg>
+                  <dgm:constrLst>
+                    <dgm:constr type="alignOff" val="0.25"/>
+                  </dgm:constrLst>
+                </dgm:else>
+              </dgm:choose>
+            </dgm:if>
+            <dgm:if name="Name10" func="var" arg="hierBranch" op="equ" val="r">
+              <dgm:choose name="Name11">
+                <dgm:if name="Name12" axis="ch" ptType="asst" func="cnt" op="gte" val="1">
+                  <dgm:alg type="hierRoot">
+                    <dgm:param type="hierAlign" val="tL"/>
+                  </dgm:alg>
+                  <dgm:constrLst>
+                    <dgm:constr type="alignOff" val="0.65"/>
+                  </dgm:constrLst>
+                </dgm:if>
+                <dgm:else name="Name13">
+                  <dgm:alg type="hierRoot">
+                    <dgm:param type="hierAlign" val="tL"/>
+                  </dgm:alg>
+                  <dgm:constrLst>
+                    <dgm:constr type="alignOff" val="0.25"/>
+                  </dgm:constrLst>
+                </dgm:else>
+              </dgm:choose>
+            </dgm:if>
+            <dgm:if name="Name14" func="var" arg="hierBranch" op="equ" val="hang">
+              <dgm:alg type="hierRoot"/>
+              <dgm:constrLst>
+                <dgm:constr type="alignOff" val="0.65"/>
+              </dgm:constrLst>
+            </dgm:if>
+            <dgm:else name="Name15">
+              <dgm:alg type="hierRoot"/>
+              <dgm:constrLst>
+                <dgm:constr type="alignOff"/>
+                <dgm:constr type="bendDist" for="des" ptType="parTrans" refType="sp" fact="0.5"/>
+              </dgm:constrLst>
+            </dgm:else>
+          </dgm:choose>
+          <dgm:shape xmlns:r="http://schemas.openxmlformats.org/officeDocument/2006/relationships" r:blip="">
+            <dgm:adjLst/>
+          </dgm:shape>
+          <dgm:presOf/>
+          <dgm:ruleLst/>
+          <dgm:layoutNode name="rootComposite1">
+            <dgm:alg type="composite"/>
+            <dgm:shape xmlns:r="http://schemas.openxmlformats.org/officeDocument/2006/relationships" r:blip="">
+              <dgm:adjLst/>
+            </dgm:shape>
+            <dgm:presOf axis="self" ptType="node" cnt="1"/>
+            <dgm:choose name="Name16">
+              <dgm:if name="Name17" func="var" arg="hierBranch" op="equ" val="init">
+                <dgm:constrLst>
+                  <dgm:constr type="l" for="ch" forName="rootText1"/>
+                  <dgm:constr type="t" for="ch" forName="rootText1"/>
+                  <dgm:constr type="w" for="ch" forName="rootText1" refType="w"/>
+                  <dgm:constr type="h" for="ch" forName="rootText1" refType="h"/>
+                  <dgm:constr type="l" for="ch" forName="rootConnector1"/>
+                  <dgm:constr type="t" for="ch" forName="rootConnector1"/>
+                  <dgm:constr type="w" for="ch" forName="rootConnector1" refType="w" refFor="ch" refForName="rootText1" fact="0.2"/>
+                  <dgm:constr type="h" for="ch" forName="rootConnector1" refType="h" refFor="ch" refForName="rootText1"/>
+                </dgm:constrLst>
+              </dgm:if>
+              <dgm:if name="Name18" func="var" arg="hierBranch" op="equ" val="l">
+                <dgm:constrLst>
+                  <dgm:constr type="l" for="ch" forName="rootText1"/>
+                  <dgm:constr type="t" for="ch" forName="rootText1"/>
+                  <dgm:constr type="w" for="ch" forName="rootText1" refType="w"/>
+                  <dgm:constr type="h" for="ch" forName="rootText1" refType="h"/>
+                  <dgm:constr type="r" for="ch" forName="rootConnector1" refType="w"/>
+                  <dgm:constr type="t" for="ch" forName="rootConnector1"/>
+                  <dgm:constr type="w" for="ch" forName="rootConnector1" refType="w" refFor="ch" refForName="rootText1" fact="0.2"/>
+                  <dgm:constr type="h" for="ch" forName="rootConnector1" refType="h" refFor="ch" refForName="rootText1"/>
+                </dgm:constrLst>
+              </dgm:if>
+              <dgm:if name="Name19" func="var" arg="hierBranch" op="equ" val="r">
+                <dgm:constrLst>
+                  <dgm:constr type="l" for="ch" forName="rootText1"/>
+                  <dgm:constr type="t" for="ch" forName="rootText1"/>
+                  <dgm:constr type="w" for="ch" forName="rootText1" refType="w"/>
+                  <dgm:constr type="h" for="ch" forName="rootText1" refType="h"/>
+                  <dgm:constr type="l" for="ch" forName="rootConnector1"/>
+                  <dgm:constr type="t" for="ch" forName="rootConnector1"/>
+                  <dgm:constr type="w" for="ch" forName="rootConnector1" refType="w" refFor="ch" refForName="rootText1" fact="0.2"/>
+                  <dgm:constr type="h" for="ch" forName="rootConnector1" refType="h" refFor="ch" refForName="rootText1"/>
+                </dgm:constrLst>
+              </dgm:if>
+              <dgm:else name="Name20">
+                <dgm:constrLst>
+                  <dgm:constr type="l" for="ch" forName="rootText1"/>
+                  <dgm:constr type="t" for="ch" forName="rootText1"/>
+                  <dgm:constr type="w" for="ch" forName="rootText1" refType="w"/>
+                  <dgm:constr type="h" for="ch" forName="rootText1" refType="h"/>
+                  <dgm:constr type="r" for="ch" forName="rootConnector1" refType="w"/>
+                  <dgm:constr type="t" for="ch" forName="rootConnector1"/>
+                  <dgm:constr type="w" for="ch" forName="rootConnector1" refType="w" refFor="ch" refForName="rootText1" fact="0.2"/>
+                  <dgm:constr type="h" for="ch" forName="rootConnector1" refType="h" refFor="ch" refForName="rootText1"/>
+                </dgm:constrLst>
+              </dgm:else>
+            </dgm:choose>
+            <dgm:ruleLst/>
+            <dgm:layoutNode name="rootText1" styleLbl="node0">
+              <dgm:varLst>
+                <dgm:chPref val="3"/>
+              </dgm:varLst>
+              <dgm:alg type="tx"/>
+              <dgm:shape xmlns:r="http://schemas.openxmlformats.org/officeDocument/2006/relationships" type="rect" r:blip="">
+                <dgm:adjLst/>
+              </dgm:shape>
+              <dgm:presOf axis="self" ptType="node" cnt="1"/>
+              <dgm:constrLst>
+                <dgm:constr type="primFontSz" val="65"/>
+                <dgm:constr type="lMarg" refType="primFontSz" fact="0.05"/>
+                <dgm:constr type="rMarg" refType="primFontSz" fact="0.05"/>
+                <dgm:constr type="tMarg" refType="primFontSz" fact="0.05"/>
+                <dgm:constr type="bMarg" refType="primFontSz" fact="0.05"/>
+              </dgm:constrLst>
+              <dgm:ruleLst>
+                <dgm:rule type="primFontSz" val="5" fact="NaN" max="NaN"/>
+              </dgm:ruleLst>
+            </dgm:layoutNode>
+            <dgm:layoutNode name="rootConnector1" moveWith="rootText1">
+              <dgm:alg type="sp"/>
+              <dgm:shape xmlns:r="http://schemas.openxmlformats.org/officeDocument/2006/relationships" type="rect" r:blip="" hideGeom="1">
+                <dgm:adjLst/>
+              </dgm:shape>
+              <dgm:presOf axis="self" ptType="node" cnt="1"/>
+              <dgm:constrLst/>
+              <dgm:ruleLst/>
+            </dgm:layoutNode>
+          </dgm:layoutNode>
+          <dgm:layoutNode name="hierChild2">
+            <dgm:choose name="Name21">
+              <dgm:if name="Name22" func="var" arg="hierBranch" op="equ" val="l">
+                <dgm:alg type="hierChild">
+                  <dgm:param type="chAlign" val="r"/>
+                  <dgm:param type="linDir" val="fromT"/>
+                </dgm:alg>
+              </dgm:if>
+              <dgm:if name="Name23" func="var" arg="hierBranch" op="equ" val="r">
+                <dgm:alg type="hierChild">
+                  <dgm:param type="chAlign" val="l"/>
+                  <dgm:param type="linDir" val="fromT"/>
+                </dgm:alg>
+              </dgm:if>
+              <dgm:if name="Name24" func="var" arg="hierBranch" op="equ" val="hang">
+                <dgm:choose name="Name25">
+                  <dgm:if name="Name26" func="var" arg="dir" op="equ" val="norm">
+                    <dgm:alg type="hierChild">
+                      <dgm:param type="chAlign" val="l"/>
+                      <dgm:param type="linDir" val="fromL"/>
+                      <dgm:param type="secChAlign" val="t"/>
+                      <dgm:param type="secLinDir" val="fromT"/>
+                    </dgm:alg>
+                  </dgm:if>
+                  <dgm:else name="Name27">
+                    <dgm:alg type="hierChild">
+                      <dgm:param type="chAlign" val="l"/>
+                      <dgm:param type="linDir" val="fromR"/>
+                      <dgm:param type="secChAlign" val="t"/>
+                      <dgm:param type="secLinDir" val="fromT"/>
+                    </dgm:alg>
+                  </dgm:else>
+                </dgm:choose>
+              </dgm:if>
+              <dgm:else name="Name28">
+                <dgm:choose name="Name29">
+                  <dgm:if name="Name30" func="var" arg="dir" op="equ" val="norm">
+                    <dgm:alg type="hierChild"/>
+                  </dgm:if>
+                  <dgm:else name="Name31">
+                    <dgm:alg type="hierChild">
+                      <dgm:param type="linDir" val="fromR"/>
+                    </dgm:alg>
+                  </dgm:else>
+                </dgm:choose>
+              </dgm:else>
+            </dgm:choose>
+            <dgm:shape xmlns:r="http://schemas.openxmlformats.org/officeDocument/2006/relationships" r:blip="">
+              <dgm:adjLst/>
+            </dgm:shape>
+            <dgm:presOf/>
+            <dgm:constrLst/>
+            <dgm:ruleLst/>
+            <dgm:forEach name="rep2a" axis="ch" ptType="nonAsst">
+              <dgm:forEach name="Name32" axis="precedSib" ptType="parTrans" st="-1" cnt="1">
+                <dgm:choose name="Name33">
+                  <dgm:if name="Name34" func="var" arg="hierBranch" op="equ" val="std">
+                    <dgm:layoutNode name="Name35">
+                      <dgm:alg type="conn">
+                        <dgm:param type="connRout" val="bend"/>
+                        <dgm:param type="dim" val="1D"/>
+                        <dgm:param type="endSty" val="noArr"/>
+                        <dgm:param type="begPts" val="bCtr"/>
+                        <dgm:param type="endPts" val="tCtr"/>
+                        <dgm:param type="bendPt" val="end"/>
+                      </dgm:alg>
+                      <dgm:shape xmlns:r="http://schemas.openxmlformats.org/officeDocument/2006/relationships" type="conn" r:blip="" zOrderOff="-99999">
+                        <dgm:adjLst/>
+                      </dgm:shape>
+                      <dgm:presOf axis="self"/>
+                      <dgm:constrLst>
+                        <dgm:constr type="begPad"/>
+                        <dgm:constr type="endPad"/>
+                      </dgm:constrLst>
+                      <dgm:ruleLst/>
+                    </dgm:layoutNode>
+                  </dgm:if>
+                  <dgm:if name="Name36" func="var" arg="hierBranch" op="equ" val="init">
+                    <dgm:layoutNode name="Name37">
+                      <dgm:choose name="Name38">
+                        <dgm:if name="Name39" axis="self" func="depth" op="lte" val="2">
+                          <dgm:alg type="conn">
+                            <dgm:param type="connRout" val="bend"/>
+                            <dgm:param type="dim" val="1D"/>
+                            <dgm:param type="endSty" val="noArr"/>
+                            <dgm:param type="begPts" val="bCtr"/>
+                            <dgm:param type="endPts" val="tCtr"/>
+                            <dgm:param type="bendPt" val="end"/>
+                          </dgm:alg>
+                        </dgm:if>
+                        <dgm:else name="Name40">
+                          <dgm:choose name="Name41">
+                            <dgm:if name="Name42" axis="par des" func="maxDepth" op="lte" val="1">
+                              <dgm:choose name="Name43">
+                                <dgm:if name="Name44" axis="par ch" ptType="node asst" func="cnt" op="gte" val="1">
+                                  <dgm:alg type="conn">
+                                    <dgm:param type="connRout" val="bend"/>
+                                    <dgm:param type="dim" val="1D"/>
+                                    <dgm:param type="endSty" val="noArr"/>
+                                    <dgm:param type="begPts" val="bCtr"/>
+                                    <dgm:param type="endPts" val="midL midR"/>
+                                  </dgm:alg>
+                                </dgm:if>
+                                <dgm:else name="Name45">
+                                  <dgm:alg type="conn">
+                                    <dgm:param type="connRout" val="bend"/>
+                                    <dgm:param type="dim" val="1D"/>
+                                    <dgm:param type="endSty" val="noArr"/>
+                                    <dgm:param type="begPts" val="bCtr"/>
+                                    <dgm:param type="endPts" val="midL midR"/>
+                                    <dgm:param type="srcNode" val="rootConnector"/>
+                                  </dgm:alg>
+                                </dgm:else>
+                              </dgm:choose>
+                            </dgm:if>
+                            <dgm:else name="Name46">
+                              <dgm:alg type="conn">
+                                <dgm:param type="connRout" val="bend"/>
+                                <dgm:param type="dim" val="1D"/>
+                                <dgm:param type="endSty" val="noArr"/>
+                                <dgm:param type="begPts" val="bCtr"/>
+                                <dgm:param type="endPts" val="tCtr"/>
+                                <dgm:param type="bendPt" val="end"/>
+                              </dgm:alg>
+                            </dgm:else>
+                          </dgm:choose>
+                        </dgm:else>
+                      </dgm:choose>
+                      <dgm:shape xmlns:r="http://schemas.openxmlformats.org/officeDocument/2006/relationships" type="conn" r:blip="" zOrderOff="-99999">
+                        <dgm:adjLst/>
+                      </dgm:shape>
+                      <dgm:presOf axis="self"/>
+                      <dgm:constrLst>
+                        <dgm:constr type="begPad"/>
+                        <dgm:constr type="endPad"/>
+                      </dgm:constrLst>
+                      <dgm:ruleLst/>
+                    </dgm:layoutNode>
+                  </dgm:if>
+                  <dgm:if name="Name47" func="var" arg="hierBranch" op="equ" val="hang">
+                    <dgm:layoutNode name="Name48">
+                      <dgm:alg type="conn">
+                        <dgm:param type="connRout" val="bend"/>
+                        <dgm:param type="dim" val="1D"/>
+                        <dgm:param type="endSty" val="noArr"/>
+                        <dgm:param type="begPts" val="bCtr"/>
+                        <dgm:param type="endPts" val="midL midR"/>
+                      </dgm:alg>
+                      <dgm:shape xmlns:r="http://schemas.openxmlformats.org/officeDocument/2006/relationships" type="conn" r:blip="" zOrderOff="-99999">
+                        <dgm:adjLst/>
+                      </dgm:shape>
+                      <dgm:presOf axis="self"/>
+                      <dgm:constrLst>
+                        <dgm:constr type="begPad"/>
+                        <dgm:constr type="endPad"/>
+                      </dgm:constrLst>
+                      <dgm:ruleLst/>
+                    </dgm:layoutNode>
+                  </dgm:if>
+                  <dgm:else name="Name49">
+                    <dgm:layoutNode name="Name50">
+                      <dgm:choose name="Name51">
+                        <dgm:if name="Name52" axis="self" func="depth" op="lte" val="2">
+                          <dgm:choose name="Name53">
+                            <dgm:if name="Name54" axis="par ch" ptType="node asst" func="cnt" op="gte" val="1">
+                              <dgm:alg type="conn">
+                                <dgm:param type="connRout" val="bend"/>
+                                <dgm:param type="dim" val="1D"/>
+                                <dgm:param type="endSty" val="noArr"/>
+                                <dgm:param type="begPts" val="bCtr"/>
+                                <dgm:param type="endPts" val="midL midR"/>
+                              </dgm:alg>
+                            </dgm:if>
+                            <dgm:else name="Name55">
+                              <dgm:alg type="conn">
+                                <dgm:param type="connRout" val="bend"/>
+                                <dgm:param type="dim" val="1D"/>
+                                <dgm:param type="endSty" val="noArr"/>
+                                <dgm:param type="begPts" val="bCtr"/>
+                                <dgm:param type="endPts" val="midL midR"/>
+                                <dgm:param type="srcNode" val="rootConnector1"/>
+                              </dgm:alg>
+                            </dgm:else>
+                          </dgm:choose>
+                        </dgm:if>
+                        <dgm:else name="Name56">
+                          <dgm:choose name="Name57">
+                            <dgm:if name="Name58" axis="par ch" ptType="node asst" func="cnt" op="gte" val="1">
+                              <dgm:alg type="conn">
+                                <dgm:param type="connRout" val="bend"/>
+                                <dgm:param type="dim" val="1D"/>
+                                <dgm:param type="endSty" val="noArr"/>
+                                <dgm:param type="begPts" val="bCtr"/>
+                                <dgm:param type="endPts" val="midL midR"/>
+                              </dgm:alg>
+                            </dgm:if>
+                            <dgm:else name="Name59">
+                              <dgm:alg type="conn">
+                                <dgm:param type="connRout" val="bend"/>
+                                <dgm:param type="dim" val="1D"/>
+                                <dgm:param type="endSty" val="noArr"/>
+                                <dgm:param type="begPts" val="bCtr"/>
+                                <dgm:param type="endPts" val="midL midR"/>
+                                <dgm:param type="srcNode" val="rootConnector"/>
+                              </dgm:alg>
+                            </dgm:else>
+                          </dgm:choose>
+                        </dgm:else>
+                      </dgm:choose>
+                      <dgm:shape xmlns:r="http://schemas.openxmlformats.org/officeDocument/2006/relationships" type="conn" r:blip="" zOrderOff="-99999">
+                        <dgm:adjLst/>
+                      </dgm:shape>
+                      <dgm:presOf axis="self"/>
+                      <dgm:constrLst>
+                        <dgm:constr type="begPad"/>
+                        <dgm:constr type="endPad"/>
+                      </dgm:constrLst>
+                      <dgm:ruleLst/>
+                    </dgm:layoutNode>
+                  </dgm:else>
+                </dgm:choose>
+              </dgm:forEach>
+              <dgm:layoutNode name="hierRoot2">
+                <dgm:varLst>
+                  <dgm:hierBranch val="init"/>
+                </dgm:varLst>
+                <dgm:choose name="Name60">
+                  <dgm:if name="Name61" func="var" arg="hierBranch" op="equ" val="l">
+                    <dgm:choose name="Name62">
+                      <dgm:if name="Name63" axis="ch" ptType="asst" func="cnt" op="gte" val="1">
+                        <dgm:alg type="hierRoot">
+                          <dgm:param type="hierAlign" val="tR"/>
+                        </dgm:alg>
+                        <dgm:shape xmlns:r="http://schemas.openxmlformats.org/officeDocument/2006/relationships" r:blip="">
+                          <dgm:adjLst/>
+                        </dgm:shape>
+                        <dgm:presOf/>
+                        <dgm:constrLst>
+                          <dgm:constr type="alignOff" val="0.65"/>
+                        </dgm:constrLst>
+                      </dgm:if>
+                      <dgm:else name="Name64">
+                        <dgm:alg type="hierRoot">
+                          <dgm:param type="hierAlign" val="tR"/>
+                        </dgm:alg>
+                        <dgm:shape xmlns:r="http://schemas.openxmlformats.org/officeDocument/2006/relationships" r:blip="">
+                          <dgm:adjLst/>
+                        </dgm:shape>
+                        <dgm:presOf/>
+                        <dgm:constrLst>
+                          <dgm:constr type="alignOff" val="0.25"/>
+                        </dgm:constrLst>
+                      </dgm:else>
+                    </dgm:choose>
+                  </dgm:if>
+                  <dgm:if name="Name65" func="var" arg="hierBranch" op="equ" val="r">
+                    <dgm:choose name="Name66">
+                      <dgm:if name="Name67" axis="ch" ptType="asst" func="cnt" op="gte" val="1">
+                        <dgm:alg type="hierRoot">
+                          <dgm:param type="hierAlign" val="tL"/>
+                        </dgm:alg>
+                        <dgm:shape xmlns:r="http://schemas.openxmlformats.org/officeDocument/2006/relationships" r:blip="">
+                          <dgm:adjLst/>
+                        </dgm:shape>
+                        <dgm:presOf/>
+                        <dgm:constrLst>
+                          <dgm:constr type="alignOff" val="0.65"/>
+                        </dgm:constrLst>
+                      </dgm:if>
+                      <dgm:else name="Name68">
+                        <dgm:alg type="hierRoot">
+                          <dgm:param type="hierAlign" val="tL"/>
+                        </dgm:alg>
+                        <dgm:shape xmlns:r="http://schemas.openxmlformats.org/officeDocument/2006/relationships" r:blip="">
+                          <dgm:adjLst/>
+                        </dgm:shape>
+                        <dgm:presOf/>
+                        <dgm:constrLst>
+                          <dgm:constr type="alignOff" val="0.25"/>
+                        </dgm:constrLst>
+                      </dgm:else>
+                    </dgm:choose>
+                  </dgm:if>
+                  <dgm:if name="Name69" func="var" arg="hierBranch" op="equ" val="std">
+                    <dgm:alg type="hierRoot"/>
+                    <dgm:shape xmlns:r="http://schemas.openxmlformats.org/officeDocument/2006/relationships" r:blip="">
+                      <dgm:adjLst/>
+                    </dgm:shape>
+                    <dgm:presOf/>
+                    <dgm:constrLst>
+                      <dgm:constr type="alignOff"/>
+                      <dgm:constr type="bendDist" for="des" ptType="parTrans" refType="sp" fact="0.5"/>
+                    </dgm:constrLst>
+                  </dgm:if>
+                  <dgm:if name="Name70" func="var" arg="hierBranch" op="equ" val="init">
+                    <dgm:choose name="Name71">
+                      <dgm:if name="Name72" axis="des" func="maxDepth" op="lte" val="1">
+                        <dgm:choose name="Name73">
+                          <dgm:if name="Name74" axis="ch" ptType="asst" func="cnt" op="gte" val="1">
+                            <dgm:alg type="hierRoot">
+                              <dgm:param type="hierAlign" val="tL"/>
+                            </dgm:alg>
+                            <dgm:shape xmlns:r="http://schemas.openxmlformats.org/officeDocument/2006/relationships" r:blip="">
+                              <dgm:adjLst/>
+                            </dgm:shape>
+                            <dgm:presOf/>
+                            <dgm:constrLst>
+                              <dgm:constr type="alignOff" val="0.65"/>
+                            </dgm:constrLst>
+                          </dgm:if>
+                          <dgm:else name="Name75">
+                            <dgm:alg type="hierRoot">
+                              <dgm:param type="hierAlign" val="tL"/>
+                            </dgm:alg>
+                            <dgm:shape xmlns:r="http://schemas.openxmlformats.org/officeDocument/2006/relationships" r:blip="">
+                              <dgm:adjLst/>
+                            </dgm:shape>
+                            <dgm:presOf/>
+                            <dgm:constrLst>
+                              <dgm:constr type="alignOff" val="0.25"/>
+                            </dgm:constrLst>
+                          </dgm:else>
+                        </dgm:choose>
+                      </dgm:if>
+                      <dgm:else name="Name76">
+                        <dgm:alg type="hierRoot"/>
+                        <dgm:shape xmlns:r="http://schemas.openxmlformats.org/officeDocument/2006/relationships" r:blip="">
+                          <dgm:adjLst/>
+                        </dgm:shape>
+                        <dgm:presOf/>
+                        <dgm:constrLst>
+                          <dgm:constr type="alignOff"/>
+                          <dgm:constr type="bendDist" for="des" ptType="parTrans" refType="sp" fact="0.5"/>
+                        </dgm:constrLst>
+                      </dgm:else>
+                    </dgm:choose>
+                  </dgm:if>
+                  <dgm:else name="Name77">
+                    <dgm:alg type="hierRoot"/>
+                    <dgm:shape xmlns:r="http://schemas.openxmlformats.org/officeDocument/2006/relationships" r:blip="">
+                      <dgm:adjLst/>
+                    </dgm:shape>
+                    <dgm:presOf/>
+                    <dgm:constrLst>
+                      <dgm:constr type="alignOff" val="0.65"/>
+                    </dgm:constrLst>
+                  </dgm:else>
+                </dgm:choose>
+                <dgm:ruleLst/>
+                <dgm:layoutNode name="rootComposite">
+                  <dgm:alg type="composite"/>
+                  <dgm:shape xmlns:r="http://schemas.openxmlformats.org/officeDocument/2006/relationships" r:blip="">
+                    <dgm:adjLst/>
+                  </dgm:shape>
+                  <dgm:presOf axis="self" ptType="node" cnt="1"/>
+                  <dgm:choose name="Name78">
+                    <dgm:if name="Name79" func="var" arg="hierBranch" op="equ" val="init">
+                      <dgm:constrLst>
+                        <dgm:constr type="l" for="ch" forName="rootText"/>
+                        <dgm:constr type="t" for="ch" forName="rootText"/>
+                        <dgm:constr type="w" for="ch" forName="rootText" refType="w"/>
+                        <dgm:constr type="h" for="ch" forName="rootText" refType="h"/>
+                        <dgm:constr type="l" for="ch" forName="rootConnector"/>
+                        <dgm:constr type="t" for="ch" forName="rootConnector"/>
+                        <dgm:constr type="w" for="ch" forName="rootConnector" refType="w" refFor="ch" refForName="rootText" fact="0.2"/>
+                        <dgm:constr type="h" for="ch" forName="rootConnector" refType="h" refFor="ch" refForName="rootText"/>
+                      </dgm:constrLst>
+                    </dgm:if>
+                    <dgm:if name="Name80" func="var" arg="hierBranch" op="equ" val="l">
+                      <dgm:constrLst>
+                        <dgm:constr type="l" for="ch" forName="rootText"/>
+                        <dgm:constr type="t" for="ch" forName="rootText"/>
+                        <dgm:constr type="w" for="ch" forName="rootText" refType="w"/>
+                        <dgm:constr type="h" for="ch" forName="rootText" refType="h"/>
+                        <dgm:constr type="r" for="ch" forName="rootConnector" refType="w"/>
+                        <dgm:constr type="t" for="ch" forName="rootConnector"/>
+                        <dgm:constr type="w" for="ch" forName="rootConnector" refType="w" refFor="ch" refForName="rootText" fact="0.2"/>
+                        <dgm:constr type="h" for="ch" forName="rootConnector" refType="h" refFor="ch" refForName="rootText"/>
+                      </dgm:constrLst>
+                    </dgm:if>
+                    <dgm:if name="Name81" func="var" arg="hierBranch" op="equ" val="r">
+                      <dgm:constrLst>
+                        <dgm:constr type="l" for="ch" forName="rootText"/>
+                        <dgm:constr type="t" for="ch" forName="rootText"/>
+                        <dgm:constr type="w" for="ch" forName="rootText" refType="w"/>
+                        <dgm:constr type="h" for="ch" forName="rootText" refType="h"/>
+                        <dgm:constr type="l" for="ch" forName="rootConnector"/>
+                        <dgm:constr type="t" for="ch" forName="rootConnector"/>
+                        <dgm:constr type="w" for="ch" forName="rootConnector" refType="w" refFor="ch" refForName="rootText" fact="0.2"/>
+                        <dgm:constr type="h" for="ch" forName="rootConnector" refType="h" refFor="ch" refForName="rootText"/>
+                      </dgm:constrLst>
+                    </dgm:if>
+                    <dgm:else name="Name82">
+                      <dgm:constrLst>
+                        <dgm:constr type="l" for="ch" forName="rootText"/>
+                        <dgm:constr type="t" for="ch" forName="rootText"/>
+                        <dgm:constr type="w" for="ch" forName="rootText" refType="w"/>
+                        <dgm:constr type="h" for="ch" forName="rootText" refType="h"/>
+                        <dgm:constr type="r" for="ch" forName="rootConnector" refType="w"/>
+                        <dgm:constr type="t" for="ch" forName="rootConnector"/>
+                        <dgm:constr type="w" for="ch" forName="rootConnector" refType="w" refFor="ch" refForName="rootText" fact="0.2"/>
+                        <dgm:constr type="h" for="ch" forName="rootConnector" refType="h" refFor="ch" refForName="rootText"/>
+                      </dgm:constrLst>
+                    </dgm:else>
+                  </dgm:choose>
+                  <dgm:ruleLst/>
+                  <dgm:layoutNode name="rootText">
+                    <dgm:varLst>
+                      <dgm:chPref val="3"/>
+                    </dgm:varLst>
+                    <dgm:alg type="tx"/>
+                    <dgm:shape xmlns:r="http://schemas.openxmlformats.org/officeDocument/2006/relationships" type="rect" r:blip="">
+                      <dgm:adjLst/>
+                    </dgm:shape>
+                    <dgm:presOf axis="self" ptType="node" cnt="1"/>
+                    <dgm:constrLst>
+                      <dgm:constr type="primFontSz" val="65"/>
+                      <dgm:constr type="lMarg" refType="primFontSz" fact="0.05"/>
+                      <dgm:constr type="rMarg" refType="primFontSz" fact="0.05"/>
+                      <dgm:constr type="tMarg" refType="primFontSz" fact="0.05"/>
+                      <dgm:constr type="bMarg" refType="primFontSz" fact="0.05"/>
+                    </dgm:constrLst>
+                    <dgm:ruleLst>
+                      <dgm:rule type="primFontSz" val="5" fact="NaN" max="NaN"/>
+                    </dgm:ruleLst>
+                  </dgm:layoutNode>
+                  <dgm:layoutNode name="rootConnector" moveWith="rootText">
+                    <dgm:alg type="sp"/>
+                    <dgm:shape xmlns:r="http://schemas.openxmlformats.org/officeDocument/2006/relationships" type="rect" r:blip="" hideGeom="1">
+                      <dgm:adjLst/>
+                    </dgm:shape>
+                    <dgm:presOf axis="self" ptType="node" cnt="1"/>
+                    <dgm:constrLst/>
+                    <dgm:ruleLst/>
+                  </dgm:layoutNode>
+                </dgm:layoutNode>
+                <dgm:layoutNode name="hierChild4">
+                  <dgm:choose name="Name83">
+                    <dgm:if name="Name84" func="var" arg="hierBranch" op="equ" val="l">
+                      <dgm:alg type="hierChild">
+                        <dgm:param type="chAlign" val="r"/>
+                        <dgm:param type="linDir" val="fromT"/>
+                      </dgm:alg>
+                    </dgm:if>
+                    <dgm:if name="Name85" func="var" arg="hierBranch" op="equ" val="r">
+                      <dgm:alg type="hierChild">
+                        <dgm:param type="chAlign" val="l"/>
+                        <dgm:param type="linDir" val="fromT"/>
+                      </dgm:alg>
+                    </dgm:if>
+                    <dgm:if name="Name86" func="var" arg="hierBranch" op="equ" val="hang">
+                      <dgm:choose name="Name87">
+                        <dgm:if name="Name88" func="var" arg="dir" op="equ" val="norm">
+                          <dgm:alg type="hierChild">
+                            <dgm:param type="chAlign" val="l"/>
+                            <dgm:param type="linDir" val="fromL"/>
+                            <dgm:param type="secChAlign" val="t"/>
+                            <dgm:param type="secLinDir" val="fromT"/>
+                          </dgm:alg>
+                        </dgm:if>
+                        <dgm:else name="Name89">
+                          <dgm:alg type="hierChild">
+                            <dgm:param type="chAlign" val="l"/>
+                            <dgm:param type="linDir" val="fromR"/>
+                            <dgm:param type="secChAlign" val="t"/>
+                            <dgm:param type="secLinDir" val="fromT"/>
+                          </dgm:alg>
+                        </dgm:else>
+                      </dgm:choose>
+                    </dgm:if>
+                    <dgm:if name="Name90" func="var" arg="hierBranch" op="equ" val="std">
+                      <dgm:choose name="Name91">
+                        <dgm:if name="Name92" func="var" arg="dir" op="equ" val="norm">
+                          <dgm:alg type="hierChild"/>
+                        </dgm:if>
+                        <dgm:else name="Name93">
+                          <dgm:alg type="hierChild">
+                            <dgm:param type="linDir" val="fromR"/>
+                          </dgm:alg>
+                        </dgm:else>
+                      </dgm:choose>
+                    </dgm:if>
+                    <dgm:if name="Name94" func="var" arg="hierBranch" op="equ" val="init">
+                      <dgm:choose name="Name95">
+                        <dgm:if name="Name96" axis="des" func="maxDepth" op="lte" val="1">
+                          <dgm:alg type="hierChild">
+                            <dgm:param type="chAlign" val="l"/>
+                            <dgm:param type="linDir" val="fromT"/>
+                          </dgm:alg>
+                        </dgm:if>
+                        <dgm:else name="Name97">
+                          <dgm:choose name="Name98">
+                            <dgm:if name="Name99" func="var" arg="dir" op="equ" val="norm">
+                              <dgm:alg type="hierChild"/>
+                            </dgm:if>
+                            <dgm:else name="Name100">
+                              <dgm:alg type="hierChild">
+                                <dgm:param type="linDir" val="fromR"/>
+                              </dgm:alg>
+                            </dgm:else>
+                          </dgm:choose>
+                        </dgm:else>
+                      </dgm:choose>
+                    </dgm:if>
+                    <dgm:else name="Name101"/>
+                  </dgm:choose>
+                  <dgm:shape xmlns:r="http://schemas.openxmlformats.org/officeDocument/2006/relationships" r:blip="">
+                    <dgm:adjLst/>
+                  </dgm:shape>
+                  <dgm:presOf/>
+                  <dgm:constrLst/>
+                  <dgm:ruleLst/>
+                  <dgm:forEach name="Name102" ref="rep2a"/>
+                </dgm:layoutNode>
+                <dgm:layoutNode name="hierChild5">
+                  <dgm:choose name="Name103">
+                    <dgm:if name="Name104" func="var" arg="dir" op="equ" val="norm">
+                      <dgm:alg type="hierChild">
+                        <dgm:param type="chAlign" val="l"/>
+                        <dgm:param type="linDir" val="fromL"/>
+                        <dgm:param type="secChAlign" val="t"/>
+                        <dgm:param type="secLinDir" val="fromT"/>
+                      </dgm:alg>
+                    </dgm:if>
+                    <dgm:else name="Name105">
+                      <dgm:alg type="hierChild">
+                        <dgm:param type="chAlign" val="l"/>
+                        <dgm:param type="linDir" val="fromR"/>
+                        <dgm:param type="secChAlign" val="t"/>
+                        <dgm:param type="secLinDir" val="fromT"/>
+                      </dgm:alg>
+                    </dgm:else>
+                  </dgm:choose>
+                  <dgm:shape xmlns:r="http://schemas.openxmlformats.org/officeDocument/2006/relationships" r:blip="">
+                    <dgm:adjLst/>
+                  </dgm:shape>
+                  <dgm:presOf/>
+                  <dgm:constrLst/>
+                  <dgm:ruleLst/>
+                  <dgm:forEach name="Name106" ref="rep2b"/>
+                </dgm:layoutNode>
+              </dgm:layoutNode>
+            </dgm:forEach>
+          </dgm:layoutNode>
+          <dgm:layoutNode name="hierChild3">
+            <dgm:choose name="Name107">
+              <dgm:if name="Name108" func="var" arg="dir" op="equ" val="norm">
+                <dgm:alg type="hierChild">
+                  <dgm:param type="chAlign" val="l"/>
+                  <dgm:param type="linDir" val="fromL"/>
+                  <dgm:param type="secChAlign" val="t"/>
+                  <dgm:param type="secLinDir" val="fromT"/>
+                </dgm:alg>
+              </dgm:if>
+              <dgm:else name="Name109">
+                <dgm:alg type="hierChild">
+                  <dgm:param type="chAlign" val="l"/>
+                  <dgm:param type="linDir" val="fromR"/>
+                  <dgm:param type="secChAlign" val="t"/>
+                  <dgm:param type="secLinDir" val="fromT"/>
+                </dgm:alg>
+              </dgm:else>
+            </dgm:choose>
+            <dgm:shape xmlns:r="http://schemas.openxmlformats.org/officeDocument/2006/relationships" r:blip="">
+              <dgm:adjLst/>
+            </dgm:shape>
+            <dgm:presOf/>
+            <dgm:constrLst/>
+            <dgm:ruleLst/>
+            <dgm:forEach name="rep2b" axis="ch" ptType="asst">
+              <dgm:forEach name="Name110" axis="precedSib" ptType="parTrans" st="-1" cnt="1">
+                <dgm:layoutNode name="Name111">
+                  <dgm:alg type="conn">
+                    <dgm:param type="connRout" val="bend"/>
+                    <dgm:param type="dim" val="1D"/>
+                    <dgm:param type="endSty" val="noArr"/>
+                    <dgm:param type="begPts" val="bCtr"/>
+                    <dgm:param type="endPts" val="midL midR"/>
+                  </dgm:alg>
+                  <dgm:shape xmlns:r="http://schemas.openxmlformats.org/officeDocument/2006/relationships" type="conn" r:blip="" zOrderOff="-99999">
+                    <dgm:adjLst/>
+                  </dgm:shape>
+                  <dgm:presOf axis="self"/>
+                  <dgm:constrLst>
+                    <dgm:constr type="begPad"/>
+                    <dgm:constr type="endPad"/>
+                  </dgm:constrLst>
+                  <dgm:ruleLst/>
+                </dgm:layoutNode>
+              </dgm:forEach>
+              <dgm:layoutNode name="hierRoot3">
+                <dgm:varLst>
+                  <dgm:hierBranch val="init"/>
+                </dgm:varLst>
+                <dgm:choose name="Name112">
+                  <dgm:if name="Name113" func="var" arg="hierBranch" op="equ" val="l">
+                    <dgm:alg type="hierRoot">
+                      <dgm:param type="hierAlign" val="tR"/>
+                    </dgm:alg>
+                    <dgm:shape xmlns:r="http://schemas.openxmlformats.org/officeDocument/2006/relationships" r:blip="">
+                      <dgm:adjLst/>
+                    </dgm:shape>
+                    <dgm:presOf/>
+                    <dgm:constrLst>
+                      <dgm:constr type="alignOff" val="0.65"/>
+                    </dgm:constrLst>
+                  </dgm:if>
+                  <dgm:if name="Name114" func="var" arg="hierBranch" op="equ" val="r">
+                    <dgm:alg type="hierRoot">
+                      <dgm:param type="hierAlign" val="tL"/>
+                    </dgm:alg>
+                    <dgm:shape xmlns:r="http://schemas.openxmlformats.org/officeDocument/2006/relationships" r:blip="">
+                      <dgm:adjLst/>
+                    </dgm:shape>
+                    <dgm:presOf/>
+                    <dgm:constrLst>
+                      <dgm:constr type="alignOff" val="0.65"/>
+                    </dgm:constrLst>
+                  </dgm:if>
+                  <dgm:if name="Name115" func="var" arg="hierBranch" op="equ" val="hang">
+                    <dgm:alg type="hierRoot"/>
+                    <dgm:shape xmlns:r="http://schemas.openxmlformats.org/officeDocument/2006/relationships" r:blip="">
+                      <dgm:adjLst/>
+                    </dgm:shape>
+                    <dgm:presOf/>
+                    <dgm:constrLst>
+                      <dgm:constr type="alignOff" val="0.65"/>
+                    </dgm:constrLst>
+                  </dgm:if>
+                  <dgm:if name="Name116" func="var" arg="hierBranch" op="equ" val="std">
+                    <dgm:alg type="hierRoot"/>
+                    <dgm:shape xmlns:r="http://schemas.openxmlformats.org/officeDocument/2006/relationships" r:blip="">
+                      <dgm:adjLst/>
+                    </dgm:shape>
+                    <dgm:presOf/>
+                    <dgm:constrLst>
+                      <dgm:constr type="alignOff"/>
+                      <dgm:constr type="bendDist" for="des" ptType="parTrans" refType="sp" fact="0.5"/>
+                    </dgm:constrLst>
+                  </dgm:if>
+                  <dgm:if name="Name117" func="var" arg="hierBranch" op="equ" val="init">
+                    <dgm:choose name="Name118">
+                      <dgm:if name="Name119" axis="des" func="maxDepth" op="lte" val="1">
+                        <dgm:alg type="hierRoot">
+                          <dgm:param type="hierAlign" val="tL"/>
+                        </dgm:alg>
+                        <dgm:shape xmlns:r="http://schemas.openxmlformats.org/officeDocument/2006/relationships" r:blip="">
+                          <dgm:adjLst/>
+                        </dgm:shape>
+                        <dgm:presOf/>
+                        <dgm:constrLst>
+                          <dgm:constr type="alignOff" val="0.65"/>
+                        </dgm:constrLst>
+                      </dgm:if>
+                      <dgm:else name="Name120">
+                        <dgm:alg type="hierRoot"/>
+                        <dgm:shape xmlns:r="http://schemas.openxmlformats.org/officeDocument/2006/relationships" r:blip="">
+                          <dgm:adjLst/>
+                        </dgm:shape>
+                        <dgm:presOf/>
+                        <dgm:constrLst>
+                          <dgm:constr type="alignOff"/>
+                          <dgm:constr type="bendDist" for="des" ptType="parTrans" refType="sp" fact="0.5"/>
+                        </dgm:constrLst>
+                      </dgm:else>
+                    </dgm:choose>
+                  </dgm:if>
+                  <dgm:else name="Name121"/>
+                </dgm:choose>
+                <dgm:ruleLst/>
+                <dgm:layoutNode name="rootComposite3">
+                  <dgm:alg type="composite"/>
+                  <dgm:shape xmlns:r="http://schemas.openxmlformats.org/officeDocument/2006/relationships" r:blip="">
+                    <dgm:adjLst/>
+                  </dgm:shape>
+                  <dgm:presOf axis="self" ptType="node" cnt="1"/>
+                  <dgm:choose name="Name122">
+                    <dgm:if name="Name123" func="var" arg="hierBranch" op="equ" val="init">
+                      <dgm:constrLst>
+                        <dgm:constr type="l" for="ch" forName="rootText3"/>
+                        <dgm:constr type="t" for="ch" forName="rootText3"/>
+                        <dgm:constr type="w" for="ch" forName="rootText3" refType="w"/>
+                        <dgm:constr type="h" for="ch" forName="rootText3" refType="h"/>
+                        <dgm:constr type="l" for="ch" forName="rootConnector3"/>
+                        <dgm:constr type="t" for="ch" forName="rootConnector3"/>
+                        <dgm:constr type="w" for="ch" forName="rootConnector3" refType="w" refFor="ch" refForName="rootText3" fact="0.2"/>
+                        <dgm:constr type="h" for="ch" forName="rootConnector3" refType="h" refFor="ch" refForName="rootText3"/>
+                      </dgm:constrLst>
+                    </dgm:if>
+                    <dgm:if name="Name124" func="var" arg="hierBranch" op="equ" val="l">
+                      <dgm:constrLst>
+                        <dgm:constr type="l" for="ch" forName="rootText3"/>
+                        <dgm:constr type="t" for="ch" forName="rootText3"/>
+                        <dgm:constr type="w" for="ch" forName="rootText3" refType="w"/>
+                        <dgm:constr type="h" for="ch" forName="rootText3" refType="h"/>
+                        <dgm:constr type="r" for="ch" forName="rootConnector3" refType="w"/>
+                        <dgm:constr type="t" for="ch" forName="rootConnector3"/>
+                        <dgm:constr type="w" for="ch" forName="rootConnector3" refType="w" refFor="ch" refForName="rootText3" fact="0.2"/>
+                        <dgm:constr type="h" for="ch" forName="rootConnector3" refType="h" refFor="ch" refForName="rootText3"/>
+                      </dgm:constrLst>
+                    </dgm:if>
+                    <dgm:if name="Name125" func="var" arg="hierBranch" op="equ" val="r">
+                      <dgm:constrLst>
+                        <dgm:constr type="l" for="ch" forName="rootText3"/>
+                        <dgm:constr type="t" for="ch" forName="rootText3"/>
+                        <dgm:constr type="w" for="ch" forName="rootText3" refType="w"/>
+                        <dgm:constr type="h" for="ch" forName="rootText3" refType="h"/>
+                        <dgm:constr type="l" for="ch" forName="rootConnector3"/>
+                        <dgm:constr type="t" for="ch" forName="rootConnector3"/>
+                        <dgm:constr type="w" for="ch" forName="rootConnector3" refType="w" refFor="ch" refForName="rootText3" fact="0.2"/>
+                        <dgm:constr type="h" for="ch" forName="rootConnector3" refType="h" refFor="ch" refForName="rootText3"/>
+                      </dgm:constrLst>
+                    </dgm:if>
+                    <dgm:else name="Name126">
+                      <dgm:constrLst>
+                        <dgm:constr type="l" for="ch" forName="rootText3"/>
+                        <dgm:constr type="t" for="ch" forName="rootText3"/>
+                        <dgm:constr type="w" for="ch" forName="rootText3" refType="w"/>
+                        <dgm:constr type="h" for="ch" forName="rootText3" refType="h"/>
+                        <dgm:constr type="r" for="ch" forName="rootConnector3" refType="w"/>
+                        <dgm:constr type="t" for="ch" forName="rootConnector3"/>
+                        <dgm:constr type="w" for="ch" forName="rootConnector3" refType="w" refFor="ch" refForName="rootText3" fact="0.2"/>
+                        <dgm:constr type="h" for="ch" forName="rootConnector3" refType="h" refFor="ch" refForName="rootText3"/>
+                      </dgm:constrLst>
+                    </dgm:else>
+                  </dgm:choose>
+                  <dgm:ruleLst/>
+                  <dgm:layoutNode name="rootText3">
+                    <dgm:varLst>
+                      <dgm:chPref val="3"/>
+                    </dgm:varLst>
+                    <dgm:alg type="tx"/>
+                    <dgm:shape xmlns:r="http://schemas.openxmlformats.org/officeDocument/2006/relationships" type="rect" r:blip="">
+                      <dgm:adjLst/>
+                    </dgm:shape>
+                    <dgm:presOf axis="self" ptType="node" cnt="1"/>
+                    <dgm:constrLst>
+                      <dgm:constr type="primFontSz" val="65"/>
+                      <dgm:constr type="lMarg" refType="primFontSz" fact="0.05"/>
+                      <dgm:constr type="rMarg" refType="primFontSz" fact="0.05"/>
+                      <dgm:constr type="tMarg" refType="primFontSz" fact="0.05"/>
+                      <dgm:constr type="bMarg" refType="primFontSz" fact="0.05"/>
+                    </dgm:constrLst>
+                    <dgm:ruleLst>
+                      <dgm:rule type="primFontSz" val="5" fact="NaN" max="NaN"/>
+                    </dgm:ruleLst>
+                  </dgm:layoutNode>
+                  <dgm:layoutNode name="rootConnector3" moveWith="rootText1">
+                    <dgm:alg type="sp"/>
+                    <dgm:shape xmlns:r="http://schemas.openxmlformats.org/officeDocument/2006/relationships" type="rect" r:blip="" hideGeom="1">
+                      <dgm:adjLst/>
+                    </dgm:shape>
+                    <dgm:presOf axis="self" ptType="node" cnt="1"/>
+                    <dgm:constrLst/>
+                    <dgm:ruleLst/>
+                  </dgm:layoutNode>
+                </dgm:layoutNode>
+                <dgm:layoutNode name="hierChild6">
+                  <dgm:choose name="Name127">
+                    <dgm:if name="Name128" func="var" arg="hierBranch" op="equ" val="l">
+                      <dgm:alg type="hierChild">
+                        <dgm:param type="chAlign" val="r"/>
+                        <dgm:param type="linDir" val="fromT"/>
+                      </dgm:alg>
+                    </dgm:if>
+                    <dgm:if name="Name129" func="var" arg="hierBranch" op="equ" val="r">
+                      <dgm:alg type="hierChild">
+                        <dgm:param type="chAlign" val="l"/>
+                        <dgm:param type="linDir" val="fromT"/>
+                      </dgm:alg>
+                    </dgm:if>
+                    <dgm:if name="Name130" func="var" arg="hierBranch" op="equ" val="hang">
+                      <dgm:choose name="Name131">
+                        <dgm:if name="Name132" func="var" arg="dir" op="equ" val="norm">
+                          <dgm:alg type="hierChild">
+                            <dgm:param type="chAlign" val="l"/>
+                            <dgm:param type="linDir" val="fromL"/>
+                            <dgm:param type="secChAlign" val="t"/>
+                            <dgm:param type="secLinDir" val="fromT"/>
+                          </dgm:alg>
+                        </dgm:if>
+                        <dgm:else name="Name133">
+                          <dgm:alg type="hierChild">
+                            <dgm:param type="chAlign" val="l"/>
+                            <dgm:param type="linDir" val="fromR"/>
+                            <dgm:param type="secChAlign" val="t"/>
+                            <dgm:param type="secLinDir" val="fromT"/>
+                          </dgm:alg>
+                        </dgm:else>
+                      </dgm:choose>
+                    </dgm:if>
+                    <dgm:if name="Name134" func="var" arg="hierBranch" op="equ" val="std">
+                      <dgm:choose name="Name135">
+                        <dgm:if name="Name136" func="var" arg="dir" op="equ" val="norm">
+                          <dgm:alg type="hierChild"/>
+                        </dgm:if>
+                        <dgm:else name="Name137">
+                          <dgm:alg type="hierChild">
+                            <dgm:param type="linDir" val="fromR"/>
+                          </dgm:alg>
+                        </dgm:else>
+                      </dgm:choose>
+                    </dgm:if>
+                    <dgm:if name="Name138" func="var" arg="hierBranch" op="equ" val="init">
+                      <dgm:choose name="Name139">
+                        <dgm:if name="Name140" axis="des" func="maxDepth" op="lte" val="1">
+                          <dgm:alg type="hierChild">
+                            <dgm:param type="chAlign" val="l"/>
+                            <dgm:param type="linDir" val="fromT"/>
+                          </dgm:alg>
+                        </dgm:if>
+                        <dgm:else name="Name141">
+                          <dgm:alg type="hierChild"/>
+                        </dgm:else>
+                      </dgm:choose>
+                    </dgm:if>
+                    <dgm:else name="Name142"/>
+                  </dgm:choose>
+                  <dgm:shape xmlns:r="http://schemas.openxmlformats.org/officeDocument/2006/relationships" r:blip="">
+                    <dgm:adjLst/>
+                  </dgm:shape>
+                  <dgm:presOf/>
+                  <dgm:constrLst/>
+                  <dgm:ruleLst/>
+                  <dgm:forEach name="Name143" ref="rep2a"/>
+                </dgm:layoutNode>
+                <dgm:layoutNode name="hierChild7">
+                  <dgm:choose name="Name144">
+                    <dgm:if name="Name145" func="var" arg="dir" op="equ" val="norm">
+                      <dgm:alg type="hierChild">
+                        <dgm:param type="chAlign" val="l"/>
+                        <dgm:param type="linDir" val="fromL"/>
+                        <dgm:param type="secChAlign" val="t"/>
+                        <dgm:param type="secLinDir" val="fromT"/>
+                      </dgm:alg>
+                    </dgm:if>
+                    <dgm:else name="Name146">
+                      <dgm:alg type="hierChild">
+                        <dgm:param type="chAlign" val="l"/>
+                        <dgm:param type="linDir" val="fromR"/>
+                        <dgm:param type="secChAlign" val="t"/>
+                        <dgm:param type="secLinDir" val="fromT"/>
+                      </dgm:alg>
+                    </dgm:else>
+                  </dgm:choose>
+                  <dgm:shape xmlns:r="http://schemas.openxmlformats.org/officeDocument/2006/relationships" r:blip="">
+                    <dgm:adjLst/>
+                  </dgm:shape>
+                  <dgm:presOf/>
+                  <dgm:constrLst/>
+                  <dgm:ruleLst/>
+                  <dgm:forEach name="Name147" ref="rep2b"/>
+                </dgm:layoutNode>
+              </dgm:layoutNode>
+            </dgm:forEach>
+          </dgm:layoutNode>
+        </dgm:layoutNode>
+      </dgm:forEach>
+    </dgm:forEach>
+  </dgm:layoutNode>
+</dgm:layoutDef>
+</file>
+
+<file path=ppt/diagrams/quickStyle1.xml><?xml version="1.0" encoding="utf-8"?>
+<dgm:styleDef xmlns:dgm="http://schemas.openxmlformats.org/drawingml/2006/diagram" xmlns:a="http://schemas.openxmlformats.org/drawingml/2006/main" uniqueId="urn:microsoft.com/office/officeart/2005/8/quickstyle/simple1">
+  <dgm:title val=""/>
+  <dgm:desc val=""/>
+  <dgm:catLst>
+    <dgm:cat type="simple" pri="10100"/>
+  </dgm:catLst>
+  <dgm:scene3d>
+    <a:camera prst="orthographicFront"/>
+    <a:lightRig rig="threePt" dir="t"/>
+  </dgm:scene3d>
+  <dgm:styleLbl name="node0">
+    <dgm:scene3d>
+      <a:camera prst="orthographicFront"/>
+      <a:lightRig rig="threePt" dir="t"/>
+    </dgm:scene3d>
+    <dgm:sp3d/>
+    <dgm:txPr/>
+    <dgm:style>
+      <a:lnRef idx="2">
+        <a:scrgbClr r="0" g="0" b="0"/>
+      </a:lnRef>
+      <a:fillRef idx="1">
+        <a:scrgbClr r="0" g="0" b="0"/>
+      </a:fillRef>
+      <a:effectRef idx="0">
+        <a:scrgbClr r="0" g="0" b="0"/>
+      </a:effectRef>
+      <a:fontRef idx="minor">
+        <a:schemeClr val="lt1"/>
+      </a:fontRef>
+    </dgm:style>
+  </dgm:styleLbl>
+  <dgm:styleLbl name="lnNode1">
+    <dgm:scene3d>
+      <a:camera prst="orthographicFront"/>
+      <a:lightRig rig="threePt" dir="t"/>
+    </dgm:scene3d>
+    <dgm:sp3d/>
+    <dgm:txPr/>
+    <dgm:style>
+      <a:lnRef idx="2">
+        <a:scrgbClr r="0" g="0" b="0"/>
+      </a:lnRef>
+      <a:fillRef idx="1">
+        <a:scrgbClr r="0" g="0" b="0"/>
+      </a:fillRef>
+      <a:effectRef idx="0">
+        <a:scrgbClr r="0" g="0" b="0"/>
+      </a:effectRef>
+      <a:fontRef idx="minor">
+        <a:schemeClr val="lt1"/>
+      </a:fontRef>
+    </dgm:style>
+  </dgm:styleLbl>
+  <dgm:styleLbl name="vennNode1">
+    <dgm:scene3d>
+      <a:camera prst="orthographicFront"/>
+      <a:lightRig rig="threePt" dir="t"/>
+    </dgm:scene3d>
+    <dgm:sp3d/>
+    <dgm:txPr/>
+    <dgm:style>
+      <a:lnRef idx="2">
+        <a:scrgbClr r="0" g="0" b="0"/>
+      </a:lnRef>
+      <a:fillRef idx="1">
+        <a:scrgbClr r="0" g="0" b="0"/>
+      </a:fillRef>
+      <a:effectRef idx="0">
+        <a:scrgbClr r="0" g="0" b="0"/>
+      </a:effectRef>
+      <a:fontRef idx="minor">
+        <a:schemeClr val="tx1"/>
+      </a:fontRef>
+    </dgm:style>
+  </dgm:styleLbl>
+  <dgm:styleLbl name="alignNode1">
+    <dgm:scene3d>
+      <a:camera prst="orthographicFront"/>
+      <a:lightRig rig="threePt" dir="t"/>
+    </dgm:scene3d>
+    <dgm:sp3d/>
+    <dgm:txPr/>
+    <dgm:style>
+      <a:lnRef idx="2">
+        <a:scrgbClr r="0" g="0" b="0"/>
+      </a:lnRef>
+      <a:fillRef idx="1">
+        <a:scrgbClr r="0" g="0" b="0"/>
+      </a:fillRef>
+      <a:effectRef idx="0">
+        <a:scrgbClr r="0" g="0" b="0"/>
+      </a:effectRef>
+      <a:fontRef idx="minor">
+        <a:schemeClr val="lt1"/>
+      </a:fontRef>
+    </dgm:style>
+  </dgm:styleLbl>
+  <dgm:styleLbl name="node1">
+    <dgm:scene3d>
+      <a:camera prst="orthographicFront"/>
+      <a:lightRig rig="threePt" dir="t"/>
+    </dgm:scene3d>
+    <dgm:sp3d/>
+    <dgm:txPr/>
+    <dgm:style>
+      <a:lnRef idx="2">
+        <a:scrgbClr r="0" g="0" b="0"/>
+      </a:lnRef>
+      <a:fillRef idx="1">
+        <a:scrgbClr r="0" g="0" b="0"/>
+      </a:fillRef>
+      <a:effectRef idx="0">
+        <a:scrgbClr r="0" g="0" b="0"/>
+      </a:effectRef>
+      <a:fontRef idx="minor">
+        <a:schemeClr val="lt1"/>
+      </a:fontRef>
+    </dgm:style>
+  </dgm:styleLbl>
+  <dgm:styleLbl name="node2">
+    <dgm:scene3d>
+      <a:camera prst="orthographicFront"/>
+      <a:lightRig rig="threePt" dir="t"/>
+    </dgm:scene3d>
+    <dgm:sp3d/>
+    <dgm:txPr/>
+    <dgm:style>
+      <a:lnRef idx="2">
+        <a:scrgbClr r="0" g="0" b="0"/>
+      </a:lnRef>
+      <a:fillRef idx="1">
+        <a:scrgbClr r="0" g="0" b="0"/>
+      </a:fillRef>
+      <a:effectRef idx="0">
+        <a:scrgbClr r="0" g="0" b="0"/>
+      </a:effectRef>
+      <a:fontRef idx="minor">
+        <a:schemeClr val="lt1"/>
+      </a:fontRef>
+    </dgm:style>
+  </dgm:styleLbl>
+  <dgm:styleLbl name="node3">
+    <dgm:scene3d>
+      <a:camera prst="orthographicFront"/>
+      <a:lightRig rig="threePt" dir="t"/>
+    </dgm:scene3d>
+    <dgm:sp3d/>
+    <dgm:txPr/>
+    <dgm:style>
+      <a:lnRef idx="2">
+        <a:scrgbClr r="0" g="0" b="0"/>
+      </a:lnRef>
+      <a:fillRef idx="1">
+        <a:scrgbClr r="0" g="0" b="0"/>
+      </a:fillRef>
+      <a:effectRef idx="0">
+        <a:scrgbClr r="0" g="0" b="0"/>
+      </a:effectRef>
+      <a:fontRef idx="minor">
+        <a:schemeClr val="lt1"/>
+      </a:fontRef>
+    </dgm:style>
+  </dgm:styleLbl>
+  <dgm:styleLbl name="node4">
+    <dgm:scene3d>
+      <a:camera prst="orthographicFront"/>
+      <a:lightRig rig="threePt" dir="t"/>
+    </dgm:scene3d>
+    <dgm:sp3d/>
+    <dgm:txPr/>
+    <dgm:style>
+      <a:lnRef idx="2">
+        <a:scrgbClr r="0" g="0" b="0"/>
+      </a:lnRef>
+      <a:fillRef idx="1">
+        <a:scrgbClr r="0" g="0" b="0"/>
+      </a:fillRef>
+      <a:effectRef idx="0">
+        <a:scrgbClr r="0" g="0" b="0"/>
+      </a:effectRef>
+      <a:fontRef idx="minor">
+        <a:schemeClr val="lt1"/>
+      </a:fontRef>
+    </dgm:style>
+  </dgm:styleLbl>
+  <dgm:styleLbl name="fgImgPlace1">
+    <dgm:scene3d>
+      <a:camera prst="orthographicFront"/>
+      <a:lightRig rig="threePt" dir="t"/>
+    </dgm:scene3d>
+    <dgm:sp3d/>
+    <dgm:txPr/>
+    <dgm:style>
+      <a:lnRef idx="2">
+        <a:scrgbClr r="0" g="0" b="0"/>
+      </a:lnRef>
+      <a:fillRef idx="1">
+        <a:scrgbClr r="0" g="0" b="0"/>
+      </a:fillRef>
+      <a:effectRef idx="0">
+        <a:scrgbClr r="0" g="0" b="0"/>
+      </a:effectRef>
+      <a:fontRef idx="minor"/>
+    </dgm:style>
+  </dgm:styleLbl>
+  <dgm:styleLbl name="alignImgPlace1">
+    <dgm:scene3d>
+      <a:camera prst="orthographicFront"/>
+      <a:lightRig rig="threePt" dir="t"/>
+    </dgm:scene3d>
+    <dgm:sp3d/>
+    <dgm:txPr/>
+    <dgm:style>
+      <a:lnRef idx="2">
+        <a:scrgbClr r="0" g="0" b="0"/>
+      </a:lnRef>
+      <a:fillRef idx="1">
+        <a:scrgbClr r="0" g="0" b="0"/>
+      </a:fillRef>
+      <a:effectRef idx="0">
+        <a:scrgbClr r="0" g="0" b="0"/>
+      </a:effectRef>
+      <a:fontRef idx="minor"/>
+    </dgm:style>
+  </dgm:styleLbl>
+  <dgm:styleLbl name="bgImgPlace1">
+    <dgm:scene3d>
+      <a:camera prst="orthographicFront"/>
+      <a:lightRig rig="threePt" dir="t"/>
+    </dgm:scene3d>
+    <dgm:sp3d/>
+    <dgm:txPr/>
+    <dgm:style>
+      <a:lnRef idx="2">
+        <a:scrgbClr r="0" g="0" b="0"/>
+      </a:lnRef>
+      <a:fillRef idx="1">
+        <a:scrgbClr r="0" g="0" b="0"/>
+      </a:fillRef>
+      <a:effectRef idx="0">
+        <a:scrgbClr r="0" g="0" b="0"/>
+      </a:effectRef>
+      <a:fontRef idx="minor"/>
+    </dgm:style>
+  </dgm:styleLbl>
+  <dgm:styleLbl name="sibTrans2D1">
+    <dgm:scene3d>
+      <a:camera prst="orthographicFront"/>
+      <a:lightRig rig="threePt" dir="t"/>
+    </dgm:scene3d>
+    <dgm:sp3d/>
+    <dgm:txPr/>
+    <dgm:style>
+      <a:lnRef idx="0">
+        <a:scrgbClr r="0" g="0" b="0"/>
+      </a:lnRef>
+      <a:fillRef idx="1">
+        <a:scrgbClr r="0" g="0" b="0"/>
+      </a:fillRef>
+      <a:effectRef idx="0">
+        <a:scrgbClr r="0" g="0" b="0"/>
+      </a:effectRef>
+      <a:fontRef idx="minor">
+        <a:schemeClr val="lt1"/>
+      </a:fontRef>
+    </dgm:style>
+  </dgm:styleLbl>
+  <dgm:styleLbl name="fgSibTrans2D1">
+    <dgm:scene3d>
+      <a:camera prst="orthographicFront"/>
+      <a:lightRig rig="threePt" dir="t"/>
+    </dgm:scene3d>
+    <dgm:sp3d/>
+    <dgm:txPr/>
+    <dgm:style>
+      <a:lnRef idx="0">
+        <a:scrgbClr r="0" g="0" b="0"/>
+      </a:lnRef>
+      <a:fillRef idx="1">
+        <a:scrgbClr r="0" g="0" b="0"/>
+      </a:fillRef>
+      <a:effectRef idx="0">
+        <a:scrgbClr r="0" g="0" b="0"/>
+      </a:effectRef>
+      <a:fontRef idx="minor">
+        <a:schemeClr val="lt1"/>
+      </a:fontRef>
+    </dgm:style>
+  </dgm:styleLbl>
+  <dgm:styleLbl name="bgSibTrans2D1">
+    <dgm:scene3d>
+      <a:camera prst="orthographicFront"/>
+      <a:lightRig rig="threePt" dir="t"/>
+    </dgm:scene3d>
+    <dgm:sp3d/>
+    <dgm:txPr/>
+    <dgm:style>
+      <a:lnRef idx="0">
+        <a:scrgbClr r="0" g="0" b="0"/>
+      </a:lnRef>
+      <a:fillRef idx="1">
+        <a:scrgbClr r="0" g="0" b="0"/>
+      </a:fillRef>
+      <a:effectRef idx="0">
+        <a:scrgbClr r="0" g="0" b="0"/>
+      </a:effectRef>
+      <a:fontRef idx="minor">
+        <a:schemeClr val="lt1"/>
+      </a:fontRef>
+    </dgm:style>
+  </dgm:styleLbl>
+  <dgm:styleLbl name="sibTrans1D1">
+    <dgm:scene3d>
+      <a:camera prst="orthographicFront"/>
+      <a:lightRig rig="threePt" dir="t"/>
+    </dgm:scene3d>
+    <dgm:sp3d/>
+    <dgm:txPr/>
+    <dgm:style>
+      <a:lnRef idx="1">
+        <a:scrgbClr r="0" g="0" b="0"/>
+      </a:lnRef>
+      <a:fillRef idx="0">
+        <a:scrgbClr r="0" g="0" b="0"/>
+      </a:fillRef>
+      <a:effectRef idx="0">
+        <a:scrgbClr r="0" g="0" b="0"/>
+      </a:effectRef>
+      <a:fontRef idx="minor"/>
+    </dgm:style>
+  </dgm:styleLbl>
+  <dgm:styleLbl name="callout">
+    <dgm:scene3d>
+      <a:camera prst="orthographicFront"/>
+      <a:lightRig rig="threePt" dir="t"/>
+    </dgm:scene3d>
+    <dgm:sp3d/>
+    <dgm:txPr/>
+    <dgm:style>
+      <a:lnRef idx="2">
+        <a:scrgbClr r="0" g="0" b="0"/>
+      </a:lnRef>
+      <a:fillRef idx="1">
+        <a:scrgbClr r="0" g="0" b="0"/>
+      </a:fillRef>
+      <a:effectRef idx="0">
+        <a:scrgbClr r="0" g="0" b="0"/>
+      </a:effectRef>
+      <a:fontRef idx="minor"/>
+    </dgm:style>
+  </dgm:styleLbl>
+  <dgm:styleLbl name="asst0">
+    <dgm:scene3d>
+      <a:camera prst="orthographicFront"/>
+      <a:lightRig rig="threePt" dir="t"/>
+    </dgm:scene3d>
+    <dgm:sp3d/>
+    <dgm:txPr/>
+    <dgm:style>
+      <a:lnRef idx="2">
+        <a:scrgbClr r="0" g="0" b="0"/>
+      </a:lnRef>
+      <a:fillRef idx="1">
+        <a:scrgbClr r="0" g="0" b="0"/>
+      </a:fillRef>
+      <a:effectRef idx="0">
+        <a:scrgbClr r="0" g="0" b="0"/>
+      </a:effectRef>
+      <a:fontRef idx="minor">
+        <a:schemeClr val="lt1"/>
+      </a:fontRef>
+    </dgm:style>
+  </dgm:styleLbl>
+  <dgm:styleLbl name="asst1">
+    <dgm:scene3d>
+      <a:camera prst="orthographicFront"/>
+      <a:lightRig rig="threePt" dir="t"/>
+    </dgm:scene3d>
+    <dgm:sp3d/>
+    <dgm:txPr/>
+    <dgm:style>
+      <a:lnRef idx="2">
+        <a:scrgbClr r="0" g="0" b="0"/>
+      </a:lnRef>
+      <a:fillRef idx="1">
+        <a:scrgbClr r="0" g="0" b="0"/>
+      </a:fillRef>
+      <a:effectRef idx="0">
+        <a:scrgbClr r="0" g="0" b="0"/>
+      </a:effectRef>
+      <a:fontRef idx="minor">
+        <a:schemeClr val="lt1"/>
+      </a:fontRef>
+    </dgm:style>
+  </dgm:styleLbl>
+  <dgm:styleLbl name="asst2">
+    <dgm:scene3d>
+      <a:camera prst="orthographicFront"/>
+      <a:lightRig rig="threePt" dir="t"/>
+    </dgm:scene3d>
+    <dgm:sp3d/>
+    <dgm:txPr/>
+    <dgm:style>
+      <a:lnRef idx="2">
+        <a:scrgbClr r="0" g="0" b="0"/>
+      </a:lnRef>
+      <a:fillRef idx="1">
+        <a:scrgbClr r="0" g="0" b="0"/>
+      </a:fillRef>
+      <a:effectRef idx="0">
+        <a:scrgbClr r="0" g="0" b="0"/>
+      </a:effectRef>
+      <a:fontRef idx="minor">
+        <a:schemeClr val="lt1"/>
+      </a:fontRef>
+    </dgm:style>
+  </dgm:styleLbl>
+  <dgm:styleLbl name="asst3">
+    <dgm:scene3d>
+      <a:camera prst="orthographicFront"/>
+      <a:lightRig rig="threePt" dir="t"/>
+    </dgm:scene3d>
+    <dgm:sp3d/>
+    <dgm:txPr/>
+    <dgm:style>
+      <a:lnRef idx="2">
+        <a:scrgbClr r="0" g="0" b="0"/>
+      </a:lnRef>
+      <a:fillRef idx="1">
+        <a:scrgbClr r="0" g="0" b="0"/>
+      </a:fillRef>
+      <a:effectRef idx="0">
+        <a:scrgbClr r="0" g="0" b="0"/>
+      </a:effectRef>
+      <a:fontRef idx="minor">
+        <a:schemeClr val="lt1"/>
+      </a:fontRef>
+    </dgm:style>
+  </dgm:styleLbl>
+  <dgm:styleLbl name="asst4">
+    <dgm:scene3d>
+      <a:camera prst="orthographicFront"/>
+      <a:lightRig rig="threePt" dir="t"/>
+    </dgm:scene3d>
+    <dgm:sp3d/>
+    <dgm:txPr/>
+    <dgm:style>
+      <a:lnRef idx="2">
+        <a:scrgbClr r="0" g="0" b="0"/>
+      </a:lnRef>
+      <a:fillRef idx="1">
+        <a:scrgbClr r="0" g="0" b="0"/>
+      </a:fillRef>
+      <a:effectRef idx="0">
+        <a:scrgbClr r="0" g="0" b="0"/>
+      </a:effectRef>
+      <a:fontRef idx="minor">
+        <a:schemeClr val="lt1"/>
+      </a:fontRef>
+    </dgm:style>
+  </dgm:styleLbl>
+  <dgm:styleLbl name="parChTrans2D1">
+    <dgm:scene3d>
+      <a:camera prst="orthographicFront"/>
+      <a:lightRig rig="threePt" dir="t"/>
+    </dgm:scene3d>
+    <dgm:sp3d/>
+    <dgm:txPr/>
+    <dgm:style>
+      <a:lnRef idx="2">
+        <a:scrgbClr r="0" g="0" b="0"/>
+      </a:lnRef>
+      <a:fillRef idx="1">
+        <a:scrgbClr r="0" g="0" b="0"/>
+      </a:fillRef>
+      <a:effectRef idx="0">
+        <a:scrgbClr r="0" g="0" b="0"/>
+      </a:effectRef>
+      <a:fontRef idx="minor">
+        <a:schemeClr val="lt1"/>
+      </a:fontRef>
+    </dgm:style>
+  </dgm:styleLbl>
+  <dgm:styleLbl name="parChTrans2D2">
+    <dgm:scene3d>
+      <a:camera prst="orthographicFront"/>
+      <a:lightRig rig="threePt" dir="t"/>
+    </dgm:scene3d>
+    <dgm:sp3d/>
+    <dgm:txPr/>
+    <dgm:style>
+      <a:lnRef idx="2">
+        <a:scrgbClr r="0" g="0" b="0"/>
+      </a:lnRef>
+      <a:fillRef idx="1">
+        <a:scrgbClr r="0" g="0" b="0"/>
+      </a:fillRef>
+      <a:effectRef idx="0">
+        <a:scrgbClr r="0" g="0" b="0"/>
+      </a:effectRef>
+      <a:fontRef idx="minor">
+        <a:schemeClr val="lt1"/>
+      </a:fontRef>
+    </dgm:style>
+  </dgm:styleLbl>
+  <dgm:styleLbl name="parChTrans2D3">
+    <dgm:scene3d>
+      <a:camera prst="orthographicFront"/>
+      <a:lightRig rig="threePt" dir="t"/>
+    </dgm:scene3d>
+    <dgm:sp3d/>
+    <dgm:txPr/>
+    <dgm:style>
+      <a:lnRef idx="2">
+        <a:scrgbClr r="0" g="0" b="0"/>
+      </a:lnRef>
+      <a:fillRef idx="1">
+        <a:scrgbClr r="0" g="0" b="0"/>
+      </a:fillRef>
+      <a:effectRef idx="0">
+        <a:scrgbClr r="0" g="0" b="0"/>
+      </a:effectRef>
+      <a:fontRef idx="minor">
+        <a:schemeClr val="lt1"/>
+      </a:fontRef>
+    </dgm:style>
+  </dgm:styleLbl>
+  <dgm:styleLbl name="parChTrans2D4">
+    <dgm:scene3d>
+      <a:camera prst="orthographicFront"/>
+      <a:lightRig rig="threePt" dir="t"/>
+    </dgm:scene3d>
+    <dgm:sp3d/>
+    <dgm:txPr/>
+    <dgm:style>
+      <a:lnRef idx="2">
+        <a:scrgbClr r="0" g="0" b="0"/>
+      </a:lnRef>
+      <a:fillRef idx="1">
+        <a:scrgbClr r="0" g="0" b="0"/>
+      </a:fillRef>
+      <a:effectRef idx="0">
+        <a:scrgbClr r="0" g="0" b="0"/>
+      </a:effectRef>
+      <a:fontRef idx="minor">
+        <a:schemeClr val="lt1"/>
+      </a:fontRef>
+    </dgm:style>
+  </dgm:styleLbl>
+  <dgm:styleLbl name="parChTrans1D1">
+    <dgm:scene3d>
+      <a:camera prst="orthographicFront"/>
+      <a:lightRig rig="threePt" dir="t"/>
+    </dgm:scene3d>
+    <dgm:sp3d/>
+    <dgm:txPr/>
+    <dgm:style>
+      <a:lnRef idx="2">
+        <a:scrgbClr r="0" g="0" b="0"/>
+      </a:lnRef>
+      <a:fillRef idx="0">
+        <a:scrgbClr r="0" g="0" b="0"/>
+      </a:fillRef>
+      <a:effectRef idx="0">
+        <a:scrgbClr r="0" g="0" b="0"/>
+      </a:effectRef>
+      <a:fontRef idx="minor"/>
+    </dgm:style>
+  </dgm:styleLbl>
+  <dgm:styleLbl name="parChTrans1D2">
+    <dgm:scene3d>
+      <a:camera prst="orthographicFront"/>
+      <a:lightRig rig="threePt" dir="t"/>
+    </dgm:scene3d>
+    <dgm:sp3d/>
+    <dgm:txPr/>
+    <dgm:style>
+      <a:lnRef idx="2">
+        <a:scrgbClr r="0" g="0" b="0"/>
+      </a:lnRef>
+      <a:fillRef idx="0">
+        <a:scrgbClr r="0" g="0" b="0"/>
+      </a:fillRef>
+      <a:effectRef idx="0">
+        <a:scrgbClr r="0" g="0" b="0"/>
+      </a:effectRef>
+      <a:fontRef idx="minor"/>
+    </dgm:style>
+  </dgm:styleLbl>
+  <dgm:styleLbl name="parChTrans1D3">
+    <dgm:scene3d>
+      <a:camera prst="orthographicFront"/>
+      <a:lightRig rig="threePt" dir="t"/>
+    </dgm:scene3d>
+    <dgm:sp3d/>
+    <dgm:txPr/>
+    <dgm:style>
+      <a:lnRef idx="2">
+        <a:scrgbClr r="0" g="0" b="0"/>
+      </a:lnRef>
+      <a:fillRef idx="0">
+        <a:scrgbClr r="0" g="0" b="0"/>
+      </a:fillRef>
+      <a:effectRef idx="0">
+        <a:scrgbClr r="0" g="0" b="0"/>
+      </a:effectRef>
+      <a:fontRef idx="minor"/>
+    </dgm:style>
+  </dgm:styleLbl>
+  <dgm:styleLbl name="parChTrans1D4">
+    <dgm:scene3d>
+      <a:camera prst="orthographicFront"/>
+      <a:lightRig rig="threePt" dir="t"/>
+    </dgm:scene3d>
+    <dgm:sp3d/>
+    <dgm:txPr/>
+    <dgm:style>
+      <a:lnRef idx="2">
+        <a:scrgbClr r="0" g="0" b="0"/>
+      </a:lnRef>
+      <a:fillRef idx="0">
+        <a:scrgbClr r="0" g="0" b="0"/>
+      </a:fillRef>
+      <a:effectRef idx="0">
+        <a:scrgbClr r="0" g="0" b="0"/>
+      </a:effectRef>
+      <a:fontRef idx="minor"/>
+    </dgm:style>
+  </dgm:styleLbl>
+  <dgm:styleLbl name="fgAcc1">
+    <dgm:scene3d>
+      <a:camera prst="orthographicFront"/>
+      <a:lightRig rig="threePt" dir="t"/>
+    </dgm:scene3d>
+    <dgm:sp3d/>
+    <dgm:txPr/>
+    <dgm:style>
+      <a:lnRef idx="2">
+        <a:scrgbClr r="0" g="0" b="0"/>
+      </a:lnRef>
+      <a:fillRef idx="1">
+        <a:scrgbClr r="0" g="0" b="0"/>
+      </a:fillRef>
+      <a:effectRef idx="0">
+        <a:scrgbClr r="0" g="0" b="0"/>
+      </a:effectRef>
+      <a:fontRef idx="minor"/>
+    </dgm:style>
+  </dgm:styleLbl>
+  <dgm:styleLbl name="conFgAcc1">
+    <dgm:scene3d>
+      <a:camera prst="orthographicFront"/>
+      <a:lightRig rig="threePt" dir="t"/>
+    </dgm:scene3d>
+    <dgm:sp3d/>
+    <dgm:txPr/>
+    <dgm:style>
+      <a:lnRef idx="2">
+        <a:scrgbClr r="0" g="0" b="0"/>
+      </a:lnRef>
+      <a:fillRef idx="1">
+        <a:scrgbClr r="0" g="0" b="0"/>
+      </a:fillRef>
+      <a:effectRef idx="0">
+        <a:scrgbClr r="0" g="0" b="0"/>
+      </a:effectRef>
+      <a:fontRef idx="minor"/>
+    </dgm:style>
+  </dgm:styleLbl>
+  <dgm:styleLbl name="alignAcc1">
+    <dgm:scene3d>
+      <a:camera prst="orthographicFront"/>
+      <a:lightRig rig="threePt" dir="t"/>
+    </dgm:scene3d>
+    <dgm:sp3d/>
+    <dgm:txPr/>
+    <dgm:style>
+      <a:lnRef idx="2">
+        <a:scrgbClr r="0" g="0" b="0"/>
+      </a:lnRef>
+      <a:fillRef idx="1">
+        <a:scrgbClr r="0" g="0" b="0"/>
+      </a:fillRef>
+      <a:effectRef idx="0">
+        <a:scrgbClr r="0" g="0" b="0"/>
+      </a:effectRef>
+      <a:fontRef idx="minor"/>
+    </dgm:style>
+  </dgm:styleLbl>
+  <dgm:styleLbl name="trAlignAcc1">
+    <dgm:scene3d>
+      <a:camera prst="orthographicFront"/>
+      <a:lightRig rig="threePt" dir="t"/>
+    </dgm:scene3d>
+    <dgm:sp3d/>
+    <dgm:txPr/>
+    <dgm:style>
+      <a:lnRef idx="1">
+        <a:scrgbClr r="0" g="0" b="0"/>
+      </a:lnRef>
+      <a:fillRef idx="1">
+        <a:scrgbClr r="0" g="0" b="0"/>
+      </a:fillRef>
+      <a:effectRef idx="0">
+        <a:scrgbClr r="0" g="0" b="0"/>
+      </a:effectRef>
+      <a:fontRef idx="minor"/>
+    </dgm:style>
+  </dgm:styleLbl>
+  <dgm:styleLbl name="bgAcc1">
+    <dgm:scene3d>
+      <a:camera prst="orthographicFront"/>
+      <a:lightRig rig="threePt" dir="t"/>
+    </dgm:scene3d>
+    <dgm:sp3d/>
+    <dgm:txPr/>
+    <dgm:style>
+      <a:lnRef idx="2">
+        <a:scrgbClr r="0" g="0" b="0"/>
+      </a:lnRef>
+      <a:fillRef idx="1">
+        <a:scrgbClr r="0" g="0" b="0"/>
+      </a:fillRef>
+      <a:effectRef idx="0">
+        <a:scrgbClr r="0" g="0" b="0"/>
+      </a:effectRef>
+      <a:fontRef idx="minor"/>
+    </dgm:style>
+  </dgm:styleLbl>
+  <dgm:styleLbl name="solidFgAcc1">
+    <dgm:scene3d>
+      <a:camera prst="orthographicFront"/>
+      <a:lightRig rig="threePt" dir="t"/>
+    </dgm:scene3d>
+    <dgm:sp3d/>
+    <dgm:txPr/>
+    <dgm:style>
+      <a:lnRef idx="2">
+        <a:scrgbClr r="0" g="0" b="0"/>
+      </a:lnRef>
+      <a:fillRef idx="1">
+        <a:scrgbClr r="0" g="0" b="0"/>
+      </a:fillRef>
+      <a:effectRef idx="0">
+        <a:scrgbClr r="0" g="0" b="0"/>
+      </a:effectRef>
+      <a:fontRef idx="minor"/>
+    </dgm:style>
+  </dgm:styleLbl>
+  <dgm:styleLbl name="solidAlignAcc1">
+    <dgm:scene3d>
+      <a:camera prst="orthographicFront"/>
+      <a:lightRig rig="threePt" dir="t"/>
+    </dgm:scene3d>
+    <dgm:sp3d/>
+    <dgm:txPr/>
+    <dgm:style>
+      <a:lnRef idx="2">
+        <a:scrgbClr r="0" g="0" b="0"/>
+      </a:lnRef>
+      <a:fillRef idx="1">
+        <a:scrgbClr r="0" g="0" b="0"/>
+      </a:fillRef>
+      <a:effectRef idx="0">
+        <a:scrgbClr r="0" g="0" b="0"/>
+      </a:effectRef>
+      <a:fontRef idx="minor"/>
+    </dgm:style>
+  </dgm:styleLbl>
+  <dgm:styleLbl name="solidBgAcc1">
+    <dgm:scene3d>
+      <a:camera prst="orthographicFront"/>
+      <a:lightRig rig="threePt" dir="t"/>
+    </dgm:scene3d>
+    <dgm:sp3d/>
+    <dgm:txPr/>
+    <dgm:style>
+      <a:lnRef idx="2">
+        <a:scrgbClr r="0" g="0" b="0"/>
+      </a:lnRef>
+      <a:fillRef idx="1">
+        <a:scrgbClr r="0" g="0" b="0"/>
+      </a:fillRef>
+      <a:effectRef idx="0">
+        <a:scrgbClr r="0" g="0" b="0"/>
+      </a:effectRef>
+      <a:fontRef idx="minor"/>
+    </dgm:style>
+  </dgm:styleLbl>
+  <dgm:styleLbl name="fgAccFollowNode1">
+    <dgm:scene3d>
+      <a:camera prst="orthographicFront"/>
+      <a:lightRig rig="threePt" dir="t"/>
+    </dgm:scene3d>
+    <dgm:sp3d/>
+    <dgm:txPr/>
+    <dgm:style>
+      <a:lnRef idx="2">
+        <a:scrgbClr r="0" g="0" b="0"/>
+      </a:lnRef>
+      <a:fillRef idx="1">
+        <a:scrgbClr r="0" g="0" b="0"/>
+      </a:fillRef>
+      <a:effectRef idx="0">
+        <a:scrgbClr r="0" g="0" b="0"/>
+      </a:effectRef>
+      <a:fontRef idx="minor"/>
+    </dgm:style>
+  </dgm:styleLbl>
+  <dgm:styleLbl name="alignAccFollowNode1">
+    <dgm:scene3d>
+      <a:camera prst="orthographicFront"/>
+      <a:lightRig rig="threePt" dir="t"/>
+    </dgm:scene3d>
+    <dgm:sp3d/>
+    <dgm:txPr/>
+    <dgm:style>
+      <a:lnRef idx="2">
+        <a:scrgbClr r="0" g="0" b="0"/>
+      </a:lnRef>
+      <a:fillRef idx="1">
+        <a:scrgbClr r="0" g="0" b="0"/>
+      </a:fillRef>
+      <a:effectRef idx="0">
+        <a:scrgbClr r="0" g="0" b="0"/>
+      </a:effectRef>
+      <a:fontRef idx="minor"/>
+    </dgm:style>
+  </dgm:styleLbl>
+  <dgm:styleLbl name="bgAccFollowNode1">
+    <dgm:scene3d>
+      <a:camera prst="orthographicFront"/>
+      <a:lightRig rig="threePt" dir="t"/>
+    </dgm:scene3d>
+    <dgm:sp3d/>
+    <dgm:txPr/>
+    <dgm:style>
+      <a:lnRef idx="2">
+        <a:scrgbClr r="0" g="0" b="0"/>
+      </a:lnRef>
+      <a:fillRef idx="1">
+        <a:scrgbClr r="0" g="0" b="0"/>
+      </a:fillRef>
+      <a:effectRef idx="0">
+        <a:scrgbClr r="0" g="0" b="0"/>
+      </a:effectRef>
+      <a:fontRef idx="minor"/>
+    </dgm:style>
+  </dgm:styleLbl>
+  <dgm:styleLbl name="fgAcc0">
+    <dgm:scene3d>
+      <a:camera prst="orthographicFront"/>
+      <a:lightRig rig="threePt" dir="t"/>
+    </dgm:scene3d>
+    <dgm:sp3d/>
+    <dgm:txPr/>
+    <dgm:style>
+      <a:lnRef idx="2">
+        <a:scrgbClr r="0" g="0" b="0"/>
+      </a:lnRef>
+      <a:fillRef idx="1">
+        <a:scrgbClr r="0" g="0" b="0"/>
+      </a:fillRef>
+      <a:effectRef idx="0">
+        <a:scrgbClr r="0" g="0" b="0"/>
+      </a:effectRef>
+      <a:fontRef idx="minor"/>
+    </dgm:style>
+  </dgm:styleLbl>
+  <dgm:styleLbl name="fgAcc2">
+    <dgm:scene3d>
+      <a:camera prst="orthographicFront"/>
+      <a:lightRig rig="threePt" dir="t"/>
+    </dgm:scene3d>
+    <dgm:sp3d/>
+    <dgm:txPr/>
+    <dgm:style>
+      <a:lnRef idx="2">
+        <a:scrgbClr r="0" g="0" b="0"/>
+      </a:lnRef>
+      <a:fillRef idx="1">
+        <a:scrgbClr r="0" g="0" b="0"/>
+      </a:fillRef>
+      <a:effectRef idx="0">
+        <a:scrgbClr r="0" g="0" b="0"/>
+      </a:effectRef>
+      <a:fontRef idx="minor"/>
+    </dgm:style>
+  </dgm:styleLbl>
+  <dgm:styleLbl name="fgAcc3">
+    <dgm:scene3d>
+      <a:camera prst="orthographicFront"/>
+      <a:lightRig rig="threePt" dir="t"/>
+    </dgm:scene3d>
+    <dgm:sp3d/>
+    <dgm:txPr/>
+    <dgm:style>
+      <a:lnRef idx="2">
+        <a:scrgbClr r="0" g="0" b="0"/>
+      </a:lnRef>
+      <a:fillRef idx="1">
+        <a:scrgbClr r="0" g="0" b="0"/>
+      </a:fillRef>
+      <a:effectRef idx="0">
+        <a:scrgbClr r="0" g="0" b="0"/>
+      </a:effectRef>
+      <a:fontRef idx="minor"/>
+    </dgm:style>
+  </dgm:styleLbl>
+  <dgm:styleLbl name="fgAcc4">
+    <dgm:scene3d>
+      <a:camera prst="orthographicFront"/>
+      <a:lightRig rig="threePt" dir="t"/>
+    </dgm:scene3d>
+    <dgm:sp3d/>
+    <dgm:txPr/>
+    <dgm:style>
+      <a:lnRef idx="2">
+        <a:scrgbClr r="0" g="0" b="0"/>
+      </a:lnRef>
+      <a:fillRef idx="1">
+        <a:scrgbClr r="0" g="0" b="0"/>
+      </a:fillRef>
+      <a:effectRef idx="0">
+        <a:scrgbClr r="0" g="0" b="0"/>
+      </a:effectRef>
+      <a:fontRef idx="minor"/>
+    </dgm:style>
+  </dgm:styleLbl>
+  <dgm:styleLbl name="bgShp">
+    <dgm:scene3d>
+      <a:camera prst="orthographicFront"/>
+      <a:lightRig rig="threePt" dir="t"/>
+    </dgm:scene3d>
+    <dgm:sp3d/>
+    <dgm:txPr/>
+    <dgm:style>
+      <a:lnRef idx="0">
+        <a:scrgbClr r="0" g="0" b="0"/>
+      </a:lnRef>
+      <a:fillRef idx="1">
+        <a:scrgbClr r="0" g="0" b="0"/>
+      </a:fillRef>
+      <a:effectRef idx="0">
+        <a:scrgbClr r="0" g="0" b="0"/>
+      </a:effectRef>
+      <a:fontRef idx="minor"/>
+    </dgm:style>
+  </dgm:styleLbl>
+  <dgm:styleLbl name="dkBgShp">
+    <dgm:scene3d>
+      <a:camera prst="orthographicFront"/>
+      <a:lightRig rig="threePt" dir="t"/>
+    </dgm:scene3d>
+    <dgm:sp3d/>
+    <dgm:txPr/>
+    <dgm:style>
+      <a:lnRef idx="0">
+        <a:scrgbClr r="0" g="0" b="0"/>
+      </a:lnRef>
+      <a:fillRef idx="1">
+        <a:scrgbClr r="0" g="0" b="0"/>
+      </a:fillRef>
+      <a:effectRef idx="0">
+        <a:scrgbClr r="0" g="0" b="0"/>
+      </a:effectRef>
+      <a:fontRef idx="minor"/>
+    </dgm:style>
+  </dgm:styleLbl>
+  <dgm:styleLbl name="trBgShp">
+    <dgm:scene3d>
+      <a:camera prst="orthographicFront"/>
+      <a:lightRig rig="threePt" dir="t"/>
+    </dgm:scene3d>
+    <dgm:sp3d/>
+    <dgm:txPr/>
+    <dgm:style>
+      <a:lnRef idx="0">
+        <a:scrgbClr r="0" g="0" b="0"/>
+      </a:lnRef>
+      <a:fillRef idx="1">
+        <a:scrgbClr r="0" g="0" b="0"/>
+      </a:fillRef>
+      <a:effectRef idx="0">
+        <a:scrgbClr r="0" g="0" b="0"/>
+      </a:effectRef>
+      <a:fontRef idx="minor"/>
+    </dgm:style>
+  </dgm:styleLbl>
+  <dgm:styleLbl name="fgShp">
+    <dgm:scene3d>
+      <a:camera prst="orthographicFront"/>
+      <a:lightRig rig="threePt" dir="t"/>
+    </dgm:scene3d>
+    <dgm:sp3d/>
+    <dgm:txPr/>
+    <dgm:style>
+      <a:lnRef idx="2">
+        <a:scrgbClr r="0" g="0" b="0"/>
+      </a:lnRef>
+      <a:fillRef idx="1">
+        <a:scrgbClr r="0" g="0" b="0"/>
+      </a:fillRef>
+      <a:effectRef idx="0">
+        <a:scrgbClr r="0" g="0" b="0"/>
+      </a:effectRef>
+      <a:fontRef idx="minor"/>
+    </dgm:style>
+  </dgm:styleLbl>
+  <dgm:styleLbl name="revTx">
+    <dgm:scene3d>
+      <a:camera prst="orthographicFront"/>
+      <a:lightRig rig="threePt" dir="t"/>
+    </dgm:scene3d>
+    <dgm:sp3d/>
+    <dgm:txPr/>
+    <dgm:style>
+      <a:lnRef idx="0">
+        <a:scrgbClr r="0" g="0" b="0"/>
+      </a:lnRef>
+      <a:fillRef idx="0">
+        <a:scrgbClr r="0" g="0" b="0"/>
+      </a:fillRef>
+      <a:effectRef idx="0">
+        <a:scrgbClr r="0" g="0" b="0"/>
+      </a:effectRef>
+      <a:fontRef idx="minor"/>
+    </dgm:style>
+  </dgm:styleLbl>
+</dgm:styleDef>
+</file>
+
 <file path=ppt/notesMasters/notesMaster1.xml><?xml version="1.0" encoding="utf-8"?>
 <p:notesMaster xmlns:a="http://schemas.openxmlformats.org/drawingml/2006/main" xmlns:r="http://schemas.openxmlformats.org/officeDocument/2006/relationships" xmlns:p="http://schemas.openxmlformats.org/presentationml/2006/main">
   <p:cSld>
@@ -198,7 +4781,7 @@
           <a:p>
             <a:fld id="{7FCC5362-11BE-4886-978B-F647D810DE1A}" type="datetimeFigureOut">
               <a:rPr lang="en-US" smtClean="0"/>
-              <a:t>7/30/2021</a:t>
+              <a:t>8/11/2021</a:t>
             </a:fld>
             <a:endParaRPr lang="en-US"/>
           </a:p>
@@ -746,6 +5329,93 @@
 </p:notes>
 </file>
 
+<file path=ppt/notesSlides/notesSlide3.xml><?xml version="1.0" encoding="utf-8"?>
+<p:notes xmlns:a="http://schemas.openxmlformats.org/drawingml/2006/main" xmlns:r="http://schemas.openxmlformats.org/officeDocument/2006/relationships" xmlns:p="http://schemas.openxmlformats.org/presentationml/2006/main">
+  <p:cSld>
+    <p:spTree>
+      <p:nvGrpSpPr>
+        <p:cNvPr id="1" name=""/>
+        <p:cNvGrpSpPr/>
+        <p:nvPr/>
+      </p:nvGrpSpPr>
+      <p:grpSpPr>
+        <a:xfrm>
+          <a:off x="0" y="0"/>
+          <a:ext cx="0" cy="0"/>
+          <a:chOff x="0" y="0"/>
+          <a:chExt cx="0" cy="0"/>
+        </a:xfrm>
+      </p:grpSpPr>
+      <p:sp>
+        <p:nvSpPr>
+          <p:cNvPr id="2" name="Slide Image Placeholder 1"/>
+          <p:cNvSpPr>
+            <a:spLocks noGrp="1" noRot="1" noChangeAspect="1"/>
+          </p:cNvSpPr>
+          <p:nvPr>
+            <p:ph type="sldImg"/>
+          </p:nvPr>
+        </p:nvSpPr>
+        <p:spPr/>
+      </p:sp>
+      <p:sp>
+        <p:nvSpPr>
+          <p:cNvPr id="3" name="Notes Placeholder 2"/>
+          <p:cNvSpPr>
+            <a:spLocks noGrp="1"/>
+          </p:cNvSpPr>
+          <p:nvPr>
+            <p:ph type="body" idx="1"/>
+          </p:nvPr>
+        </p:nvSpPr>
+        <p:spPr/>
+        <p:txBody>
+          <a:bodyPr/>
+          <a:lstStyle/>
+          <a:p>
+            <a:r>
+              <a:rPr lang="en-US" dirty="0"/>
+              <a:t>Market class tree example</a:t>
+            </a:r>
+          </a:p>
+        </p:txBody>
+      </p:sp>
+      <p:sp>
+        <p:nvSpPr>
+          <p:cNvPr id="4" name="Slide Number Placeholder 3"/>
+          <p:cNvSpPr>
+            <a:spLocks noGrp="1"/>
+          </p:cNvSpPr>
+          <p:nvPr>
+            <p:ph type="sldNum" sz="quarter" idx="5"/>
+          </p:nvPr>
+        </p:nvSpPr>
+        <p:spPr/>
+        <p:txBody>
+          <a:bodyPr/>
+          <a:lstStyle/>
+          <a:p>
+            <a:fld id="{5776C217-D2E5-4CF0-BBF1-F5F5822D63B3}" type="slidenum">
+              <a:rPr lang="en-US" smtClean="0"/>
+              <a:t>3</a:t>
+            </a:fld>
+            <a:endParaRPr lang="en-US"/>
+          </a:p>
+        </p:txBody>
+      </p:sp>
+    </p:spTree>
+    <p:extLst>
+      <p:ext uri="{BB962C8B-B14F-4D97-AF65-F5344CB8AC3E}">
+        <p14:creationId xmlns:p14="http://schemas.microsoft.com/office/powerpoint/2010/main" val="2749460696"/>
+      </p:ext>
+    </p:extLst>
+  </p:cSld>
+  <p:clrMapOvr>
+    <a:masterClrMapping/>
+  </p:clrMapOvr>
+</p:notes>
+</file>
+
 <file path=ppt/slideLayouts/slideLayout1.xml><?xml version="1.0" encoding="utf-8"?>
 <p:sldLayout xmlns:a="http://schemas.openxmlformats.org/drawingml/2006/main" xmlns:r="http://schemas.openxmlformats.org/officeDocument/2006/relationships" xmlns:p="http://schemas.openxmlformats.org/presentationml/2006/main" type="title" preserve="1">
   <p:cSld name="Title Slide">
@@ -893,7 +5563,7 @@
           <a:p>
             <a:fld id="{E82AF7A9-B7DD-4441-9529-7051C501C076}" type="datetimeFigureOut">
               <a:rPr lang="en-US" smtClean="0"/>
-              <a:t>7/30/2021</a:t>
+              <a:t>8/11/2021</a:t>
             </a:fld>
             <a:endParaRPr lang="en-US"/>
           </a:p>
@@ -1091,7 +5761,7 @@
           <a:p>
             <a:fld id="{E82AF7A9-B7DD-4441-9529-7051C501C076}" type="datetimeFigureOut">
               <a:rPr lang="en-US" smtClean="0"/>
-              <a:t>7/30/2021</a:t>
+              <a:t>8/11/2021</a:t>
             </a:fld>
             <a:endParaRPr lang="en-US"/>
           </a:p>
@@ -1299,7 +5969,7 @@
           <a:p>
             <a:fld id="{E82AF7A9-B7DD-4441-9529-7051C501C076}" type="datetimeFigureOut">
               <a:rPr lang="en-US" smtClean="0"/>
-              <a:t>7/30/2021</a:t>
+              <a:t>8/11/2021</a:t>
             </a:fld>
             <a:endParaRPr lang="en-US"/>
           </a:p>
@@ -1497,7 +6167,7 @@
           <a:p>
             <a:fld id="{E82AF7A9-B7DD-4441-9529-7051C501C076}" type="datetimeFigureOut">
               <a:rPr lang="en-US" smtClean="0"/>
-              <a:t>7/30/2021</a:t>
+              <a:t>8/11/2021</a:t>
             </a:fld>
             <a:endParaRPr lang="en-US"/>
           </a:p>
@@ -1772,7 +6442,7 @@
           <a:p>
             <a:fld id="{E82AF7A9-B7DD-4441-9529-7051C501C076}" type="datetimeFigureOut">
               <a:rPr lang="en-US" smtClean="0"/>
-              <a:t>7/30/2021</a:t>
+              <a:t>8/11/2021</a:t>
             </a:fld>
             <a:endParaRPr lang="en-US"/>
           </a:p>
@@ -2037,7 +6707,7 @@
           <a:p>
             <a:fld id="{E82AF7A9-B7DD-4441-9529-7051C501C076}" type="datetimeFigureOut">
               <a:rPr lang="en-US" smtClean="0"/>
-              <a:t>7/30/2021</a:t>
+              <a:t>8/11/2021</a:t>
             </a:fld>
             <a:endParaRPr lang="en-US"/>
           </a:p>
@@ -2449,7 +7119,7 @@
           <a:p>
             <a:fld id="{E82AF7A9-B7DD-4441-9529-7051C501C076}" type="datetimeFigureOut">
               <a:rPr lang="en-US" smtClean="0"/>
-              <a:t>7/30/2021</a:t>
+              <a:t>8/11/2021</a:t>
             </a:fld>
             <a:endParaRPr lang="en-US"/>
           </a:p>
@@ -2590,7 +7260,7 @@
           <a:p>
             <a:fld id="{E82AF7A9-B7DD-4441-9529-7051C501C076}" type="datetimeFigureOut">
               <a:rPr lang="en-US" smtClean="0"/>
-              <a:t>7/30/2021</a:t>
+              <a:t>8/11/2021</a:t>
             </a:fld>
             <a:endParaRPr lang="en-US"/>
           </a:p>
@@ -2703,7 +7373,7 @@
           <a:p>
             <a:fld id="{E82AF7A9-B7DD-4441-9529-7051C501C076}" type="datetimeFigureOut">
               <a:rPr lang="en-US" smtClean="0"/>
-              <a:t>7/30/2021</a:t>
+              <a:t>8/11/2021</a:t>
             </a:fld>
             <a:endParaRPr lang="en-US"/>
           </a:p>
@@ -3014,7 +7684,7 @@
           <a:p>
             <a:fld id="{E82AF7A9-B7DD-4441-9529-7051C501C076}" type="datetimeFigureOut">
               <a:rPr lang="en-US" smtClean="0"/>
-              <a:t>7/30/2021</a:t>
+              <a:t>8/11/2021</a:t>
             </a:fld>
             <a:endParaRPr lang="en-US"/>
           </a:p>
@@ -3302,7 +7972,7 @@
           <a:p>
             <a:fld id="{E82AF7A9-B7DD-4441-9529-7051C501C076}" type="datetimeFigureOut">
               <a:rPr lang="en-US" smtClean="0"/>
-              <a:t>7/30/2021</a:t>
+              <a:t>8/11/2021</a:t>
             </a:fld>
             <a:endParaRPr lang="en-US"/>
           </a:p>
@@ -3543,7 +8213,7 @@
           <a:p>
             <a:fld id="{E82AF7A9-B7DD-4441-9529-7051C501C076}" type="datetimeFigureOut">
               <a:rPr lang="en-US" smtClean="0"/>
-              <a:t>7/30/2021</a:t>
+              <a:t>8/11/2021</a:t>
             </a:fld>
             <a:endParaRPr lang="en-US"/>
           </a:p>
@@ -10334,6 +15004,170 @@
     <p:extLst>
       <p:ext uri="{BB962C8B-B14F-4D97-AF65-F5344CB8AC3E}">
         <p14:creationId xmlns:p14="http://schemas.microsoft.com/office/powerpoint/2010/main" val="546461552"/>
+      </p:ext>
+    </p:extLst>
+  </p:cSld>
+  <p:clrMapOvr>
+    <a:masterClrMapping/>
+  </p:clrMapOvr>
+</p:sld>
+</file>
+
+<file path=ppt/slides/slide3.xml><?xml version="1.0" encoding="utf-8"?>
+<p:sld xmlns:a="http://schemas.openxmlformats.org/drawingml/2006/main" xmlns:r="http://schemas.openxmlformats.org/officeDocument/2006/relationships" xmlns:p="http://schemas.openxmlformats.org/presentationml/2006/main">
+  <p:cSld>
+    <p:spTree>
+      <p:nvGrpSpPr>
+        <p:cNvPr id="1" name=""/>
+        <p:cNvGrpSpPr/>
+        <p:nvPr/>
+      </p:nvGrpSpPr>
+      <p:grpSpPr>
+        <a:xfrm>
+          <a:off x="0" y="0"/>
+          <a:ext cx="0" cy="0"/>
+          <a:chOff x="0" y="0"/>
+          <a:chExt cx="0" cy="0"/>
+        </a:xfrm>
+      </p:grpSpPr>
+      <p:graphicFrame>
+        <p:nvGraphicFramePr>
+          <p:cNvPr id="4" name="Diagram 3">
+            <a:extLst>
+              <a:ext uri="{FF2B5EF4-FFF2-40B4-BE49-F238E27FC236}">
+                <a16:creationId xmlns:a16="http://schemas.microsoft.com/office/drawing/2014/main" id="{E4DE09E8-30DE-445F-832C-C18B324CB55A}"/>
+              </a:ext>
+            </a:extLst>
+          </p:cNvPr>
+          <p:cNvGraphicFramePr/>
+          <p:nvPr/>
+        </p:nvGraphicFramePr>
+        <p:xfrm>
+          <a:off x="1405718" y="161136"/>
+          <a:ext cx="9380565" cy="5507665"/>
+        </p:xfrm>
+        <a:graphic>
+          <a:graphicData uri="http://schemas.openxmlformats.org/drawingml/2006/diagram">
+            <dgm:relIds xmlns:dgm="http://schemas.openxmlformats.org/drawingml/2006/diagram" xmlns:r="http://schemas.openxmlformats.org/officeDocument/2006/relationships" r:dm="rId3" r:lo="rId4" r:qs="rId5" r:cs="rId6"/>
+          </a:graphicData>
+        </a:graphic>
+      </p:graphicFrame>
+      <p:sp>
+        <p:nvSpPr>
+          <p:cNvPr id="9" name="Arc 8">
+            <a:extLst>
+              <a:ext uri="{FF2B5EF4-FFF2-40B4-BE49-F238E27FC236}">
+                <a16:creationId xmlns:a16="http://schemas.microsoft.com/office/drawing/2014/main" id="{732EA318-9497-4D54-BE0B-6F66542D25DD}"/>
+              </a:ext>
+            </a:extLst>
+          </p:cNvPr>
+          <p:cNvSpPr/>
+          <p:nvPr/>
+        </p:nvSpPr>
+        <p:spPr>
+          <a:xfrm rot="8229009">
+            <a:off x="2649921" y="3764280"/>
+            <a:ext cx="2198998" cy="2265350"/>
+          </a:xfrm>
+          <a:prstGeom prst="arc">
+            <a:avLst>
+              <a:gd name="adj1" fmla="val 14800640"/>
+              <a:gd name="adj2" fmla="val 1115702"/>
+            </a:avLst>
+          </a:prstGeom>
+          <a:ln w="19050">
+            <a:prstDash val="dash"/>
+            <a:headEnd type="triangle" w="med" len="med"/>
+            <a:tailEnd type="triangle" w="med" len="med"/>
+          </a:ln>
+        </p:spPr>
+        <p:style>
+          <a:lnRef idx="1">
+            <a:schemeClr val="accent1"/>
+          </a:lnRef>
+          <a:fillRef idx="0">
+            <a:schemeClr val="accent1"/>
+          </a:fillRef>
+          <a:effectRef idx="0">
+            <a:schemeClr val="accent1"/>
+          </a:effectRef>
+          <a:fontRef idx="minor">
+            <a:schemeClr val="tx1"/>
+          </a:fontRef>
+        </p:style>
+        <p:txBody>
+          <a:bodyPr rot="0" spcFirstLastPara="0" vert="horz" wrap="square" lIns="91440" tIns="45720" rIns="91440" bIns="45720" numCol="1" spcCol="0" rtlCol="0" fromWordArt="0" anchor="ctr" anchorCtr="0" forceAA="0" compatLnSpc="1">
+            <a:prstTxWarp prst="textNoShape">
+              <a:avLst/>
+            </a:prstTxWarp>
+            <a:noAutofit/>
+          </a:bodyPr>
+          <a:lstStyle/>
+          <a:p>
+            <a:endParaRPr lang="en-US"/>
+          </a:p>
+        </p:txBody>
+      </p:sp>
+      <p:sp>
+        <p:nvSpPr>
+          <p:cNvPr id="11" name="Arc 10">
+            <a:extLst>
+              <a:ext uri="{FF2B5EF4-FFF2-40B4-BE49-F238E27FC236}">
+                <a16:creationId xmlns:a16="http://schemas.microsoft.com/office/drawing/2014/main" id="{FE7AE257-8FDD-4CB8-866F-74932742A368}"/>
+              </a:ext>
+            </a:extLst>
+          </p:cNvPr>
+          <p:cNvSpPr/>
+          <p:nvPr/>
+        </p:nvSpPr>
+        <p:spPr>
+          <a:xfrm rot="8229637">
+            <a:off x="7427479" y="3764274"/>
+            <a:ext cx="2198998" cy="2265350"/>
+          </a:xfrm>
+          <a:prstGeom prst="arc">
+            <a:avLst>
+              <a:gd name="adj1" fmla="val 14800640"/>
+              <a:gd name="adj2" fmla="val 1115702"/>
+            </a:avLst>
+          </a:prstGeom>
+          <a:ln w="19050">
+            <a:prstDash val="dash"/>
+            <a:headEnd type="triangle" w="med" len="med"/>
+            <a:tailEnd type="triangle" w="med" len="med"/>
+          </a:ln>
+        </p:spPr>
+        <p:style>
+          <a:lnRef idx="1">
+            <a:schemeClr val="accent1"/>
+          </a:lnRef>
+          <a:fillRef idx="0">
+            <a:schemeClr val="accent1"/>
+          </a:fillRef>
+          <a:effectRef idx="0">
+            <a:schemeClr val="accent1"/>
+          </a:effectRef>
+          <a:fontRef idx="minor">
+            <a:schemeClr val="tx1"/>
+          </a:fontRef>
+        </p:style>
+        <p:txBody>
+          <a:bodyPr rot="0" spcFirstLastPara="0" vert="horz" wrap="square" lIns="91440" tIns="45720" rIns="91440" bIns="45720" numCol="1" spcCol="0" rtlCol="0" fromWordArt="0" anchor="ctr" anchorCtr="0" forceAA="0" compatLnSpc="1">
+            <a:prstTxWarp prst="textNoShape">
+              <a:avLst/>
+            </a:prstTxWarp>
+            <a:noAutofit/>
+          </a:bodyPr>
+          <a:lstStyle/>
+          <a:p>
+            <a:endParaRPr lang="en-US"/>
+          </a:p>
+        </p:txBody>
+      </p:sp>
+    </p:spTree>
+    <p:extLst>
+      <p:ext uri="{BB962C8B-B14F-4D97-AF65-F5344CB8AC3E}">
+        <p14:creationId xmlns:p14="http://schemas.microsoft.com/office/powerpoint/2010/main" val="849435611"/>
       </p:ext>
     </p:extLst>
   </p:cSld>

</xml_diff>

<commit_message>
CM updates COB 8_13
</commit_message>
<xml_diff>
--- a/doc/source/_static/raw_figures.pptx
+++ b/doc/source/_static/raw_figures.pptx
@@ -5,12 +5,17 @@
     <p:sldMasterId id="2147483648" r:id="rId1"/>
   </p:sldMasterIdLst>
   <p:notesMasterIdLst>
-    <p:notesMasterId r:id="rId5"/>
+    <p:notesMasterId r:id="rId10"/>
   </p:notesMasterIdLst>
   <p:sldIdLst>
     <p:sldId id="257" r:id="rId2"/>
     <p:sldId id="258" r:id="rId3"/>
     <p:sldId id="256" r:id="rId4"/>
+    <p:sldId id="259" r:id="rId5"/>
+    <p:sldId id="263" r:id="rId6"/>
+    <p:sldId id="260" r:id="rId7"/>
+    <p:sldId id="261" r:id="rId8"/>
+    <p:sldId id="262" r:id="rId9"/>
   </p:sldIdLst>
   <p:sldSz cx="12192000" cy="6858000"/>
   <p:notesSz cx="6858000" cy="9144000"/>
@@ -882,7 +887,9 @@
       <dgm:prSet phldrT="[Text]" custT="1"/>
       <dgm:spPr>
         <a:solidFill>
-          <a:schemeClr val="accent2"/>
+          <a:schemeClr val="accent2">
+            <a:lumMod val="75000"/>
+          </a:schemeClr>
         </a:solidFill>
         <a:ln>
           <a:solidFill>
@@ -895,7 +902,7 @@
         <a:lstStyle/>
         <a:p>
           <a:r>
-            <a:rPr lang="en-US" sz="2000" dirty="0"/>
+            <a:rPr lang="en-US" sz="2800" dirty="0"/>
             <a:t>All Vehicles</a:t>
           </a:r>
         </a:p>
@@ -908,7 +915,7 @@
         <a:bodyPr/>
         <a:lstStyle/>
         <a:p>
-          <a:endParaRPr lang="en-US" sz="2000"/>
+          <a:endParaRPr lang="en-US" sz="2800"/>
         </a:p>
       </dgm:t>
     </dgm:pt>
@@ -919,7 +926,7 @@
         <a:bodyPr/>
         <a:lstStyle/>
         <a:p>
-          <a:endParaRPr lang="en-US" sz="2000"/>
+          <a:endParaRPr lang="en-US" sz="2800"/>
         </a:p>
       </dgm:t>
     </dgm:pt>
@@ -927,7 +934,9 @@
       <dgm:prSet phldrT="[Text]" custT="1"/>
       <dgm:spPr>
         <a:solidFill>
-          <a:schemeClr val="accent2"/>
+          <a:schemeClr val="accent2">
+            <a:lumMod val="75000"/>
+          </a:schemeClr>
         </a:solidFill>
         <a:ln>
           <a:solidFill>
@@ -940,7 +949,7 @@
         <a:lstStyle/>
         <a:p>
           <a:r>
-            <a:rPr lang="en-US" sz="2000" dirty="0"/>
+            <a:rPr lang="en-US" sz="2800" dirty="0"/>
             <a:t>Hauling Vehicles</a:t>
           </a:r>
         </a:p>
@@ -964,7 +973,10 @@
         </dgm:style>
       </dgm:prSet>
       <dgm:spPr>
-        <a:ln w="19050">
+        <a:ln w="28575">
+          <a:solidFill>
+            <a:schemeClr val="tx1"/>
+          </a:solidFill>
           <a:headEnd type="none" w="med" len="med"/>
           <a:tailEnd type="triangle" w="med" len="med"/>
         </a:ln>
@@ -973,7 +985,7 @@
         <a:bodyPr/>
         <a:lstStyle/>
         <a:p>
-          <a:endParaRPr lang="en-US" sz="2000"/>
+          <a:endParaRPr lang="en-US" sz="2800"/>
         </a:p>
       </dgm:t>
     </dgm:pt>
@@ -984,7 +996,7 @@
         <a:bodyPr/>
         <a:lstStyle/>
         <a:p>
-          <a:endParaRPr lang="en-US" sz="2000"/>
+          <a:endParaRPr lang="en-US" sz="2800"/>
         </a:p>
       </dgm:t>
     </dgm:pt>
@@ -992,7 +1004,9 @@
       <dgm:prSet phldrT="[Text]" custT="1"/>
       <dgm:spPr>
         <a:solidFill>
-          <a:schemeClr val="accent2"/>
+          <a:schemeClr val="accent2">
+            <a:lumMod val="75000"/>
+          </a:schemeClr>
         </a:solidFill>
         <a:ln>
           <a:solidFill>
@@ -1005,11 +1019,11 @@
         <a:lstStyle/>
         <a:p>
           <a:r>
-            <a:rPr lang="en-US" sz="2000" dirty="0" err="1"/>
+            <a:rPr lang="en-US" sz="2800" dirty="0" err="1"/>
             <a:t>Nonhauling</a:t>
           </a:r>
           <a:r>
-            <a:rPr lang="en-US" sz="2000" dirty="0"/>
+            <a:rPr lang="en-US" sz="2800" dirty="0"/>
             <a:t> Vehicles</a:t>
           </a:r>
         </a:p>
@@ -1033,7 +1047,10 @@
         </dgm:style>
       </dgm:prSet>
       <dgm:spPr>
-        <a:ln w="19050">
+        <a:ln w="28575">
+          <a:solidFill>
+            <a:schemeClr val="tx1"/>
+          </a:solidFill>
           <a:headEnd type="none" w="med" len="med"/>
           <a:tailEnd type="triangle" w="med" len="med"/>
         </a:ln>
@@ -1042,7 +1059,7 @@
         <a:bodyPr/>
         <a:lstStyle/>
         <a:p>
-          <a:endParaRPr lang="en-US" sz="2000"/>
+          <a:endParaRPr lang="en-US" sz="2800"/>
         </a:p>
       </dgm:t>
     </dgm:pt>
@@ -1053,7 +1070,7 @@
         <a:bodyPr/>
         <a:lstStyle/>
         <a:p>
-          <a:endParaRPr lang="en-US" sz="2000"/>
+          <a:endParaRPr lang="en-US" sz="2800"/>
         </a:p>
       </dgm:t>
     </dgm:pt>
@@ -1061,7 +1078,9 @@
       <dgm:prSet phldrT="[Text]" custT="1"/>
       <dgm:spPr>
         <a:solidFill>
-          <a:schemeClr val="accent2"/>
+          <a:schemeClr val="accent2">
+            <a:lumMod val="75000"/>
+          </a:schemeClr>
         </a:solidFill>
         <a:ln>
           <a:solidFill>
@@ -1074,7 +1093,7 @@
         <a:lstStyle/>
         <a:p>
           <a:r>
-            <a:rPr lang="en-US" sz="2000" dirty="0"/>
+            <a:rPr lang="en-US" sz="2800" dirty="0"/>
             <a:t>BEV</a:t>
           </a:r>
         </a:p>
@@ -1098,7 +1117,10 @@
         </dgm:style>
       </dgm:prSet>
       <dgm:spPr>
-        <a:ln w="19050">
+        <a:ln w="28575">
+          <a:solidFill>
+            <a:schemeClr val="tx1"/>
+          </a:solidFill>
           <a:headEnd type="none" w="med" len="med"/>
           <a:tailEnd type="triangle" w="med" len="med"/>
         </a:ln>
@@ -1107,7 +1129,7 @@
         <a:bodyPr/>
         <a:lstStyle/>
         <a:p>
-          <a:endParaRPr lang="en-US" sz="2000"/>
+          <a:endParaRPr lang="en-US" sz="2800"/>
         </a:p>
       </dgm:t>
     </dgm:pt>
@@ -1118,7 +1140,7 @@
         <a:bodyPr/>
         <a:lstStyle/>
         <a:p>
-          <a:endParaRPr lang="en-US" sz="2000"/>
+          <a:endParaRPr lang="en-US" sz="2800"/>
         </a:p>
       </dgm:t>
     </dgm:pt>
@@ -1126,7 +1148,9 @@
       <dgm:prSet phldrT="[Text]" custT="1"/>
       <dgm:spPr>
         <a:solidFill>
-          <a:schemeClr val="accent2"/>
+          <a:schemeClr val="accent2">
+            <a:lumMod val="75000"/>
+          </a:schemeClr>
         </a:solidFill>
         <a:ln>
           <a:solidFill>
@@ -1139,7 +1163,7 @@
         <a:lstStyle/>
         <a:p>
           <a:r>
-            <a:rPr lang="en-US" sz="2000" dirty="0"/>
+            <a:rPr lang="en-US" sz="2800" dirty="0"/>
             <a:t>ICE</a:t>
           </a:r>
         </a:p>
@@ -1163,7 +1187,10 @@
         </dgm:style>
       </dgm:prSet>
       <dgm:spPr>
-        <a:ln w="19050">
+        <a:ln w="28575">
+          <a:solidFill>
+            <a:schemeClr val="tx1"/>
+          </a:solidFill>
           <a:headEnd type="none" w="med" len="med"/>
           <a:tailEnd type="triangle" w="med" len="med"/>
         </a:ln>
@@ -1172,7 +1199,7 @@
         <a:bodyPr/>
         <a:lstStyle/>
         <a:p>
-          <a:endParaRPr lang="en-US" sz="2000"/>
+          <a:endParaRPr lang="en-US" sz="2800"/>
         </a:p>
       </dgm:t>
     </dgm:pt>
@@ -1183,7 +1210,7 @@
         <a:bodyPr/>
         <a:lstStyle/>
         <a:p>
-          <a:endParaRPr lang="en-US" sz="2000"/>
+          <a:endParaRPr lang="en-US" sz="2800"/>
         </a:p>
       </dgm:t>
     </dgm:pt>
@@ -1191,7 +1218,9 @@
       <dgm:prSet phldrT="[Text]" custT="1"/>
       <dgm:spPr>
         <a:solidFill>
-          <a:schemeClr val="accent2"/>
+          <a:schemeClr val="accent2">
+            <a:lumMod val="75000"/>
+          </a:schemeClr>
         </a:solidFill>
         <a:ln>
           <a:solidFill>
@@ -1204,7 +1233,7 @@
         <a:lstStyle/>
         <a:p>
           <a:r>
-            <a:rPr lang="en-US" sz="2000" dirty="0"/>
+            <a:rPr lang="en-US" sz="2800" dirty="0"/>
             <a:t>BEV</a:t>
           </a:r>
         </a:p>
@@ -1228,7 +1257,10 @@
         </dgm:style>
       </dgm:prSet>
       <dgm:spPr>
-        <a:ln w="19050">
+        <a:ln w="28575">
+          <a:solidFill>
+            <a:schemeClr val="tx1"/>
+          </a:solidFill>
           <a:headEnd type="none" w="med" len="med"/>
           <a:tailEnd type="triangle" w="med" len="med"/>
         </a:ln>
@@ -1237,7 +1269,7 @@
         <a:bodyPr/>
         <a:lstStyle/>
         <a:p>
-          <a:endParaRPr lang="en-US" sz="2000"/>
+          <a:endParaRPr lang="en-US" sz="2800"/>
         </a:p>
       </dgm:t>
     </dgm:pt>
@@ -1248,7 +1280,7 @@
         <a:bodyPr/>
         <a:lstStyle/>
         <a:p>
-          <a:endParaRPr lang="en-US" sz="2000"/>
+          <a:endParaRPr lang="en-US" sz="2800"/>
         </a:p>
       </dgm:t>
     </dgm:pt>
@@ -1256,7 +1288,9 @@
       <dgm:prSet phldrT="[Text]" custT="1"/>
       <dgm:spPr>
         <a:solidFill>
-          <a:schemeClr val="accent2"/>
+          <a:schemeClr val="accent2">
+            <a:lumMod val="75000"/>
+          </a:schemeClr>
         </a:solidFill>
         <a:ln>
           <a:solidFill>
@@ -1269,7 +1303,7 @@
         <a:lstStyle/>
         <a:p>
           <a:r>
-            <a:rPr lang="en-US" sz="2000" dirty="0"/>
+            <a:rPr lang="en-US" sz="2800" dirty="0"/>
             <a:t>ICE</a:t>
           </a:r>
         </a:p>
@@ -1293,7 +1327,10 @@
         </dgm:style>
       </dgm:prSet>
       <dgm:spPr>
-        <a:ln w="19050">
+        <a:ln w="28575">
+          <a:solidFill>
+            <a:schemeClr val="tx1"/>
+          </a:solidFill>
           <a:headEnd type="none" w="med" len="med"/>
           <a:tailEnd type="triangle" w="med" len="med"/>
         </a:ln>
@@ -1302,7 +1339,7 @@
         <a:bodyPr/>
         <a:lstStyle/>
         <a:p>
-          <a:endParaRPr lang="en-US" sz="2000"/>
+          <a:endParaRPr lang="en-US" sz="2800"/>
         </a:p>
       </dgm:t>
     </dgm:pt>
@@ -1313,7 +1350,7 @@
         <a:bodyPr/>
         <a:lstStyle/>
         <a:p>
-          <a:endParaRPr lang="en-US" sz="2000"/>
+          <a:endParaRPr lang="en-US" sz="2800"/>
         </a:p>
       </dgm:t>
     </dgm:pt>
@@ -1709,9 +1746,9 @@
           </a:pathLst>
         </a:custGeom>
         <a:noFill/>
-        <a:ln w="19050" cap="flat" cmpd="sng" algn="ctr">
+        <a:ln w="28575" cap="flat" cmpd="sng" algn="ctr">
           <a:solidFill>
-            <a:schemeClr val="accent1"/>
+            <a:schemeClr val="tx1"/>
           </a:solidFill>
           <a:prstDash val="solid"/>
           <a:miter lim="800000"/>
@@ -1769,9 +1806,9 @@
           </a:pathLst>
         </a:custGeom>
         <a:noFill/>
-        <a:ln w="19050" cap="flat" cmpd="sng" algn="ctr">
+        <a:ln w="28575" cap="flat" cmpd="sng" algn="ctr">
           <a:solidFill>
-            <a:schemeClr val="accent1"/>
+            <a:schemeClr val="tx1"/>
           </a:solidFill>
           <a:prstDash val="solid"/>
           <a:miter lim="800000"/>
@@ -1829,9 +1866,9 @@
           </a:pathLst>
         </a:custGeom>
         <a:noFill/>
-        <a:ln w="19050" cap="flat" cmpd="sng" algn="ctr">
+        <a:ln w="28575" cap="flat" cmpd="sng" algn="ctr">
           <a:solidFill>
-            <a:schemeClr val="accent1"/>
+            <a:schemeClr val="tx1"/>
           </a:solidFill>
           <a:prstDash val="solid"/>
           <a:miter lim="800000"/>
@@ -1889,9 +1926,9 @@
           </a:pathLst>
         </a:custGeom>
         <a:noFill/>
-        <a:ln w="19050" cap="flat" cmpd="sng" algn="ctr">
+        <a:ln w="28575" cap="flat" cmpd="sng" algn="ctr">
           <a:solidFill>
-            <a:schemeClr val="accent1"/>
+            <a:schemeClr val="tx1"/>
           </a:solidFill>
           <a:prstDash val="solid"/>
           <a:miter lim="800000"/>
@@ -1949,9 +1986,9 @@
           </a:pathLst>
         </a:custGeom>
         <a:noFill/>
-        <a:ln w="19050" cap="flat" cmpd="sng" algn="ctr">
+        <a:ln w="28575" cap="flat" cmpd="sng" algn="ctr">
           <a:solidFill>
-            <a:schemeClr val="accent1"/>
+            <a:schemeClr val="tx1"/>
           </a:solidFill>
           <a:prstDash val="solid"/>
           <a:miter lim="800000"/>
@@ -2009,9 +2046,9 @@
           </a:pathLst>
         </a:custGeom>
         <a:noFill/>
-        <a:ln w="19050" cap="flat" cmpd="sng" algn="ctr">
+        <a:ln w="28575" cap="flat" cmpd="sng" algn="ctr">
           <a:solidFill>
-            <a:schemeClr val="accent1"/>
+            <a:schemeClr val="tx1"/>
           </a:solidFill>
           <a:prstDash val="solid"/>
           <a:miter lim="800000"/>
@@ -2049,7 +2086,9 @@
           <a:avLst/>
         </a:prstGeom>
         <a:solidFill>
-          <a:schemeClr val="accent2"/>
+          <a:schemeClr val="accent2">
+            <a:lumMod val="75000"/>
+          </a:schemeClr>
         </a:solidFill>
         <a:ln w="12700" cap="flat" cmpd="sng" algn="ctr">
           <a:solidFill>
@@ -2075,12 +2114,12 @@
         </a:fontRef>
       </dsp:style>
       <dsp:txBody>
-        <a:bodyPr spcFirstLastPara="0" vert="horz" wrap="square" lIns="12700" tIns="12700" rIns="12700" bIns="12700" numCol="1" spcCol="1270" anchor="ctr" anchorCtr="0">
+        <a:bodyPr spcFirstLastPara="0" vert="horz" wrap="square" lIns="17780" tIns="17780" rIns="17780" bIns="17780" numCol="1" spcCol="1270" anchor="ctr" anchorCtr="0">
           <a:noAutofit/>
         </a:bodyPr>
         <a:lstStyle/>
         <a:p>
-          <a:pPr marL="0" lvl="0" indent="0" algn="ctr" defTabSz="889000">
+          <a:pPr marL="0" lvl="0" indent="0" algn="ctr" defTabSz="1244600">
             <a:lnSpc>
               <a:spcPct val="90000"/>
             </a:lnSpc>
@@ -2093,7 +2132,7 @@
             <a:buNone/>
           </a:pPr>
           <a:r>
-            <a:rPr lang="en-US" sz="2000" kern="1200" dirty="0"/>
+            <a:rPr lang="en-US" sz="2800" kern="1200" dirty="0"/>
             <a:t>All Vehicles</a:t>
           </a:r>
         </a:p>
@@ -2117,7 +2156,9 @@
           <a:avLst/>
         </a:prstGeom>
         <a:solidFill>
-          <a:schemeClr val="accent2"/>
+          <a:schemeClr val="accent2">
+            <a:lumMod val="75000"/>
+          </a:schemeClr>
         </a:solidFill>
         <a:ln w="12700" cap="flat" cmpd="sng" algn="ctr">
           <a:solidFill>
@@ -2143,12 +2184,12 @@
         </a:fontRef>
       </dsp:style>
       <dsp:txBody>
-        <a:bodyPr spcFirstLastPara="0" vert="horz" wrap="square" lIns="12700" tIns="12700" rIns="12700" bIns="12700" numCol="1" spcCol="1270" anchor="ctr" anchorCtr="0">
+        <a:bodyPr spcFirstLastPara="0" vert="horz" wrap="square" lIns="17780" tIns="17780" rIns="17780" bIns="17780" numCol="1" spcCol="1270" anchor="ctr" anchorCtr="0">
           <a:noAutofit/>
         </a:bodyPr>
         <a:lstStyle/>
         <a:p>
-          <a:pPr marL="0" lvl="0" indent="0" algn="ctr" defTabSz="889000">
+          <a:pPr marL="0" lvl="0" indent="0" algn="ctr" defTabSz="1244600">
             <a:lnSpc>
               <a:spcPct val="90000"/>
             </a:lnSpc>
@@ -2161,7 +2202,7 @@
             <a:buNone/>
           </a:pPr>
           <a:r>
-            <a:rPr lang="en-US" sz="2000" kern="1200" dirty="0"/>
+            <a:rPr lang="en-US" sz="2800" kern="1200" dirty="0"/>
             <a:t>Hauling Vehicles</a:t>
           </a:r>
         </a:p>
@@ -2185,7 +2226,9 @@
           <a:avLst/>
         </a:prstGeom>
         <a:solidFill>
-          <a:schemeClr val="accent2"/>
+          <a:schemeClr val="accent2">
+            <a:lumMod val="75000"/>
+          </a:schemeClr>
         </a:solidFill>
         <a:ln w="12700" cap="flat" cmpd="sng" algn="ctr">
           <a:solidFill>
@@ -2211,12 +2254,12 @@
         </a:fontRef>
       </dsp:style>
       <dsp:txBody>
-        <a:bodyPr spcFirstLastPara="0" vert="horz" wrap="square" lIns="12700" tIns="12700" rIns="12700" bIns="12700" numCol="1" spcCol="1270" anchor="ctr" anchorCtr="0">
+        <a:bodyPr spcFirstLastPara="0" vert="horz" wrap="square" lIns="17780" tIns="17780" rIns="17780" bIns="17780" numCol="1" spcCol="1270" anchor="ctr" anchorCtr="0">
           <a:noAutofit/>
         </a:bodyPr>
         <a:lstStyle/>
         <a:p>
-          <a:pPr marL="0" lvl="0" indent="0" algn="ctr" defTabSz="889000">
+          <a:pPr marL="0" lvl="0" indent="0" algn="ctr" defTabSz="1244600">
             <a:lnSpc>
               <a:spcPct val="90000"/>
             </a:lnSpc>
@@ -2229,7 +2272,7 @@
             <a:buNone/>
           </a:pPr>
           <a:r>
-            <a:rPr lang="en-US" sz="2000" kern="1200" dirty="0"/>
+            <a:rPr lang="en-US" sz="2800" kern="1200" dirty="0"/>
             <a:t>ICE</a:t>
           </a:r>
         </a:p>
@@ -2253,7 +2296,9 @@
           <a:avLst/>
         </a:prstGeom>
         <a:solidFill>
-          <a:schemeClr val="accent2"/>
+          <a:schemeClr val="accent2">
+            <a:lumMod val="75000"/>
+          </a:schemeClr>
         </a:solidFill>
         <a:ln w="12700" cap="flat" cmpd="sng" algn="ctr">
           <a:solidFill>
@@ -2279,12 +2324,12 @@
         </a:fontRef>
       </dsp:style>
       <dsp:txBody>
-        <a:bodyPr spcFirstLastPara="0" vert="horz" wrap="square" lIns="12700" tIns="12700" rIns="12700" bIns="12700" numCol="1" spcCol="1270" anchor="ctr" anchorCtr="0">
+        <a:bodyPr spcFirstLastPara="0" vert="horz" wrap="square" lIns="17780" tIns="17780" rIns="17780" bIns="17780" numCol="1" spcCol="1270" anchor="ctr" anchorCtr="0">
           <a:noAutofit/>
         </a:bodyPr>
         <a:lstStyle/>
         <a:p>
-          <a:pPr marL="0" lvl="0" indent="0" algn="ctr" defTabSz="889000">
+          <a:pPr marL="0" lvl="0" indent="0" algn="ctr" defTabSz="1244600">
             <a:lnSpc>
               <a:spcPct val="90000"/>
             </a:lnSpc>
@@ -2297,7 +2342,7 @@
             <a:buNone/>
           </a:pPr>
           <a:r>
-            <a:rPr lang="en-US" sz="2000" kern="1200" dirty="0"/>
+            <a:rPr lang="en-US" sz="2800" kern="1200" dirty="0"/>
             <a:t>BEV</a:t>
           </a:r>
         </a:p>
@@ -2321,7 +2366,9 @@
           <a:avLst/>
         </a:prstGeom>
         <a:solidFill>
-          <a:schemeClr val="accent2"/>
+          <a:schemeClr val="accent2">
+            <a:lumMod val="75000"/>
+          </a:schemeClr>
         </a:solidFill>
         <a:ln w="12700" cap="flat" cmpd="sng" algn="ctr">
           <a:solidFill>
@@ -2347,12 +2394,12 @@
         </a:fontRef>
       </dsp:style>
       <dsp:txBody>
-        <a:bodyPr spcFirstLastPara="0" vert="horz" wrap="square" lIns="12700" tIns="12700" rIns="12700" bIns="12700" numCol="1" spcCol="1270" anchor="ctr" anchorCtr="0">
+        <a:bodyPr spcFirstLastPara="0" vert="horz" wrap="square" lIns="17780" tIns="17780" rIns="17780" bIns="17780" numCol="1" spcCol="1270" anchor="ctr" anchorCtr="0">
           <a:noAutofit/>
         </a:bodyPr>
         <a:lstStyle/>
         <a:p>
-          <a:pPr marL="0" lvl="0" indent="0" algn="ctr" defTabSz="889000">
+          <a:pPr marL="0" lvl="0" indent="0" algn="ctr" defTabSz="1244600">
             <a:lnSpc>
               <a:spcPct val="90000"/>
             </a:lnSpc>
@@ -2365,11 +2412,11 @@
             <a:buNone/>
           </a:pPr>
           <a:r>
-            <a:rPr lang="en-US" sz="2000" kern="1200" dirty="0" err="1"/>
+            <a:rPr lang="en-US" sz="2800" kern="1200" dirty="0" err="1"/>
             <a:t>Nonhauling</a:t>
           </a:r>
           <a:r>
-            <a:rPr lang="en-US" sz="2000" kern="1200" dirty="0"/>
+            <a:rPr lang="en-US" sz="2800" kern="1200" dirty="0"/>
             <a:t> Vehicles</a:t>
           </a:r>
         </a:p>
@@ -2393,7 +2440,9 @@
           <a:avLst/>
         </a:prstGeom>
         <a:solidFill>
-          <a:schemeClr val="accent2"/>
+          <a:schemeClr val="accent2">
+            <a:lumMod val="75000"/>
+          </a:schemeClr>
         </a:solidFill>
         <a:ln w="12700" cap="flat" cmpd="sng" algn="ctr">
           <a:solidFill>
@@ -2419,12 +2468,12 @@
         </a:fontRef>
       </dsp:style>
       <dsp:txBody>
-        <a:bodyPr spcFirstLastPara="0" vert="horz" wrap="square" lIns="12700" tIns="12700" rIns="12700" bIns="12700" numCol="1" spcCol="1270" anchor="ctr" anchorCtr="0">
+        <a:bodyPr spcFirstLastPara="0" vert="horz" wrap="square" lIns="17780" tIns="17780" rIns="17780" bIns="17780" numCol="1" spcCol="1270" anchor="ctr" anchorCtr="0">
           <a:noAutofit/>
         </a:bodyPr>
         <a:lstStyle/>
         <a:p>
-          <a:pPr marL="0" lvl="0" indent="0" algn="ctr" defTabSz="889000">
+          <a:pPr marL="0" lvl="0" indent="0" algn="ctr" defTabSz="1244600">
             <a:lnSpc>
               <a:spcPct val="90000"/>
             </a:lnSpc>
@@ -2437,7 +2486,7 @@
             <a:buNone/>
           </a:pPr>
           <a:r>
-            <a:rPr lang="en-US" sz="2000" kern="1200" dirty="0"/>
+            <a:rPr lang="en-US" sz="2800" kern="1200" dirty="0"/>
             <a:t>ICE</a:t>
           </a:r>
         </a:p>
@@ -2461,7 +2510,9 @@
           <a:avLst/>
         </a:prstGeom>
         <a:solidFill>
-          <a:schemeClr val="accent2"/>
+          <a:schemeClr val="accent2">
+            <a:lumMod val="75000"/>
+          </a:schemeClr>
         </a:solidFill>
         <a:ln w="12700" cap="flat" cmpd="sng" algn="ctr">
           <a:solidFill>
@@ -2487,12 +2538,12 @@
         </a:fontRef>
       </dsp:style>
       <dsp:txBody>
-        <a:bodyPr spcFirstLastPara="0" vert="horz" wrap="square" lIns="12700" tIns="12700" rIns="12700" bIns="12700" numCol="1" spcCol="1270" anchor="ctr" anchorCtr="0">
+        <a:bodyPr spcFirstLastPara="0" vert="horz" wrap="square" lIns="17780" tIns="17780" rIns="17780" bIns="17780" numCol="1" spcCol="1270" anchor="ctr" anchorCtr="0">
           <a:noAutofit/>
         </a:bodyPr>
         <a:lstStyle/>
         <a:p>
-          <a:pPr marL="0" lvl="0" indent="0" algn="ctr" defTabSz="889000">
+          <a:pPr marL="0" lvl="0" indent="0" algn="ctr" defTabSz="1244600">
             <a:lnSpc>
               <a:spcPct val="90000"/>
             </a:lnSpc>
@@ -2505,7 +2556,7 @@
             <a:buNone/>
           </a:pPr>
           <a:r>
-            <a:rPr lang="en-US" sz="2000" kern="1200" dirty="0"/>
+            <a:rPr lang="en-US" sz="2800" kern="1200" dirty="0"/>
             <a:t>BEV</a:t>
           </a:r>
         </a:p>
@@ -4781,7 +4832,7 @@
           <a:p>
             <a:fld id="{7FCC5362-11BE-4886-978B-F647D810DE1A}" type="datetimeFigureOut">
               <a:rPr lang="en-US" smtClean="0"/>
-              <a:t>8/11/2021</a:t>
+              <a:t>8/13/2021</a:t>
             </a:fld>
             <a:endParaRPr lang="en-US"/>
           </a:p>
@@ -5416,6 +5467,441 @@
 </p:notes>
 </file>
 
+<file path=ppt/notesSlides/notesSlide4.xml><?xml version="1.0" encoding="utf-8"?>
+<p:notes xmlns:a="http://schemas.openxmlformats.org/drawingml/2006/main" xmlns:r="http://schemas.openxmlformats.org/officeDocument/2006/relationships" xmlns:p="http://schemas.openxmlformats.org/presentationml/2006/main">
+  <p:cSld>
+    <p:spTree>
+      <p:nvGrpSpPr>
+        <p:cNvPr id="1" name=""/>
+        <p:cNvGrpSpPr/>
+        <p:nvPr/>
+      </p:nvGrpSpPr>
+      <p:grpSpPr>
+        <a:xfrm>
+          <a:off x="0" y="0"/>
+          <a:ext cx="0" cy="0"/>
+          <a:chOff x="0" y="0"/>
+          <a:chExt cx="0" cy="0"/>
+        </a:xfrm>
+      </p:grpSpPr>
+      <p:sp>
+        <p:nvSpPr>
+          <p:cNvPr id="2" name="Slide Image Placeholder 1"/>
+          <p:cNvSpPr>
+            <a:spLocks noGrp="1" noRot="1" noChangeAspect="1"/>
+          </p:cNvSpPr>
+          <p:nvPr>
+            <p:ph type="sldImg"/>
+          </p:nvPr>
+        </p:nvSpPr>
+        <p:spPr/>
+      </p:sp>
+      <p:sp>
+        <p:nvSpPr>
+          <p:cNvPr id="3" name="Notes Placeholder 2"/>
+          <p:cNvSpPr>
+            <a:spLocks noGrp="1"/>
+          </p:cNvSpPr>
+          <p:nvPr>
+            <p:ph type="body" idx="1"/>
+          </p:nvPr>
+        </p:nvSpPr>
+        <p:spPr/>
+        <p:txBody>
+          <a:bodyPr/>
+          <a:lstStyle/>
+          <a:p>
+            <a:r>
+              <a:rPr lang="en-US" dirty="0"/>
+              <a:t>Consumer Module Overview</a:t>
+            </a:r>
+          </a:p>
+        </p:txBody>
+      </p:sp>
+      <p:sp>
+        <p:nvSpPr>
+          <p:cNvPr id="4" name="Slide Number Placeholder 3"/>
+          <p:cNvSpPr>
+            <a:spLocks noGrp="1"/>
+          </p:cNvSpPr>
+          <p:nvPr>
+            <p:ph type="sldNum" sz="quarter" idx="5"/>
+          </p:nvPr>
+        </p:nvSpPr>
+        <p:spPr/>
+        <p:txBody>
+          <a:bodyPr/>
+          <a:lstStyle/>
+          <a:p>
+            <a:fld id="{5776C217-D2E5-4CF0-BBF1-F5F5822D63B3}" type="slidenum">
+              <a:rPr lang="en-US" smtClean="0"/>
+              <a:t>4</a:t>
+            </a:fld>
+            <a:endParaRPr lang="en-US"/>
+          </a:p>
+        </p:txBody>
+      </p:sp>
+    </p:spTree>
+    <p:extLst>
+      <p:ext uri="{BB962C8B-B14F-4D97-AF65-F5344CB8AC3E}">
+        <p14:creationId xmlns:p14="http://schemas.microsoft.com/office/powerpoint/2010/main" val="2966008811"/>
+      </p:ext>
+    </p:extLst>
+  </p:cSld>
+  <p:clrMapOvr>
+    <a:masterClrMapping/>
+  </p:clrMapOvr>
+</p:notes>
+</file>
+
+<file path=ppt/notesSlides/notesSlide5.xml><?xml version="1.0" encoding="utf-8"?>
+<p:notes xmlns:a="http://schemas.openxmlformats.org/drawingml/2006/main" xmlns:r="http://schemas.openxmlformats.org/officeDocument/2006/relationships" xmlns:p="http://schemas.openxmlformats.org/presentationml/2006/main">
+  <p:cSld>
+    <p:spTree>
+      <p:nvGrpSpPr>
+        <p:cNvPr id="1" name=""/>
+        <p:cNvGrpSpPr/>
+        <p:nvPr/>
+      </p:nvGrpSpPr>
+      <p:grpSpPr>
+        <a:xfrm>
+          <a:off x="0" y="0"/>
+          <a:ext cx="0" cy="0"/>
+          <a:chOff x="0" y="0"/>
+          <a:chExt cx="0" cy="0"/>
+        </a:xfrm>
+      </p:grpSpPr>
+      <p:sp>
+        <p:nvSpPr>
+          <p:cNvPr id="2" name="Slide Image Placeholder 1"/>
+          <p:cNvSpPr>
+            <a:spLocks noGrp="1" noRot="1" noChangeAspect="1"/>
+          </p:cNvSpPr>
+          <p:nvPr>
+            <p:ph type="sldImg"/>
+          </p:nvPr>
+        </p:nvSpPr>
+        <p:spPr/>
+      </p:sp>
+      <p:sp>
+        <p:nvSpPr>
+          <p:cNvPr id="3" name="Notes Placeholder 2"/>
+          <p:cNvSpPr>
+            <a:spLocks noGrp="1"/>
+          </p:cNvSpPr>
+          <p:nvPr>
+            <p:ph type="body" idx="1"/>
+          </p:nvPr>
+        </p:nvSpPr>
+        <p:spPr/>
+        <p:txBody>
+          <a:bodyPr/>
+          <a:lstStyle/>
+          <a:p>
+            <a:r>
+              <a:rPr lang="en-US" dirty="0"/>
+              <a:t>Within the Consumer Module</a:t>
+            </a:r>
+          </a:p>
+        </p:txBody>
+      </p:sp>
+      <p:sp>
+        <p:nvSpPr>
+          <p:cNvPr id="4" name="Slide Number Placeholder 3"/>
+          <p:cNvSpPr>
+            <a:spLocks noGrp="1"/>
+          </p:cNvSpPr>
+          <p:nvPr>
+            <p:ph type="sldNum" sz="quarter" idx="5"/>
+          </p:nvPr>
+        </p:nvSpPr>
+        <p:spPr/>
+        <p:txBody>
+          <a:bodyPr/>
+          <a:lstStyle/>
+          <a:p>
+            <a:fld id="{5776C217-D2E5-4CF0-BBF1-F5F5822D63B3}" type="slidenum">
+              <a:rPr lang="en-US" smtClean="0"/>
+              <a:t>5</a:t>
+            </a:fld>
+            <a:endParaRPr lang="en-US"/>
+          </a:p>
+        </p:txBody>
+      </p:sp>
+    </p:spTree>
+    <p:extLst>
+      <p:ext uri="{BB962C8B-B14F-4D97-AF65-F5344CB8AC3E}">
+        <p14:creationId xmlns:p14="http://schemas.microsoft.com/office/powerpoint/2010/main" val="298325960"/>
+      </p:ext>
+    </p:extLst>
+  </p:cSld>
+  <p:clrMapOvr>
+    <a:masterClrMapping/>
+  </p:clrMapOvr>
+</p:notes>
+</file>
+
+<file path=ppt/notesSlides/notesSlide6.xml><?xml version="1.0" encoding="utf-8"?>
+<p:notes xmlns:a="http://schemas.openxmlformats.org/drawingml/2006/main" xmlns:r="http://schemas.openxmlformats.org/officeDocument/2006/relationships" xmlns:p="http://schemas.openxmlformats.org/presentationml/2006/main">
+  <p:cSld>
+    <p:spTree>
+      <p:nvGrpSpPr>
+        <p:cNvPr id="1" name=""/>
+        <p:cNvGrpSpPr/>
+        <p:nvPr/>
+      </p:nvGrpSpPr>
+      <p:grpSpPr>
+        <a:xfrm>
+          <a:off x="0" y="0"/>
+          <a:ext cx="0" cy="0"/>
+          <a:chOff x="0" y="0"/>
+          <a:chExt cx="0" cy="0"/>
+        </a:xfrm>
+      </p:grpSpPr>
+      <p:sp>
+        <p:nvSpPr>
+          <p:cNvPr id="2" name="Slide Image Placeholder 1"/>
+          <p:cNvSpPr>
+            <a:spLocks noGrp="1" noRot="1" noChangeAspect="1"/>
+          </p:cNvSpPr>
+          <p:nvPr>
+            <p:ph type="sldImg"/>
+          </p:nvPr>
+        </p:nvSpPr>
+        <p:spPr/>
+      </p:sp>
+      <p:sp>
+        <p:nvSpPr>
+          <p:cNvPr id="3" name="Notes Placeholder 2"/>
+          <p:cNvSpPr>
+            <a:spLocks noGrp="1"/>
+          </p:cNvSpPr>
+          <p:nvPr>
+            <p:ph type="body" idx="1"/>
+          </p:nvPr>
+        </p:nvSpPr>
+        <p:spPr/>
+        <p:txBody>
+          <a:bodyPr/>
+          <a:lstStyle/>
+          <a:p>
+            <a:r>
+              <a:rPr lang="en-US" dirty="0"/>
+              <a:t>Producer Module Overview</a:t>
+            </a:r>
+          </a:p>
+        </p:txBody>
+      </p:sp>
+      <p:sp>
+        <p:nvSpPr>
+          <p:cNvPr id="4" name="Slide Number Placeholder 3"/>
+          <p:cNvSpPr>
+            <a:spLocks noGrp="1"/>
+          </p:cNvSpPr>
+          <p:nvPr>
+            <p:ph type="sldNum" sz="quarter" idx="5"/>
+          </p:nvPr>
+        </p:nvSpPr>
+        <p:spPr/>
+        <p:txBody>
+          <a:bodyPr/>
+          <a:lstStyle/>
+          <a:p>
+            <a:fld id="{5776C217-D2E5-4CF0-BBF1-F5F5822D63B3}" type="slidenum">
+              <a:rPr lang="en-US" smtClean="0"/>
+              <a:t>6</a:t>
+            </a:fld>
+            <a:endParaRPr lang="en-US"/>
+          </a:p>
+        </p:txBody>
+      </p:sp>
+    </p:spTree>
+    <p:extLst>
+      <p:ext uri="{BB962C8B-B14F-4D97-AF65-F5344CB8AC3E}">
+        <p14:creationId xmlns:p14="http://schemas.microsoft.com/office/powerpoint/2010/main" val="344477920"/>
+      </p:ext>
+    </p:extLst>
+  </p:cSld>
+  <p:clrMapOvr>
+    <a:masterClrMapping/>
+  </p:clrMapOvr>
+</p:notes>
+</file>
+
+<file path=ppt/notesSlides/notesSlide7.xml><?xml version="1.0" encoding="utf-8"?>
+<p:notes xmlns:a="http://schemas.openxmlformats.org/drawingml/2006/main" xmlns:r="http://schemas.openxmlformats.org/officeDocument/2006/relationships" xmlns:p="http://schemas.openxmlformats.org/presentationml/2006/main">
+  <p:cSld>
+    <p:spTree>
+      <p:nvGrpSpPr>
+        <p:cNvPr id="1" name=""/>
+        <p:cNvGrpSpPr/>
+        <p:nvPr/>
+      </p:nvGrpSpPr>
+      <p:grpSpPr>
+        <a:xfrm>
+          <a:off x="0" y="0"/>
+          <a:ext cx="0" cy="0"/>
+          <a:chOff x="0" y="0"/>
+          <a:chExt cx="0" cy="0"/>
+        </a:xfrm>
+      </p:grpSpPr>
+      <p:sp>
+        <p:nvSpPr>
+          <p:cNvPr id="2" name="Slide Image Placeholder 1"/>
+          <p:cNvSpPr>
+            <a:spLocks noGrp="1" noRot="1" noChangeAspect="1"/>
+          </p:cNvSpPr>
+          <p:nvPr>
+            <p:ph type="sldImg"/>
+          </p:nvPr>
+        </p:nvSpPr>
+        <p:spPr/>
+      </p:sp>
+      <p:sp>
+        <p:nvSpPr>
+          <p:cNvPr id="3" name="Notes Placeholder 2"/>
+          <p:cNvSpPr>
+            <a:spLocks noGrp="1"/>
+          </p:cNvSpPr>
+          <p:nvPr>
+            <p:ph type="body" idx="1"/>
+          </p:nvPr>
+        </p:nvSpPr>
+        <p:spPr/>
+        <p:txBody>
+          <a:bodyPr/>
+          <a:lstStyle/>
+          <a:p>
+            <a:r>
+              <a:rPr lang="en-US" dirty="0"/>
+              <a:t>Effects Module Overview</a:t>
+            </a:r>
+          </a:p>
+        </p:txBody>
+      </p:sp>
+      <p:sp>
+        <p:nvSpPr>
+          <p:cNvPr id="4" name="Slide Number Placeholder 3"/>
+          <p:cNvSpPr>
+            <a:spLocks noGrp="1"/>
+          </p:cNvSpPr>
+          <p:nvPr>
+            <p:ph type="sldNum" sz="quarter" idx="5"/>
+          </p:nvPr>
+        </p:nvSpPr>
+        <p:spPr/>
+        <p:txBody>
+          <a:bodyPr/>
+          <a:lstStyle/>
+          <a:p>
+            <a:fld id="{5776C217-D2E5-4CF0-BBF1-F5F5822D63B3}" type="slidenum">
+              <a:rPr lang="en-US" smtClean="0"/>
+              <a:t>7</a:t>
+            </a:fld>
+            <a:endParaRPr lang="en-US"/>
+          </a:p>
+        </p:txBody>
+      </p:sp>
+    </p:spTree>
+    <p:extLst>
+      <p:ext uri="{BB962C8B-B14F-4D97-AF65-F5344CB8AC3E}">
+        <p14:creationId xmlns:p14="http://schemas.microsoft.com/office/powerpoint/2010/main" val="117964479"/>
+      </p:ext>
+    </p:extLst>
+  </p:cSld>
+  <p:clrMapOvr>
+    <a:masterClrMapping/>
+  </p:clrMapOvr>
+</p:notes>
+</file>
+
+<file path=ppt/notesSlides/notesSlide8.xml><?xml version="1.0" encoding="utf-8"?>
+<p:notes xmlns:a="http://schemas.openxmlformats.org/drawingml/2006/main" xmlns:r="http://schemas.openxmlformats.org/officeDocument/2006/relationships" xmlns:p="http://schemas.openxmlformats.org/presentationml/2006/main">
+  <p:cSld>
+    <p:spTree>
+      <p:nvGrpSpPr>
+        <p:cNvPr id="1" name=""/>
+        <p:cNvGrpSpPr/>
+        <p:nvPr/>
+      </p:nvGrpSpPr>
+      <p:grpSpPr>
+        <a:xfrm>
+          <a:off x="0" y="0"/>
+          <a:ext cx="0" cy="0"/>
+          <a:chOff x="0" y="0"/>
+          <a:chExt cx="0" cy="0"/>
+        </a:xfrm>
+      </p:grpSpPr>
+      <p:sp>
+        <p:nvSpPr>
+          <p:cNvPr id="2" name="Slide Image Placeholder 1"/>
+          <p:cNvSpPr>
+            <a:spLocks noGrp="1" noRot="1" noChangeAspect="1"/>
+          </p:cNvSpPr>
+          <p:nvPr>
+            <p:ph type="sldImg"/>
+          </p:nvPr>
+        </p:nvSpPr>
+        <p:spPr/>
+      </p:sp>
+      <p:sp>
+        <p:nvSpPr>
+          <p:cNvPr id="3" name="Notes Placeholder 2"/>
+          <p:cNvSpPr>
+            <a:spLocks noGrp="1"/>
+          </p:cNvSpPr>
+          <p:nvPr>
+            <p:ph type="body" idx="1"/>
+          </p:nvPr>
+        </p:nvSpPr>
+        <p:spPr/>
+        <p:txBody>
+          <a:bodyPr/>
+          <a:lstStyle/>
+          <a:p>
+            <a:r>
+              <a:rPr lang="en-US" dirty="0"/>
+              <a:t>Policy Module Overview</a:t>
+            </a:r>
+          </a:p>
+        </p:txBody>
+      </p:sp>
+      <p:sp>
+        <p:nvSpPr>
+          <p:cNvPr id="4" name="Slide Number Placeholder 3"/>
+          <p:cNvSpPr>
+            <a:spLocks noGrp="1"/>
+          </p:cNvSpPr>
+          <p:nvPr>
+            <p:ph type="sldNum" sz="quarter" idx="5"/>
+          </p:nvPr>
+        </p:nvSpPr>
+        <p:spPr/>
+        <p:txBody>
+          <a:bodyPr/>
+          <a:lstStyle/>
+          <a:p>
+            <a:fld id="{5776C217-D2E5-4CF0-BBF1-F5F5822D63B3}" type="slidenum">
+              <a:rPr lang="en-US" smtClean="0"/>
+              <a:t>8</a:t>
+            </a:fld>
+            <a:endParaRPr lang="en-US"/>
+          </a:p>
+        </p:txBody>
+      </p:sp>
+    </p:spTree>
+    <p:extLst>
+      <p:ext uri="{BB962C8B-B14F-4D97-AF65-F5344CB8AC3E}">
+        <p14:creationId xmlns:p14="http://schemas.microsoft.com/office/powerpoint/2010/main" val="2358801822"/>
+      </p:ext>
+    </p:extLst>
+  </p:cSld>
+  <p:clrMapOvr>
+    <a:masterClrMapping/>
+  </p:clrMapOvr>
+</p:notes>
+</file>
+
 <file path=ppt/slideLayouts/slideLayout1.xml><?xml version="1.0" encoding="utf-8"?>
 <p:sldLayout xmlns:a="http://schemas.openxmlformats.org/drawingml/2006/main" xmlns:r="http://schemas.openxmlformats.org/officeDocument/2006/relationships" xmlns:p="http://schemas.openxmlformats.org/presentationml/2006/main" type="title" preserve="1">
   <p:cSld name="Title Slide">
@@ -5563,7 +6049,7 @@
           <a:p>
             <a:fld id="{E82AF7A9-B7DD-4441-9529-7051C501C076}" type="datetimeFigureOut">
               <a:rPr lang="en-US" smtClean="0"/>
-              <a:t>8/11/2021</a:t>
+              <a:t>8/13/2021</a:t>
             </a:fld>
             <a:endParaRPr lang="en-US"/>
           </a:p>
@@ -5761,7 +6247,7 @@
           <a:p>
             <a:fld id="{E82AF7A9-B7DD-4441-9529-7051C501C076}" type="datetimeFigureOut">
               <a:rPr lang="en-US" smtClean="0"/>
-              <a:t>8/11/2021</a:t>
+              <a:t>8/13/2021</a:t>
             </a:fld>
             <a:endParaRPr lang="en-US"/>
           </a:p>
@@ -5969,7 +6455,7 @@
           <a:p>
             <a:fld id="{E82AF7A9-B7DD-4441-9529-7051C501C076}" type="datetimeFigureOut">
               <a:rPr lang="en-US" smtClean="0"/>
-              <a:t>8/11/2021</a:t>
+              <a:t>8/13/2021</a:t>
             </a:fld>
             <a:endParaRPr lang="en-US"/>
           </a:p>
@@ -6167,7 +6653,7 @@
           <a:p>
             <a:fld id="{E82AF7A9-B7DD-4441-9529-7051C501C076}" type="datetimeFigureOut">
               <a:rPr lang="en-US" smtClean="0"/>
-              <a:t>8/11/2021</a:t>
+              <a:t>8/13/2021</a:t>
             </a:fld>
             <a:endParaRPr lang="en-US"/>
           </a:p>
@@ -6442,7 +6928,7 @@
           <a:p>
             <a:fld id="{E82AF7A9-B7DD-4441-9529-7051C501C076}" type="datetimeFigureOut">
               <a:rPr lang="en-US" smtClean="0"/>
-              <a:t>8/11/2021</a:t>
+              <a:t>8/13/2021</a:t>
             </a:fld>
             <a:endParaRPr lang="en-US"/>
           </a:p>
@@ -6707,7 +7193,7 @@
           <a:p>
             <a:fld id="{E82AF7A9-B7DD-4441-9529-7051C501C076}" type="datetimeFigureOut">
               <a:rPr lang="en-US" smtClean="0"/>
-              <a:t>8/11/2021</a:t>
+              <a:t>8/13/2021</a:t>
             </a:fld>
             <a:endParaRPr lang="en-US"/>
           </a:p>
@@ -7119,7 +7605,7 @@
           <a:p>
             <a:fld id="{E82AF7A9-B7DD-4441-9529-7051C501C076}" type="datetimeFigureOut">
               <a:rPr lang="en-US" smtClean="0"/>
-              <a:t>8/11/2021</a:t>
+              <a:t>8/13/2021</a:t>
             </a:fld>
             <a:endParaRPr lang="en-US"/>
           </a:p>
@@ -7260,7 +7746,7 @@
           <a:p>
             <a:fld id="{E82AF7A9-B7DD-4441-9529-7051C501C076}" type="datetimeFigureOut">
               <a:rPr lang="en-US" smtClean="0"/>
-              <a:t>8/11/2021</a:t>
+              <a:t>8/13/2021</a:t>
             </a:fld>
             <a:endParaRPr lang="en-US"/>
           </a:p>
@@ -7373,7 +7859,7 @@
           <a:p>
             <a:fld id="{E82AF7A9-B7DD-4441-9529-7051C501C076}" type="datetimeFigureOut">
               <a:rPr lang="en-US" smtClean="0"/>
-              <a:t>8/11/2021</a:t>
+              <a:t>8/13/2021</a:t>
             </a:fld>
             <a:endParaRPr lang="en-US"/>
           </a:p>
@@ -7684,7 +8170,7 @@
           <a:p>
             <a:fld id="{E82AF7A9-B7DD-4441-9529-7051C501C076}" type="datetimeFigureOut">
               <a:rPr lang="en-US" smtClean="0"/>
-              <a:t>8/11/2021</a:t>
+              <a:t>8/13/2021</a:t>
             </a:fld>
             <a:endParaRPr lang="en-US"/>
           </a:p>
@@ -7972,7 +8458,7 @@
           <a:p>
             <a:fld id="{E82AF7A9-B7DD-4441-9529-7051C501C076}" type="datetimeFigureOut">
               <a:rPr lang="en-US" smtClean="0"/>
-              <a:t>8/11/2021</a:t>
+              <a:t>8/13/2021</a:t>
             </a:fld>
             <a:endParaRPr lang="en-US"/>
           </a:p>
@@ -8213,7 +8699,7 @@
           <a:p>
             <a:fld id="{E82AF7A9-B7DD-4441-9529-7051C501C076}" type="datetimeFigureOut">
               <a:rPr lang="en-US" smtClean="0"/>
-              <a:t>8/11/2021</a:t>
+              <a:t>8/13/2021</a:t>
             </a:fld>
             <a:endParaRPr lang="en-US"/>
           </a:p>
@@ -15040,7 +15526,13 @@
             </a:extLst>
           </p:cNvPr>
           <p:cNvGraphicFramePr/>
-          <p:nvPr/>
+          <p:nvPr>
+            <p:extLst>
+              <p:ext uri="{D42A27DB-BD31-4B8C-83A1-F6EECF244321}">
+                <p14:modId xmlns:p14="http://schemas.microsoft.com/office/powerpoint/2010/main" val="1888142333"/>
+              </p:ext>
+            </p:extLst>
+          </p:nvPr>
         </p:nvGraphicFramePr>
         <p:xfrm>
           <a:off x="1405718" y="161136"/>
@@ -15075,7 +15567,10 @@
               <a:gd name="adj2" fmla="val 1115702"/>
             </a:avLst>
           </a:prstGeom>
-          <a:ln w="19050">
+          <a:ln w="28575">
+            <a:solidFill>
+              <a:schemeClr val="tx1"/>
+            </a:solidFill>
             <a:prstDash val="dash"/>
             <a:headEnd type="triangle" w="med" len="med"/>
             <a:tailEnd type="triangle" w="med" len="med"/>
@@ -15131,7 +15626,10 @@
               <a:gd name="adj2" fmla="val 1115702"/>
             </a:avLst>
           </a:prstGeom>
-          <a:ln w="19050">
+          <a:ln w="28575">
+            <a:solidFill>
+              <a:schemeClr val="tx1"/>
+            </a:solidFill>
             <a:prstDash val="dash"/>
             <a:headEnd type="triangle" w="med" len="med"/>
             <a:tailEnd type="triangle" w="med" len="med"/>
@@ -15168,6 +15666,2467 @@
     <p:extLst>
       <p:ext uri="{BB962C8B-B14F-4D97-AF65-F5344CB8AC3E}">
         <p14:creationId xmlns:p14="http://schemas.microsoft.com/office/powerpoint/2010/main" val="849435611"/>
+      </p:ext>
+    </p:extLst>
+  </p:cSld>
+  <p:clrMapOvr>
+    <a:masterClrMapping/>
+  </p:clrMapOvr>
+</p:sld>
+</file>
+
+<file path=ppt/slides/slide4.xml><?xml version="1.0" encoding="utf-8"?>
+<p:sld xmlns:a="http://schemas.openxmlformats.org/drawingml/2006/main" xmlns:r="http://schemas.openxmlformats.org/officeDocument/2006/relationships" xmlns:p="http://schemas.openxmlformats.org/presentationml/2006/main">
+  <p:cSld>
+    <p:spTree>
+      <p:nvGrpSpPr>
+        <p:cNvPr id="1" name=""/>
+        <p:cNvGrpSpPr/>
+        <p:nvPr/>
+      </p:nvGrpSpPr>
+      <p:grpSpPr>
+        <a:xfrm>
+          <a:off x="0" y="0"/>
+          <a:ext cx="0" cy="0"/>
+          <a:chOff x="0" y="0"/>
+          <a:chExt cx="0" cy="0"/>
+        </a:xfrm>
+      </p:grpSpPr>
+      <p:sp>
+        <p:nvSpPr>
+          <p:cNvPr id="4" name="Rectangle 3">
+            <a:extLst>
+              <a:ext uri="{FF2B5EF4-FFF2-40B4-BE49-F238E27FC236}">
+                <a16:creationId xmlns:a16="http://schemas.microsoft.com/office/drawing/2014/main" id="{BF210D2C-8611-4D00-998F-BB9024E49821}"/>
+              </a:ext>
+            </a:extLst>
+          </p:cNvPr>
+          <p:cNvSpPr/>
+          <p:nvPr/>
+        </p:nvSpPr>
+        <p:spPr>
+          <a:xfrm>
+            <a:off x="2629052" y="1694937"/>
+            <a:ext cx="3933933" cy="3104710"/>
+          </a:xfrm>
+          <a:prstGeom prst="rect">
+            <a:avLst/>
+          </a:prstGeom>
+          <a:solidFill>
+            <a:schemeClr val="accent2">
+              <a:lumMod val="75000"/>
+            </a:schemeClr>
+          </a:solidFill>
+          <a:ln>
+            <a:solidFill>
+              <a:schemeClr val="tx1"/>
+            </a:solidFill>
+          </a:ln>
+        </p:spPr>
+        <p:style>
+          <a:lnRef idx="2">
+            <a:schemeClr val="accent1">
+              <a:shade val="50000"/>
+            </a:schemeClr>
+          </a:lnRef>
+          <a:fillRef idx="1">
+            <a:schemeClr val="accent1"/>
+          </a:fillRef>
+          <a:effectRef idx="0">
+            <a:schemeClr val="accent1"/>
+          </a:effectRef>
+          <a:fontRef idx="minor">
+            <a:schemeClr val="lt1"/>
+          </a:fontRef>
+        </p:style>
+        <p:txBody>
+          <a:bodyPr rtlCol="0" anchor="ctr"/>
+          <a:lstStyle/>
+          <a:p>
+            <a:pPr algn="ctr"/>
+            <a:r>
+              <a:rPr lang="en-US" sz="3600" dirty="0">
+                <a:solidFill>
+                  <a:schemeClr val="bg1"/>
+                </a:solidFill>
+              </a:rPr>
+              <a:t>Consumers</a:t>
+            </a:r>
+          </a:p>
+        </p:txBody>
+      </p:sp>
+      <p:cxnSp>
+        <p:nvCxnSpPr>
+          <p:cNvPr id="5" name="Straight Arrow Connector 4">
+            <a:extLst>
+              <a:ext uri="{FF2B5EF4-FFF2-40B4-BE49-F238E27FC236}">
+                <a16:creationId xmlns:a16="http://schemas.microsoft.com/office/drawing/2014/main" id="{FCC1DADA-791E-4095-A704-ED06F45B98FC}"/>
+              </a:ext>
+            </a:extLst>
+          </p:cNvPr>
+          <p:cNvCxnSpPr>
+            <a:cxnSpLocks/>
+          </p:cNvCxnSpPr>
+          <p:nvPr/>
+        </p:nvCxnSpPr>
+        <p:spPr>
+          <a:xfrm>
+            <a:off x="6575534" y="3063436"/>
+            <a:ext cx="3770733" cy="0"/>
+          </a:xfrm>
+          <a:prstGeom prst="straightConnector1">
+            <a:avLst/>
+          </a:prstGeom>
+          <a:ln w="28575">
+            <a:solidFill>
+              <a:schemeClr val="tx1"/>
+            </a:solidFill>
+            <a:tailEnd type="triangle"/>
+          </a:ln>
+        </p:spPr>
+        <p:style>
+          <a:lnRef idx="1">
+            <a:schemeClr val="accent1"/>
+          </a:lnRef>
+          <a:fillRef idx="0">
+            <a:schemeClr val="accent1"/>
+          </a:fillRef>
+          <a:effectRef idx="0">
+            <a:schemeClr val="accent1"/>
+          </a:effectRef>
+          <a:fontRef idx="minor">
+            <a:schemeClr val="tx1"/>
+          </a:fontRef>
+        </p:style>
+      </p:cxnSp>
+      <p:cxnSp>
+        <p:nvCxnSpPr>
+          <p:cNvPr id="6" name="Straight Arrow Connector 5">
+            <a:extLst>
+              <a:ext uri="{FF2B5EF4-FFF2-40B4-BE49-F238E27FC236}">
+                <a16:creationId xmlns:a16="http://schemas.microsoft.com/office/drawing/2014/main" id="{FE018BDC-F262-4312-8DA9-6E8230C39144}"/>
+              </a:ext>
+            </a:extLst>
+          </p:cNvPr>
+          <p:cNvCxnSpPr>
+            <a:cxnSpLocks/>
+          </p:cNvCxnSpPr>
+          <p:nvPr/>
+        </p:nvCxnSpPr>
+        <p:spPr>
+          <a:xfrm>
+            <a:off x="6575534" y="3889954"/>
+            <a:ext cx="3770733" cy="0"/>
+          </a:xfrm>
+          <a:prstGeom prst="straightConnector1">
+            <a:avLst/>
+          </a:prstGeom>
+          <a:ln w="28575">
+            <a:solidFill>
+              <a:schemeClr val="tx1"/>
+            </a:solidFill>
+            <a:headEnd type="triangle" w="med" len="med"/>
+            <a:tailEnd type="none" w="med" len="med"/>
+          </a:ln>
+        </p:spPr>
+        <p:style>
+          <a:lnRef idx="1">
+            <a:schemeClr val="accent1"/>
+          </a:lnRef>
+          <a:fillRef idx="0">
+            <a:schemeClr val="accent1"/>
+          </a:fillRef>
+          <a:effectRef idx="0">
+            <a:schemeClr val="accent1"/>
+          </a:effectRef>
+          <a:fontRef idx="minor">
+            <a:schemeClr val="tx1"/>
+          </a:fontRef>
+        </p:style>
+      </p:cxnSp>
+      <p:sp>
+        <p:nvSpPr>
+          <p:cNvPr id="7" name="TextBox 6">
+            <a:extLst>
+              <a:ext uri="{FF2B5EF4-FFF2-40B4-BE49-F238E27FC236}">
+                <a16:creationId xmlns:a16="http://schemas.microsoft.com/office/drawing/2014/main" id="{FEA99B4B-8FE4-4C1D-8333-EC02DB6341E3}"/>
+              </a:ext>
+            </a:extLst>
+          </p:cNvPr>
+          <p:cNvSpPr txBox="1"/>
+          <p:nvPr/>
+        </p:nvSpPr>
+        <p:spPr>
+          <a:xfrm>
+            <a:off x="3204146" y="5150036"/>
+            <a:ext cx="1264830" cy="954107"/>
+          </a:xfrm>
+          <a:prstGeom prst="rect">
+            <a:avLst/>
+          </a:prstGeom>
+          <a:noFill/>
+        </p:spPr>
+        <p:txBody>
+          <a:bodyPr wrap="square" rtlCol="0">
+            <a:spAutoFit/>
+          </a:bodyPr>
+          <a:lstStyle/>
+          <a:p>
+            <a:r>
+              <a:rPr lang="en-US" sz="2800" dirty="0"/>
+              <a:t>Vehicle Stock</a:t>
+            </a:r>
+          </a:p>
+        </p:txBody>
+      </p:sp>
+      <p:cxnSp>
+        <p:nvCxnSpPr>
+          <p:cNvPr id="8" name="Straight Arrow Connector 7">
+            <a:extLst>
+              <a:ext uri="{FF2B5EF4-FFF2-40B4-BE49-F238E27FC236}">
+                <a16:creationId xmlns:a16="http://schemas.microsoft.com/office/drawing/2014/main" id="{733C3463-9FDC-4513-8155-ED629D69F6B0}"/>
+              </a:ext>
+            </a:extLst>
+          </p:cNvPr>
+          <p:cNvCxnSpPr>
+            <a:cxnSpLocks/>
+          </p:cNvCxnSpPr>
+          <p:nvPr/>
+        </p:nvCxnSpPr>
+        <p:spPr>
+          <a:xfrm>
+            <a:off x="3204146" y="4821863"/>
+            <a:ext cx="0" cy="1284584"/>
+          </a:xfrm>
+          <a:prstGeom prst="straightConnector1">
+            <a:avLst/>
+          </a:prstGeom>
+          <a:ln w="28575">
+            <a:solidFill>
+              <a:schemeClr val="tx1"/>
+            </a:solidFill>
+            <a:tailEnd type="triangle"/>
+          </a:ln>
+        </p:spPr>
+        <p:style>
+          <a:lnRef idx="1">
+            <a:schemeClr val="accent1"/>
+          </a:lnRef>
+          <a:fillRef idx="0">
+            <a:schemeClr val="accent1"/>
+          </a:fillRef>
+          <a:effectRef idx="0">
+            <a:schemeClr val="accent1"/>
+          </a:effectRef>
+          <a:fontRef idx="minor">
+            <a:schemeClr val="tx1"/>
+          </a:fontRef>
+        </p:style>
+      </p:cxnSp>
+      <p:cxnSp>
+        <p:nvCxnSpPr>
+          <p:cNvPr id="9" name="Straight Arrow Connector 8">
+            <a:extLst>
+              <a:ext uri="{FF2B5EF4-FFF2-40B4-BE49-F238E27FC236}">
+                <a16:creationId xmlns:a16="http://schemas.microsoft.com/office/drawing/2014/main" id="{631F297E-94CB-46BE-8251-C8B4C7FEE422}"/>
+              </a:ext>
+            </a:extLst>
+          </p:cNvPr>
+          <p:cNvCxnSpPr>
+            <a:cxnSpLocks/>
+          </p:cNvCxnSpPr>
+          <p:nvPr/>
+        </p:nvCxnSpPr>
+        <p:spPr>
+          <a:xfrm>
+            <a:off x="4596018" y="803287"/>
+            <a:ext cx="0" cy="891650"/>
+          </a:xfrm>
+          <a:prstGeom prst="straightConnector1">
+            <a:avLst/>
+          </a:prstGeom>
+          <a:ln w="28575">
+            <a:solidFill>
+              <a:schemeClr val="tx1"/>
+            </a:solidFill>
+            <a:tailEnd type="triangle"/>
+          </a:ln>
+        </p:spPr>
+        <p:style>
+          <a:lnRef idx="1">
+            <a:schemeClr val="accent1"/>
+          </a:lnRef>
+          <a:fillRef idx="0">
+            <a:schemeClr val="accent1"/>
+          </a:fillRef>
+          <a:effectRef idx="0">
+            <a:schemeClr val="accent1"/>
+          </a:effectRef>
+          <a:fontRef idx="minor">
+            <a:schemeClr val="tx1"/>
+          </a:fontRef>
+        </p:style>
+      </p:cxnSp>
+      <p:sp>
+        <p:nvSpPr>
+          <p:cNvPr id="10" name="TextBox 9">
+            <a:extLst>
+              <a:ext uri="{FF2B5EF4-FFF2-40B4-BE49-F238E27FC236}">
+                <a16:creationId xmlns:a16="http://schemas.microsoft.com/office/drawing/2014/main" id="{27AB3976-05D9-47B1-BCBA-2CAC82C585EF}"/>
+              </a:ext>
+            </a:extLst>
+          </p:cNvPr>
+          <p:cNvSpPr txBox="1"/>
+          <p:nvPr/>
+        </p:nvSpPr>
+        <p:spPr>
+          <a:xfrm>
+            <a:off x="7006676" y="1880088"/>
+            <a:ext cx="4174546" cy="523220"/>
+          </a:xfrm>
+          <a:prstGeom prst="rect">
+            <a:avLst/>
+          </a:prstGeom>
+          <a:noFill/>
+        </p:spPr>
+        <p:txBody>
+          <a:bodyPr wrap="square" rtlCol="0">
+            <a:spAutoFit/>
+          </a:bodyPr>
+          <a:lstStyle/>
+          <a:p>
+            <a:pPr algn="ctr"/>
+            <a:r>
+              <a:rPr lang="en-US" sz="2800" b="1" u="sng" dirty="0"/>
+              <a:t>to/from Producer Module:</a:t>
+            </a:r>
+          </a:p>
+        </p:txBody>
+      </p:sp>
+      <p:sp>
+        <p:nvSpPr>
+          <p:cNvPr id="11" name="TextBox 10">
+            <a:extLst>
+              <a:ext uri="{FF2B5EF4-FFF2-40B4-BE49-F238E27FC236}">
+                <a16:creationId xmlns:a16="http://schemas.microsoft.com/office/drawing/2014/main" id="{5084BBBC-C952-4483-9881-76C1F0F26DFC}"/>
+              </a:ext>
+            </a:extLst>
+          </p:cNvPr>
+          <p:cNvSpPr txBox="1"/>
+          <p:nvPr/>
+        </p:nvSpPr>
+        <p:spPr>
+          <a:xfrm>
+            <a:off x="2437944" y="280067"/>
+            <a:ext cx="4568732" cy="523220"/>
+          </a:xfrm>
+          <a:prstGeom prst="rect">
+            <a:avLst/>
+          </a:prstGeom>
+          <a:noFill/>
+        </p:spPr>
+        <p:txBody>
+          <a:bodyPr wrap="square" rtlCol="0">
+            <a:spAutoFit/>
+          </a:bodyPr>
+          <a:lstStyle/>
+          <a:p>
+            <a:pPr algn="ctr"/>
+            <a:r>
+              <a:rPr lang="en-US" sz="2800" dirty="0"/>
+              <a:t>Analysis Context Inputs</a:t>
+            </a:r>
+          </a:p>
+        </p:txBody>
+      </p:sp>
+      <p:sp>
+        <p:nvSpPr>
+          <p:cNvPr id="12" name="TextBox 11">
+            <a:extLst>
+              <a:ext uri="{FF2B5EF4-FFF2-40B4-BE49-F238E27FC236}">
+                <a16:creationId xmlns:a16="http://schemas.microsoft.com/office/drawing/2014/main" id="{5EEAFE28-4F28-4270-A958-1490D8EAE705}"/>
+              </a:ext>
+            </a:extLst>
+          </p:cNvPr>
+          <p:cNvSpPr txBox="1"/>
+          <p:nvPr/>
+        </p:nvSpPr>
+        <p:spPr>
+          <a:xfrm>
+            <a:off x="5370435" y="5150035"/>
+            <a:ext cx="1264818" cy="954107"/>
+          </a:xfrm>
+          <a:prstGeom prst="rect">
+            <a:avLst/>
+          </a:prstGeom>
+          <a:noFill/>
+          <a:ln>
+            <a:noFill/>
+          </a:ln>
+        </p:spPr>
+        <p:txBody>
+          <a:bodyPr wrap="square" rtlCol="0">
+            <a:spAutoFit/>
+          </a:bodyPr>
+          <a:lstStyle/>
+          <a:p>
+            <a:r>
+              <a:rPr lang="en-US" sz="2800" dirty="0"/>
+              <a:t>Vehicle Use</a:t>
+            </a:r>
+          </a:p>
+        </p:txBody>
+      </p:sp>
+      <p:sp>
+        <p:nvSpPr>
+          <p:cNvPr id="28" name="TextBox 27">
+            <a:extLst>
+              <a:ext uri="{FF2B5EF4-FFF2-40B4-BE49-F238E27FC236}">
+                <a16:creationId xmlns:a16="http://schemas.microsoft.com/office/drawing/2014/main" id="{D6AE272E-F1F0-4269-8C78-ECF1BE8A39E1}"/>
+              </a:ext>
+            </a:extLst>
+          </p:cNvPr>
+          <p:cNvSpPr txBox="1"/>
+          <p:nvPr/>
+        </p:nvSpPr>
+        <p:spPr>
+          <a:xfrm>
+            <a:off x="6786521" y="2599600"/>
+            <a:ext cx="3009352" cy="523220"/>
+          </a:xfrm>
+          <a:prstGeom prst="rect">
+            <a:avLst/>
+          </a:prstGeom>
+          <a:noFill/>
+          <a:ln>
+            <a:noFill/>
+          </a:ln>
+        </p:spPr>
+        <p:txBody>
+          <a:bodyPr wrap="square" rtlCol="0">
+            <a:spAutoFit/>
+          </a:bodyPr>
+          <a:lstStyle/>
+          <a:p>
+            <a:r>
+              <a:rPr lang="en-US" sz="2800" dirty="0"/>
+              <a:t>Vehicle Demanded</a:t>
+            </a:r>
+          </a:p>
+        </p:txBody>
+      </p:sp>
+      <p:sp>
+        <p:nvSpPr>
+          <p:cNvPr id="29" name="TextBox 28">
+            <a:extLst>
+              <a:ext uri="{FF2B5EF4-FFF2-40B4-BE49-F238E27FC236}">
+                <a16:creationId xmlns:a16="http://schemas.microsoft.com/office/drawing/2014/main" id="{AB63568D-AF50-4657-A444-0A1B39F420C9}"/>
+              </a:ext>
+            </a:extLst>
+          </p:cNvPr>
+          <p:cNvSpPr txBox="1"/>
+          <p:nvPr/>
+        </p:nvSpPr>
+        <p:spPr>
+          <a:xfrm>
+            <a:off x="6786521" y="3432052"/>
+            <a:ext cx="3855760" cy="954107"/>
+          </a:xfrm>
+          <a:prstGeom prst="rect">
+            <a:avLst/>
+          </a:prstGeom>
+          <a:noFill/>
+          <a:ln>
+            <a:noFill/>
+          </a:ln>
+        </p:spPr>
+        <p:txBody>
+          <a:bodyPr wrap="square" rtlCol="0">
+            <a:spAutoFit/>
+          </a:bodyPr>
+          <a:lstStyle/>
+          <a:p>
+            <a:r>
+              <a:rPr lang="en-US" sz="2800" dirty="0"/>
+              <a:t>Vehicle Prices, Attributes of Candidate Vehicles</a:t>
+            </a:r>
+          </a:p>
+        </p:txBody>
+      </p:sp>
+      <p:cxnSp>
+        <p:nvCxnSpPr>
+          <p:cNvPr id="31" name="Straight Arrow Connector 30">
+            <a:extLst>
+              <a:ext uri="{FF2B5EF4-FFF2-40B4-BE49-F238E27FC236}">
+                <a16:creationId xmlns:a16="http://schemas.microsoft.com/office/drawing/2014/main" id="{EAAC6B11-B2B1-4D7D-9EBF-A76C6929EBD4}"/>
+              </a:ext>
+            </a:extLst>
+          </p:cNvPr>
+          <p:cNvCxnSpPr>
+            <a:cxnSpLocks/>
+          </p:cNvCxnSpPr>
+          <p:nvPr/>
+        </p:nvCxnSpPr>
+        <p:spPr>
+          <a:xfrm>
+            <a:off x="5370435" y="4821863"/>
+            <a:ext cx="0" cy="1284584"/>
+          </a:xfrm>
+          <a:prstGeom prst="straightConnector1">
+            <a:avLst/>
+          </a:prstGeom>
+          <a:ln w="28575">
+            <a:solidFill>
+              <a:schemeClr val="tx1"/>
+            </a:solidFill>
+            <a:tailEnd type="triangle"/>
+          </a:ln>
+        </p:spPr>
+        <p:style>
+          <a:lnRef idx="1">
+            <a:schemeClr val="accent1"/>
+          </a:lnRef>
+          <a:fillRef idx="0">
+            <a:schemeClr val="accent1"/>
+          </a:fillRef>
+          <a:effectRef idx="0">
+            <a:schemeClr val="accent1"/>
+          </a:effectRef>
+          <a:fontRef idx="minor">
+            <a:schemeClr val="tx1"/>
+          </a:fontRef>
+        </p:style>
+      </p:cxnSp>
+    </p:spTree>
+    <p:extLst>
+      <p:ext uri="{BB962C8B-B14F-4D97-AF65-F5344CB8AC3E}">
+        <p14:creationId xmlns:p14="http://schemas.microsoft.com/office/powerpoint/2010/main" val="3763063462"/>
+      </p:ext>
+    </p:extLst>
+  </p:cSld>
+  <p:clrMapOvr>
+    <a:masterClrMapping/>
+  </p:clrMapOvr>
+</p:sld>
+</file>
+
+<file path=ppt/slides/slide5.xml><?xml version="1.0" encoding="utf-8"?>
+<p:sld xmlns:a="http://schemas.openxmlformats.org/drawingml/2006/main" xmlns:r="http://schemas.openxmlformats.org/officeDocument/2006/relationships" xmlns:p="http://schemas.openxmlformats.org/presentationml/2006/main">
+  <p:cSld>
+    <p:spTree>
+      <p:nvGrpSpPr>
+        <p:cNvPr id="1" name=""/>
+        <p:cNvGrpSpPr/>
+        <p:nvPr/>
+      </p:nvGrpSpPr>
+      <p:grpSpPr>
+        <a:xfrm>
+          <a:off x="0" y="0"/>
+          <a:ext cx="0" cy="0"/>
+          <a:chOff x="0" y="0"/>
+          <a:chExt cx="0" cy="0"/>
+        </a:xfrm>
+      </p:grpSpPr>
+      <p:sp>
+        <p:nvSpPr>
+          <p:cNvPr id="5" name="Rectangle 4">
+            <a:extLst>
+              <a:ext uri="{FF2B5EF4-FFF2-40B4-BE49-F238E27FC236}">
+                <a16:creationId xmlns:a16="http://schemas.microsoft.com/office/drawing/2014/main" id="{3A774EAC-F9CD-4AFC-96DE-8C2BEC27FF58}"/>
+              </a:ext>
+            </a:extLst>
+          </p:cNvPr>
+          <p:cNvSpPr/>
+          <p:nvPr/>
+        </p:nvSpPr>
+        <p:spPr>
+          <a:xfrm>
+            <a:off x="2312329" y="4308122"/>
+            <a:ext cx="2843784" cy="1435608"/>
+          </a:xfrm>
+          <a:prstGeom prst="rect">
+            <a:avLst/>
+          </a:prstGeom>
+          <a:solidFill>
+            <a:schemeClr val="accent2">
+              <a:lumMod val="75000"/>
+            </a:schemeClr>
+          </a:solidFill>
+          <a:ln>
+            <a:solidFill>
+              <a:schemeClr val="accent2"/>
+            </a:solidFill>
+          </a:ln>
+        </p:spPr>
+        <p:style>
+          <a:lnRef idx="2">
+            <a:schemeClr val="accent1">
+              <a:shade val="50000"/>
+            </a:schemeClr>
+          </a:lnRef>
+          <a:fillRef idx="1">
+            <a:schemeClr val="accent1"/>
+          </a:fillRef>
+          <a:effectRef idx="0">
+            <a:schemeClr val="accent1"/>
+          </a:effectRef>
+          <a:fontRef idx="minor">
+            <a:schemeClr val="lt1"/>
+          </a:fontRef>
+        </p:style>
+        <p:txBody>
+          <a:bodyPr rtlCol="0" anchor="ctr"/>
+          <a:lstStyle/>
+          <a:p>
+            <a:pPr algn="ctr"/>
+            <a:r>
+              <a:rPr lang="en-US" sz="2800" dirty="0">
+                <a:solidFill>
+                  <a:schemeClr val="tx1"/>
+                </a:solidFill>
+              </a:rPr>
+              <a:t>Used Vehicle Reregistration</a:t>
+            </a:r>
+          </a:p>
+        </p:txBody>
+      </p:sp>
+      <p:sp>
+        <p:nvSpPr>
+          <p:cNvPr id="10" name="Rectangle 9">
+            <a:extLst>
+              <a:ext uri="{FF2B5EF4-FFF2-40B4-BE49-F238E27FC236}">
+                <a16:creationId xmlns:a16="http://schemas.microsoft.com/office/drawing/2014/main" id="{FCF625C8-0661-4EC7-9689-C2C2CEA26AE9}"/>
+              </a:ext>
+            </a:extLst>
+          </p:cNvPr>
+          <p:cNvSpPr/>
+          <p:nvPr/>
+        </p:nvSpPr>
+        <p:spPr>
+          <a:xfrm>
+            <a:off x="7186267" y="4328960"/>
+            <a:ext cx="2843784" cy="1435608"/>
+          </a:xfrm>
+          <a:prstGeom prst="rect">
+            <a:avLst/>
+          </a:prstGeom>
+          <a:solidFill>
+            <a:schemeClr val="accent2">
+              <a:lumMod val="75000"/>
+            </a:schemeClr>
+          </a:solidFill>
+          <a:ln>
+            <a:solidFill>
+              <a:schemeClr val="accent2"/>
+            </a:solidFill>
+          </a:ln>
+        </p:spPr>
+        <p:style>
+          <a:lnRef idx="2">
+            <a:schemeClr val="accent1">
+              <a:shade val="50000"/>
+            </a:schemeClr>
+          </a:lnRef>
+          <a:fillRef idx="1">
+            <a:schemeClr val="accent1"/>
+          </a:fillRef>
+          <a:effectRef idx="0">
+            <a:schemeClr val="accent1"/>
+          </a:effectRef>
+          <a:fontRef idx="minor">
+            <a:schemeClr val="lt1"/>
+          </a:fontRef>
+        </p:style>
+        <p:txBody>
+          <a:bodyPr rtlCol="0" anchor="ctr"/>
+          <a:lstStyle/>
+          <a:p>
+            <a:pPr algn="ctr"/>
+            <a:r>
+              <a:rPr lang="en-US" sz="2800" dirty="0">
+                <a:solidFill>
+                  <a:schemeClr val="tx1"/>
+                </a:solidFill>
+              </a:rPr>
+              <a:t>New and Used Vehicle Use (VMT)</a:t>
+            </a:r>
+          </a:p>
+        </p:txBody>
+      </p:sp>
+      <p:sp>
+        <p:nvSpPr>
+          <p:cNvPr id="11" name="Rectangle 10">
+            <a:extLst>
+              <a:ext uri="{FF2B5EF4-FFF2-40B4-BE49-F238E27FC236}">
+                <a16:creationId xmlns:a16="http://schemas.microsoft.com/office/drawing/2014/main" id="{2576E70B-6DC5-4827-8FF2-9338824D72F1}"/>
+              </a:ext>
+            </a:extLst>
+          </p:cNvPr>
+          <p:cNvSpPr/>
+          <p:nvPr/>
+        </p:nvSpPr>
+        <p:spPr>
+          <a:xfrm>
+            <a:off x="2312330" y="1114530"/>
+            <a:ext cx="2845802" cy="1435347"/>
+          </a:xfrm>
+          <a:prstGeom prst="rect">
+            <a:avLst/>
+          </a:prstGeom>
+          <a:solidFill>
+            <a:schemeClr val="accent2">
+              <a:lumMod val="75000"/>
+            </a:schemeClr>
+          </a:solidFill>
+          <a:ln>
+            <a:solidFill>
+              <a:schemeClr val="accent2"/>
+            </a:solidFill>
+          </a:ln>
+        </p:spPr>
+        <p:style>
+          <a:lnRef idx="2">
+            <a:schemeClr val="accent1">
+              <a:shade val="50000"/>
+            </a:schemeClr>
+          </a:lnRef>
+          <a:fillRef idx="1">
+            <a:schemeClr val="accent1"/>
+          </a:fillRef>
+          <a:effectRef idx="0">
+            <a:schemeClr val="accent1"/>
+          </a:effectRef>
+          <a:fontRef idx="minor">
+            <a:schemeClr val="lt1"/>
+          </a:fontRef>
+        </p:style>
+        <p:txBody>
+          <a:bodyPr rtlCol="0" anchor="ctr"/>
+          <a:lstStyle/>
+          <a:p>
+            <a:pPr algn="ctr"/>
+            <a:r>
+              <a:rPr lang="en-US" sz="2800" dirty="0">
+                <a:solidFill>
+                  <a:schemeClr val="tx1"/>
+                </a:solidFill>
+              </a:rPr>
+              <a:t>New Vehicle Sales </a:t>
+            </a:r>
+          </a:p>
+        </p:txBody>
+      </p:sp>
+      <p:sp>
+        <p:nvSpPr>
+          <p:cNvPr id="12" name="Rectangle 11">
+            <a:extLst>
+              <a:ext uri="{FF2B5EF4-FFF2-40B4-BE49-F238E27FC236}">
+                <a16:creationId xmlns:a16="http://schemas.microsoft.com/office/drawing/2014/main" id="{21CC7A20-44B1-4478-892B-0ADD02F8A6C8}"/>
+              </a:ext>
+            </a:extLst>
+          </p:cNvPr>
+          <p:cNvSpPr/>
+          <p:nvPr/>
+        </p:nvSpPr>
+        <p:spPr>
+          <a:xfrm>
+            <a:off x="4750308" y="2711195"/>
+            <a:ext cx="2843784" cy="1435608"/>
+          </a:xfrm>
+          <a:prstGeom prst="rect">
+            <a:avLst/>
+          </a:prstGeom>
+          <a:solidFill>
+            <a:schemeClr val="accent2">
+              <a:lumMod val="75000"/>
+            </a:schemeClr>
+          </a:solidFill>
+          <a:ln>
+            <a:solidFill>
+              <a:schemeClr val="accent2"/>
+            </a:solidFill>
+          </a:ln>
+        </p:spPr>
+        <p:style>
+          <a:lnRef idx="2">
+            <a:schemeClr val="accent1">
+              <a:shade val="50000"/>
+            </a:schemeClr>
+          </a:lnRef>
+          <a:fillRef idx="1">
+            <a:schemeClr val="accent1"/>
+          </a:fillRef>
+          <a:effectRef idx="0">
+            <a:schemeClr val="accent1"/>
+          </a:effectRef>
+          <a:fontRef idx="minor">
+            <a:schemeClr val="lt1"/>
+          </a:fontRef>
+        </p:style>
+        <p:txBody>
+          <a:bodyPr rtlCol="0" anchor="ctr"/>
+          <a:lstStyle/>
+          <a:p>
+            <a:pPr algn="ctr"/>
+            <a:r>
+              <a:rPr lang="en-US" sz="2800" dirty="0">
+                <a:solidFill>
+                  <a:schemeClr val="tx1"/>
+                </a:solidFill>
+              </a:rPr>
+              <a:t>New Vehicle Sales Shares</a:t>
+            </a:r>
+          </a:p>
+        </p:txBody>
+      </p:sp>
+      <p:sp>
+        <p:nvSpPr>
+          <p:cNvPr id="4" name="Rectangle 3">
+            <a:extLst>
+              <a:ext uri="{FF2B5EF4-FFF2-40B4-BE49-F238E27FC236}">
+                <a16:creationId xmlns:a16="http://schemas.microsoft.com/office/drawing/2014/main" id="{5AFF222A-F3F5-4F24-8A94-3DF3232D15E7}"/>
+              </a:ext>
+            </a:extLst>
+          </p:cNvPr>
+          <p:cNvSpPr/>
+          <p:nvPr/>
+        </p:nvSpPr>
+        <p:spPr>
+          <a:xfrm>
+            <a:off x="1930400" y="778933"/>
+            <a:ext cx="8483600" cy="5334000"/>
+          </a:xfrm>
+          <a:prstGeom prst="rect">
+            <a:avLst/>
+          </a:prstGeom>
+          <a:noFill/>
+          <a:ln w="190500">
+            <a:solidFill>
+              <a:schemeClr val="accent2">
+                <a:lumMod val="75000"/>
+              </a:schemeClr>
+            </a:solidFill>
+          </a:ln>
+        </p:spPr>
+        <p:style>
+          <a:lnRef idx="2">
+            <a:schemeClr val="accent1">
+              <a:shade val="50000"/>
+            </a:schemeClr>
+          </a:lnRef>
+          <a:fillRef idx="1">
+            <a:schemeClr val="accent1"/>
+          </a:fillRef>
+          <a:effectRef idx="0">
+            <a:schemeClr val="accent1"/>
+          </a:effectRef>
+          <a:fontRef idx="minor">
+            <a:schemeClr val="lt1"/>
+          </a:fontRef>
+        </p:style>
+        <p:txBody>
+          <a:bodyPr rtlCol="0" anchor="ctr"/>
+          <a:lstStyle/>
+          <a:p>
+            <a:pPr algn="ctr"/>
+            <a:endParaRPr lang="en-US"/>
+          </a:p>
+        </p:txBody>
+      </p:sp>
+      <p:sp>
+        <p:nvSpPr>
+          <p:cNvPr id="17" name="Rectangle 16">
+            <a:extLst>
+              <a:ext uri="{FF2B5EF4-FFF2-40B4-BE49-F238E27FC236}">
+                <a16:creationId xmlns:a16="http://schemas.microsoft.com/office/drawing/2014/main" id="{9EA41B12-1356-42C2-9A09-FC9E8E8069B3}"/>
+              </a:ext>
+            </a:extLst>
+          </p:cNvPr>
+          <p:cNvSpPr/>
+          <p:nvPr/>
+        </p:nvSpPr>
+        <p:spPr>
+          <a:xfrm>
+            <a:off x="7186267" y="1114530"/>
+            <a:ext cx="2843784" cy="1435608"/>
+          </a:xfrm>
+          <a:prstGeom prst="rect">
+            <a:avLst/>
+          </a:prstGeom>
+          <a:solidFill>
+            <a:schemeClr val="accent2">
+              <a:lumMod val="75000"/>
+            </a:schemeClr>
+          </a:solidFill>
+          <a:ln>
+            <a:solidFill>
+              <a:schemeClr val="accent2"/>
+            </a:solidFill>
+          </a:ln>
+        </p:spPr>
+        <p:style>
+          <a:lnRef idx="2">
+            <a:schemeClr val="accent1">
+              <a:shade val="50000"/>
+            </a:schemeClr>
+          </a:lnRef>
+          <a:fillRef idx="1">
+            <a:schemeClr val="accent1"/>
+          </a:fillRef>
+          <a:effectRef idx="0">
+            <a:schemeClr val="accent1"/>
+          </a:effectRef>
+          <a:fontRef idx="minor">
+            <a:schemeClr val="lt1"/>
+          </a:fontRef>
+        </p:style>
+        <p:txBody>
+          <a:bodyPr rtlCol="0" anchor="ctr"/>
+          <a:lstStyle/>
+          <a:p>
+            <a:pPr algn="ctr"/>
+            <a:r>
+              <a:rPr lang="en-US" sz="2800" dirty="0">
+                <a:solidFill>
+                  <a:schemeClr val="tx1"/>
+                </a:solidFill>
+              </a:rPr>
+              <a:t>Market Class Definitions</a:t>
+            </a:r>
+          </a:p>
+        </p:txBody>
+      </p:sp>
+      <p:sp>
+        <p:nvSpPr>
+          <p:cNvPr id="18" name="Rectangle 17">
+            <a:extLst>
+              <a:ext uri="{FF2B5EF4-FFF2-40B4-BE49-F238E27FC236}">
+                <a16:creationId xmlns:a16="http://schemas.microsoft.com/office/drawing/2014/main" id="{63352584-7BE1-4DB5-BC7A-9B1955FE3FD8}"/>
+              </a:ext>
+            </a:extLst>
+          </p:cNvPr>
+          <p:cNvSpPr/>
+          <p:nvPr/>
+        </p:nvSpPr>
+        <p:spPr>
+          <a:xfrm>
+            <a:off x="1845735" y="694268"/>
+            <a:ext cx="8666755" cy="5513700"/>
+          </a:xfrm>
+          <a:prstGeom prst="rect">
+            <a:avLst/>
+          </a:prstGeom>
+          <a:noFill/>
+          <a:ln w="28575">
+            <a:solidFill>
+              <a:schemeClr val="tx1"/>
+            </a:solidFill>
+          </a:ln>
+        </p:spPr>
+        <p:style>
+          <a:lnRef idx="2">
+            <a:schemeClr val="accent1">
+              <a:shade val="50000"/>
+            </a:schemeClr>
+          </a:lnRef>
+          <a:fillRef idx="1">
+            <a:schemeClr val="accent1"/>
+          </a:fillRef>
+          <a:effectRef idx="0">
+            <a:schemeClr val="accent1"/>
+          </a:effectRef>
+          <a:fontRef idx="minor">
+            <a:schemeClr val="lt1"/>
+          </a:fontRef>
+        </p:style>
+        <p:txBody>
+          <a:bodyPr rtlCol="0" anchor="ctr"/>
+          <a:lstStyle/>
+          <a:p>
+            <a:pPr algn="ctr"/>
+            <a:endParaRPr lang="en-US"/>
+          </a:p>
+        </p:txBody>
+      </p:sp>
+    </p:spTree>
+    <p:extLst>
+      <p:ext uri="{BB962C8B-B14F-4D97-AF65-F5344CB8AC3E}">
+        <p14:creationId xmlns:p14="http://schemas.microsoft.com/office/powerpoint/2010/main" val="4016740263"/>
+      </p:ext>
+    </p:extLst>
+  </p:cSld>
+  <p:clrMapOvr>
+    <a:masterClrMapping/>
+  </p:clrMapOvr>
+</p:sld>
+</file>
+
+<file path=ppt/slides/slide6.xml><?xml version="1.0" encoding="utf-8"?>
+<p:sld xmlns:a="http://schemas.openxmlformats.org/drawingml/2006/main" xmlns:r="http://schemas.openxmlformats.org/officeDocument/2006/relationships" xmlns:p="http://schemas.openxmlformats.org/presentationml/2006/main">
+  <p:cSld>
+    <p:spTree>
+      <p:nvGrpSpPr>
+        <p:cNvPr id="1" name=""/>
+        <p:cNvGrpSpPr/>
+        <p:nvPr/>
+      </p:nvGrpSpPr>
+      <p:grpSpPr>
+        <a:xfrm>
+          <a:off x="0" y="0"/>
+          <a:ext cx="0" cy="0"/>
+          <a:chOff x="0" y="0"/>
+          <a:chExt cx="0" cy="0"/>
+        </a:xfrm>
+      </p:grpSpPr>
+      <p:sp>
+        <p:nvSpPr>
+          <p:cNvPr id="4" name="Rectangle 3">
+            <a:extLst>
+              <a:ext uri="{FF2B5EF4-FFF2-40B4-BE49-F238E27FC236}">
+                <a16:creationId xmlns:a16="http://schemas.microsoft.com/office/drawing/2014/main" id="{C6A4E665-52AF-48B4-8B85-A6A9DB6E4472}"/>
+              </a:ext>
+            </a:extLst>
+          </p:cNvPr>
+          <p:cNvSpPr/>
+          <p:nvPr/>
+        </p:nvSpPr>
+        <p:spPr>
+          <a:xfrm>
+            <a:off x="5926666" y="2581757"/>
+            <a:ext cx="3818526" cy="2579268"/>
+          </a:xfrm>
+          <a:prstGeom prst="rect">
+            <a:avLst/>
+          </a:prstGeom>
+          <a:solidFill>
+            <a:schemeClr val="accent1"/>
+          </a:solidFill>
+          <a:ln>
+            <a:solidFill>
+              <a:schemeClr val="tx1"/>
+            </a:solidFill>
+          </a:ln>
+        </p:spPr>
+        <p:style>
+          <a:lnRef idx="2">
+            <a:schemeClr val="accent1">
+              <a:shade val="50000"/>
+            </a:schemeClr>
+          </a:lnRef>
+          <a:fillRef idx="1">
+            <a:schemeClr val="accent1"/>
+          </a:fillRef>
+          <a:effectRef idx="0">
+            <a:schemeClr val="accent1"/>
+          </a:effectRef>
+          <a:fontRef idx="minor">
+            <a:schemeClr val="lt1"/>
+          </a:fontRef>
+        </p:style>
+        <p:txBody>
+          <a:bodyPr rtlCol="0" anchor="ctr"/>
+          <a:lstStyle/>
+          <a:p>
+            <a:pPr algn="ctr"/>
+            <a:r>
+              <a:rPr lang="en-US" sz="3200" dirty="0">
+                <a:solidFill>
+                  <a:schemeClr val="bg1"/>
+                </a:solidFill>
+              </a:rPr>
+              <a:t>Producers</a:t>
+            </a:r>
+          </a:p>
+        </p:txBody>
+      </p:sp>
+      <p:cxnSp>
+        <p:nvCxnSpPr>
+          <p:cNvPr id="5" name="Straight Arrow Connector 4">
+            <a:extLst>
+              <a:ext uri="{FF2B5EF4-FFF2-40B4-BE49-F238E27FC236}">
+                <a16:creationId xmlns:a16="http://schemas.microsoft.com/office/drawing/2014/main" id="{BB2208B7-B445-4E3C-B423-53B2F5EF9873}"/>
+              </a:ext>
+            </a:extLst>
+          </p:cNvPr>
+          <p:cNvCxnSpPr>
+            <a:cxnSpLocks/>
+          </p:cNvCxnSpPr>
+          <p:nvPr/>
+        </p:nvCxnSpPr>
+        <p:spPr>
+          <a:xfrm>
+            <a:off x="1813423" y="3871391"/>
+            <a:ext cx="4113243" cy="0"/>
+          </a:xfrm>
+          <a:prstGeom prst="straightConnector1">
+            <a:avLst/>
+          </a:prstGeom>
+          <a:ln w="28575">
+            <a:solidFill>
+              <a:schemeClr val="tx1"/>
+            </a:solidFill>
+            <a:tailEnd type="triangle"/>
+          </a:ln>
+        </p:spPr>
+        <p:style>
+          <a:lnRef idx="1">
+            <a:schemeClr val="accent1"/>
+          </a:lnRef>
+          <a:fillRef idx="0">
+            <a:schemeClr val="accent1"/>
+          </a:fillRef>
+          <a:effectRef idx="0">
+            <a:schemeClr val="accent1"/>
+          </a:effectRef>
+          <a:fontRef idx="minor">
+            <a:schemeClr val="tx1"/>
+          </a:fontRef>
+        </p:style>
+      </p:cxnSp>
+      <p:cxnSp>
+        <p:nvCxnSpPr>
+          <p:cNvPr id="6" name="Straight Arrow Connector 5">
+            <a:extLst>
+              <a:ext uri="{FF2B5EF4-FFF2-40B4-BE49-F238E27FC236}">
+                <a16:creationId xmlns:a16="http://schemas.microsoft.com/office/drawing/2014/main" id="{22D2F96B-D683-4FF9-B577-1BA2B7059C15}"/>
+              </a:ext>
+            </a:extLst>
+          </p:cNvPr>
+          <p:cNvCxnSpPr>
+            <a:cxnSpLocks/>
+          </p:cNvCxnSpPr>
+          <p:nvPr/>
+        </p:nvCxnSpPr>
+        <p:spPr>
+          <a:xfrm>
+            <a:off x="9435350" y="1248248"/>
+            <a:ext cx="0" cy="1333509"/>
+          </a:xfrm>
+          <a:prstGeom prst="straightConnector1">
+            <a:avLst/>
+          </a:prstGeom>
+          <a:ln w="28575">
+            <a:solidFill>
+              <a:schemeClr val="tx1"/>
+            </a:solidFill>
+            <a:headEnd type="triangle" w="med" len="med"/>
+            <a:tailEnd type="none" w="med" len="med"/>
+          </a:ln>
+        </p:spPr>
+        <p:style>
+          <a:lnRef idx="1">
+            <a:schemeClr val="accent1"/>
+          </a:lnRef>
+          <a:fillRef idx="0">
+            <a:schemeClr val="accent1"/>
+          </a:fillRef>
+          <a:effectRef idx="0">
+            <a:schemeClr val="accent1"/>
+          </a:effectRef>
+          <a:fontRef idx="minor">
+            <a:schemeClr val="tx1"/>
+          </a:fontRef>
+        </p:style>
+      </p:cxnSp>
+      <p:sp>
+        <p:nvSpPr>
+          <p:cNvPr id="8" name="TextBox 7">
+            <a:extLst>
+              <a:ext uri="{FF2B5EF4-FFF2-40B4-BE49-F238E27FC236}">
+                <a16:creationId xmlns:a16="http://schemas.microsoft.com/office/drawing/2014/main" id="{C9C5D4BF-1D14-4CAD-8946-3E2B8AB9D52D}"/>
+              </a:ext>
+            </a:extLst>
+          </p:cNvPr>
+          <p:cNvSpPr txBox="1"/>
+          <p:nvPr/>
+        </p:nvSpPr>
+        <p:spPr>
+          <a:xfrm>
+            <a:off x="9515043" y="1238176"/>
+            <a:ext cx="2145810" cy="1384995"/>
+          </a:xfrm>
+          <a:prstGeom prst="rect">
+            <a:avLst/>
+          </a:prstGeom>
+          <a:noFill/>
+        </p:spPr>
+        <p:txBody>
+          <a:bodyPr wrap="square" rtlCol="0">
+            <a:spAutoFit/>
+          </a:bodyPr>
+          <a:lstStyle/>
+          <a:p>
+            <a:r>
+              <a:rPr lang="en-US" sz="2800" dirty="0"/>
+              <a:t>Attributes of Candidate Vehicles</a:t>
+            </a:r>
+          </a:p>
+        </p:txBody>
+      </p:sp>
+      <p:sp>
+        <p:nvSpPr>
+          <p:cNvPr id="10" name="TextBox 9">
+            <a:extLst>
+              <a:ext uri="{FF2B5EF4-FFF2-40B4-BE49-F238E27FC236}">
+                <a16:creationId xmlns:a16="http://schemas.microsoft.com/office/drawing/2014/main" id="{97BB6B44-3429-40C0-B960-1A5CBC09C26D}"/>
+              </a:ext>
+            </a:extLst>
+          </p:cNvPr>
+          <p:cNvSpPr txBox="1"/>
+          <p:nvPr/>
+        </p:nvSpPr>
+        <p:spPr>
+          <a:xfrm>
+            <a:off x="6663954" y="1246298"/>
+            <a:ext cx="2323678" cy="1384995"/>
+          </a:xfrm>
+          <a:prstGeom prst="rect">
+            <a:avLst/>
+          </a:prstGeom>
+          <a:noFill/>
+        </p:spPr>
+        <p:txBody>
+          <a:bodyPr wrap="square" rtlCol="0">
+            <a:spAutoFit/>
+          </a:bodyPr>
+          <a:lstStyle/>
+          <a:p>
+            <a:pPr algn="r"/>
+            <a:r>
+              <a:rPr lang="en-US" sz="2800" dirty="0"/>
+              <a:t>Vehicle GHG cert and target values</a:t>
+            </a:r>
+          </a:p>
+        </p:txBody>
+      </p:sp>
+      <p:cxnSp>
+        <p:nvCxnSpPr>
+          <p:cNvPr id="14" name="Straight Arrow Connector 13">
+            <a:extLst>
+              <a:ext uri="{FF2B5EF4-FFF2-40B4-BE49-F238E27FC236}">
+                <a16:creationId xmlns:a16="http://schemas.microsoft.com/office/drawing/2014/main" id="{6B857E6D-733A-4489-A8B7-D05B974F49AC}"/>
+              </a:ext>
+            </a:extLst>
+          </p:cNvPr>
+          <p:cNvCxnSpPr>
+            <a:cxnSpLocks/>
+          </p:cNvCxnSpPr>
+          <p:nvPr/>
+        </p:nvCxnSpPr>
+        <p:spPr>
+          <a:xfrm>
+            <a:off x="9145026" y="5161025"/>
+            <a:ext cx="0" cy="1367816"/>
+          </a:xfrm>
+          <a:prstGeom prst="straightConnector1">
+            <a:avLst/>
+          </a:prstGeom>
+          <a:ln w="28575">
+            <a:solidFill>
+              <a:schemeClr val="tx1"/>
+            </a:solidFill>
+            <a:tailEnd type="triangle"/>
+          </a:ln>
+        </p:spPr>
+        <p:style>
+          <a:lnRef idx="1">
+            <a:schemeClr val="accent1"/>
+          </a:lnRef>
+          <a:fillRef idx="0">
+            <a:schemeClr val="accent1"/>
+          </a:fillRef>
+          <a:effectRef idx="0">
+            <a:schemeClr val="accent1"/>
+          </a:effectRef>
+          <a:fontRef idx="minor">
+            <a:schemeClr val="tx1"/>
+          </a:fontRef>
+        </p:style>
+      </p:cxnSp>
+      <p:sp>
+        <p:nvSpPr>
+          <p:cNvPr id="15" name="TextBox 14">
+            <a:extLst>
+              <a:ext uri="{FF2B5EF4-FFF2-40B4-BE49-F238E27FC236}">
+                <a16:creationId xmlns:a16="http://schemas.microsoft.com/office/drawing/2014/main" id="{68D6F7A8-0A48-48BD-9FE1-21F55C87EEEC}"/>
+              </a:ext>
+            </a:extLst>
+          </p:cNvPr>
+          <p:cNvSpPr txBox="1"/>
+          <p:nvPr/>
+        </p:nvSpPr>
+        <p:spPr>
+          <a:xfrm>
+            <a:off x="5840356" y="5331932"/>
+            <a:ext cx="3304065" cy="954107"/>
+          </a:xfrm>
+          <a:prstGeom prst="rect">
+            <a:avLst/>
+          </a:prstGeom>
+          <a:noFill/>
+        </p:spPr>
+        <p:txBody>
+          <a:bodyPr wrap="square" rtlCol="0">
+            <a:spAutoFit/>
+          </a:bodyPr>
+          <a:lstStyle/>
+          <a:p>
+            <a:pPr algn="r"/>
+            <a:r>
+              <a:rPr lang="en-US" sz="2800" dirty="0"/>
+              <a:t>Attributes of Produced Vehicles</a:t>
+            </a:r>
+          </a:p>
+        </p:txBody>
+      </p:sp>
+      <p:sp>
+        <p:nvSpPr>
+          <p:cNvPr id="16" name="TextBox 15">
+            <a:extLst>
+              <a:ext uri="{FF2B5EF4-FFF2-40B4-BE49-F238E27FC236}">
+                <a16:creationId xmlns:a16="http://schemas.microsoft.com/office/drawing/2014/main" id="{9BC3522A-D902-403A-931B-9666BEDD603A}"/>
+              </a:ext>
+            </a:extLst>
+          </p:cNvPr>
+          <p:cNvSpPr txBox="1"/>
+          <p:nvPr/>
+        </p:nvSpPr>
+        <p:spPr>
+          <a:xfrm>
+            <a:off x="7711958" y="725028"/>
+            <a:ext cx="3907115" cy="523220"/>
+          </a:xfrm>
+          <a:prstGeom prst="rect">
+            <a:avLst/>
+          </a:prstGeom>
+          <a:noFill/>
+        </p:spPr>
+        <p:txBody>
+          <a:bodyPr wrap="square" rtlCol="0">
+            <a:spAutoFit/>
+          </a:bodyPr>
+          <a:lstStyle/>
+          <a:p>
+            <a:r>
+              <a:rPr lang="en-US" sz="2800" b="1" u="sng" dirty="0"/>
+              <a:t>to/from Policy Module:</a:t>
+            </a:r>
+          </a:p>
+        </p:txBody>
+      </p:sp>
+      <p:cxnSp>
+        <p:nvCxnSpPr>
+          <p:cNvPr id="17" name="Straight Arrow Connector 16">
+            <a:extLst>
+              <a:ext uri="{FF2B5EF4-FFF2-40B4-BE49-F238E27FC236}">
+                <a16:creationId xmlns:a16="http://schemas.microsoft.com/office/drawing/2014/main" id="{1E31C9C9-4F59-4FDE-A16B-0688D9EE3751}"/>
+              </a:ext>
+            </a:extLst>
+          </p:cNvPr>
+          <p:cNvCxnSpPr>
+            <a:cxnSpLocks/>
+          </p:cNvCxnSpPr>
+          <p:nvPr/>
+        </p:nvCxnSpPr>
+        <p:spPr>
+          <a:xfrm>
+            <a:off x="6248400" y="695398"/>
+            <a:ext cx="0" cy="1876287"/>
+          </a:xfrm>
+          <a:prstGeom prst="straightConnector1">
+            <a:avLst/>
+          </a:prstGeom>
+          <a:ln w="28575">
+            <a:solidFill>
+              <a:schemeClr val="tx1"/>
+            </a:solidFill>
+            <a:tailEnd type="triangle"/>
+          </a:ln>
+        </p:spPr>
+        <p:style>
+          <a:lnRef idx="1">
+            <a:schemeClr val="accent1"/>
+          </a:lnRef>
+          <a:fillRef idx="0">
+            <a:schemeClr val="accent1"/>
+          </a:fillRef>
+          <a:effectRef idx="0">
+            <a:schemeClr val="accent1"/>
+          </a:effectRef>
+          <a:fontRef idx="minor">
+            <a:schemeClr val="tx1"/>
+          </a:fontRef>
+        </p:style>
+      </p:cxnSp>
+      <p:sp>
+        <p:nvSpPr>
+          <p:cNvPr id="18" name="TextBox 17">
+            <a:extLst>
+              <a:ext uri="{FF2B5EF4-FFF2-40B4-BE49-F238E27FC236}">
+                <a16:creationId xmlns:a16="http://schemas.microsoft.com/office/drawing/2014/main" id="{CFCA20BC-F607-4AD3-ADAE-0F1F7B482A3C}"/>
+              </a:ext>
+            </a:extLst>
+          </p:cNvPr>
+          <p:cNvSpPr txBox="1"/>
+          <p:nvPr/>
+        </p:nvSpPr>
+        <p:spPr>
+          <a:xfrm>
+            <a:off x="4181848" y="182250"/>
+            <a:ext cx="3828304" cy="523220"/>
+          </a:xfrm>
+          <a:prstGeom prst="rect">
+            <a:avLst/>
+          </a:prstGeom>
+          <a:noFill/>
+        </p:spPr>
+        <p:txBody>
+          <a:bodyPr wrap="square" rtlCol="0">
+            <a:spAutoFit/>
+          </a:bodyPr>
+          <a:lstStyle/>
+          <a:p>
+            <a:pPr algn="r"/>
+            <a:r>
+              <a:rPr lang="en-US" sz="2800" b="1" u="sng" dirty="0"/>
+              <a:t>Analysis Context Inputs</a:t>
+            </a:r>
+          </a:p>
+        </p:txBody>
+      </p:sp>
+      <p:sp>
+        <p:nvSpPr>
+          <p:cNvPr id="27" name="TextBox 26">
+            <a:extLst>
+              <a:ext uri="{FF2B5EF4-FFF2-40B4-BE49-F238E27FC236}">
+                <a16:creationId xmlns:a16="http://schemas.microsoft.com/office/drawing/2014/main" id="{F8817752-DB18-434B-8453-2024D94175B9}"/>
+              </a:ext>
+            </a:extLst>
+          </p:cNvPr>
+          <p:cNvSpPr txBox="1"/>
+          <p:nvPr/>
+        </p:nvSpPr>
+        <p:spPr>
+          <a:xfrm>
+            <a:off x="1116690" y="2441744"/>
+            <a:ext cx="4343617" cy="523220"/>
+          </a:xfrm>
+          <a:prstGeom prst="rect">
+            <a:avLst/>
+          </a:prstGeom>
+          <a:noFill/>
+        </p:spPr>
+        <p:txBody>
+          <a:bodyPr wrap="square" rtlCol="0">
+            <a:spAutoFit/>
+          </a:bodyPr>
+          <a:lstStyle/>
+          <a:p>
+            <a:pPr algn="ctr"/>
+            <a:r>
+              <a:rPr lang="en-US" sz="2800" b="1" u="sng" dirty="0"/>
+              <a:t>to/from Consumer Module:</a:t>
+            </a:r>
+          </a:p>
+        </p:txBody>
+      </p:sp>
+      <p:sp>
+        <p:nvSpPr>
+          <p:cNvPr id="28" name="TextBox 27">
+            <a:extLst>
+              <a:ext uri="{FF2B5EF4-FFF2-40B4-BE49-F238E27FC236}">
+                <a16:creationId xmlns:a16="http://schemas.microsoft.com/office/drawing/2014/main" id="{EC71D4C2-B83C-408F-8908-BDB32EA192A1}"/>
+              </a:ext>
+            </a:extLst>
+          </p:cNvPr>
+          <p:cNvSpPr txBox="1"/>
+          <p:nvPr/>
+        </p:nvSpPr>
+        <p:spPr>
+          <a:xfrm>
+            <a:off x="1984596" y="3386700"/>
+            <a:ext cx="3009352" cy="523220"/>
+          </a:xfrm>
+          <a:prstGeom prst="rect">
+            <a:avLst/>
+          </a:prstGeom>
+          <a:noFill/>
+          <a:ln>
+            <a:noFill/>
+          </a:ln>
+        </p:spPr>
+        <p:txBody>
+          <a:bodyPr wrap="square" rtlCol="0">
+            <a:spAutoFit/>
+          </a:bodyPr>
+          <a:lstStyle/>
+          <a:p>
+            <a:r>
+              <a:rPr lang="en-US" sz="2800" dirty="0"/>
+              <a:t>Vehicle Demanded</a:t>
+            </a:r>
+          </a:p>
+        </p:txBody>
+      </p:sp>
+      <p:sp>
+        <p:nvSpPr>
+          <p:cNvPr id="29" name="TextBox 28">
+            <a:extLst>
+              <a:ext uri="{FF2B5EF4-FFF2-40B4-BE49-F238E27FC236}">
+                <a16:creationId xmlns:a16="http://schemas.microsoft.com/office/drawing/2014/main" id="{4535C367-51AC-40DB-8A1A-B40AAA16F0E6}"/>
+              </a:ext>
+            </a:extLst>
+          </p:cNvPr>
+          <p:cNvSpPr txBox="1"/>
+          <p:nvPr/>
+        </p:nvSpPr>
+        <p:spPr>
+          <a:xfrm>
+            <a:off x="1984596" y="4148447"/>
+            <a:ext cx="3855760" cy="954107"/>
+          </a:xfrm>
+          <a:prstGeom prst="rect">
+            <a:avLst/>
+          </a:prstGeom>
+          <a:noFill/>
+          <a:ln>
+            <a:noFill/>
+          </a:ln>
+        </p:spPr>
+        <p:txBody>
+          <a:bodyPr wrap="square" rtlCol="0">
+            <a:spAutoFit/>
+          </a:bodyPr>
+          <a:lstStyle/>
+          <a:p>
+            <a:r>
+              <a:rPr lang="en-US" sz="2800" dirty="0"/>
+              <a:t>Prices, Attributes of Candidate Vehicles</a:t>
+            </a:r>
+          </a:p>
+        </p:txBody>
+      </p:sp>
+      <p:cxnSp>
+        <p:nvCxnSpPr>
+          <p:cNvPr id="30" name="Straight Arrow Connector 29">
+            <a:extLst>
+              <a:ext uri="{FF2B5EF4-FFF2-40B4-BE49-F238E27FC236}">
+                <a16:creationId xmlns:a16="http://schemas.microsoft.com/office/drawing/2014/main" id="{7688B204-7351-43DA-BD9E-208BB1FC2186}"/>
+              </a:ext>
+            </a:extLst>
+          </p:cNvPr>
+          <p:cNvCxnSpPr>
+            <a:cxnSpLocks/>
+          </p:cNvCxnSpPr>
+          <p:nvPr/>
+        </p:nvCxnSpPr>
+        <p:spPr>
+          <a:xfrm>
+            <a:off x="1748239" y="4625501"/>
+            <a:ext cx="4113243" cy="0"/>
+          </a:xfrm>
+          <a:prstGeom prst="straightConnector1">
+            <a:avLst/>
+          </a:prstGeom>
+          <a:ln w="28575">
+            <a:solidFill>
+              <a:schemeClr val="tx1"/>
+            </a:solidFill>
+            <a:headEnd type="triangle" w="med" len="med"/>
+            <a:tailEnd type="none" w="med" len="med"/>
+          </a:ln>
+        </p:spPr>
+        <p:style>
+          <a:lnRef idx="1">
+            <a:schemeClr val="accent1"/>
+          </a:lnRef>
+          <a:fillRef idx="0">
+            <a:schemeClr val="accent1"/>
+          </a:fillRef>
+          <a:effectRef idx="0">
+            <a:schemeClr val="accent1"/>
+          </a:effectRef>
+          <a:fontRef idx="minor">
+            <a:schemeClr val="tx1"/>
+          </a:fontRef>
+        </p:style>
+      </p:cxnSp>
+      <p:cxnSp>
+        <p:nvCxnSpPr>
+          <p:cNvPr id="37" name="Straight Arrow Connector 36">
+            <a:extLst>
+              <a:ext uri="{FF2B5EF4-FFF2-40B4-BE49-F238E27FC236}">
+                <a16:creationId xmlns:a16="http://schemas.microsoft.com/office/drawing/2014/main" id="{4F63EAB6-39A8-4115-983A-40E6CA46A307}"/>
+              </a:ext>
+            </a:extLst>
+          </p:cNvPr>
+          <p:cNvCxnSpPr>
+            <a:cxnSpLocks/>
+          </p:cNvCxnSpPr>
+          <p:nvPr/>
+        </p:nvCxnSpPr>
+        <p:spPr>
+          <a:xfrm>
+            <a:off x="9028950" y="1238176"/>
+            <a:ext cx="0" cy="1333509"/>
+          </a:xfrm>
+          <a:prstGeom prst="straightConnector1">
+            <a:avLst/>
+          </a:prstGeom>
+          <a:ln w="28575">
+            <a:solidFill>
+              <a:schemeClr val="tx1"/>
+            </a:solidFill>
+            <a:headEnd type="none" w="med" len="med"/>
+            <a:tailEnd type="triangle" w="med" len="med"/>
+          </a:ln>
+        </p:spPr>
+        <p:style>
+          <a:lnRef idx="1">
+            <a:schemeClr val="accent1"/>
+          </a:lnRef>
+          <a:fillRef idx="0">
+            <a:schemeClr val="accent1"/>
+          </a:fillRef>
+          <a:effectRef idx="0">
+            <a:schemeClr val="accent1"/>
+          </a:effectRef>
+          <a:fontRef idx="minor">
+            <a:schemeClr val="tx1"/>
+          </a:fontRef>
+        </p:style>
+      </p:cxnSp>
+    </p:spTree>
+    <p:extLst>
+      <p:ext uri="{BB962C8B-B14F-4D97-AF65-F5344CB8AC3E}">
+        <p14:creationId xmlns:p14="http://schemas.microsoft.com/office/powerpoint/2010/main" val="3325125366"/>
+      </p:ext>
+    </p:extLst>
+  </p:cSld>
+  <p:clrMapOvr>
+    <a:masterClrMapping/>
+  </p:clrMapOvr>
+</p:sld>
+</file>
+
+<file path=ppt/slides/slide7.xml><?xml version="1.0" encoding="utf-8"?>
+<p:sld xmlns:a="http://schemas.openxmlformats.org/drawingml/2006/main" xmlns:r="http://schemas.openxmlformats.org/officeDocument/2006/relationships" xmlns:p="http://schemas.openxmlformats.org/presentationml/2006/main">
+  <p:cSld>
+    <p:spTree>
+      <p:nvGrpSpPr>
+        <p:cNvPr id="1" name=""/>
+        <p:cNvGrpSpPr/>
+        <p:nvPr/>
+      </p:nvGrpSpPr>
+      <p:grpSpPr>
+        <a:xfrm>
+          <a:off x="0" y="0"/>
+          <a:ext cx="0" cy="0"/>
+          <a:chOff x="0" y="0"/>
+          <a:chExt cx="0" cy="0"/>
+        </a:xfrm>
+      </p:grpSpPr>
+      <p:sp>
+        <p:nvSpPr>
+          <p:cNvPr id="4" name="Rectangle 3">
+            <a:extLst>
+              <a:ext uri="{FF2B5EF4-FFF2-40B4-BE49-F238E27FC236}">
+                <a16:creationId xmlns:a16="http://schemas.microsoft.com/office/drawing/2014/main" id="{B458B539-01A4-4F76-A138-31587F215E0B}"/>
+              </a:ext>
+            </a:extLst>
+          </p:cNvPr>
+          <p:cNvSpPr/>
+          <p:nvPr/>
+        </p:nvSpPr>
+        <p:spPr>
+          <a:xfrm>
+            <a:off x="4918994" y="2624868"/>
+            <a:ext cx="3515999" cy="2274469"/>
+          </a:xfrm>
+          <a:prstGeom prst="rect">
+            <a:avLst/>
+          </a:prstGeom>
+          <a:solidFill>
+            <a:schemeClr val="accent4">
+              <a:lumMod val="75000"/>
+            </a:schemeClr>
+          </a:solidFill>
+          <a:ln>
+            <a:solidFill>
+              <a:schemeClr val="tx1"/>
+            </a:solidFill>
+          </a:ln>
+        </p:spPr>
+        <p:style>
+          <a:lnRef idx="2">
+            <a:schemeClr val="accent1">
+              <a:shade val="50000"/>
+            </a:schemeClr>
+          </a:lnRef>
+          <a:fillRef idx="1">
+            <a:schemeClr val="accent1"/>
+          </a:fillRef>
+          <a:effectRef idx="0">
+            <a:schemeClr val="accent1"/>
+          </a:effectRef>
+          <a:fontRef idx="minor">
+            <a:schemeClr val="lt1"/>
+          </a:fontRef>
+        </p:style>
+        <p:txBody>
+          <a:bodyPr rtlCol="0" anchor="ctr"/>
+          <a:lstStyle/>
+          <a:p>
+            <a:pPr algn="ctr"/>
+            <a:r>
+              <a:rPr lang="en-US" sz="3200" dirty="0">
+                <a:solidFill>
+                  <a:schemeClr val="tx1"/>
+                </a:solidFill>
+              </a:rPr>
+              <a:t>Effects</a:t>
+            </a:r>
+            <a:endParaRPr lang="en-US" sz="2800" dirty="0">
+              <a:solidFill>
+                <a:schemeClr val="tx1"/>
+              </a:solidFill>
+            </a:endParaRPr>
+          </a:p>
+        </p:txBody>
+      </p:sp>
+      <p:sp>
+        <p:nvSpPr>
+          <p:cNvPr id="5" name="TextBox 4">
+            <a:extLst>
+              <a:ext uri="{FF2B5EF4-FFF2-40B4-BE49-F238E27FC236}">
+                <a16:creationId xmlns:a16="http://schemas.microsoft.com/office/drawing/2014/main" id="{4E7080AA-523B-4128-A367-8CBC6F626DCC}"/>
+              </a:ext>
+            </a:extLst>
+          </p:cNvPr>
+          <p:cNvSpPr txBox="1"/>
+          <p:nvPr/>
+        </p:nvSpPr>
+        <p:spPr>
+          <a:xfrm>
+            <a:off x="4094456" y="5072874"/>
+            <a:ext cx="3892958" cy="1135054"/>
+          </a:xfrm>
+          <a:prstGeom prst="rect">
+            <a:avLst/>
+          </a:prstGeom>
+          <a:noFill/>
+          <a:ln>
+            <a:noFill/>
+          </a:ln>
+        </p:spPr>
+        <p:txBody>
+          <a:bodyPr wrap="square" rtlCol="0">
+            <a:spAutoFit/>
+          </a:bodyPr>
+          <a:lstStyle/>
+          <a:p>
+            <a:pPr algn="r">
+              <a:lnSpc>
+                <a:spcPct val="80000"/>
+              </a:lnSpc>
+            </a:pPr>
+            <a:r>
+              <a:rPr lang="en-US" sz="2800" dirty="0"/>
+              <a:t>Emissions inventory, Fuel Consumption, Pollution Costs, More…</a:t>
+            </a:r>
+          </a:p>
+        </p:txBody>
+      </p:sp>
+      <p:cxnSp>
+        <p:nvCxnSpPr>
+          <p:cNvPr id="6" name="Straight Arrow Connector 5">
+            <a:extLst>
+              <a:ext uri="{FF2B5EF4-FFF2-40B4-BE49-F238E27FC236}">
+                <a16:creationId xmlns:a16="http://schemas.microsoft.com/office/drawing/2014/main" id="{1F55AC7A-61D6-42B4-B3C4-827F5DEA74C7}"/>
+              </a:ext>
+            </a:extLst>
+          </p:cNvPr>
+          <p:cNvCxnSpPr>
+            <a:cxnSpLocks/>
+          </p:cNvCxnSpPr>
+          <p:nvPr/>
+        </p:nvCxnSpPr>
+        <p:spPr>
+          <a:xfrm>
+            <a:off x="7987414" y="1141551"/>
+            <a:ext cx="462" cy="1449248"/>
+          </a:xfrm>
+          <a:prstGeom prst="straightConnector1">
+            <a:avLst/>
+          </a:prstGeom>
+          <a:ln w="28575">
+            <a:solidFill>
+              <a:schemeClr val="tx1"/>
+            </a:solidFill>
+            <a:tailEnd type="triangle"/>
+          </a:ln>
+        </p:spPr>
+        <p:style>
+          <a:lnRef idx="1">
+            <a:schemeClr val="accent1"/>
+          </a:lnRef>
+          <a:fillRef idx="0">
+            <a:schemeClr val="accent1"/>
+          </a:fillRef>
+          <a:effectRef idx="0">
+            <a:schemeClr val="accent1"/>
+          </a:effectRef>
+          <a:fontRef idx="minor">
+            <a:schemeClr val="tx1"/>
+          </a:fontRef>
+        </p:style>
+      </p:cxnSp>
+      <p:sp>
+        <p:nvSpPr>
+          <p:cNvPr id="7" name="TextBox 6">
+            <a:extLst>
+              <a:ext uri="{FF2B5EF4-FFF2-40B4-BE49-F238E27FC236}">
+                <a16:creationId xmlns:a16="http://schemas.microsoft.com/office/drawing/2014/main" id="{3218E2D3-8C58-45E8-A27F-3448837F7DAA}"/>
+              </a:ext>
+            </a:extLst>
+          </p:cNvPr>
+          <p:cNvSpPr txBox="1"/>
+          <p:nvPr/>
+        </p:nvSpPr>
+        <p:spPr>
+          <a:xfrm>
+            <a:off x="7970480" y="1315011"/>
+            <a:ext cx="2391200" cy="954107"/>
+          </a:xfrm>
+          <a:prstGeom prst="rect">
+            <a:avLst/>
+          </a:prstGeom>
+          <a:noFill/>
+        </p:spPr>
+        <p:txBody>
+          <a:bodyPr wrap="square" rtlCol="0">
+            <a:spAutoFit/>
+          </a:bodyPr>
+          <a:lstStyle/>
+          <a:p>
+            <a:r>
+              <a:rPr lang="en-US" sz="2800" dirty="0"/>
+              <a:t>Vehicle Stock and Use</a:t>
+            </a:r>
+          </a:p>
+        </p:txBody>
+      </p:sp>
+      <p:sp>
+        <p:nvSpPr>
+          <p:cNvPr id="8" name="TextBox 7">
+            <a:extLst>
+              <a:ext uri="{FF2B5EF4-FFF2-40B4-BE49-F238E27FC236}">
+                <a16:creationId xmlns:a16="http://schemas.microsoft.com/office/drawing/2014/main" id="{791841E3-E21F-4286-A661-19D32475608B}"/>
+              </a:ext>
+            </a:extLst>
+          </p:cNvPr>
+          <p:cNvSpPr txBox="1"/>
+          <p:nvPr/>
+        </p:nvSpPr>
+        <p:spPr>
+          <a:xfrm>
+            <a:off x="6044882" y="170511"/>
+            <a:ext cx="3970447" cy="954107"/>
+          </a:xfrm>
+          <a:prstGeom prst="rect">
+            <a:avLst/>
+          </a:prstGeom>
+          <a:noFill/>
+        </p:spPr>
+        <p:txBody>
+          <a:bodyPr wrap="square" rtlCol="0">
+            <a:spAutoFit/>
+          </a:bodyPr>
+          <a:lstStyle/>
+          <a:p>
+            <a:r>
+              <a:rPr lang="en-US" sz="2800" b="1" u="sng" dirty="0"/>
+              <a:t>from Consumer and Producer Modules:</a:t>
+            </a:r>
+          </a:p>
+        </p:txBody>
+      </p:sp>
+      <p:cxnSp>
+        <p:nvCxnSpPr>
+          <p:cNvPr id="9" name="Straight Arrow Connector 8">
+            <a:extLst>
+              <a:ext uri="{FF2B5EF4-FFF2-40B4-BE49-F238E27FC236}">
+                <a16:creationId xmlns:a16="http://schemas.microsoft.com/office/drawing/2014/main" id="{DFFA3DEE-D252-4BA6-9906-AF78800F9A88}"/>
+              </a:ext>
+            </a:extLst>
+          </p:cNvPr>
+          <p:cNvCxnSpPr>
+            <a:cxnSpLocks/>
+          </p:cNvCxnSpPr>
+          <p:nvPr/>
+        </p:nvCxnSpPr>
+        <p:spPr>
+          <a:xfrm>
+            <a:off x="7179269" y="1141551"/>
+            <a:ext cx="0" cy="1466181"/>
+          </a:xfrm>
+          <a:prstGeom prst="straightConnector1">
+            <a:avLst/>
+          </a:prstGeom>
+          <a:ln w="28575">
+            <a:solidFill>
+              <a:schemeClr val="tx1"/>
+            </a:solidFill>
+            <a:tailEnd type="triangle"/>
+          </a:ln>
+        </p:spPr>
+        <p:style>
+          <a:lnRef idx="1">
+            <a:schemeClr val="accent1"/>
+          </a:lnRef>
+          <a:fillRef idx="0">
+            <a:schemeClr val="accent1"/>
+          </a:fillRef>
+          <a:effectRef idx="0">
+            <a:schemeClr val="accent1"/>
+          </a:effectRef>
+          <a:fontRef idx="minor">
+            <a:schemeClr val="tx1"/>
+          </a:fontRef>
+        </p:style>
+      </p:cxnSp>
+      <p:sp>
+        <p:nvSpPr>
+          <p:cNvPr id="10" name="TextBox 9">
+            <a:extLst>
+              <a:ext uri="{FF2B5EF4-FFF2-40B4-BE49-F238E27FC236}">
+                <a16:creationId xmlns:a16="http://schemas.microsoft.com/office/drawing/2014/main" id="{806135D2-0587-4B83-B879-07D9417A945D}"/>
+              </a:ext>
+            </a:extLst>
+          </p:cNvPr>
+          <p:cNvSpPr txBox="1"/>
+          <p:nvPr/>
+        </p:nvSpPr>
+        <p:spPr>
+          <a:xfrm>
+            <a:off x="3787560" y="1334839"/>
+            <a:ext cx="3391709" cy="954107"/>
+          </a:xfrm>
+          <a:prstGeom prst="rect">
+            <a:avLst/>
+          </a:prstGeom>
+          <a:noFill/>
+        </p:spPr>
+        <p:txBody>
+          <a:bodyPr wrap="square" rtlCol="0">
+            <a:spAutoFit/>
+          </a:bodyPr>
+          <a:lstStyle/>
+          <a:p>
+            <a:pPr algn="r"/>
+            <a:r>
+              <a:rPr lang="en-US" sz="2800" dirty="0"/>
+              <a:t>Attributes of Produced Vehicles</a:t>
+            </a:r>
+          </a:p>
+        </p:txBody>
+      </p:sp>
+      <p:cxnSp>
+        <p:nvCxnSpPr>
+          <p:cNvPr id="11" name="Straight Arrow Connector 10">
+            <a:extLst>
+              <a:ext uri="{FF2B5EF4-FFF2-40B4-BE49-F238E27FC236}">
+                <a16:creationId xmlns:a16="http://schemas.microsoft.com/office/drawing/2014/main" id="{74658D8E-878B-4469-ABCE-4FFAFF007241}"/>
+              </a:ext>
+            </a:extLst>
+          </p:cNvPr>
+          <p:cNvCxnSpPr>
+            <a:cxnSpLocks/>
+          </p:cNvCxnSpPr>
+          <p:nvPr/>
+        </p:nvCxnSpPr>
+        <p:spPr>
+          <a:xfrm>
+            <a:off x="2134448" y="3979873"/>
+            <a:ext cx="2784546" cy="0"/>
+          </a:xfrm>
+          <a:prstGeom prst="straightConnector1">
+            <a:avLst/>
+          </a:prstGeom>
+          <a:ln w="28575">
+            <a:solidFill>
+              <a:schemeClr val="tx1"/>
+            </a:solidFill>
+            <a:tailEnd type="triangle"/>
+          </a:ln>
+        </p:spPr>
+        <p:style>
+          <a:lnRef idx="1">
+            <a:schemeClr val="accent1"/>
+          </a:lnRef>
+          <a:fillRef idx="0">
+            <a:schemeClr val="accent1"/>
+          </a:fillRef>
+          <a:effectRef idx="0">
+            <a:schemeClr val="accent1"/>
+          </a:effectRef>
+          <a:fontRef idx="minor">
+            <a:schemeClr val="tx1"/>
+          </a:fontRef>
+        </p:style>
+      </p:cxnSp>
+      <p:sp>
+        <p:nvSpPr>
+          <p:cNvPr id="12" name="TextBox 11">
+            <a:extLst>
+              <a:ext uri="{FF2B5EF4-FFF2-40B4-BE49-F238E27FC236}">
+                <a16:creationId xmlns:a16="http://schemas.microsoft.com/office/drawing/2014/main" id="{5BD09C0C-188D-4141-AE86-1257FC2B0AD1}"/>
+              </a:ext>
+            </a:extLst>
+          </p:cNvPr>
+          <p:cNvSpPr txBox="1"/>
+          <p:nvPr/>
+        </p:nvSpPr>
+        <p:spPr>
+          <a:xfrm>
+            <a:off x="1304618" y="2990334"/>
+            <a:ext cx="3135400" cy="954107"/>
+          </a:xfrm>
+          <a:prstGeom prst="rect">
+            <a:avLst/>
+          </a:prstGeom>
+          <a:noFill/>
+        </p:spPr>
+        <p:txBody>
+          <a:bodyPr wrap="square" rtlCol="0">
+            <a:spAutoFit/>
+          </a:bodyPr>
+          <a:lstStyle/>
+          <a:p>
+            <a:pPr algn="r"/>
+            <a:r>
+              <a:rPr lang="en-US" sz="2800" b="1" u="sng" dirty="0"/>
+              <a:t>Analysis Context Inputs</a:t>
+            </a:r>
+          </a:p>
+        </p:txBody>
+      </p:sp>
+      <p:cxnSp>
+        <p:nvCxnSpPr>
+          <p:cNvPr id="13" name="Straight Arrow Connector 12">
+            <a:extLst>
+              <a:ext uri="{FF2B5EF4-FFF2-40B4-BE49-F238E27FC236}">
+                <a16:creationId xmlns:a16="http://schemas.microsoft.com/office/drawing/2014/main" id="{77724172-5DB1-4E3C-ABC1-220FA36249AE}"/>
+              </a:ext>
+            </a:extLst>
+          </p:cNvPr>
+          <p:cNvCxnSpPr>
+            <a:cxnSpLocks/>
+          </p:cNvCxnSpPr>
+          <p:nvPr/>
+        </p:nvCxnSpPr>
+        <p:spPr>
+          <a:xfrm>
+            <a:off x="7987414" y="4899337"/>
+            <a:ext cx="462" cy="1619996"/>
+          </a:xfrm>
+          <a:prstGeom prst="straightConnector1">
+            <a:avLst/>
+          </a:prstGeom>
+          <a:ln w="28575">
+            <a:solidFill>
+              <a:schemeClr val="tx1"/>
+            </a:solidFill>
+            <a:tailEnd type="triangle"/>
+          </a:ln>
+        </p:spPr>
+        <p:style>
+          <a:lnRef idx="1">
+            <a:schemeClr val="accent1"/>
+          </a:lnRef>
+          <a:fillRef idx="0">
+            <a:schemeClr val="accent1"/>
+          </a:fillRef>
+          <a:effectRef idx="0">
+            <a:schemeClr val="accent1"/>
+          </a:effectRef>
+          <a:fontRef idx="minor">
+            <a:schemeClr val="tx1"/>
+          </a:fontRef>
+        </p:style>
+      </p:cxnSp>
+    </p:spTree>
+    <p:extLst>
+      <p:ext uri="{BB962C8B-B14F-4D97-AF65-F5344CB8AC3E}">
+        <p14:creationId xmlns:p14="http://schemas.microsoft.com/office/powerpoint/2010/main" val="1468936822"/>
+      </p:ext>
+    </p:extLst>
+  </p:cSld>
+  <p:clrMapOvr>
+    <a:masterClrMapping/>
+  </p:clrMapOvr>
+</p:sld>
+</file>
+
+<file path=ppt/slides/slide8.xml><?xml version="1.0" encoding="utf-8"?>
+<p:sld xmlns:a="http://schemas.openxmlformats.org/drawingml/2006/main" xmlns:r="http://schemas.openxmlformats.org/officeDocument/2006/relationships" xmlns:p="http://schemas.openxmlformats.org/presentationml/2006/main">
+  <p:cSld>
+    <p:spTree>
+      <p:nvGrpSpPr>
+        <p:cNvPr id="1" name=""/>
+        <p:cNvGrpSpPr/>
+        <p:nvPr/>
+      </p:nvGrpSpPr>
+      <p:grpSpPr>
+        <a:xfrm>
+          <a:off x="0" y="0"/>
+          <a:ext cx="0" cy="0"/>
+          <a:chOff x="0" y="0"/>
+          <a:chExt cx="0" cy="0"/>
+        </a:xfrm>
+      </p:grpSpPr>
+      <p:sp>
+        <p:nvSpPr>
+          <p:cNvPr id="4" name="Rectangle 3">
+            <a:extLst>
+              <a:ext uri="{FF2B5EF4-FFF2-40B4-BE49-F238E27FC236}">
+                <a16:creationId xmlns:a16="http://schemas.microsoft.com/office/drawing/2014/main" id="{A7F22433-FF77-4424-A770-0747D4FE3E8E}"/>
+              </a:ext>
+            </a:extLst>
+          </p:cNvPr>
+          <p:cNvSpPr/>
+          <p:nvPr/>
+        </p:nvSpPr>
+        <p:spPr>
+          <a:xfrm>
+            <a:off x="6096000" y="1841826"/>
+            <a:ext cx="3037278" cy="2122069"/>
+          </a:xfrm>
+          <a:prstGeom prst="rect">
+            <a:avLst/>
+          </a:prstGeom>
+          <a:solidFill>
+            <a:schemeClr val="accent6">
+              <a:lumMod val="75000"/>
+            </a:schemeClr>
+          </a:solidFill>
+          <a:ln>
+            <a:solidFill>
+              <a:schemeClr val="tx1"/>
+            </a:solidFill>
+          </a:ln>
+        </p:spPr>
+        <p:style>
+          <a:lnRef idx="2">
+            <a:schemeClr val="accent1">
+              <a:shade val="50000"/>
+            </a:schemeClr>
+          </a:lnRef>
+          <a:fillRef idx="1">
+            <a:schemeClr val="accent1"/>
+          </a:fillRef>
+          <a:effectRef idx="0">
+            <a:schemeClr val="accent1"/>
+          </a:effectRef>
+          <a:fontRef idx="minor">
+            <a:schemeClr val="lt1"/>
+          </a:fontRef>
+        </p:style>
+        <p:txBody>
+          <a:bodyPr rtlCol="0" anchor="ctr"/>
+          <a:lstStyle/>
+          <a:p>
+            <a:pPr algn="ctr"/>
+            <a:r>
+              <a:rPr lang="en-US" sz="3200" dirty="0">
+                <a:solidFill>
+                  <a:schemeClr val="bg1"/>
+                </a:solidFill>
+              </a:rPr>
+              <a:t>Policy</a:t>
+            </a:r>
+          </a:p>
+        </p:txBody>
+      </p:sp>
+      <p:cxnSp>
+        <p:nvCxnSpPr>
+          <p:cNvPr id="5" name="Straight Arrow Connector 4">
+            <a:extLst>
+              <a:ext uri="{FF2B5EF4-FFF2-40B4-BE49-F238E27FC236}">
+                <a16:creationId xmlns:a16="http://schemas.microsoft.com/office/drawing/2014/main" id="{7EEBAFD2-98D3-4CA5-8953-EACA6D0EC732}"/>
+              </a:ext>
+            </a:extLst>
+          </p:cNvPr>
+          <p:cNvCxnSpPr>
+            <a:cxnSpLocks/>
+          </p:cNvCxnSpPr>
+          <p:nvPr/>
+        </p:nvCxnSpPr>
+        <p:spPr>
+          <a:xfrm>
+            <a:off x="8186244" y="4000674"/>
+            <a:ext cx="0" cy="1656876"/>
+          </a:xfrm>
+          <a:prstGeom prst="straightConnector1">
+            <a:avLst/>
+          </a:prstGeom>
+          <a:ln w="28575">
+            <a:solidFill>
+              <a:schemeClr val="tx1"/>
+            </a:solidFill>
+            <a:headEnd type="triangle" w="med" len="med"/>
+            <a:tailEnd type="none" w="med" len="med"/>
+          </a:ln>
+        </p:spPr>
+        <p:style>
+          <a:lnRef idx="1">
+            <a:schemeClr val="accent1"/>
+          </a:lnRef>
+          <a:fillRef idx="0">
+            <a:schemeClr val="accent1"/>
+          </a:fillRef>
+          <a:effectRef idx="0">
+            <a:schemeClr val="accent1"/>
+          </a:effectRef>
+          <a:fontRef idx="minor">
+            <a:schemeClr val="tx1"/>
+          </a:fontRef>
+        </p:style>
+      </p:cxnSp>
+      <p:sp>
+        <p:nvSpPr>
+          <p:cNvPr id="6" name="TextBox 5">
+            <a:extLst>
+              <a:ext uri="{FF2B5EF4-FFF2-40B4-BE49-F238E27FC236}">
+                <a16:creationId xmlns:a16="http://schemas.microsoft.com/office/drawing/2014/main" id="{1E860A63-5B18-4A2B-A0F8-88E3125B59FE}"/>
+              </a:ext>
+            </a:extLst>
+          </p:cNvPr>
+          <p:cNvSpPr txBox="1"/>
+          <p:nvPr/>
+        </p:nvSpPr>
+        <p:spPr>
+          <a:xfrm>
+            <a:off x="8186244" y="4138234"/>
+            <a:ext cx="2079252" cy="1384995"/>
+          </a:xfrm>
+          <a:prstGeom prst="rect">
+            <a:avLst/>
+          </a:prstGeom>
+          <a:noFill/>
+        </p:spPr>
+        <p:txBody>
+          <a:bodyPr wrap="square" rtlCol="0">
+            <a:spAutoFit/>
+          </a:bodyPr>
+          <a:lstStyle/>
+          <a:p>
+            <a:r>
+              <a:rPr lang="en-US" sz="2800" dirty="0"/>
+              <a:t>Attributes of Candidate Vehicles</a:t>
+            </a:r>
+          </a:p>
+        </p:txBody>
+      </p:sp>
+      <p:cxnSp>
+        <p:nvCxnSpPr>
+          <p:cNvPr id="7" name="Straight Arrow Connector 6">
+            <a:extLst>
+              <a:ext uri="{FF2B5EF4-FFF2-40B4-BE49-F238E27FC236}">
+                <a16:creationId xmlns:a16="http://schemas.microsoft.com/office/drawing/2014/main" id="{165DD53A-C3CE-4806-996A-0AE9328FE1E8}"/>
+              </a:ext>
+            </a:extLst>
+          </p:cNvPr>
+          <p:cNvCxnSpPr>
+            <a:cxnSpLocks/>
+          </p:cNvCxnSpPr>
+          <p:nvPr/>
+        </p:nvCxnSpPr>
+        <p:spPr>
+          <a:xfrm>
+            <a:off x="7080008" y="4000674"/>
+            <a:ext cx="0" cy="1705859"/>
+          </a:xfrm>
+          <a:prstGeom prst="straightConnector1">
+            <a:avLst/>
+          </a:prstGeom>
+          <a:ln w="28575">
+            <a:solidFill>
+              <a:schemeClr val="tx1"/>
+            </a:solidFill>
+            <a:tailEnd type="triangle"/>
+          </a:ln>
+        </p:spPr>
+        <p:style>
+          <a:lnRef idx="1">
+            <a:schemeClr val="accent1"/>
+          </a:lnRef>
+          <a:fillRef idx="0">
+            <a:schemeClr val="accent1"/>
+          </a:fillRef>
+          <a:effectRef idx="0">
+            <a:schemeClr val="accent1"/>
+          </a:effectRef>
+          <a:fontRef idx="minor">
+            <a:schemeClr val="tx1"/>
+          </a:fontRef>
+        </p:style>
+      </p:cxnSp>
+      <p:sp>
+        <p:nvSpPr>
+          <p:cNvPr id="8" name="TextBox 7">
+            <a:extLst>
+              <a:ext uri="{FF2B5EF4-FFF2-40B4-BE49-F238E27FC236}">
+                <a16:creationId xmlns:a16="http://schemas.microsoft.com/office/drawing/2014/main" id="{AC4BAAF2-F3F5-4F01-9AFD-9AB9D34E40CA}"/>
+              </a:ext>
+            </a:extLst>
+          </p:cNvPr>
+          <p:cNvSpPr txBox="1"/>
+          <p:nvPr/>
+        </p:nvSpPr>
+        <p:spPr>
+          <a:xfrm>
+            <a:off x="5000756" y="4114774"/>
+            <a:ext cx="2079252" cy="1384995"/>
+          </a:xfrm>
+          <a:prstGeom prst="rect">
+            <a:avLst/>
+          </a:prstGeom>
+          <a:noFill/>
+        </p:spPr>
+        <p:txBody>
+          <a:bodyPr wrap="square" rtlCol="0">
+            <a:spAutoFit/>
+          </a:bodyPr>
+          <a:lstStyle/>
+          <a:p>
+            <a:pPr algn="r"/>
+            <a:r>
+              <a:rPr lang="en-US" sz="2800" dirty="0"/>
+              <a:t>Vehicle GHG cert and target values</a:t>
+            </a:r>
+          </a:p>
+        </p:txBody>
+      </p:sp>
+      <p:sp>
+        <p:nvSpPr>
+          <p:cNvPr id="9" name="TextBox 8">
+            <a:extLst>
+              <a:ext uri="{FF2B5EF4-FFF2-40B4-BE49-F238E27FC236}">
+                <a16:creationId xmlns:a16="http://schemas.microsoft.com/office/drawing/2014/main" id="{4D9E72B8-84D0-4DB7-B185-D04D7B03C87F}"/>
+              </a:ext>
+            </a:extLst>
+          </p:cNvPr>
+          <p:cNvSpPr txBox="1"/>
+          <p:nvPr/>
+        </p:nvSpPr>
+        <p:spPr>
+          <a:xfrm>
+            <a:off x="435375" y="4591993"/>
+            <a:ext cx="4187422" cy="523220"/>
+          </a:xfrm>
+          <a:prstGeom prst="rect">
+            <a:avLst/>
+          </a:prstGeom>
+          <a:noFill/>
+        </p:spPr>
+        <p:txBody>
+          <a:bodyPr wrap="square" rtlCol="0">
+            <a:spAutoFit/>
+          </a:bodyPr>
+          <a:lstStyle/>
+          <a:p>
+            <a:r>
+              <a:rPr lang="en-US" sz="2800" b="1" u="sng" dirty="0"/>
+              <a:t>to/from Producer Module:</a:t>
+            </a:r>
+          </a:p>
+        </p:txBody>
+      </p:sp>
+      <p:cxnSp>
+        <p:nvCxnSpPr>
+          <p:cNvPr id="10" name="Straight Arrow Connector 9">
+            <a:extLst>
+              <a:ext uri="{FF2B5EF4-FFF2-40B4-BE49-F238E27FC236}">
+                <a16:creationId xmlns:a16="http://schemas.microsoft.com/office/drawing/2014/main" id="{D2B6BC88-F297-4561-BF99-042D46697AA4}"/>
+              </a:ext>
+            </a:extLst>
+          </p:cNvPr>
+          <p:cNvCxnSpPr>
+            <a:cxnSpLocks/>
+          </p:cNvCxnSpPr>
+          <p:nvPr/>
+        </p:nvCxnSpPr>
+        <p:spPr>
+          <a:xfrm>
+            <a:off x="7503341" y="907257"/>
+            <a:ext cx="0" cy="900702"/>
+          </a:xfrm>
+          <a:prstGeom prst="straightConnector1">
+            <a:avLst/>
+          </a:prstGeom>
+          <a:ln w="28575">
+            <a:solidFill>
+              <a:schemeClr val="tx1"/>
+            </a:solidFill>
+            <a:tailEnd type="triangle"/>
+          </a:ln>
+        </p:spPr>
+        <p:style>
+          <a:lnRef idx="1">
+            <a:schemeClr val="accent1"/>
+          </a:lnRef>
+          <a:fillRef idx="0">
+            <a:schemeClr val="accent1"/>
+          </a:fillRef>
+          <a:effectRef idx="0">
+            <a:schemeClr val="accent1"/>
+          </a:effectRef>
+          <a:fontRef idx="minor">
+            <a:schemeClr val="tx1"/>
+          </a:fontRef>
+        </p:style>
+      </p:cxnSp>
+      <p:sp>
+        <p:nvSpPr>
+          <p:cNvPr id="11" name="TextBox 10">
+            <a:extLst>
+              <a:ext uri="{FF2B5EF4-FFF2-40B4-BE49-F238E27FC236}">
+                <a16:creationId xmlns:a16="http://schemas.microsoft.com/office/drawing/2014/main" id="{FFD2649D-AF57-4F99-8A69-D29169AEBBAA}"/>
+              </a:ext>
+            </a:extLst>
+          </p:cNvPr>
+          <p:cNvSpPr txBox="1"/>
+          <p:nvPr/>
+        </p:nvSpPr>
+        <p:spPr>
+          <a:xfrm>
+            <a:off x="6100000" y="384037"/>
+            <a:ext cx="3045055" cy="523220"/>
+          </a:xfrm>
+          <a:prstGeom prst="rect">
+            <a:avLst/>
+          </a:prstGeom>
+          <a:noFill/>
+        </p:spPr>
+        <p:txBody>
+          <a:bodyPr wrap="square" rtlCol="0">
+            <a:spAutoFit/>
+          </a:bodyPr>
+          <a:lstStyle/>
+          <a:p>
+            <a:pPr algn="r"/>
+            <a:r>
+              <a:rPr lang="en-US" sz="2800" b="1" u="sng" dirty="0"/>
+              <a:t>Policy Alternatives</a:t>
+            </a:r>
+          </a:p>
+        </p:txBody>
+      </p:sp>
+    </p:spTree>
+    <p:extLst>
+      <p:ext uri="{BB962C8B-B14F-4D97-AF65-F5344CB8AC3E}">
+        <p14:creationId xmlns:p14="http://schemas.microsoft.com/office/powerpoint/2010/main" val="3584262926"/>
       </p:ext>
     </p:extLst>
   </p:cSld>

</xml_diff>

<commit_message>
documentation updates COB 9_2
</commit_message>
<xml_diff>
--- a/doc/source/_static/raw_figures.pptx
+++ b/doc/source/_static/raw_figures.pptx
@@ -978,8 +978,8 @@
           <a:solidFill>
             <a:schemeClr val="tx1"/>
           </a:solidFill>
-          <a:headEnd type="none" w="med" len="med"/>
-          <a:tailEnd type="triangle" w="med" len="med"/>
+          <a:headEnd type="none" w="lg" len="lg"/>
+          <a:tailEnd type="triangle" w="lg" len="lg"/>
         </a:ln>
       </dgm:spPr>
       <dgm:t>
@@ -1052,8 +1052,8 @@
           <a:solidFill>
             <a:schemeClr val="tx1"/>
           </a:solidFill>
-          <a:headEnd type="none" w="med" len="med"/>
-          <a:tailEnd type="triangle" w="med" len="med"/>
+          <a:headEnd type="none" w="lg" len="lg"/>
+          <a:tailEnd type="triangle" w="lg" len="lg"/>
         </a:ln>
       </dgm:spPr>
       <dgm:t>
@@ -1122,8 +1122,8 @@
           <a:solidFill>
             <a:schemeClr val="tx1"/>
           </a:solidFill>
-          <a:headEnd type="none" w="med" len="med"/>
-          <a:tailEnd type="triangle" w="med" len="med"/>
+          <a:headEnd type="none" w="lg" len="lg"/>
+          <a:tailEnd type="triangle" w="lg" len="lg"/>
         </a:ln>
       </dgm:spPr>
       <dgm:t>
@@ -1192,8 +1192,8 @@
           <a:solidFill>
             <a:schemeClr val="tx1"/>
           </a:solidFill>
-          <a:headEnd type="none" w="med" len="med"/>
-          <a:tailEnd type="triangle" w="med" len="med"/>
+          <a:headEnd type="none" w="lg" len="lg"/>
+          <a:tailEnd type="triangle" w="lg" len="lg"/>
         </a:ln>
       </dgm:spPr>
       <dgm:t>
@@ -1262,8 +1262,8 @@
           <a:solidFill>
             <a:schemeClr val="tx1"/>
           </a:solidFill>
-          <a:headEnd type="none" w="med" len="med"/>
-          <a:tailEnd type="triangle" w="med" len="med"/>
+          <a:headEnd type="none" w="lg" len="lg"/>
+          <a:tailEnd type="triangle" w="lg" len="lg"/>
         </a:ln>
       </dgm:spPr>
       <dgm:t>
@@ -1332,8 +1332,8 @@
           <a:solidFill>
             <a:schemeClr val="tx1"/>
           </a:solidFill>
-          <a:headEnd type="none" w="med" len="med"/>
-          <a:tailEnd type="triangle" w="med" len="med"/>
+          <a:headEnd type="none" w="lg" len="lg"/>
+          <a:tailEnd type="triangle" w="lg" len="lg"/>
         </a:ln>
       </dgm:spPr>
       <dgm:t>
@@ -1753,8 +1753,8 @@
           </a:solidFill>
           <a:prstDash val="solid"/>
           <a:miter lim="800000"/>
-          <a:headEnd type="none" w="med" len="med"/>
-          <a:tailEnd type="triangle" w="med" len="med"/>
+          <a:headEnd type="none" w="lg" len="lg"/>
+          <a:tailEnd type="triangle" w="lg" len="lg"/>
         </a:ln>
         <a:effectLst/>
       </dsp:spPr>
@@ -1813,8 +1813,8 @@
           </a:solidFill>
           <a:prstDash val="solid"/>
           <a:miter lim="800000"/>
-          <a:headEnd type="none" w="med" len="med"/>
-          <a:tailEnd type="triangle" w="med" len="med"/>
+          <a:headEnd type="none" w="lg" len="lg"/>
+          <a:tailEnd type="triangle" w="lg" len="lg"/>
         </a:ln>
         <a:effectLst/>
       </dsp:spPr>
@@ -1873,8 +1873,8 @@
           </a:solidFill>
           <a:prstDash val="solid"/>
           <a:miter lim="800000"/>
-          <a:headEnd type="none" w="med" len="med"/>
-          <a:tailEnd type="triangle" w="med" len="med"/>
+          <a:headEnd type="none" w="lg" len="lg"/>
+          <a:tailEnd type="triangle" w="lg" len="lg"/>
         </a:ln>
         <a:effectLst/>
       </dsp:spPr>
@@ -1933,8 +1933,8 @@
           </a:solidFill>
           <a:prstDash val="solid"/>
           <a:miter lim="800000"/>
-          <a:headEnd type="none" w="med" len="med"/>
-          <a:tailEnd type="triangle" w="med" len="med"/>
+          <a:headEnd type="none" w="lg" len="lg"/>
+          <a:tailEnd type="triangle" w="lg" len="lg"/>
         </a:ln>
         <a:effectLst/>
       </dsp:spPr>
@@ -1993,8 +1993,8 @@
           </a:solidFill>
           <a:prstDash val="solid"/>
           <a:miter lim="800000"/>
-          <a:headEnd type="none" w="med" len="med"/>
-          <a:tailEnd type="triangle" w="med" len="med"/>
+          <a:headEnd type="none" w="lg" len="lg"/>
+          <a:tailEnd type="triangle" w="lg" len="lg"/>
         </a:ln>
         <a:effectLst/>
       </dsp:spPr>
@@ -2053,8 +2053,8 @@
           </a:solidFill>
           <a:prstDash val="solid"/>
           <a:miter lim="800000"/>
-          <a:headEnd type="none" w="med" len="med"/>
-          <a:tailEnd type="triangle" w="med" len="med"/>
+          <a:headEnd type="none" w="lg" len="lg"/>
+          <a:tailEnd type="triangle" w="lg" len="lg"/>
         </a:ln>
         <a:effectLst/>
       </dsp:spPr>
@@ -4833,7 +4833,7 @@
           <a:p>
             <a:fld id="{7FCC5362-11BE-4886-978B-F647D810DE1A}" type="datetimeFigureOut">
               <a:rPr lang="en-US" smtClean="0"/>
-              <a:t>8/13/2021</a:t>
+              <a:t>9/2/2021</a:t>
             </a:fld>
             <a:endParaRPr lang="en-US"/>
           </a:p>
@@ -6140,7 +6140,7 @@
           <a:p>
             <a:fld id="{E82AF7A9-B7DD-4441-9529-7051C501C076}" type="datetimeFigureOut">
               <a:rPr lang="en-US" smtClean="0"/>
-              <a:t>8/13/2021</a:t>
+              <a:t>9/2/2021</a:t>
             </a:fld>
             <a:endParaRPr lang="en-US"/>
           </a:p>
@@ -6338,7 +6338,7 @@
           <a:p>
             <a:fld id="{E82AF7A9-B7DD-4441-9529-7051C501C076}" type="datetimeFigureOut">
               <a:rPr lang="en-US" smtClean="0"/>
-              <a:t>8/13/2021</a:t>
+              <a:t>9/2/2021</a:t>
             </a:fld>
             <a:endParaRPr lang="en-US"/>
           </a:p>
@@ -6546,7 +6546,7 @@
           <a:p>
             <a:fld id="{E82AF7A9-B7DD-4441-9529-7051C501C076}" type="datetimeFigureOut">
               <a:rPr lang="en-US" smtClean="0"/>
-              <a:t>8/13/2021</a:t>
+              <a:t>9/2/2021</a:t>
             </a:fld>
             <a:endParaRPr lang="en-US"/>
           </a:p>
@@ -6744,7 +6744,7 @@
           <a:p>
             <a:fld id="{E82AF7A9-B7DD-4441-9529-7051C501C076}" type="datetimeFigureOut">
               <a:rPr lang="en-US" smtClean="0"/>
-              <a:t>8/13/2021</a:t>
+              <a:t>9/2/2021</a:t>
             </a:fld>
             <a:endParaRPr lang="en-US"/>
           </a:p>
@@ -7019,7 +7019,7 @@
           <a:p>
             <a:fld id="{E82AF7A9-B7DD-4441-9529-7051C501C076}" type="datetimeFigureOut">
               <a:rPr lang="en-US" smtClean="0"/>
-              <a:t>8/13/2021</a:t>
+              <a:t>9/2/2021</a:t>
             </a:fld>
             <a:endParaRPr lang="en-US"/>
           </a:p>
@@ -7284,7 +7284,7 @@
           <a:p>
             <a:fld id="{E82AF7A9-B7DD-4441-9529-7051C501C076}" type="datetimeFigureOut">
               <a:rPr lang="en-US" smtClean="0"/>
-              <a:t>8/13/2021</a:t>
+              <a:t>9/2/2021</a:t>
             </a:fld>
             <a:endParaRPr lang="en-US"/>
           </a:p>
@@ -7696,7 +7696,7 @@
           <a:p>
             <a:fld id="{E82AF7A9-B7DD-4441-9529-7051C501C076}" type="datetimeFigureOut">
               <a:rPr lang="en-US" smtClean="0"/>
-              <a:t>8/13/2021</a:t>
+              <a:t>9/2/2021</a:t>
             </a:fld>
             <a:endParaRPr lang="en-US"/>
           </a:p>
@@ -7837,7 +7837,7 @@
           <a:p>
             <a:fld id="{E82AF7A9-B7DD-4441-9529-7051C501C076}" type="datetimeFigureOut">
               <a:rPr lang="en-US" smtClean="0"/>
-              <a:t>8/13/2021</a:t>
+              <a:t>9/2/2021</a:t>
             </a:fld>
             <a:endParaRPr lang="en-US"/>
           </a:p>
@@ -7950,7 +7950,7 @@
           <a:p>
             <a:fld id="{E82AF7A9-B7DD-4441-9529-7051C501C076}" type="datetimeFigureOut">
               <a:rPr lang="en-US" smtClean="0"/>
-              <a:t>8/13/2021</a:t>
+              <a:t>9/2/2021</a:t>
             </a:fld>
             <a:endParaRPr lang="en-US"/>
           </a:p>
@@ -8261,7 +8261,7 @@
           <a:p>
             <a:fld id="{E82AF7A9-B7DD-4441-9529-7051C501C076}" type="datetimeFigureOut">
               <a:rPr lang="en-US" smtClean="0"/>
-              <a:t>8/13/2021</a:t>
+              <a:t>9/2/2021</a:t>
             </a:fld>
             <a:endParaRPr lang="en-US"/>
           </a:p>
@@ -8549,7 +8549,7 @@
           <a:p>
             <a:fld id="{E82AF7A9-B7DD-4441-9529-7051C501C076}" type="datetimeFigureOut">
               <a:rPr lang="en-US" smtClean="0"/>
-              <a:t>8/13/2021</a:t>
+              <a:t>9/2/2021</a:t>
             </a:fld>
             <a:endParaRPr lang="en-US"/>
           </a:p>
@@ -8790,7 +8790,7 @@
           <a:p>
             <a:fld id="{E82AF7A9-B7DD-4441-9529-7051C501C076}" type="datetimeFigureOut">
               <a:rPr lang="en-US" smtClean="0"/>
-              <a:t>8/13/2021</a:t>
+              <a:t>9/2/2021</a:t>
             </a:fld>
             <a:endParaRPr lang="en-US"/>
           </a:p>
@@ -18518,7 +18518,7 @@
           <p:nvPr>
             <p:extLst>
               <p:ext uri="{D42A27DB-BD31-4B8C-83A1-F6EECF244321}">
-                <p14:modId xmlns:p14="http://schemas.microsoft.com/office/powerpoint/2010/main" val="1888142333"/>
+                <p14:modId xmlns:p14="http://schemas.microsoft.com/office/powerpoint/2010/main" val="3517361539"/>
               </p:ext>
             </p:extLst>
           </p:nvPr>
@@ -18561,8 +18561,8 @@
               <a:schemeClr val="tx1"/>
             </a:solidFill>
             <a:prstDash val="dash"/>
-            <a:headEnd type="triangle" w="med" len="med"/>
-            <a:tailEnd type="triangle" w="med" len="med"/>
+            <a:headEnd type="triangle" w="lg" len="lg"/>
+            <a:tailEnd type="triangle" w="lg" len="lg"/>
           </a:ln>
         </p:spPr>
         <p:style>
@@ -18620,8 +18620,8 @@
               <a:schemeClr val="tx1"/>
             </a:solidFill>
             <a:prstDash val="dash"/>
-            <a:headEnd type="triangle" w="med" len="med"/>
-            <a:tailEnd type="triangle" w="med" len="med"/>
+            <a:headEnd type="triangle" w="lg" len="lg"/>
+            <a:tailEnd type="triangle" w="lg" len="lg"/>
           </a:ln>
         </p:spPr>
         <p:style>
@@ -18695,7 +18695,7 @@
         </p:nvSpPr>
         <p:spPr>
           <a:xfrm>
-            <a:off x="2629052" y="1694937"/>
+            <a:off x="2981596" y="1694937"/>
             <a:ext cx="3933933" cy="3104710"/>
           </a:xfrm>
           <a:prstGeom prst="rect">
@@ -18760,7 +18760,7 @@
         </p:nvCxnSpPr>
         <p:spPr>
           <a:xfrm>
-            <a:off x="6575534" y="3063436"/>
+            <a:off x="6928078" y="3063436"/>
             <a:ext cx="3770733" cy="0"/>
           </a:xfrm>
           <a:prstGeom prst="straightConnector1">
@@ -18770,7 +18770,7 @@
             <a:solidFill>
               <a:schemeClr val="tx1"/>
             </a:solidFill>
-            <a:tailEnd type="triangle"/>
+            <a:tailEnd type="triangle" w="lg" len="lg"/>
           </a:ln>
         </p:spPr>
         <p:style>
@@ -18804,7 +18804,7 @@
         </p:nvCxnSpPr>
         <p:spPr>
           <a:xfrm>
-            <a:off x="6575534" y="3889954"/>
+            <a:off x="6928078" y="3889954"/>
             <a:ext cx="3770733" cy="0"/>
           </a:xfrm>
           <a:prstGeom prst="straightConnector1">
@@ -18814,8 +18814,8 @@
             <a:solidFill>
               <a:schemeClr val="tx1"/>
             </a:solidFill>
-            <a:headEnd type="triangle" w="med" len="med"/>
-            <a:tailEnd type="none" w="med" len="med"/>
+            <a:headEnd type="triangle" w="lg" len="lg"/>
+            <a:tailEnd type="none" w="lg" len="lg"/>
           </a:ln>
         </p:spPr>
         <p:style>
@@ -18847,7 +18847,7 @@
         </p:nvSpPr>
         <p:spPr>
           <a:xfrm>
-            <a:off x="3204146" y="5150036"/>
+            <a:off x="3556690" y="5072917"/>
             <a:ext cx="1264830" cy="954107"/>
           </a:xfrm>
           <a:prstGeom prst="rect">
@@ -18884,7 +18884,7 @@
         </p:nvCxnSpPr>
         <p:spPr>
           <a:xfrm>
-            <a:off x="3204146" y="4821863"/>
+            <a:off x="3556690" y="4810846"/>
             <a:ext cx="0" cy="1284584"/>
           </a:xfrm>
           <a:prstGeom prst="straightConnector1">
@@ -18894,7 +18894,7 @@
             <a:solidFill>
               <a:schemeClr val="tx1"/>
             </a:solidFill>
-            <a:tailEnd type="triangle"/>
+            <a:tailEnd type="triangle" w="lg" len="lg"/>
           </a:ln>
         </p:spPr>
         <p:style>
@@ -18928,7 +18928,7 @@
         </p:nvCxnSpPr>
         <p:spPr>
           <a:xfrm>
-            <a:off x="4596018" y="803287"/>
+            <a:off x="4948562" y="803287"/>
             <a:ext cx="0" cy="891650"/>
           </a:xfrm>
           <a:prstGeom prst="straightConnector1">
@@ -18938,7 +18938,7 @@
             <a:solidFill>
               <a:schemeClr val="tx1"/>
             </a:solidFill>
-            <a:tailEnd type="triangle"/>
+            <a:tailEnd type="triangle" w="lg" len="lg"/>
           </a:ln>
         </p:spPr>
         <p:style>
@@ -18970,7 +18970,7 @@
         </p:nvSpPr>
         <p:spPr>
           <a:xfrm>
-            <a:off x="7006676" y="1880088"/>
+            <a:off x="7359220" y="1880088"/>
             <a:ext cx="4174546" cy="523220"/>
           </a:xfrm>
           <a:prstGeom prst="rect">
@@ -19006,7 +19006,7 @@
         </p:nvSpPr>
         <p:spPr>
           <a:xfrm>
-            <a:off x="2437944" y="280067"/>
+            <a:off x="2790488" y="280067"/>
             <a:ext cx="4568732" cy="523220"/>
           </a:xfrm>
           <a:prstGeom prst="rect">
@@ -19042,7 +19042,7 @@
         </p:nvSpPr>
         <p:spPr>
           <a:xfrm>
-            <a:off x="5370435" y="5150035"/>
+            <a:off x="5722979" y="5072916"/>
             <a:ext cx="1264818" cy="954107"/>
           </a:xfrm>
           <a:prstGeom prst="rect">
@@ -19080,7 +19080,7 @@
         </p:nvSpPr>
         <p:spPr>
           <a:xfrm>
-            <a:off x="6786521" y="2599600"/>
+            <a:off x="7139065" y="2599600"/>
             <a:ext cx="3009352" cy="523220"/>
           </a:xfrm>
           <a:prstGeom prst="rect">
@@ -19118,7 +19118,7 @@
         </p:nvSpPr>
         <p:spPr>
           <a:xfrm>
-            <a:off x="6786521" y="3432052"/>
+            <a:off x="7139065" y="3432052"/>
             <a:ext cx="3855760" cy="954107"/>
           </a:xfrm>
           <a:prstGeom prst="rect">
@@ -19158,7 +19158,7 @@
         </p:nvCxnSpPr>
         <p:spPr>
           <a:xfrm>
-            <a:off x="5370435" y="4821863"/>
+            <a:off x="5722979" y="4799829"/>
             <a:ext cx="0" cy="1284584"/>
           </a:xfrm>
           <a:prstGeom prst="straightConnector1">
@@ -19168,7 +19168,7 @@
             <a:solidFill>
               <a:schemeClr val="tx1"/>
             </a:solidFill>
-            <a:tailEnd type="triangle"/>
+            <a:tailEnd type="triangle" w="lg" len="lg"/>
           </a:ln>
         </p:spPr>
         <p:style>
@@ -19186,6 +19186,42 @@
           </a:fontRef>
         </p:style>
       </p:cxnSp>
+      <p:sp>
+        <p:nvSpPr>
+          <p:cNvPr id="14" name="TextBox 13">
+            <a:extLst>
+              <a:ext uri="{FF2B5EF4-FFF2-40B4-BE49-F238E27FC236}">
+                <a16:creationId xmlns:a16="http://schemas.microsoft.com/office/drawing/2014/main" id="{51BED4B2-28D6-405D-9022-647FD3FF8B24}"/>
+              </a:ext>
+            </a:extLst>
+          </p:cNvPr>
+          <p:cNvSpPr txBox="1"/>
+          <p:nvPr/>
+        </p:nvSpPr>
+        <p:spPr>
+          <a:xfrm>
+            <a:off x="-117698" y="5110942"/>
+            <a:ext cx="4174546" cy="523220"/>
+          </a:xfrm>
+          <a:prstGeom prst="rect">
+            <a:avLst/>
+          </a:prstGeom>
+          <a:noFill/>
+        </p:spPr>
+        <p:txBody>
+          <a:bodyPr wrap="square" rtlCol="0">
+            <a:spAutoFit/>
+          </a:bodyPr>
+          <a:lstStyle/>
+          <a:p>
+            <a:pPr algn="ctr"/>
+            <a:r>
+              <a:rPr lang="en-US" sz="2800" b="1" u="sng" dirty="0"/>
+              <a:t>to Effects Module:</a:t>
+            </a:r>
+          </a:p>
+        </p:txBody>
+      </p:sp>
     </p:spTree>
     <p:extLst>
       <p:ext uri="{BB962C8B-B14F-4D97-AF65-F5344CB8AC3E}">
@@ -19754,7 +19790,7 @@
             <a:solidFill>
               <a:schemeClr val="tx1"/>
             </a:solidFill>
-            <a:tailEnd type="triangle"/>
+            <a:tailEnd type="triangle" w="lg" len="lg"/>
           </a:ln>
         </p:spPr>
         <p:style>
@@ -19798,8 +19834,8 @@
             <a:solidFill>
               <a:schemeClr val="tx1"/>
             </a:solidFill>
-            <a:headEnd type="triangle" w="med" len="med"/>
-            <a:tailEnd type="none" w="med" len="med"/>
+            <a:headEnd type="triangle" w="lg" len="lg"/>
+            <a:tailEnd type="none" w="lg" len="lg"/>
           </a:ln>
         </p:spPr>
         <p:style>
@@ -19914,7 +19950,7 @@
             <a:solidFill>
               <a:schemeClr val="tx1"/>
             </a:solidFill>
-            <a:tailEnd type="triangle"/>
+            <a:tailEnd type="triangle" w="lg" len="lg"/>
           </a:ln>
         </p:spPr>
         <p:style>
@@ -20029,7 +20065,7 @@
             <a:solidFill>
               <a:schemeClr val="tx1"/>
             </a:solidFill>
-            <a:tailEnd type="triangle"/>
+            <a:tailEnd type="triangle" w="lg" len="lg"/>
           </a:ln>
         </p:spPr>
         <p:style>
@@ -20097,7 +20133,7 @@
         </p:nvSpPr>
         <p:spPr>
           <a:xfrm>
-            <a:off x="1116690" y="2441744"/>
+            <a:off x="863299" y="2640050"/>
             <a:ext cx="4343617" cy="523220"/>
           </a:xfrm>
           <a:prstGeom prst="rect">
@@ -20211,7 +20247,7 @@
         </p:nvCxnSpPr>
         <p:spPr>
           <a:xfrm>
-            <a:off x="1748239" y="4625501"/>
+            <a:off x="1803324" y="4625501"/>
             <a:ext cx="4113243" cy="0"/>
           </a:xfrm>
           <a:prstGeom prst="straightConnector1">
@@ -20221,8 +20257,8 @@
             <a:solidFill>
               <a:schemeClr val="tx1"/>
             </a:solidFill>
-            <a:headEnd type="triangle" w="med" len="med"/>
-            <a:tailEnd type="none" w="med" len="med"/>
+            <a:headEnd type="triangle" w="lg" len="lg"/>
+            <a:tailEnd type="none" w="lg" len="lg"/>
           </a:ln>
         </p:spPr>
         <p:style>
@@ -20267,7 +20303,7 @@
               <a:schemeClr val="tx1"/>
             </a:solidFill>
             <a:headEnd type="none" w="med" len="med"/>
-            <a:tailEnd type="triangle" w="med" len="med"/>
+            <a:tailEnd type="triangle" w="lg" len="lg"/>
           </a:ln>
         </p:spPr>
         <p:style>
@@ -20285,6 +20321,42 @@
           </a:fontRef>
         </p:style>
       </p:cxnSp>
+      <p:sp>
+        <p:nvSpPr>
+          <p:cNvPr id="19" name="TextBox 18">
+            <a:extLst>
+              <a:ext uri="{FF2B5EF4-FFF2-40B4-BE49-F238E27FC236}">
+                <a16:creationId xmlns:a16="http://schemas.microsoft.com/office/drawing/2014/main" id="{72080ABB-8B24-4371-9A6F-9CE4DF942C3E}"/>
+              </a:ext>
+            </a:extLst>
+          </p:cNvPr>
+          <p:cNvSpPr txBox="1"/>
+          <p:nvPr/>
+        </p:nvSpPr>
+        <p:spPr>
+          <a:xfrm>
+            <a:off x="2581434" y="5645716"/>
+            <a:ext cx="4174546" cy="523220"/>
+          </a:xfrm>
+          <a:prstGeom prst="rect">
+            <a:avLst/>
+          </a:prstGeom>
+          <a:noFill/>
+        </p:spPr>
+        <p:txBody>
+          <a:bodyPr wrap="square" rtlCol="0">
+            <a:spAutoFit/>
+          </a:bodyPr>
+          <a:lstStyle/>
+          <a:p>
+            <a:pPr algn="ctr"/>
+            <a:r>
+              <a:rPr lang="en-US" sz="2800" b="1" u="sng" dirty="0"/>
+              <a:t>to Effects Module:</a:t>
+            </a:r>
+          </a:p>
+        </p:txBody>
+      </p:sp>
     </p:spTree>
     <p:extLst>
       <p:ext uri="{BB962C8B-B14F-4D97-AF65-F5344CB8AC3E}">
@@ -20452,7 +20524,8 @@
             <a:solidFill>
               <a:schemeClr val="tx1"/>
             </a:solidFill>
-            <a:tailEnd type="triangle"/>
+            <a:headEnd w="lg" len="lg"/>
+            <a:tailEnd type="triangle" w="lg" len="lg"/>
           </a:ln>
         </p:spPr>
         <p:style>
@@ -20566,7 +20639,8 @@
             <a:solidFill>
               <a:schemeClr val="tx1"/>
             </a:solidFill>
-            <a:tailEnd type="triangle"/>
+            <a:headEnd w="lg" len="lg"/>
+            <a:tailEnd type="triangle" w="lg" len="lg"/>
           </a:ln>
         </p:spPr>
         <p:style>
@@ -20646,7 +20720,8 @@
             <a:solidFill>
               <a:schemeClr val="tx1"/>
             </a:solidFill>
-            <a:tailEnd type="triangle"/>
+            <a:headEnd w="lg" len="lg"/>
+            <a:tailEnd type="triangle" w="lg" len="lg"/>
           </a:ln>
         </p:spPr>
         <p:style>
@@ -20726,7 +20801,8 @@
             <a:solidFill>
               <a:schemeClr val="tx1"/>
             </a:solidFill>
-            <a:tailEnd type="triangle"/>
+            <a:headEnd w="lg" len="lg"/>
+            <a:tailEnd type="triangle" w="lg" len="lg"/>
           </a:ln>
         </p:spPr>
         <p:style>
@@ -20863,8 +20939,8 @@
             <a:solidFill>
               <a:schemeClr val="tx1"/>
             </a:solidFill>
-            <a:headEnd type="triangle" w="med" len="med"/>
-            <a:tailEnd type="none" w="med" len="med"/>
+            <a:headEnd type="triangle" w="lg" len="lg"/>
+            <a:tailEnd type="none" w="lg" len="lg"/>
           </a:ln>
         </p:spPr>
         <p:style>
@@ -20933,7 +21009,7 @@
         </p:nvCxnSpPr>
         <p:spPr>
           <a:xfrm>
-            <a:off x="7080008" y="4000674"/>
+            <a:off x="7080008" y="3967623"/>
             <a:ext cx="0" cy="1705859"/>
           </a:xfrm>
           <a:prstGeom prst="straightConnector1">
@@ -20943,7 +21019,8 @@
             <a:solidFill>
               <a:schemeClr val="tx1"/>
             </a:solidFill>
-            <a:tailEnd type="triangle"/>
+            <a:headEnd w="lg" len="lg"/>
+            <a:tailEnd type="triangle" w="lg" len="lg"/>
           </a:ln>
         </p:spPr>
         <p:style>
@@ -21011,7 +21088,7 @@
         </p:nvSpPr>
         <p:spPr>
           <a:xfrm>
-            <a:off x="435375" y="4591993"/>
+            <a:off x="677749" y="4591993"/>
             <a:ext cx="4187422" cy="523220"/>
           </a:xfrm>
           <a:prstGeom prst="rect">
@@ -21058,7 +21135,8 @@
             <a:solidFill>
               <a:schemeClr val="tx1"/>
             </a:solidFill>
-            <a:tailEnd type="triangle"/>
+            <a:headEnd w="lg" len="lg"/>
+            <a:tailEnd type="triangle" w="lg" len="lg"/>
           </a:ln>
         </p:spPr>
         <p:style>

</xml_diff>

<commit_message>
updates to market class documentation
</commit_message>
<xml_diff>
--- a/doc/source/_static/raw_figures.pptx
+++ b/doc/source/_static/raw_figures.pptx
@@ -5,7 +5,7 @@
     <p:sldMasterId id="2147483648" r:id="rId1"/>
   </p:sldMasterIdLst>
   <p:notesMasterIdLst>
-    <p:notesMasterId r:id="rId11"/>
+    <p:notesMasterId r:id="rId12"/>
   </p:notesMasterIdLst>
   <p:sldIdLst>
     <p:sldId id="257" r:id="rId2"/>
@@ -17,6 +17,7 @@
     <p:sldId id="260" r:id="rId8"/>
     <p:sldId id="261" r:id="rId9"/>
     <p:sldId id="262" r:id="rId10"/>
+    <p:sldId id="266" r:id="rId11"/>
   </p:sldIdLst>
   <p:sldSz cx="12192000" cy="6858000"/>
   <p:notesSz cx="6858000" cy="9144000"/>
@@ -4833,7 +4834,7 @@
           <a:p>
             <a:fld id="{7FCC5362-11BE-4886-978B-F647D810DE1A}" type="datetimeFigureOut">
               <a:rPr lang="en-US" smtClean="0"/>
-              <a:t>9/13/2021</a:t>
+              <a:t>9/15/2021</a:t>
             </a:fld>
             <a:endParaRPr lang="en-US"/>
           </a:p>
@@ -6146,7 +6147,7 @@
           <a:p>
             <a:fld id="{E82AF7A9-B7DD-4441-9529-7051C501C076}" type="datetimeFigureOut">
               <a:rPr lang="en-US" smtClean="0"/>
-              <a:t>9/13/2021</a:t>
+              <a:t>9/15/2021</a:t>
             </a:fld>
             <a:endParaRPr lang="en-US"/>
           </a:p>
@@ -6344,7 +6345,7 @@
           <a:p>
             <a:fld id="{E82AF7A9-B7DD-4441-9529-7051C501C076}" type="datetimeFigureOut">
               <a:rPr lang="en-US" smtClean="0"/>
-              <a:t>9/13/2021</a:t>
+              <a:t>9/15/2021</a:t>
             </a:fld>
             <a:endParaRPr lang="en-US"/>
           </a:p>
@@ -6552,7 +6553,7 @@
           <a:p>
             <a:fld id="{E82AF7A9-B7DD-4441-9529-7051C501C076}" type="datetimeFigureOut">
               <a:rPr lang="en-US" smtClean="0"/>
-              <a:t>9/13/2021</a:t>
+              <a:t>9/15/2021</a:t>
             </a:fld>
             <a:endParaRPr lang="en-US"/>
           </a:p>
@@ -6750,7 +6751,7 @@
           <a:p>
             <a:fld id="{E82AF7A9-B7DD-4441-9529-7051C501C076}" type="datetimeFigureOut">
               <a:rPr lang="en-US" smtClean="0"/>
-              <a:t>9/13/2021</a:t>
+              <a:t>9/15/2021</a:t>
             </a:fld>
             <a:endParaRPr lang="en-US"/>
           </a:p>
@@ -7025,7 +7026,7 @@
           <a:p>
             <a:fld id="{E82AF7A9-B7DD-4441-9529-7051C501C076}" type="datetimeFigureOut">
               <a:rPr lang="en-US" smtClean="0"/>
-              <a:t>9/13/2021</a:t>
+              <a:t>9/15/2021</a:t>
             </a:fld>
             <a:endParaRPr lang="en-US"/>
           </a:p>
@@ -7290,7 +7291,7 @@
           <a:p>
             <a:fld id="{E82AF7A9-B7DD-4441-9529-7051C501C076}" type="datetimeFigureOut">
               <a:rPr lang="en-US" smtClean="0"/>
-              <a:t>9/13/2021</a:t>
+              <a:t>9/15/2021</a:t>
             </a:fld>
             <a:endParaRPr lang="en-US"/>
           </a:p>
@@ -7702,7 +7703,7 @@
           <a:p>
             <a:fld id="{E82AF7A9-B7DD-4441-9529-7051C501C076}" type="datetimeFigureOut">
               <a:rPr lang="en-US" smtClean="0"/>
-              <a:t>9/13/2021</a:t>
+              <a:t>9/15/2021</a:t>
             </a:fld>
             <a:endParaRPr lang="en-US"/>
           </a:p>
@@ -7843,7 +7844,7 @@
           <a:p>
             <a:fld id="{E82AF7A9-B7DD-4441-9529-7051C501C076}" type="datetimeFigureOut">
               <a:rPr lang="en-US" smtClean="0"/>
-              <a:t>9/13/2021</a:t>
+              <a:t>9/15/2021</a:t>
             </a:fld>
             <a:endParaRPr lang="en-US"/>
           </a:p>
@@ -7956,7 +7957,7 @@
           <a:p>
             <a:fld id="{E82AF7A9-B7DD-4441-9529-7051C501C076}" type="datetimeFigureOut">
               <a:rPr lang="en-US" smtClean="0"/>
-              <a:t>9/13/2021</a:t>
+              <a:t>9/15/2021</a:t>
             </a:fld>
             <a:endParaRPr lang="en-US"/>
           </a:p>
@@ -8267,7 +8268,7 @@
           <a:p>
             <a:fld id="{E82AF7A9-B7DD-4441-9529-7051C501C076}" type="datetimeFigureOut">
               <a:rPr lang="en-US" smtClean="0"/>
-              <a:t>9/13/2021</a:t>
+              <a:t>9/15/2021</a:t>
             </a:fld>
             <a:endParaRPr lang="en-US"/>
           </a:p>
@@ -8555,7 +8556,7 @@
           <a:p>
             <a:fld id="{E82AF7A9-B7DD-4441-9529-7051C501C076}" type="datetimeFigureOut">
               <a:rPr lang="en-US" smtClean="0"/>
-              <a:t>9/13/2021</a:t>
+              <a:t>9/15/2021</a:t>
             </a:fld>
             <a:endParaRPr lang="en-US"/>
           </a:p>
@@ -8796,7 +8797,7 @@
           <a:p>
             <a:fld id="{E82AF7A9-B7DD-4441-9529-7051C501C076}" type="datetimeFigureOut">
               <a:rPr lang="en-US" smtClean="0"/>
-              <a:t>9/13/2021</a:t>
+              <a:t>9/15/2021</a:t>
             </a:fld>
             <a:endParaRPr lang="en-US"/>
           </a:p>
@@ -12750,6 +12751,827 @@
     <p:extLst>
       <p:ext uri="{BB962C8B-B14F-4D97-AF65-F5344CB8AC3E}">
         <p14:creationId xmlns:p14="http://schemas.microsoft.com/office/powerpoint/2010/main" val="2665398751"/>
+      </p:ext>
+    </p:extLst>
+  </p:cSld>
+  <p:clrMapOvr>
+    <a:masterClrMapping/>
+  </p:clrMapOvr>
+</p:sld>
+</file>
+
+<file path=ppt/slides/slide10.xml><?xml version="1.0" encoding="utf-8"?>
+<p:sld xmlns:a="http://schemas.openxmlformats.org/drawingml/2006/main" xmlns:r="http://schemas.openxmlformats.org/officeDocument/2006/relationships" xmlns:p="http://schemas.openxmlformats.org/presentationml/2006/main">
+  <p:cSld>
+    <p:spTree>
+      <p:nvGrpSpPr>
+        <p:cNvPr id="1" name=""/>
+        <p:cNvGrpSpPr/>
+        <p:nvPr/>
+      </p:nvGrpSpPr>
+      <p:grpSpPr>
+        <a:xfrm>
+          <a:off x="0" y="0"/>
+          <a:ext cx="0" cy="0"/>
+          <a:chOff x="0" y="0"/>
+          <a:chExt cx="0" cy="0"/>
+        </a:xfrm>
+      </p:grpSpPr>
+      <p:sp>
+        <p:nvSpPr>
+          <p:cNvPr id="11" name="TextBox 10">
+            <a:extLst>
+              <a:ext uri="{FF2B5EF4-FFF2-40B4-BE49-F238E27FC236}">
+                <a16:creationId xmlns:a16="http://schemas.microsoft.com/office/drawing/2014/main" id="{9E7F7633-E89C-4D59-81AE-60198AAB2032}"/>
+              </a:ext>
+            </a:extLst>
+          </p:cNvPr>
+          <p:cNvSpPr txBox="1"/>
+          <p:nvPr/>
+        </p:nvSpPr>
+        <p:spPr>
+          <a:xfrm>
+            <a:off x="1961003" y="1116958"/>
+            <a:ext cx="2384234" cy="523220"/>
+          </a:xfrm>
+          <a:prstGeom prst="rect">
+            <a:avLst/>
+          </a:prstGeom>
+          <a:noFill/>
+        </p:spPr>
+        <p:txBody>
+          <a:bodyPr wrap="square" rtlCol="0">
+            <a:spAutoFit/>
+          </a:bodyPr>
+          <a:lstStyle/>
+          <a:p>
+            <a:pPr algn="ctr"/>
+            <a:r>
+              <a:rPr lang="en-US" sz="2800" dirty="0"/>
+              <a:t>Base year</a:t>
+            </a:r>
+          </a:p>
+        </p:txBody>
+      </p:sp>
+      <p:sp>
+        <p:nvSpPr>
+          <p:cNvPr id="12" name="TextBox 11">
+            <a:extLst>
+              <a:ext uri="{FF2B5EF4-FFF2-40B4-BE49-F238E27FC236}">
+                <a16:creationId xmlns:a16="http://schemas.microsoft.com/office/drawing/2014/main" id="{A07CC0E2-1079-47AC-AF4F-C1315624B1F7}"/>
+              </a:ext>
+            </a:extLst>
+          </p:cNvPr>
+          <p:cNvSpPr txBox="1"/>
+          <p:nvPr/>
+        </p:nvSpPr>
+        <p:spPr>
+          <a:xfrm>
+            <a:off x="4611477" y="685572"/>
+            <a:ext cx="2846942" cy="954107"/>
+          </a:xfrm>
+          <a:prstGeom prst="rect">
+            <a:avLst/>
+          </a:prstGeom>
+          <a:noFill/>
+        </p:spPr>
+        <p:txBody>
+          <a:bodyPr wrap="square" rtlCol="0">
+            <a:spAutoFit/>
+          </a:bodyPr>
+          <a:lstStyle/>
+          <a:p>
+            <a:pPr algn="ctr"/>
+            <a:r>
+              <a:rPr lang="en-US" sz="2800" dirty="0"/>
+              <a:t>Analysis start year (analysis year 1)</a:t>
+            </a:r>
+          </a:p>
+        </p:txBody>
+      </p:sp>
+      <p:sp>
+        <p:nvSpPr>
+          <p:cNvPr id="13" name="TextBox 12">
+            <a:extLst>
+              <a:ext uri="{FF2B5EF4-FFF2-40B4-BE49-F238E27FC236}">
+                <a16:creationId xmlns:a16="http://schemas.microsoft.com/office/drawing/2014/main" id="{93E4E1F1-3F03-4657-9ADF-FD49DB8C444D}"/>
+              </a:ext>
+            </a:extLst>
+          </p:cNvPr>
+          <p:cNvSpPr txBox="1"/>
+          <p:nvPr/>
+        </p:nvSpPr>
+        <p:spPr>
+          <a:xfrm>
+            <a:off x="7760447" y="1107275"/>
+            <a:ext cx="2370468" cy="523220"/>
+          </a:xfrm>
+          <a:prstGeom prst="rect">
+            <a:avLst/>
+          </a:prstGeom>
+          <a:noFill/>
+        </p:spPr>
+        <p:txBody>
+          <a:bodyPr wrap="square" rtlCol="0">
+            <a:spAutoFit/>
+          </a:bodyPr>
+          <a:lstStyle/>
+          <a:p>
+            <a:pPr algn="ctr"/>
+            <a:r>
+              <a:rPr lang="en-US" sz="2800" dirty="0"/>
+              <a:t>Analysis year 2</a:t>
+            </a:r>
+          </a:p>
+        </p:txBody>
+      </p:sp>
+      <p:sp>
+        <p:nvSpPr>
+          <p:cNvPr id="14" name="TextBox 13">
+            <a:extLst>
+              <a:ext uri="{FF2B5EF4-FFF2-40B4-BE49-F238E27FC236}">
+                <a16:creationId xmlns:a16="http://schemas.microsoft.com/office/drawing/2014/main" id="{39850623-B2CA-46EE-86A5-7761C0CD728A}"/>
+              </a:ext>
+            </a:extLst>
+          </p:cNvPr>
+          <p:cNvSpPr txBox="1"/>
+          <p:nvPr/>
+        </p:nvSpPr>
+        <p:spPr>
+          <a:xfrm>
+            <a:off x="1961003" y="2930869"/>
+            <a:ext cx="2342922" cy="954107"/>
+          </a:xfrm>
+          <a:prstGeom prst="rect">
+            <a:avLst/>
+          </a:prstGeom>
+          <a:noFill/>
+        </p:spPr>
+        <p:txBody>
+          <a:bodyPr wrap="square" rtlCol="0">
+            <a:spAutoFit/>
+          </a:bodyPr>
+          <a:lstStyle/>
+          <a:p>
+            <a:pPr algn="ctr"/>
+            <a:r>
+              <a:rPr lang="en-US" sz="2800" dirty="0"/>
+              <a:t>Base year stock</a:t>
+            </a:r>
+          </a:p>
+        </p:txBody>
+      </p:sp>
+      <p:sp>
+        <p:nvSpPr>
+          <p:cNvPr id="15" name="TextBox 14">
+            <a:extLst>
+              <a:ext uri="{FF2B5EF4-FFF2-40B4-BE49-F238E27FC236}">
+                <a16:creationId xmlns:a16="http://schemas.microsoft.com/office/drawing/2014/main" id="{13169EBB-44BD-4B90-BFB3-F149A5300580}"/>
+              </a:ext>
+            </a:extLst>
+          </p:cNvPr>
+          <p:cNvSpPr txBox="1"/>
+          <p:nvPr/>
+        </p:nvSpPr>
+        <p:spPr>
+          <a:xfrm>
+            <a:off x="4874961" y="1661175"/>
+            <a:ext cx="2370468" cy="1384995"/>
+          </a:xfrm>
+          <a:prstGeom prst="rect">
+            <a:avLst/>
+          </a:prstGeom>
+          <a:noFill/>
+        </p:spPr>
+        <p:txBody>
+          <a:bodyPr wrap="square" rtlCol="0">
+            <a:spAutoFit/>
+          </a:bodyPr>
+          <a:lstStyle/>
+          <a:p>
+            <a:pPr algn="ctr"/>
+            <a:r>
+              <a:rPr lang="en-US" sz="2800" dirty="0"/>
+              <a:t>Reregistered base year stock</a:t>
+            </a:r>
+          </a:p>
+        </p:txBody>
+      </p:sp>
+      <p:sp>
+        <p:nvSpPr>
+          <p:cNvPr id="16" name="TextBox 15">
+            <a:extLst>
+              <a:ext uri="{FF2B5EF4-FFF2-40B4-BE49-F238E27FC236}">
+                <a16:creationId xmlns:a16="http://schemas.microsoft.com/office/drawing/2014/main" id="{D2EB3EB6-AFC8-428A-BCBB-F455BEF63EFA}"/>
+              </a:ext>
+            </a:extLst>
+          </p:cNvPr>
+          <p:cNvSpPr txBox="1"/>
+          <p:nvPr/>
+        </p:nvSpPr>
+        <p:spPr>
+          <a:xfrm>
+            <a:off x="4863948" y="3484438"/>
+            <a:ext cx="2370469" cy="1815882"/>
+          </a:xfrm>
+          <a:prstGeom prst="rect">
+            <a:avLst/>
+          </a:prstGeom>
+          <a:noFill/>
+        </p:spPr>
+        <p:txBody>
+          <a:bodyPr wrap="square" rtlCol="0">
+            <a:spAutoFit/>
+          </a:bodyPr>
+          <a:lstStyle/>
+          <a:p>
+            <a:pPr algn="ctr"/>
+            <a:r>
+              <a:rPr lang="en-US" sz="2800" dirty="0"/>
+              <a:t>New vehicle sales modeled in the analysis start year</a:t>
+            </a:r>
+          </a:p>
+        </p:txBody>
+      </p:sp>
+      <p:sp>
+        <p:nvSpPr>
+          <p:cNvPr id="17" name="TextBox 16">
+            <a:extLst>
+              <a:ext uri="{FF2B5EF4-FFF2-40B4-BE49-F238E27FC236}">
+                <a16:creationId xmlns:a16="http://schemas.microsoft.com/office/drawing/2014/main" id="{1E81F8AD-5FA1-4789-ABED-7E7E9280043E}"/>
+              </a:ext>
+            </a:extLst>
+          </p:cNvPr>
+          <p:cNvSpPr txBox="1"/>
+          <p:nvPr/>
+        </p:nvSpPr>
+        <p:spPr>
+          <a:xfrm>
+            <a:off x="4873127" y="5495326"/>
+            <a:ext cx="2405343" cy="523220"/>
+          </a:xfrm>
+          <a:prstGeom prst="rect">
+            <a:avLst/>
+          </a:prstGeom>
+          <a:noFill/>
+        </p:spPr>
+        <p:txBody>
+          <a:bodyPr wrap="square" rtlCol="0">
+            <a:spAutoFit/>
+          </a:bodyPr>
+          <a:lstStyle/>
+          <a:p>
+            <a:pPr algn="ctr"/>
+            <a:r>
+              <a:rPr lang="en-US" sz="2800" dirty="0"/>
+              <a:t>Year 1 stock</a:t>
+            </a:r>
+          </a:p>
+        </p:txBody>
+      </p:sp>
+      <p:sp>
+        <p:nvSpPr>
+          <p:cNvPr id="19" name="TextBox 18">
+            <a:extLst>
+              <a:ext uri="{FF2B5EF4-FFF2-40B4-BE49-F238E27FC236}">
+                <a16:creationId xmlns:a16="http://schemas.microsoft.com/office/drawing/2014/main" id="{815B0353-2FD3-4F2B-9302-AA2D4A97C7EA}"/>
+              </a:ext>
+            </a:extLst>
+          </p:cNvPr>
+          <p:cNvSpPr txBox="1"/>
+          <p:nvPr/>
+        </p:nvSpPr>
+        <p:spPr>
+          <a:xfrm>
+            <a:off x="4871295" y="2963537"/>
+            <a:ext cx="2405342" cy="523220"/>
+          </a:xfrm>
+          <a:prstGeom prst="rect">
+            <a:avLst/>
+          </a:prstGeom>
+          <a:noFill/>
+        </p:spPr>
+        <p:txBody>
+          <a:bodyPr wrap="square" rtlCol="0">
+            <a:spAutoFit/>
+          </a:bodyPr>
+          <a:lstStyle/>
+          <a:p>
+            <a:pPr algn="ctr"/>
+            <a:r>
+              <a:rPr lang="en-US" sz="2800" dirty="0"/>
+              <a:t>+</a:t>
+            </a:r>
+          </a:p>
+        </p:txBody>
+      </p:sp>
+      <p:sp>
+        <p:nvSpPr>
+          <p:cNvPr id="20" name="TextBox 19">
+            <a:extLst>
+              <a:ext uri="{FF2B5EF4-FFF2-40B4-BE49-F238E27FC236}">
+                <a16:creationId xmlns:a16="http://schemas.microsoft.com/office/drawing/2014/main" id="{FFE19DD6-F4C3-4EFE-BC6B-A1838E785629}"/>
+              </a:ext>
+            </a:extLst>
+          </p:cNvPr>
+          <p:cNvSpPr txBox="1"/>
+          <p:nvPr/>
+        </p:nvSpPr>
+        <p:spPr>
+          <a:xfrm>
+            <a:off x="7783416" y="1680495"/>
+            <a:ext cx="2370469" cy="954107"/>
+          </a:xfrm>
+          <a:prstGeom prst="rect">
+            <a:avLst/>
+          </a:prstGeom>
+          <a:noFill/>
+        </p:spPr>
+        <p:txBody>
+          <a:bodyPr wrap="square" rtlCol="0">
+            <a:spAutoFit/>
+          </a:bodyPr>
+          <a:lstStyle/>
+          <a:p>
+            <a:pPr algn="ctr"/>
+            <a:r>
+              <a:rPr lang="en-US" sz="2800" dirty="0"/>
+              <a:t>Reregistered year 1 stock</a:t>
+            </a:r>
+          </a:p>
+        </p:txBody>
+      </p:sp>
+      <p:sp>
+        <p:nvSpPr>
+          <p:cNvPr id="21" name="TextBox 20">
+            <a:extLst>
+              <a:ext uri="{FF2B5EF4-FFF2-40B4-BE49-F238E27FC236}">
+                <a16:creationId xmlns:a16="http://schemas.microsoft.com/office/drawing/2014/main" id="{BF5D662B-D058-4D5B-ACA4-636350D2E1F0}"/>
+              </a:ext>
+            </a:extLst>
+          </p:cNvPr>
+          <p:cNvSpPr txBox="1"/>
+          <p:nvPr/>
+        </p:nvSpPr>
+        <p:spPr>
+          <a:xfrm>
+            <a:off x="7783416" y="3507789"/>
+            <a:ext cx="2370468" cy="1815882"/>
+          </a:xfrm>
+          <a:prstGeom prst="rect">
+            <a:avLst/>
+          </a:prstGeom>
+          <a:noFill/>
+        </p:spPr>
+        <p:txBody>
+          <a:bodyPr wrap="square" rtlCol="0">
+            <a:spAutoFit/>
+          </a:bodyPr>
+          <a:lstStyle/>
+          <a:p>
+            <a:pPr algn="ctr"/>
+            <a:r>
+              <a:rPr lang="en-US" sz="2800" dirty="0"/>
+              <a:t>New vehicle sales modeled in analysis year 2</a:t>
+            </a:r>
+          </a:p>
+        </p:txBody>
+      </p:sp>
+      <p:sp>
+        <p:nvSpPr>
+          <p:cNvPr id="22" name="TextBox 21">
+            <a:extLst>
+              <a:ext uri="{FF2B5EF4-FFF2-40B4-BE49-F238E27FC236}">
+                <a16:creationId xmlns:a16="http://schemas.microsoft.com/office/drawing/2014/main" id="{51A54E89-F3C8-4937-B35C-E093F4050296}"/>
+              </a:ext>
+            </a:extLst>
+          </p:cNvPr>
+          <p:cNvSpPr txBox="1"/>
+          <p:nvPr/>
+        </p:nvSpPr>
+        <p:spPr>
+          <a:xfrm>
+            <a:off x="7774242" y="5480897"/>
+            <a:ext cx="2370469" cy="523220"/>
+          </a:xfrm>
+          <a:prstGeom prst="rect">
+            <a:avLst/>
+          </a:prstGeom>
+          <a:noFill/>
+        </p:spPr>
+        <p:txBody>
+          <a:bodyPr wrap="square" rtlCol="0">
+            <a:spAutoFit/>
+          </a:bodyPr>
+          <a:lstStyle/>
+          <a:p>
+            <a:pPr algn="ctr"/>
+            <a:r>
+              <a:rPr lang="en-US" sz="2800" dirty="0"/>
+              <a:t>Year 2 stock</a:t>
+            </a:r>
+          </a:p>
+        </p:txBody>
+      </p:sp>
+      <p:sp>
+        <p:nvSpPr>
+          <p:cNvPr id="24" name="TextBox 23">
+            <a:extLst>
+              <a:ext uri="{FF2B5EF4-FFF2-40B4-BE49-F238E27FC236}">
+                <a16:creationId xmlns:a16="http://schemas.microsoft.com/office/drawing/2014/main" id="{CF8E6A78-BB2F-4D07-AF99-7BC8EDAEC1AF}"/>
+              </a:ext>
+            </a:extLst>
+          </p:cNvPr>
+          <p:cNvSpPr txBox="1"/>
+          <p:nvPr/>
+        </p:nvSpPr>
+        <p:spPr>
+          <a:xfrm>
+            <a:off x="7772399" y="2940343"/>
+            <a:ext cx="2370468" cy="523220"/>
+          </a:xfrm>
+          <a:prstGeom prst="rect">
+            <a:avLst/>
+          </a:prstGeom>
+          <a:noFill/>
+        </p:spPr>
+        <p:txBody>
+          <a:bodyPr wrap="square" rtlCol="0">
+            <a:spAutoFit/>
+          </a:bodyPr>
+          <a:lstStyle/>
+          <a:p>
+            <a:pPr algn="ctr"/>
+            <a:r>
+              <a:rPr lang="en-US" sz="2800" dirty="0"/>
+              <a:t>+</a:t>
+            </a:r>
+          </a:p>
+        </p:txBody>
+      </p:sp>
+      <p:cxnSp>
+        <p:nvCxnSpPr>
+          <p:cNvPr id="26" name="Straight Arrow Connector 25">
+            <a:extLst>
+              <a:ext uri="{FF2B5EF4-FFF2-40B4-BE49-F238E27FC236}">
+                <a16:creationId xmlns:a16="http://schemas.microsoft.com/office/drawing/2014/main" id="{040D0784-80BF-4D7B-80F5-BCDE4D278BFD}"/>
+              </a:ext>
+            </a:extLst>
+          </p:cNvPr>
+          <p:cNvCxnSpPr/>
+          <p:nvPr/>
+        </p:nvCxnSpPr>
+        <p:spPr>
+          <a:xfrm>
+            <a:off x="4201098" y="3201953"/>
+            <a:ext cx="649995" cy="0"/>
+          </a:xfrm>
+          <a:prstGeom prst="straightConnector1">
+            <a:avLst/>
+          </a:prstGeom>
+          <a:ln w="57150">
+            <a:solidFill>
+              <a:schemeClr val="tx1"/>
+            </a:solidFill>
+            <a:tailEnd type="triangle"/>
+          </a:ln>
+        </p:spPr>
+        <p:style>
+          <a:lnRef idx="1">
+            <a:schemeClr val="accent1"/>
+          </a:lnRef>
+          <a:fillRef idx="0">
+            <a:schemeClr val="accent1"/>
+          </a:fillRef>
+          <a:effectRef idx="0">
+            <a:schemeClr val="accent1"/>
+          </a:effectRef>
+          <a:fontRef idx="minor">
+            <a:schemeClr val="tx1"/>
+          </a:fontRef>
+        </p:style>
+      </p:cxnSp>
+      <p:cxnSp>
+        <p:nvCxnSpPr>
+          <p:cNvPr id="27" name="Straight Arrow Connector 26">
+            <a:extLst>
+              <a:ext uri="{FF2B5EF4-FFF2-40B4-BE49-F238E27FC236}">
+                <a16:creationId xmlns:a16="http://schemas.microsoft.com/office/drawing/2014/main" id="{E4E465CB-E625-46DC-B8AD-33B8B25376A7}"/>
+              </a:ext>
+            </a:extLst>
+          </p:cNvPr>
+          <p:cNvCxnSpPr/>
+          <p:nvPr/>
+        </p:nvCxnSpPr>
+        <p:spPr>
+          <a:xfrm>
+            <a:off x="7100370" y="3222151"/>
+            <a:ext cx="649995" cy="0"/>
+          </a:xfrm>
+          <a:prstGeom prst="straightConnector1">
+            <a:avLst/>
+          </a:prstGeom>
+          <a:ln w="57150">
+            <a:solidFill>
+              <a:schemeClr val="tx1"/>
+            </a:solidFill>
+            <a:tailEnd type="triangle"/>
+          </a:ln>
+        </p:spPr>
+        <p:style>
+          <a:lnRef idx="1">
+            <a:schemeClr val="accent1"/>
+          </a:lnRef>
+          <a:fillRef idx="0">
+            <a:schemeClr val="accent1"/>
+          </a:fillRef>
+          <a:effectRef idx="0">
+            <a:schemeClr val="accent1"/>
+          </a:effectRef>
+          <a:fontRef idx="minor">
+            <a:schemeClr val="tx1"/>
+          </a:fontRef>
+        </p:style>
+      </p:cxnSp>
+      <p:cxnSp>
+        <p:nvCxnSpPr>
+          <p:cNvPr id="28" name="Straight Arrow Connector 27">
+            <a:extLst>
+              <a:ext uri="{FF2B5EF4-FFF2-40B4-BE49-F238E27FC236}">
+                <a16:creationId xmlns:a16="http://schemas.microsoft.com/office/drawing/2014/main" id="{F2ABEB31-A666-4503-9C2E-DE1FC9F13409}"/>
+              </a:ext>
+            </a:extLst>
+          </p:cNvPr>
+          <p:cNvCxnSpPr/>
+          <p:nvPr/>
+        </p:nvCxnSpPr>
+        <p:spPr>
+          <a:xfrm>
+            <a:off x="9979445" y="3201953"/>
+            <a:ext cx="649995" cy="0"/>
+          </a:xfrm>
+          <a:prstGeom prst="straightConnector1">
+            <a:avLst/>
+          </a:prstGeom>
+          <a:ln w="57150">
+            <a:solidFill>
+              <a:schemeClr val="tx1"/>
+            </a:solidFill>
+            <a:tailEnd type="triangle"/>
+          </a:ln>
+        </p:spPr>
+        <p:style>
+          <a:lnRef idx="1">
+            <a:schemeClr val="accent1"/>
+          </a:lnRef>
+          <a:fillRef idx="0">
+            <a:schemeClr val="accent1"/>
+          </a:fillRef>
+          <a:effectRef idx="0">
+            <a:schemeClr val="accent1"/>
+          </a:effectRef>
+          <a:fontRef idx="minor">
+            <a:schemeClr val="tx1"/>
+          </a:fontRef>
+        </p:style>
+      </p:cxnSp>
+      <p:sp>
+        <p:nvSpPr>
+          <p:cNvPr id="31" name="Rectangle 30">
+            <a:extLst>
+              <a:ext uri="{FF2B5EF4-FFF2-40B4-BE49-F238E27FC236}">
+                <a16:creationId xmlns:a16="http://schemas.microsoft.com/office/drawing/2014/main" id="{E7E23904-F95B-46C4-AED5-FEC5DD87ECF8}"/>
+              </a:ext>
+            </a:extLst>
+          </p:cNvPr>
+          <p:cNvSpPr/>
+          <p:nvPr/>
+        </p:nvSpPr>
+        <p:spPr>
+          <a:xfrm>
+            <a:off x="1961002" y="1663546"/>
+            <a:ext cx="2370468" cy="3800815"/>
+          </a:xfrm>
+          <a:prstGeom prst="rect">
+            <a:avLst/>
+          </a:prstGeom>
+          <a:noFill/>
+          <a:ln w="38100">
+            <a:solidFill>
+              <a:schemeClr val="accent2">
+                <a:lumMod val="75000"/>
+              </a:schemeClr>
+            </a:solidFill>
+          </a:ln>
+        </p:spPr>
+        <p:style>
+          <a:lnRef idx="2">
+            <a:schemeClr val="accent1">
+              <a:shade val="50000"/>
+            </a:schemeClr>
+          </a:lnRef>
+          <a:fillRef idx="1">
+            <a:schemeClr val="accent1"/>
+          </a:fillRef>
+          <a:effectRef idx="0">
+            <a:schemeClr val="accent1"/>
+          </a:effectRef>
+          <a:fontRef idx="minor">
+            <a:schemeClr val="lt1"/>
+          </a:fontRef>
+        </p:style>
+        <p:txBody>
+          <a:bodyPr rtlCol="0" anchor="ctr"/>
+          <a:lstStyle/>
+          <a:p>
+            <a:pPr algn="ctr"/>
+            <a:endParaRPr lang="en-US"/>
+          </a:p>
+        </p:txBody>
+      </p:sp>
+      <p:sp>
+        <p:nvSpPr>
+          <p:cNvPr id="32" name="Rectangle 31">
+            <a:extLst>
+              <a:ext uri="{FF2B5EF4-FFF2-40B4-BE49-F238E27FC236}">
+                <a16:creationId xmlns:a16="http://schemas.microsoft.com/office/drawing/2014/main" id="{DED77A87-5983-43EF-94A3-72A3DE8E2800}"/>
+              </a:ext>
+            </a:extLst>
+          </p:cNvPr>
+          <p:cNvSpPr/>
+          <p:nvPr/>
+        </p:nvSpPr>
+        <p:spPr>
+          <a:xfrm>
+            <a:off x="4874961" y="1663546"/>
+            <a:ext cx="2370468" cy="3813414"/>
+          </a:xfrm>
+          <a:prstGeom prst="rect">
+            <a:avLst/>
+          </a:prstGeom>
+          <a:noFill/>
+          <a:ln w="38100">
+            <a:solidFill>
+              <a:schemeClr val="accent2">
+                <a:lumMod val="75000"/>
+              </a:schemeClr>
+            </a:solidFill>
+          </a:ln>
+        </p:spPr>
+        <p:style>
+          <a:lnRef idx="2">
+            <a:schemeClr val="accent1">
+              <a:shade val="50000"/>
+            </a:schemeClr>
+          </a:lnRef>
+          <a:fillRef idx="1">
+            <a:schemeClr val="accent1"/>
+          </a:fillRef>
+          <a:effectRef idx="0">
+            <a:schemeClr val="accent1"/>
+          </a:effectRef>
+          <a:fontRef idx="minor">
+            <a:schemeClr val="lt1"/>
+          </a:fontRef>
+        </p:style>
+        <p:txBody>
+          <a:bodyPr rtlCol="0" anchor="ctr"/>
+          <a:lstStyle/>
+          <a:p>
+            <a:pPr algn="ctr"/>
+            <a:endParaRPr lang="en-US"/>
+          </a:p>
+        </p:txBody>
+      </p:sp>
+      <p:sp>
+        <p:nvSpPr>
+          <p:cNvPr id="33" name="Rectangle 32">
+            <a:extLst>
+              <a:ext uri="{FF2B5EF4-FFF2-40B4-BE49-F238E27FC236}">
+                <a16:creationId xmlns:a16="http://schemas.microsoft.com/office/drawing/2014/main" id="{8FF03FAD-E366-4EC9-90EB-DB64BC082B02}"/>
+              </a:ext>
+            </a:extLst>
+          </p:cNvPr>
+          <p:cNvSpPr/>
+          <p:nvPr/>
+        </p:nvSpPr>
+        <p:spPr>
+          <a:xfrm>
+            <a:off x="7774243" y="1650945"/>
+            <a:ext cx="2370468" cy="3813415"/>
+          </a:xfrm>
+          <a:prstGeom prst="rect">
+            <a:avLst/>
+          </a:prstGeom>
+          <a:noFill/>
+          <a:ln w="38100">
+            <a:solidFill>
+              <a:schemeClr val="accent2">
+                <a:lumMod val="75000"/>
+              </a:schemeClr>
+            </a:solidFill>
+          </a:ln>
+        </p:spPr>
+        <p:style>
+          <a:lnRef idx="2">
+            <a:schemeClr val="accent1">
+              <a:shade val="50000"/>
+            </a:schemeClr>
+          </a:lnRef>
+          <a:fillRef idx="1">
+            <a:schemeClr val="accent1"/>
+          </a:fillRef>
+          <a:effectRef idx="0">
+            <a:schemeClr val="accent1"/>
+          </a:effectRef>
+          <a:fontRef idx="minor">
+            <a:schemeClr val="lt1"/>
+          </a:fontRef>
+        </p:style>
+        <p:txBody>
+          <a:bodyPr rtlCol="0" anchor="ctr"/>
+          <a:lstStyle/>
+          <a:p>
+            <a:pPr algn="ctr"/>
+            <a:endParaRPr lang="en-US"/>
+          </a:p>
+        </p:txBody>
+      </p:sp>
+      <p:sp>
+        <p:nvSpPr>
+          <p:cNvPr id="34" name="TextBox 33">
+            <a:extLst>
+              <a:ext uri="{FF2B5EF4-FFF2-40B4-BE49-F238E27FC236}">
+                <a16:creationId xmlns:a16="http://schemas.microsoft.com/office/drawing/2014/main" id="{D42F32E4-6951-4C46-A49D-B1A129DB1543}"/>
+              </a:ext>
+            </a:extLst>
+          </p:cNvPr>
+          <p:cNvSpPr txBox="1"/>
+          <p:nvPr/>
+        </p:nvSpPr>
+        <p:spPr>
+          <a:xfrm>
+            <a:off x="1939893" y="5452202"/>
+            <a:ext cx="2405344" cy="523220"/>
+          </a:xfrm>
+          <a:prstGeom prst="rect">
+            <a:avLst/>
+          </a:prstGeom>
+          <a:noFill/>
+        </p:spPr>
+        <p:txBody>
+          <a:bodyPr wrap="square" rtlCol="0">
+            <a:spAutoFit/>
+          </a:bodyPr>
+          <a:lstStyle/>
+          <a:p>
+            <a:pPr algn="ctr"/>
+            <a:r>
+              <a:rPr lang="en-US" sz="2800" dirty="0"/>
+              <a:t>Base year stock</a:t>
+            </a:r>
+          </a:p>
+        </p:txBody>
+      </p:sp>
+      <p:sp>
+        <p:nvSpPr>
+          <p:cNvPr id="36" name="TextBox 35">
+            <a:extLst>
+              <a:ext uri="{FF2B5EF4-FFF2-40B4-BE49-F238E27FC236}">
+                <a16:creationId xmlns:a16="http://schemas.microsoft.com/office/drawing/2014/main" id="{EC5EC1F3-82C8-41A0-AF88-31EC84078EA4}"/>
+              </a:ext>
+            </a:extLst>
+          </p:cNvPr>
+          <p:cNvSpPr txBox="1"/>
+          <p:nvPr/>
+        </p:nvSpPr>
+        <p:spPr>
+          <a:xfrm>
+            <a:off x="10708394" y="2655444"/>
+            <a:ext cx="649995" cy="830997"/>
+          </a:xfrm>
+          <a:prstGeom prst="rect">
+            <a:avLst/>
+          </a:prstGeom>
+          <a:noFill/>
+        </p:spPr>
+        <p:txBody>
+          <a:bodyPr wrap="square" rtlCol="0">
+            <a:spAutoFit/>
+          </a:bodyPr>
+          <a:lstStyle/>
+          <a:p>
+            <a:r>
+              <a:rPr lang="en-US" sz="4800" b="1" dirty="0"/>
+              <a:t>…</a:t>
+            </a:r>
+          </a:p>
+        </p:txBody>
+      </p:sp>
+    </p:spTree>
+    <p:extLst>
+      <p:ext uri="{BB962C8B-B14F-4D97-AF65-F5344CB8AC3E}">
+        <p14:creationId xmlns:p14="http://schemas.microsoft.com/office/powerpoint/2010/main" val="1842570982"/>
       </p:ext>
     </p:extLst>
   </p:cSld>
@@ -19711,7 +20533,7 @@
                   <a:schemeClr val="tx1"/>
                 </a:solidFill>
               </a:rPr>
-              <a:t>New Vehicle Sales </a:t>
+              <a:t>New Vehicle Sales Volume </a:t>
             </a:r>
           </a:p>
         </p:txBody>

</xml_diff>